<commit_message>
Update annotation in results figures
</commit_message>
<xml_diff>
--- a/poster/20190915_ds_phd_Europin_KinSimStructure.pptx
+++ b/poster/20190915_ds_phd_Europin_KinSimStructure.pptx
@@ -53,7 +53,7 @@
       </p:grpSpPr>
       <p:sp>
         <p:nvSpPr>
-          <p:cNvPr id="23" name="PlaceHolder 1"/>
+          <p:cNvPr id="21" name="PlaceHolder 1"/>
           <p:cNvSpPr>
             <a:spLocks noGrp="1"/>
           </p:cNvSpPr>
@@ -64,7 +64,7 @@
         <p:spPr>
           <a:xfrm>
             <a:off x="1513440" y="1707480"/>
-            <a:ext cx="27246960" cy="7147080"/>
+            <a:ext cx="27247320" cy="7147440"/>
           </a:xfrm>
           <a:prstGeom prst="rect">
             <a:avLst/>
@@ -90,7 +90,7 @@
       </p:sp>
       <p:sp>
         <p:nvSpPr>
-          <p:cNvPr id="24" name="PlaceHolder 2"/>
+          <p:cNvPr id="22" name="PlaceHolder 2"/>
           <p:cNvSpPr>
             <a:spLocks noGrp="1"/>
           </p:cNvSpPr>
@@ -126,7 +126,7 @@
       </p:sp>
       <p:sp>
         <p:nvSpPr>
-          <p:cNvPr id="25" name="PlaceHolder 3"/>
+          <p:cNvPr id="23" name="PlaceHolder 3"/>
           <p:cNvSpPr>
             <a:spLocks noGrp="1"/>
           </p:cNvSpPr>
@@ -184,7 +184,7 @@
       </p:grpSpPr>
       <p:sp>
         <p:nvSpPr>
-          <p:cNvPr id="26" name="PlaceHolder 1"/>
+          <p:cNvPr id="24" name="PlaceHolder 1"/>
           <p:cNvSpPr>
             <a:spLocks noGrp="1"/>
           </p:cNvSpPr>
@@ -195,7 +195,7 @@
         <p:spPr>
           <a:xfrm>
             <a:off x="1513440" y="1707480"/>
-            <a:ext cx="27246960" cy="7147080"/>
+            <a:ext cx="27247320" cy="7147440"/>
           </a:xfrm>
           <a:prstGeom prst="rect">
             <a:avLst/>
@@ -221,7 +221,7 @@
       </p:sp>
       <p:sp>
         <p:nvSpPr>
-          <p:cNvPr id="27" name="PlaceHolder 2"/>
+          <p:cNvPr id="25" name="PlaceHolder 2"/>
           <p:cNvSpPr>
             <a:spLocks noGrp="1"/>
           </p:cNvSpPr>
@@ -257,7 +257,7 @@
       </p:sp>
       <p:sp>
         <p:nvSpPr>
-          <p:cNvPr id="28" name="PlaceHolder 3"/>
+          <p:cNvPr id="26" name="PlaceHolder 3"/>
           <p:cNvSpPr>
             <a:spLocks noGrp="1"/>
           </p:cNvSpPr>
@@ -293,7 +293,7 @@
       </p:sp>
       <p:sp>
         <p:nvSpPr>
-          <p:cNvPr id="29" name="PlaceHolder 4"/>
+          <p:cNvPr id="27" name="PlaceHolder 4"/>
           <p:cNvSpPr>
             <a:spLocks noGrp="1"/>
           </p:cNvSpPr>
@@ -329,7 +329,7 @@
       </p:sp>
       <p:sp>
         <p:nvSpPr>
-          <p:cNvPr id="30" name="PlaceHolder 5"/>
+          <p:cNvPr id="28" name="PlaceHolder 5"/>
           <p:cNvSpPr>
             <a:spLocks noGrp="1"/>
           </p:cNvSpPr>
@@ -387,7 +387,7 @@
       </p:grpSpPr>
       <p:sp>
         <p:nvSpPr>
-          <p:cNvPr id="31" name="PlaceHolder 1"/>
+          <p:cNvPr id="29" name="PlaceHolder 1"/>
           <p:cNvSpPr>
             <a:spLocks noGrp="1"/>
           </p:cNvSpPr>
@@ -398,7 +398,7 @@
         <p:spPr>
           <a:xfrm>
             <a:off x="1513440" y="1707480"/>
-            <a:ext cx="27246960" cy="7147080"/>
+            <a:ext cx="27247320" cy="7147440"/>
           </a:xfrm>
           <a:prstGeom prst="rect">
             <a:avLst/>
@@ -424,7 +424,7 @@
       </p:sp>
       <p:sp>
         <p:nvSpPr>
-          <p:cNvPr id="32" name="PlaceHolder 2"/>
+          <p:cNvPr id="30" name="PlaceHolder 2"/>
           <p:cNvSpPr>
             <a:spLocks noGrp="1"/>
           </p:cNvSpPr>
@@ -460,7 +460,7 @@
       </p:sp>
       <p:sp>
         <p:nvSpPr>
-          <p:cNvPr id="33" name="PlaceHolder 3"/>
+          <p:cNvPr id="31" name="PlaceHolder 3"/>
           <p:cNvSpPr>
             <a:spLocks noGrp="1"/>
           </p:cNvSpPr>
@@ -496,7 +496,7 @@
       </p:sp>
       <p:pic>
         <p:nvPicPr>
-          <p:cNvPr id="34" name="" descr=""/>
+          <p:cNvPr id="32" name="" descr=""/>
           <p:cNvPicPr/>
           <p:nvPr/>
         </p:nvPicPr>
@@ -519,7 +519,7 @@
       </p:pic>
       <p:pic>
         <p:nvPicPr>
-          <p:cNvPr id="35" name="" descr=""/>
+          <p:cNvPr id="33" name="" descr=""/>
           <p:cNvPicPr/>
           <p:nvPr/>
         </p:nvPicPr>
@@ -564,7 +564,7 @@
       </p:grpSpPr>
       <p:sp>
         <p:nvSpPr>
-          <p:cNvPr id="2" name="PlaceHolder 1"/>
+          <p:cNvPr id="0" name="PlaceHolder 1"/>
           <p:cNvSpPr>
             <a:spLocks noGrp="1"/>
           </p:cNvSpPr>
@@ -575,7 +575,7 @@
         <p:spPr>
           <a:xfrm>
             <a:off x="1513440" y="1707480"/>
-            <a:ext cx="27246960" cy="7147080"/>
+            <a:ext cx="27247320" cy="7147440"/>
           </a:xfrm>
           <a:prstGeom prst="rect">
             <a:avLst/>
@@ -601,7 +601,7 @@
       </p:sp>
       <p:sp>
         <p:nvSpPr>
-          <p:cNvPr id="3" name="PlaceHolder 2"/>
+          <p:cNvPr id="1" name="PlaceHolder 2"/>
           <p:cNvSpPr>
             <a:spLocks noGrp="1"/>
           </p:cNvSpPr>
@@ -660,7 +660,7 @@
       </p:grpSpPr>
       <p:sp>
         <p:nvSpPr>
-          <p:cNvPr id="4" name="PlaceHolder 1"/>
+          <p:cNvPr id="2" name="PlaceHolder 1"/>
           <p:cNvSpPr>
             <a:spLocks noGrp="1"/>
           </p:cNvSpPr>
@@ -671,7 +671,7 @@
         <p:spPr>
           <a:xfrm>
             <a:off x="1513440" y="1707480"/>
-            <a:ext cx="27246960" cy="7147080"/>
+            <a:ext cx="27247320" cy="7147440"/>
           </a:xfrm>
           <a:prstGeom prst="rect">
             <a:avLst/>
@@ -697,7 +697,7 @@
       </p:sp>
       <p:sp>
         <p:nvSpPr>
-          <p:cNvPr id="5" name="PlaceHolder 2"/>
+          <p:cNvPr id="3" name="PlaceHolder 2"/>
           <p:cNvSpPr>
             <a:spLocks noGrp="1"/>
           </p:cNvSpPr>
@@ -755,7 +755,7 @@
       </p:grpSpPr>
       <p:sp>
         <p:nvSpPr>
-          <p:cNvPr id="6" name="PlaceHolder 1"/>
+          <p:cNvPr id="4" name="PlaceHolder 1"/>
           <p:cNvSpPr>
             <a:spLocks noGrp="1"/>
           </p:cNvSpPr>
@@ -766,7 +766,7 @@
         <p:spPr>
           <a:xfrm>
             <a:off x="1513440" y="1707480"/>
-            <a:ext cx="27246960" cy="7147080"/>
+            <a:ext cx="27247320" cy="7147440"/>
           </a:xfrm>
           <a:prstGeom prst="rect">
             <a:avLst/>
@@ -792,7 +792,7 @@
       </p:sp>
       <p:sp>
         <p:nvSpPr>
-          <p:cNvPr id="7" name="PlaceHolder 2"/>
+          <p:cNvPr id="5" name="PlaceHolder 2"/>
           <p:cNvSpPr>
             <a:spLocks noGrp="1"/>
           </p:cNvSpPr>
@@ -828,7 +828,7 @@
       </p:sp>
       <p:sp>
         <p:nvSpPr>
-          <p:cNvPr id="8" name="PlaceHolder 3"/>
+          <p:cNvPr id="6" name="PlaceHolder 3"/>
           <p:cNvSpPr>
             <a:spLocks noGrp="1"/>
           </p:cNvSpPr>
@@ -886,7 +886,7 @@
       </p:grpSpPr>
       <p:sp>
         <p:nvSpPr>
-          <p:cNvPr id="9" name="PlaceHolder 1"/>
+          <p:cNvPr id="7" name="PlaceHolder 1"/>
           <p:cNvSpPr>
             <a:spLocks noGrp="1"/>
           </p:cNvSpPr>
@@ -897,7 +897,7 @@
         <p:spPr>
           <a:xfrm>
             <a:off x="1513440" y="1707480"/>
-            <a:ext cx="27246960" cy="7147080"/>
+            <a:ext cx="27247320" cy="7147440"/>
           </a:xfrm>
           <a:prstGeom prst="rect">
             <a:avLst/>
@@ -945,7 +945,7 @@
       </p:grpSpPr>
       <p:sp>
         <p:nvSpPr>
-          <p:cNvPr id="10" name="PlaceHolder 1"/>
+          <p:cNvPr id="8" name="PlaceHolder 1"/>
           <p:cNvSpPr>
             <a:spLocks noGrp="1"/>
           </p:cNvSpPr>
@@ -956,7 +956,7 @@
         <p:spPr>
           <a:xfrm>
             <a:off x="1513440" y="1707480"/>
-            <a:ext cx="27246960" cy="33130800"/>
+            <a:ext cx="27247320" cy="33132600"/>
           </a:xfrm>
           <a:prstGeom prst="rect">
             <a:avLst/>
@@ -1004,7 +1004,7 @@
       </p:grpSpPr>
       <p:sp>
         <p:nvSpPr>
-          <p:cNvPr id="11" name="PlaceHolder 1"/>
+          <p:cNvPr id="9" name="PlaceHolder 1"/>
           <p:cNvSpPr>
             <a:spLocks noGrp="1"/>
           </p:cNvSpPr>
@@ -1015,7 +1015,7 @@
         <p:spPr>
           <a:xfrm>
             <a:off x="1513440" y="1707480"/>
-            <a:ext cx="27246960" cy="7147080"/>
+            <a:ext cx="27247320" cy="7147440"/>
           </a:xfrm>
           <a:prstGeom prst="rect">
             <a:avLst/>
@@ -1041,7 +1041,7 @@
       </p:sp>
       <p:sp>
         <p:nvSpPr>
-          <p:cNvPr id="12" name="PlaceHolder 2"/>
+          <p:cNvPr id="10" name="PlaceHolder 2"/>
           <p:cNvSpPr>
             <a:spLocks noGrp="1"/>
           </p:cNvSpPr>
@@ -1077,7 +1077,7 @@
       </p:sp>
       <p:sp>
         <p:nvSpPr>
-          <p:cNvPr id="13" name="PlaceHolder 3"/>
+          <p:cNvPr id="11" name="PlaceHolder 3"/>
           <p:cNvSpPr>
             <a:spLocks noGrp="1"/>
           </p:cNvSpPr>
@@ -1113,7 +1113,7 @@
       </p:sp>
       <p:sp>
         <p:nvSpPr>
-          <p:cNvPr id="14" name="PlaceHolder 4"/>
+          <p:cNvPr id="12" name="PlaceHolder 4"/>
           <p:cNvSpPr>
             <a:spLocks noGrp="1"/>
           </p:cNvSpPr>
@@ -1171,7 +1171,7 @@
       </p:grpSpPr>
       <p:sp>
         <p:nvSpPr>
-          <p:cNvPr id="15" name="PlaceHolder 1"/>
+          <p:cNvPr id="13" name="PlaceHolder 1"/>
           <p:cNvSpPr>
             <a:spLocks noGrp="1"/>
           </p:cNvSpPr>
@@ -1182,7 +1182,7 @@
         <p:spPr>
           <a:xfrm>
             <a:off x="1513440" y="1707480"/>
-            <a:ext cx="27246960" cy="7147080"/>
+            <a:ext cx="27247320" cy="7147440"/>
           </a:xfrm>
           <a:prstGeom prst="rect">
             <a:avLst/>
@@ -1208,7 +1208,7 @@
       </p:sp>
       <p:sp>
         <p:nvSpPr>
-          <p:cNvPr id="16" name="PlaceHolder 2"/>
+          <p:cNvPr id="14" name="PlaceHolder 2"/>
           <p:cNvSpPr>
             <a:spLocks noGrp="1"/>
           </p:cNvSpPr>
@@ -1244,7 +1244,7 @@
       </p:sp>
       <p:sp>
         <p:nvSpPr>
-          <p:cNvPr id="17" name="PlaceHolder 3"/>
+          <p:cNvPr id="15" name="PlaceHolder 3"/>
           <p:cNvSpPr>
             <a:spLocks noGrp="1"/>
           </p:cNvSpPr>
@@ -1280,7 +1280,7 @@
       </p:sp>
       <p:sp>
         <p:nvSpPr>
-          <p:cNvPr id="18" name="PlaceHolder 4"/>
+          <p:cNvPr id="16" name="PlaceHolder 4"/>
           <p:cNvSpPr>
             <a:spLocks noGrp="1"/>
           </p:cNvSpPr>
@@ -1338,7 +1338,7 @@
       </p:grpSpPr>
       <p:sp>
         <p:nvSpPr>
-          <p:cNvPr id="19" name="PlaceHolder 1"/>
+          <p:cNvPr id="17" name="PlaceHolder 1"/>
           <p:cNvSpPr>
             <a:spLocks noGrp="1"/>
           </p:cNvSpPr>
@@ -1349,7 +1349,7 @@
         <p:spPr>
           <a:xfrm>
             <a:off x="1513440" y="1707480"/>
-            <a:ext cx="27246960" cy="7147080"/>
+            <a:ext cx="27247320" cy="7147440"/>
           </a:xfrm>
           <a:prstGeom prst="rect">
             <a:avLst/>
@@ -1375,7 +1375,7 @@
       </p:sp>
       <p:sp>
         <p:nvSpPr>
-          <p:cNvPr id="20" name="PlaceHolder 2"/>
+          <p:cNvPr id="18" name="PlaceHolder 2"/>
           <p:cNvSpPr>
             <a:spLocks noGrp="1"/>
           </p:cNvSpPr>
@@ -1411,7 +1411,7 @@
       </p:sp>
       <p:sp>
         <p:nvSpPr>
-          <p:cNvPr id="21" name="PlaceHolder 3"/>
+          <p:cNvPr id="19" name="PlaceHolder 3"/>
           <p:cNvSpPr>
             <a:spLocks noGrp="1"/>
           </p:cNvSpPr>
@@ -1447,7 +1447,7 @@
       </p:sp>
       <p:sp>
         <p:nvSpPr>
-          <p:cNvPr id="22" name="PlaceHolder 4"/>
+          <p:cNvPr id="20" name="PlaceHolder 4"/>
           <p:cNvSpPr>
             <a:spLocks noGrp="1"/>
           </p:cNvSpPr>
@@ -1503,311 +1503,6 @@
           <a:chExt cx="0" cy="0"/>
         </a:xfrm>
       </p:grpSpPr>
-      <p:sp>
-        <p:nvSpPr>
-          <p:cNvPr id="0" name="PlaceHolder 1"/>
-          <p:cNvSpPr>
-            <a:spLocks noGrp="1"/>
-          </p:cNvSpPr>
-          <p:nvPr>
-            <p:ph type="title"/>
-          </p:nvPr>
-        </p:nvSpPr>
-        <p:spPr>
-          <a:xfrm>
-            <a:off x="1513440" y="1707480"/>
-            <a:ext cx="27246960" cy="7147080"/>
-          </a:xfrm>
-          <a:prstGeom prst="rect">
-            <a:avLst/>
-          </a:prstGeom>
-        </p:spPr>
-        <p:txBody>
-          <a:bodyPr lIns="0" rIns="0" tIns="0" bIns="0" anchor="ctr"/>
-          <a:p>
-            <a:pPr algn="ctr"/>
-            <a:endParaRPr b="0" lang="en-US" sz="4400" spc="-1" strike="noStrike">
-              <a:solidFill>
-                <a:srgbClr val="000000"/>
-              </a:solidFill>
-              <a:uFill>
-                <a:solidFill>
-                  <a:srgbClr val="ffffff"/>
-                </a:solidFill>
-              </a:uFill>
-              <a:latin typeface="Arial"/>
-            </a:endParaRPr>
-          </a:p>
-        </p:txBody>
-      </p:sp>
-      <p:sp>
-        <p:nvSpPr>
-          <p:cNvPr id="1" name="PlaceHolder 2"/>
-          <p:cNvSpPr>
-            <a:spLocks noGrp="1"/>
-          </p:cNvSpPr>
-          <p:nvPr>
-            <p:ph type="body"/>
-          </p:nvPr>
-        </p:nvSpPr>
-        <p:spPr>
-          <a:xfrm>
-            <a:off x="1513440" y="10015560"/>
-            <a:ext cx="27247320" cy="24824880"/>
-          </a:xfrm>
-          <a:prstGeom prst="rect">
-            <a:avLst/>
-          </a:prstGeom>
-        </p:spPr>
-        <p:txBody>
-          <a:bodyPr lIns="0" rIns="0" tIns="0" bIns="0"/>
-          <a:p>
-            <a:pPr marL="432000" indent="-324000">
-              <a:buClr>
-                <a:srgbClr val="000000"/>
-              </a:buClr>
-              <a:buSzPct val="45000"/>
-              <a:buFont typeface="Wingdings" charset="2"/>
-              <a:buChar char=""/>
-            </a:pPr>
-            <a:r>
-              <a:rPr b="0" lang="en-US" sz="3200" spc="-1" strike="noStrike">
-                <a:solidFill>
-                  <a:srgbClr val="000000"/>
-                </a:solidFill>
-                <a:uFill>
-                  <a:solidFill>
-                    <a:srgbClr val="ffffff"/>
-                  </a:solidFill>
-                </a:uFill>
-                <a:latin typeface="Arial"/>
-              </a:rPr>
-              <a:t>Click to edit the outline text format</a:t>
-            </a:r>
-            <a:endParaRPr b="0" lang="en-US" sz="3200" spc="-1" strike="noStrike">
-              <a:solidFill>
-                <a:srgbClr val="000000"/>
-              </a:solidFill>
-              <a:uFill>
-                <a:solidFill>
-                  <a:srgbClr val="ffffff"/>
-                </a:solidFill>
-              </a:uFill>
-              <a:latin typeface="Arial"/>
-            </a:endParaRPr>
-          </a:p>
-          <a:p>
-            <a:pPr lvl="1" marL="864000" indent="-324000">
-              <a:buClr>
-                <a:srgbClr val="000000"/>
-              </a:buClr>
-              <a:buSzPct val="75000"/>
-              <a:buFont typeface="Symbol" charset="2"/>
-              <a:buChar char=""/>
-            </a:pPr>
-            <a:r>
-              <a:rPr b="0" lang="en-US" sz="2800" spc="-1" strike="noStrike">
-                <a:solidFill>
-                  <a:srgbClr val="000000"/>
-                </a:solidFill>
-                <a:uFill>
-                  <a:solidFill>
-                    <a:srgbClr val="ffffff"/>
-                  </a:solidFill>
-                </a:uFill>
-                <a:latin typeface="Arial"/>
-              </a:rPr>
-              <a:t>Second Outline Level</a:t>
-            </a:r>
-            <a:endParaRPr b="0" lang="en-US" sz="2800" spc="-1" strike="noStrike">
-              <a:solidFill>
-                <a:srgbClr val="000000"/>
-              </a:solidFill>
-              <a:uFill>
-                <a:solidFill>
-                  <a:srgbClr val="ffffff"/>
-                </a:solidFill>
-              </a:uFill>
-              <a:latin typeface="Arial"/>
-            </a:endParaRPr>
-          </a:p>
-          <a:p>
-            <a:pPr lvl="2" marL="1296000" indent="-288000">
-              <a:buClr>
-                <a:srgbClr val="000000"/>
-              </a:buClr>
-              <a:buSzPct val="45000"/>
-              <a:buFont typeface="Wingdings" charset="2"/>
-              <a:buChar char=""/>
-            </a:pPr>
-            <a:r>
-              <a:rPr b="0" lang="en-US" sz="2400" spc="-1" strike="noStrike">
-                <a:solidFill>
-                  <a:srgbClr val="000000"/>
-                </a:solidFill>
-                <a:uFill>
-                  <a:solidFill>
-                    <a:srgbClr val="ffffff"/>
-                  </a:solidFill>
-                </a:uFill>
-                <a:latin typeface="Arial"/>
-              </a:rPr>
-              <a:t>Third Outline Level</a:t>
-            </a:r>
-            <a:endParaRPr b="0" lang="en-US" sz="2400" spc="-1" strike="noStrike">
-              <a:solidFill>
-                <a:srgbClr val="000000"/>
-              </a:solidFill>
-              <a:uFill>
-                <a:solidFill>
-                  <a:srgbClr val="ffffff"/>
-                </a:solidFill>
-              </a:uFill>
-              <a:latin typeface="Arial"/>
-            </a:endParaRPr>
-          </a:p>
-          <a:p>
-            <a:pPr lvl="3" marL="1728000" indent="-216000">
-              <a:buClr>
-                <a:srgbClr val="000000"/>
-              </a:buClr>
-              <a:buSzPct val="75000"/>
-              <a:buFont typeface="Symbol" charset="2"/>
-              <a:buChar char=""/>
-            </a:pPr>
-            <a:r>
-              <a:rPr b="0" lang="en-US" sz="2000" spc="-1" strike="noStrike">
-                <a:solidFill>
-                  <a:srgbClr val="000000"/>
-                </a:solidFill>
-                <a:uFill>
-                  <a:solidFill>
-                    <a:srgbClr val="ffffff"/>
-                  </a:solidFill>
-                </a:uFill>
-                <a:latin typeface="Arial"/>
-              </a:rPr>
-              <a:t>Fourth Outline Level</a:t>
-            </a:r>
-            <a:endParaRPr b="0" lang="en-US" sz="2000" spc="-1" strike="noStrike">
-              <a:solidFill>
-                <a:srgbClr val="000000"/>
-              </a:solidFill>
-              <a:uFill>
-                <a:solidFill>
-                  <a:srgbClr val="ffffff"/>
-                </a:solidFill>
-              </a:uFill>
-              <a:latin typeface="Arial"/>
-            </a:endParaRPr>
-          </a:p>
-          <a:p>
-            <a:pPr lvl="4" marL="2160000" indent="-216000">
-              <a:buClr>
-                <a:srgbClr val="000000"/>
-              </a:buClr>
-              <a:buSzPct val="45000"/>
-              <a:buFont typeface="Wingdings" charset="2"/>
-              <a:buChar char=""/>
-            </a:pPr>
-            <a:r>
-              <a:rPr b="0" lang="en-US" sz="2000" spc="-1" strike="noStrike">
-                <a:solidFill>
-                  <a:srgbClr val="000000"/>
-                </a:solidFill>
-                <a:uFill>
-                  <a:solidFill>
-                    <a:srgbClr val="ffffff"/>
-                  </a:solidFill>
-                </a:uFill>
-                <a:latin typeface="Arial"/>
-              </a:rPr>
-              <a:t>Fifth Outline Level</a:t>
-            </a:r>
-            <a:endParaRPr b="0" lang="en-US" sz="2000" spc="-1" strike="noStrike">
-              <a:solidFill>
-                <a:srgbClr val="000000"/>
-              </a:solidFill>
-              <a:uFill>
-                <a:solidFill>
-                  <a:srgbClr val="ffffff"/>
-                </a:solidFill>
-              </a:uFill>
-              <a:latin typeface="Arial"/>
-            </a:endParaRPr>
-          </a:p>
-          <a:p>
-            <a:pPr lvl="5" marL="2592000" indent="-216000">
-              <a:buClr>
-                <a:srgbClr val="000000"/>
-              </a:buClr>
-              <a:buSzPct val="45000"/>
-              <a:buFont typeface="Wingdings" charset="2"/>
-              <a:buChar char=""/>
-            </a:pPr>
-            <a:r>
-              <a:rPr b="0" lang="en-US" sz="2000" spc="-1" strike="noStrike">
-                <a:solidFill>
-                  <a:srgbClr val="000000"/>
-                </a:solidFill>
-                <a:uFill>
-                  <a:solidFill>
-                    <a:srgbClr val="ffffff"/>
-                  </a:solidFill>
-                </a:uFill>
-                <a:latin typeface="Arial"/>
-              </a:rPr>
-              <a:t>Sixth Outline Level</a:t>
-            </a:r>
-            <a:endParaRPr b="0" lang="en-US" sz="2000" spc="-1" strike="noStrike">
-              <a:solidFill>
-                <a:srgbClr val="000000"/>
-              </a:solidFill>
-              <a:uFill>
-                <a:solidFill>
-                  <a:srgbClr val="ffffff"/>
-                </a:solidFill>
-              </a:uFill>
-              <a:latin typeface="Arial"/>
-            </a:endParaRPr>
-          </a:p>
-          <a:p>
-            <a:pPr lvl="6" marL="3024000" indent="-216000">
-              <a:buClr>
-                <a:srgbClr val="000000"/>
-              </a:buClr>
-              <a:buSzPct val="45000"/>
-              <a:buFont typeface="Wingdings" charset="2"/>
-              <a:buChar char=""/>
-            </a:pPr>
-            <a:r>
-              <a:rPr b="0" lang="en-US" sz="2000" spc="-1" strike="noStrike">
-                <a:solidFill>
-                  <a:srgbClr val="000000"/>
-                </a:solidFill>
-                <a:uFill>
-                  <a:solidFill>
-                    <a:srgbClr val="ffffff"/>
-                  </a:solidFill>
-                </a:uFill>
-                <a:latin typeface="Arial"/>
-              </a:rPr>
-              <a:t>Seventh Outline Level</a:t>
-            </a:r>
-            <a:endParaRPr b="0" lang="en-US" sz="2000" spc="-1" strike="noStrike">
-              <a:solidFill>
-                <a:srgbClr val="000000"/>
-              </a:solidFill>
-              <a:uFill>
-                <a:solidFill>
-                  <a:srgbClr val="ffffff"/>
-                </a:solidFill>
-              </a:uFill>
-              <a:latin typeface="Arial"/>
-            </a:endParaRPr>
-          </a:p>
-        </p:txBody>
-      </p:sp>
     </p:spTree>
   </p:cSld>
   <p:clrMap bg1="lt1" bg2="lt2" tx1="dk1" tx2="dk2" accent1="accent1" accent2="accent2" accent3="accent3" accent4="accent4" accent5="accent5" accent6="accent6" hlink="hlink" folHlink="folHlink"/>
@@ -1847,7 +1542,7 @@
       </p:grpSpPr>
       <p:pic>
         <p:nvPicPr>
-          <p:cNvPr id="36" name="" descr=""/>
+          <p:cNvPr id="34" name="" descr=""/>
           <p:cNvPicPr/>
           <p:nvPr/>
         </p:nvPicPr>
@@ -1858,7 +1553,7 @@
         <p:spPr>
           <a:xfrm>
             <a:off x="4134240" y="26392320"/>
-            <a:ext cx="10800000" cy="14493600"/>
+            <a:ext cx="10799280" cy="14492880"/>
           </a:xfrm>
           <a:prstGeom prst="rect">
             <a:avLst/>
@@ -1870,19 +1565,19 @@
       </p:pic>
       <p:pic>
         <p:nvPicPr>
-          <p:cNvPr id="37" name="" descr=""/>
+          <p:cNvPr id="35" name="" descr=""/>
           <p:cNvPicPr/>
           <p:nvPr/>
         </p:nvPicPr>
         <p:blipFill>
           <a:blip r:embed="rId2"/>
-          <a:srcRect l="17451" t="0" r="4773" b="0"/>
+          <a:srcRect l="17455" t="0" r="4773" b="0"/>
           <a:stretch/>
         </p:blipFill>
         <p:spPr>
           <a:xfrm>
-            <a:off x="15179040" y="24049440"/>
-            <a:ext cx="12600000" cy="12978000"/>
+            <a:off x="15179040" y="24157440"/>
+            <a:ext cx="12599280" cy="12977280"/>
           </a:xfrm>
           <a:prstGeom prst="rect">
             <a:avLst/>
@@ -1894,7 +1589,7 @@
       </p:pic>
       <p:pic>
         <p:nvPicPr>
-          <p:cNvPr id="38" name="" descr=""/>
+          <p:cNvPr id="36" name="" descr=""/>
           <p:cNvPicPr/>
           <p:nvPr/>
         </p:nvPicPr>
@@ -1905,7 +1600,7 @@
         <p:spPr>
           <a:xfrm>
             <a:off x="9601200" y="20465280"/>
-            <a:ext cx="5400000" cy="3034800"/>
+            <a:ext cx="5399280" cy="3034080"/>
           </a:xfrm>
           <a:prstGeom prst="rect">
             <a:avLst/>
@@ -1917,14 +1612,14 @@
       </p:pic>
       <p:sp>
         <p:nvSpPr>
-          <p:cNvPr id="39" name="CustomShape 1"/>
+          <p:cNvPr id="37" name="CustomShape 1"/>
           <p:cNvSpPr/>
           <p:nvPr/>
         </p:nvSpPr>
         <p:spPr>
           <a:xfrm>
             <a:off x="1170360" y="4239360"/>
-            <a:ext cx="27923760" cy="3016440"/>
+            <a:ext cx="27923040" cy="3015720"/>
           </a:xfrm>
           <a:prstGeom prst="rect">
             <a:avLst/>
@@ -2012,14 +1707,14 @@
       </p:sp>
       <p:sp>
         <p:nvSpPr>
-          <p:cNvPr id="40" name="CustomShape 2"/>
+          <p:cNvPr id="38" name="CustomShape 2"/>
           <p:cNvSpPr/>
           <p:nvPr/>
         </p:nvSpPr>
         <p:spPr>
           <a:xfrm>
             <a:off x="1170360" y="7155360"/>
-            <a:ext cx="27923760" cy="2491560"/>
+            <a:ext cx="27923040" cy="2490840"/>
           </a:xfrm>
           <a:prstGeom prst="rect">
             <a:avLst/>
@@ -2368,14 +2063,14 @@
       </p:sp>
       <p:sp>
         <p:nvSpPr>
-          <p:cNvPr id="41" name="CustomShape 3"/>
+          <p:cNvPr id="39" name="CustomShape 3"/>
           <p:cNvSpPr/>
           <p:nvPr/>
         </p:nvSpPr>
         <p:spPr>
           <a:xfrm>
             <a:off x="15318000" y="37227600"/>
-            <a:ext cx="14398920" cy="1737360"/>
+            <a:ext cx="14398200" cy="1736640"/>
           </a:xfrm>
           <a:prstGeom prst="rect">
             <a:avLst/>
@@ -2430,14 +2125,14 @@
       </p:sp>
       <p:sp>
         <p:nvSpPr>
-          <p:cNvPr id="42" name="CustomShape 4"/>
+          <p:cNvPr id="40" name="CustomShape 4"/>
           <p:cNvSpPr/>
           <p:nvPr/>
         </p:nvSpPr>
         <p:spPr>
           <a:xfrm>
             <a:off x="15318000" y="39461040"/>
-            <a:ext cx="14398920" cy="2024640"/>
+            <a:ext cx="14398200" cy="2023920"/>
           </a:xfrm>
           <a:prstGeom prst="rect">
             <a:avLst/>
@@ -2492,7 +2187,7 @@
       </p:sp>
       <p:sp>
         <p:nvSpPr>
-          <p:cNvPr id="43" name="Line 5"/>
+          <p:cNvPr id="41" name="Line 5"/>
           <p:cNvSpPr/>
           <p:nvPr/>
         </p:nvSpPr>
@@ -2521,7 +2216,7 @@
       </p:sp>
       <p:sp>
         <p:nvSpPr>
-          <p:cNvPr id="44" name="Line 6"/>
+          <p:cNvPr id="42" name="Line 6"/>
           <p:cNvSpPr/>
           <p:nvPr/>
         </p:nvSpPr>
@@ -2550,7 +2245,7 @@
       </p:sp>
       <p:sp>
         <p:nvSpPr>
-          <p:cNvPr id="45" name="Line 7"/>
+          <p:cNvPr id="43" name="Line 7"/>
           <p:cNvSpPr/>
           <p:nvPr/>
         </p:nvSpPr>
@@ -2579,7 +2274,7 @@
       </p:sp>
       <p:pic>
         <p:nvPicPr>
-          <p:cNvPr id="46" name="" descr=""/>
+          <p:cNvPr id="44" name="" descr=""/>
           <p:cNvPicPr/>
           <p:nvPr/>
         </p:nvPicPr>
@@ -2591,7 +2286,7 @@
         <p:spPr>
           <a:xfrm>
             <a:off x="0" y="2845440"/>
-            <a:ext cx="30268800" cy="724320"/>
+            <a:ext cx="30268080" cy="723600"/>
           </a:xfrm>
           <a:prstGeom prst="rect">
             <a:avLst/>
@@ -2603,7 +2298,7 @@
       </p:pic>
       <p:pic>
         <p:nvPicPr>
-          <p:cNvPr id="47" name="" descr=""/>
+          <p:cNvPr id="45" name="" descr=""/>
           <p:cNvPicPr/>
           <p:nvPr/>
         </p:nvPicPr>
@@ -2614,7 +2309,7 @@
         <p:spPr>
           <a:xfrm>
             <a:off x="12851640" y="912240"/>
-            <a:ext cx="4565160" cy="1684800"/>
+            <a:ext cx="4564440" cy="1684080"/>
           </a:xfrm>
           <a:prstGeom prst="rect">
             <a:avLst/>
@@ -2626,7 +2321,7 @@
       </p:pic>
       <p:sp>
         <p:nvSpPr>
-          <p:cNvPr id="48" name="Line 8"/>
+          <p:cNvPr id="46" name="Line 8"/>
           <p:cNvSpPr/>
           <p:nvPr/>
         </p:nvSpPr>
@@ -2654,14 +2349,14 @@
       </p:sp>
       <p:sp>
         <p:nvSpPr>
-          <p:cNvPr id="49" name="CustomShape 9"/>
+          <p:cNvPr id="47" name="CustomShape 9"/>
           <p:cNvSpPr/>
           <p:nvPr/>
         </p:nvSpPr>
         <p:spPr>
           <a:xfrm>
             <a:off x="722520" y="17007840"/>
-            <a:ext cx="14398920" cy="4144680"/>
+            <a:ext cx="14398200" cy="4143960"/>
           </a:xfrm>
           <a:prstGeom prst="rect">
             <a:avLst/>
@@ -2965,14 +2660,14 @@
       </p:sp>
       <p:sp>
         <p:nvSpPr>
-          <p:cNvPr id="50" name="CustomShape 10"/>
+          <p:cNvPr id="48" name="CustomShape 10"/>
           <p:cNvSpPr/>
           <p:nvPr/>
         </p:nvSpPr>
         <p:spPr>
           <a:xfrm>
             <a:off x="687960" y="24394320"/>
-            <a:ext cx="14398920" cy="933480"/>
+            <a:ext cx="14398200" cy="932760"/>
           </a:xfrm>
           <a:prstGeom prst="rect">
             <a:avLst/>
@@ -3075,14 +2770,14 @@
       </p:sp>
       <p:sp>
         <p:nvSpPr>
-          <p:cNvPr id="51" name="CustomShape 11"/>
+          <p:cNvPr id="49" name="CustomShape 11"/>
           <p:cNvSpPr/>
           <p:nvPr/>
         </p:nvSpPr>
         <p:spPr>
           <a:xfrm>
             <a:off x="720000" y="37980000"/>
-            <a:ext cx="14398920" cy="1653840"/>
+            <a:ext cx="14398200" cy="1653120"/>
           </a:xfrm>
           <a:prstGeom prst="rect">
             <a:avLst/>
@@ -3101,7 +2796,7 @@
       </p:sp>
       <p:pic>
         <p:nvPicPr>
-          <p:cNvPr id="52" name="" descr=""/>
+          <p:cNvPr id="50" name="" descr=""/>
           <p:cNvPicPr/>
           <p:nvPr/>
         </p:nvPicPr>
@@ -3113,7 +2808,7 @@
         <p:spPr>
           <a:xfrm>
             <a:off x="16440480" y="18960480"/>
-            <a:ext cx="11611800" cy="4570920"/>
+            <a:ext cx="11611080" cy="4570200"/>
           </a:xfrm>
           <a:prstGeom prst="rect">
             <a:avLst/>
@@ -3125,7 +2820,7 @@
       </p:pic>
       <p:pic>
         <p:nvPicPr>
-          <p:cNvPr id="53" name="" descr=""/>
+          <p:cNvPr id="51" name="" descr=""/>
           <p:cNvPicPr/>
           <p:nvPr/>
         </p:nvPicPr>
@@ -3137,7 +2832,7 @@
         <p:spPr>
           <a:xfrm>
             <a:off x="15636240" y="10010880"/>
-            <a:ext cx="13679280" cy="8868600"/>
+            <a:ext cx="13678560" cy="8867880"/>
           </a:xfrm>
           <a:prstGeom prst="rect">
             <a:avLst/>
@@ -3149,14 +2844,14 @@
       </p:pic>
       <p:sp>
         <p:nvSpPr>
-          <p:cNvPr id="54" name="CustomShape 12"/>
+          <p:cNvPr id="52" name="CustomShape 12"/>
           <p:cNvSpPr/>
           <p:nvPr/>
         </p:nvSpPr>
         <p:spPr>
           <a:xfrm>
             <a:off x="720000" y="21250800"/>
-            <a:ext cx="8606160" cy="2470320"/>
+            <a:ext cx="8605440" cy="2469600"/>
           </a:xfrm>
           <a:prstGeom prst="rect">
             <a:avLst/>
@@ -3208,7 +2903,7 @@
                 <a:latin typeface="Arial"/>
                 <a:ea typeface="DejaVu Sans"/>
               </a:rPr>
-              <a:t>Kinases are compared pairwise using the inverse, translated and scaled Manhattan distance as described for the USR method [3]. Per kinase, the best score is used for further analysis, resulting in a 253x253 similarity matrix.</a:t>
+              <a:t>Kinase structures are compared pairwise using the inverse, translated and scaled Manhattan distance as implemented for the USR method [3]. Per kinase pair, the best score is used for further analysis, resulting in a 253x253 similarity matrix.</a:t>
             </a:r>
             <a:endParaRPr b="0" lang="en-US" sz="1800" spc="-1" strike="noStrike">
               <a:solidFill>
@@ -3280,7 +2975,7 @@
       </p:sp>
       <p:pic>
         <p:nvPicPr>
-          <p:cNvPr id="55" name="" descr=""/>
+          <p:cNvPr id="53" name="" descr=""/>
           <p:cNvPicPr/>
           <p:nvPr/>
         </p:nvPicPr>
@@ -3292,7 +2987,7 @@
         <p:spPr>
           <a:xfrm>
             <a:off x="21400560" y="31181040"/>
-            <a:ext cx="1700640" cy="1828440"/>
+            <a:ext cx="1699920" cy="1827720"/>
           </a:xfrm>
           <a:prstGeom prst="rect">
             <a:avLst/>
@@ -3304,14 +2999,14 @@
       </p:pic>
       <p:sp>
         <p:nvSpPr>
-          <p:cNvPr id="56" name="CustomShape 13"/>
+          <p:cNvPr id="54" name="CustomShape 13"/>
           <p:cNvSpPr/>
           <p:nvPr/>
         </p:nvSpPr>
         <p:spPr>
           <a:xfrm>
             <a:off x="720000" y="10368000"/>
-            <a:ext cx="14398920" cy="2898360"/>
+            <a:ext cx="14398200" cy="2897640"/>
           </a:xfrm>
           <a:prstGeom prst="rect">
             <a:avLst/>
@@ -3366,14 +3061,14 @@
       </p:sp>
       <p:sp>
         <p:nvSpPr>
-          <p:cNvPr id="57" name="CustomShape 14"/>
+          <p:cNvPr id="55" name="CustomShape 14"/>
           <p:cNvSpPr/>
           <p:nvPr/>
         </p:nvSpPr>
         <p:spPr>
           <a:xfrm>
             <a:off x="720000" y="9720000"/>
-            <a:ext cx="14401440" cy="639720"/>
+            <a:ext cx="14400720" cy="639000"/>
           </a:xfrm>
           <a:prstGeom prst="rect">
             <a:avLst/>
@@ -3428,14 +3123,14 @@
       </p:sp>
       <p:sp>
         <p:nvSpPr>
-          <p:cNvPr id="58" name="CustomShape 15"/>
+          <p:cNvPr id="56" name="CustomShape 15"/>
           <p:cNvSpPr/>
           <p:nvPr/>
         </p:nvSpPr>
         <p:spPr>
           <a:xfrm>
             <a:off x="720000" y="13320000"/>
-            <a:ext cx="14401440" cy="639720"/>
+            <a:ext cx="14400720" cy="639000"/>
           </a:xfrm>
           <a:prstGeom prst="rect">
             <a:avLst/>
@@ -3544,14 +3239,14 @@
       </p:sp>
       <p:sp>
         <p:nvSpPr>
-          <p:cNvPr id="59" name="CustomShape 16"/>
+          <p:cNvPr id="57" name="CustomShape 16"/>
           <p:cNvSpPr/>
           <p:nvPr/>
         </p:nvSpPr>
         <p:spPr>
           <a:xfrm>
             <a:off x="722520" y="15526440"/>
-            <a:ext cx="14398920" cy="1338120"/>
+            <a:ext cx="14398200" cy="1337400"/>
           </a:xfrm>
           <a:prstGeom prst="rect">
             <a:avLst/>
@@ -3753,14 +3448,14 @@
       </p:sp>
       <p:sp>
         <p:nvSpPr>
-          <p:cNvPr id="60" name="CustomShape 17"/>
+          <p:cNvPr id="58" name="CustomShape 17"/>
           <p:cNvSpPr/>
           <p:nvPr/>
         </p:nvSpPr>
         <p:spPr>
           <a:xfrm>
             <a:off x="720000" y="13990320"/>
-            <a:ext cx="14398920" cy="1371240"/>
+            <a:ext cx="14398200" cy="1370520"/>
           </a:xfrm>
           <a:prstGeom prst="rect">
             <a:avLst/>
@@ -3869,14 +3564,14 @@
       </p:sp>
       <p:sp>
         <p:nvSpPr>
-          <p:cNvPr id="61" name="CustomShape 18"/>
+          <p:cNvPr id="59" name="CustomShape 18"/>
           <p:cNvSpPr/>
           <p:nvPr/>
         </p:nvSpPr>
         <p:spPr>
           <a:xfrm>
             <a:off x="687960" y="23717880"/>
-            <a:ext cx="14398920" cy="639720"/>
+            <a:ext cx="14398200" cy="639000"/>
           </a:xfrm>
           <a:prstGeom prst="rect">
             <a:avLst/>
@@ -3982,14 +3677,14 @@
       </p:sp>
       <p:sp>
         <p:nvSpPr>
-          <p:cNvPr id="62" name="CustomShape 19"/>
+          <p:cNvPr id="60" name="CustomShape 19"/>
           <p:cNvSpPr/>
           <p:nvPr/>
         </p:nvSpPr>
         <p:spPr>
           <a:xfrm>
             <a:off x="15532200" y="23735520"/>
-            <a:ext cx="14401440" cy="656640"/>
+            <a:ext cx="14400720" cy="655920"/>
           </a:xfrm>
           <a:prstGeom prst="rect">
             <a:avLst/>
@@ -4019,6 +3714,7 @@
                   </a:solidFill>
                 </a:uFill>
                 <a:latin typeface="Arial"/>
+                <a:ea typeface="DejaVu Sans"/>
               </a:rPr>
               <a:t>Fig. 1</a:t>
             </a:r>
@@ -4033,6 +3729,7 @@
                   </a:solidFill>
                 </a:uFill>
                 <a:latin typeface="Arial"/>
+                <a:ea typeface="DejaVu Sans"/>
               </a:rPr>
               <a:t>: (a) Composition of 962 bit kinase fingerprint, (b) feature value distribution over all 3,875 kinase structures.</a:t>
             </a:r>
@@ -4052,14 +3749,14 @@
       </p:sp>
       <p:sp>
         <p:nvSpPr>
-          <p:cNvPr id="63" name="CustomShape 20"/>
+          <p:cNvPr id="61" name="CustomShape 20"/>
           <p:cNvSpPr/>
           <p:nvPr/>
         </p:nvSpPr>
         <p:spPr>
           <a:xfrm>
             <a:off x="15760800" y="12003840"/>
-            <a:ext cx="1005480" cy="459000"/>
+            <a:ext cx="1004760" cy="458280"/>
           </a:xfrm>
           <a:prstGeom prst="rect">
             <a:avLst/>
@@ -4089,6 +3786,7 @@
                   </a:solidFill>
                 </a:uFill>
                 <a:latin typeface="Arial"/>
+                <a:ea typeface="DejaVu Sans"/>
               </a:rPr>
               <a:t>(a)</a:t>
             </a:r>
@@ -4108,14 +3806,14 @@
       </p:sp>
       <p:sp>
         <p:nvSpPr>
-          <p:cNvPr id="64" name="CustomShape 21"/>
+          <p:cNvPr id="62" name="CustomShape 21"/>
           <p:cNvSpPr/>
           <p:nvPr/>
         </p:nvSpPr>
         <p:spPr>
           <a:xfrm>
             <a:off x="15760800" y="19595520"/>
-            <a:ext cx="1005480" cy="459000"/>
+            <a:ext cx="1004760" cy="458280"/>
           </a:xfrm>
           <a:prstGeom prst="rect">
             <a:avLst/>
@@ -4145,6 +3843,7 @@
                   </a:solidFill>
                 </a:uFill>
                 <a:latin typeface="Arial"/>
+                <a:ea typeface="DejaVu Sans"/>
               </a:rPr>
               <a:t>(b)</a:t>
             </a:r>
@@ -4164,14 +3863,14 @@
       </p:sp>
       <p:sp>
         <p:nvSpPr>
-          <p:cNvPr id="65" name="CustomShape 22"/>
+          <p:cNvPr id="63" name="CustomShape 22"/>
           <p:cNvSpPr/>
           <p:nvPr/>
         </p:nvSpPr>
         <p:spPr>
           <a:xfrm>
             <a:off x="4480560" y="41176080"/>
-            <a:ext cx="10606680" cy="939960"/>
+            <a:ext cx="10605960" cy="939240"/>
           </a:xfrm>
           <a:prstGeom prst="rect">
             <a:avLst/>
@@ -4201,6 +3900,7 @@
                   </a:solidFill>
                 </a:uFill>
                 <a:latin typeface="Arial"/>
+                <a:ea typeface="DejaVu Sans"/>
               </a:rPr>
               <a:t>Fig. 2</a:t>
             </a:r>
@@ -4215,6 +3915,7 @@
                   </a:solidFill>
                 </a:uFill>
                 <a:latin typeface="Arial"/>
+                <a:ea typeface="DejaVu Sans"/>
               </a:rPr>
               <a:t>: Ligand-based on-/off-target prediction for EGFR inhibitor erlotinib based on our kinase fingerprint similarity: the 20 most similar structures to EGFR (blue pentagons) and erlotinib profiling data (orange circles).</a:t>
             </a:r>
@@ -4234,14 +3935,14 @@
       </p:sp>
       <p:sp>
         <p:nvSpPr>
-          <p:cNvPr id="66" name="CustomShape 23"/>
+          <p:cNvPr id="64" name="CustomShape 23"/>
           <p:cNvSpPr/>
           <p:nvPr/>
         </p:nvSpPr>
         <p:spPr>
           <a:xfrm>
             <a:off x="15318000" y="38753640"/>
-            <a:ext cx="14398920" cy="2684520"/>
+            <a:ext cx="14398200" cy="2683800"/>
           </a:xfrm>
           <a:prstGeom prst="rect">
             <a:avLst/>
@@ -4296,14 +3997,14 @@
       </p:sp>
       <p:sp>
         <p:nvSpPr>
-          <p:cNvPr id="67" name="CustomShape 24"/>
+          <p:cNvPr id="65" name="CustomShape 24"/>
           <p:cNvSpPr/>
           <p:nvPr/>
         </p:nvSpPr>
         <p:spPr>
           <a:xfrm>
             <a:off x="15318000" y="36520560"/>
-            <a:ext cx="14398920" cy="2244960"/>
+            <a:ext cx="14398200" cy="2244240"/>
           </a:xfrm>
           <a:prstGeom prst="rect">
             <a:avLst/>
@@ -4358,14 +4059,14 @@
       </p:sp>
       <p:sp>
         <p:nvSpPr>
-          <p:cNvPr id="68" name="CustomShape 25"/>
+          <p:cNvPr id="66" name="CustomShape 25"/>
           <p:cNvSpPr/>
           <p:nvPr/>
         </p:nvSpPr>
         <p:spPr>
           <a:xfrm>
-            <a:off x="26641440" y="33687360"/>
-            <a:ext cx="2696760" cy="2639880"/>
+            <a:off x="26893440" y="33687360"/>
+            <a:ext cx="2696040" cy="2639160"/>
           </a:xfrm>
           <a:prstGeom prst="rect">
             <a:avLst/>
@@ -4395,6 +4096,7 @@
                   </a:solidFill>
                 </a:uFill>
                 <a:latin typeface="Arial"/>
+                <a:ea typeface="DejaVu Sans"/>
               </a:rPr>
               <a:t>Fig. 3</a:t>
             </a:r>
@@ -4409,6 +4111,7 @@
                   </a:solidFill>
                 </a:uFill>
                 <a:latin typeface="Arial"/>
+                <a:ea typeface="DejaVu Sans"/>
               </a:rPr>
               <a:t>: Hierarchical clustering of pairwise similarity scores for best scoring structure pair for each kinase pair (Euclidean distance with unweighted average linkage clustering).</a:t>
             </a:r>
@@ -4428,14 +4131,14 @@
       </p:sp>
       <p:sp>
         <p:nvSpPr>
-          <p:cNvPr id="69" name="CustomShape 26"/>
+          <p:cNvPr id="67" name="CustomShape 26"/>
           <p:cNvSpPr/>
           <p:nvPr/>
         </p:nvSpPr>
         <p:spPr>
           <a:xfrm>
             <a:off x="685800" y="25274160"/>
-            <a:ext cx="3337200" cy="14812920"/>
+            <a:ext cx="3336480" cy="14812200"/>
           </a:xfrm>
           <a:prstGeom prst="rect">
             <a:avLst/>
@@ -4520,14 +4223,14 @@
       </p:sp>
       <p:sp>
         <p:nvSpPr>
-          <p:cNvPr id="70" name="CustomShape 27"/>
+          <p:cNvPr id="68" name="CustomShape 27"/>
           <p:cNvSpPr/>
           <p:nvPr/>
         </p:nvSpPr>
         <p:spPr>
           <a:xfrm>
             <a:off x="9050400" y="27110160"/>
-            <a:ext cx="1934640" cy="596160"/>
+            <a:ext cx="1933920" cy="595440"/>
           </a:xfrm>
           <a:prstGeom prst="rect">
             <a:avLst/>
@@ -4562,6 +4265,7 @@
                   </a:solidFill>
                 </a:uFill>
                 <a:latin typeface="Times New Roman"/>
+                <a:ea typeface="DejaVu Sans"/>
               </a:rPr>
               <a:t>Erlotinib </a:t>
             </a:r>
@@ -4594,6 +4298,7 @@
                   </a:solidFill>
                 </a:uFill>
                 <a:latin typeface="Times New Roman"/>
+                <a:ea typeface="DejaVu Sans"/>
               </a:rPr>
               <a:t>on-target </a:t>
             </a:r>
@@ -4626,6 +4331,7 @@
                   </a:solidFill>
                 </a:uFill>
                 <a:latin typeface="Times New Roman"/>
+                <a:ea typeface="DejaVu Sans"/>
               </a:rPr>
               <a:t>EGFR</a:t>
             </a:r>
@@ -4645,14 +4351,14 @@
       </p:sp>
       <p:sp>
         <p:nvSpPr>
-          <p:cNvPr id="71" name="CustomShape 28"/>
+          <p:cNvPr id="69" name="CustomShape 28"/>
           <p:cNvSpPr/>
           <p:nvPr/>
         </p:nvSpPr>
         <p:spPr>
           <a:xfrm>
-            <a:off x="13533120" y="32095440"/>
-            <a:ext cx="1998360" cy="596160"/>
+            <a:off x="13857120" y="33031440"/>
+            <a:ext cx="1997640" cy="1005480"/>
           </a:xfrm>
           <a:prstGeom prst="rect">
             <a:avLst/>
@@ -4687,6 +4393,7 @@
                   </a:solidFill>
                 </a:uFill>
                 <a:latin typeface="Times New Roman"/>
+                <a:ea typeface="DejaVu Sans"/>
               </a:rPr>
               <a:t>Erlotinib </a:t>
             </a:r>
@@ -4719,6 +4426,7 @@
                   </a:solidFill>
                 </a:uFill>
                 <a:latin typeface="Times New Roman"/>
+                <a:ea typeface="DejaVu Sans"/>
               </a:rPr>
               <a:t>off-targets</a:t>
             </a:r>
@@ -4751,6 +4459,7 @@
                   </a:solidFill>
                 </a:uFill>
                 <a:latin typeface="Times New Roman"/>
+                <a:ea typeface="DejaVu Sans"/>
               </a:rPr>
               <a:t>LOK &amp; SLK</a:t>
             </a:r>
@@ -4770,7 +4479,7 @@
       </p:sp>
       <p:pic>
         <p:nvPicPr>
-          <p:cNvPr id="72" name="" descr=""/>
+          <p:cNvPr id="70" name="" descr=""/>
           <p:cNvPicPr/>
           <p:nvPr/>
         </p:nvPicPr>
@@ -4781,7 +4490,7 @@
         <p:spPr>
           <a:xfrm>
             <a:off x="20258640" y="29972880"/>
-            <a:ext cx="1080000" cy="3121200"/>
+            <a:ext cx="1079280" cy="3120480"/>
           </a:xfrm>
           <a:prstGeom prst="rect">
             <a:avLst/>
@@ -4793,7 +4502,7 @@
       </p:pic>
       <p:pic>
         <p:nvPicPr>
-          <p:cNvPr id="73" name="" descr=""/>
+          <p:cNvPr id="71" name="" descr=""/>
           <p:cNvPicPr/>
           <p:nvPr/>
         </p:nvPicPr>
@@ -4804,7 +4513,7 @@
         <p:spPr>
           <a:xfrm>
             <a:off x="6790320" y="40504320"/>
-            <a:ext cx="7200000" cy="414000"/>
+            <a:ext cx="7199280" cy="413280"/>
           </a:xfrm>
           <a:prstGeom prst="rect">
             <a:avLst/>
@@ -4814,6 +4523,234 @@
           </a:ln>
         </p:spPr>
       </p:pic>
+      <p:sp>
+        <p:nvSpPr>
+          <p:cNvPr id="72" name="CustomShape 29"/>
+          <p:cNvSpPr/>
+          <p:nvPr/>
+        </p:nvSpPr>
+        <p:spPr>
+          <a:xfrm rot="20922000">
+            <a:off x="20387520" y="24286320"/>
+            <a:ext cx="456840" cy="1006920"/>
+          </a:xfrm>
+          <a:prstGeom prst="ellipse">
+            <a:avLst/>
+          </a:prstGeom>
+          <a:noFill/>
+          <a:ln w="12600">
+            <a:solidFill>
+              <a:srgbClr val="333333"/>
+            </a:solidFill>
+            <a:round/>
+          </a:ln>
+        </p:spPr>
+        <p:style>
+          <a:lnRef idx="0"/>
+          <a:fillRef idx="0"/>
+          <a:effectRef idx="0"/>
+          <a:fontRef idx="minor"/>
+        </p:style>
+      </p:sp>
+      <p:sp>
+        <p:nvSpPr>
+          <p:cNvPr id="73" name="CustomShape 30"/>
+          <p:cNvSpPr/>
+          <p:nvPr/>
+        </p:nvSpPr>
+        <p:spPr>
+          <a:xfrm rot="2700000">
+            <a:off x="17067600" y="34435080"/>
+            <a:ext cx="456840" cy="737640"/>
+          </a:xfrm>
+          <a:prstGeom prst="ellipse">
+            <a:avLst/>
+          </a:prstGeom>
+          <a:noFill/>
+          <a:ln w="12600">
+            <a:solidFill>
+              <a:srgbClr val="333333"/>
+            </a:solidFill>
+            <a:round/>
+          </a:ln>
+        </p:spPr>
+        <p:style>
+          <a:lnRef idx="0"/>
+          <a:fillRef idx="0"/>
+          <a:effectRef idx="0"/>
+          <a:fontRef idx="minor"/>
+        </p:style>
+      </p:sp>
+      <p:sp>
+        <p:nvSpPr>
+          <p:cNvPr id="74" name="Line 31"/>
+          <p:cNvSpPr/>
+          <p:nvPr/>
+        </p:nvSpPr>
+        <p:spPr>
+          <a:xfrm>
+            <a:off x="13167360" y="32004000"/>
+            <a:ext cx="1554480" cy="1027440"/>
+          </a:xfrm>
+          <a:prstGeom prst="line">
+            <a:avLst/>
+          </a:prstGeom>
+          <a:ln>
+            <a:solidFill>
+              <a:srgbClr val="333333"/>
+            </a:solidFill>
+          </a:ln>
+        </p:spPr>
+        <p:style>
+          <a:lnRef idx="0"/>
+          <a:fillRef idx="0"/>
+          <a:effectRef idx="0"/>
+          <a:fontRef idx="minor"/>
+        </p:style>
+      </p:sp>
+      <p:sp>
+        <p:nvSpPr>
+          <p:cNvPr id="75" name="Line 32"/>
+          <p:cNvSpPr/>
+          <p:nvPr/>
+        </p:nvSpPr>
+        <p:spPr>
+          <a:xfrm>
+            <a:off x="15179040" y="34037280"/>
+            <a:ext cx="1694520" cy="892800"/>
+          </a:xfrm>
+          <a:prstGeom prst="line">
+            <a:avLst/>
+          </a:prstGeom>
+          <a:ln>
+            <a:solidFill>
+              <a:srgbClr val="333333"/>
+            </a:solidFill>
+          </a:ln>
+        </p:spPr>
+        <p:style>
+          <a:lnRef idx="0"/>
+          <a:fillRef idx="0"/>
+          <a:effectRef idx="0"/>
+          <a:fontRef idx="minor"/>
+        </p:style>
+      </p:sp>
+      <p:sp>
+        <p:nvSpPr>
+          <p:cNvPr id="76" name="Line 33"/>
+          <p:cNvSpPr/>
+          <p:nvPr/>
+        </p:nvSpPr>
+        <p:spPr>
+          <a:xfrm flipV="1">
+            <a:off x="9180000" y="27669960"/>
+            <a:ext cx="365760" cy="274680"/>
+          </a:xfrm>
+          <a:prstGeom prst="line">
+            <a:avLst/>
+          </a:prstGeom>
+          <a:ln>
+            <a:solidFill>
+              <a:srgbClr val="333333"/>
+            </a:solidFill>
+          </a:ln>
+        </p:spPr>
+        <p:style>
+          <a:lnRef idx="0"/>
+          <a:fillRef idx="0"/>
+          <a:effectRef idx="0"/>
+          <a:fontRef idx="minor"/>
+        </p:style>
+      </p:sp>
+      <p:sp>
+        <p:nvSpPr>
+          <p:cNvPr id="77" name="CustomShape 34"/>
+          <p:cNvSpPr/>
+          <p:nvPr/>
+        </p:nvSpPr>
+        <p:spPr>
+          <a:xfrm>
+            <a:off x="16167960" y="24619680"/>
+            <a:ext cx="1997640" cy="1005480"/>
+          </a:xfrm>
+          <a:prstGeom prst="rect">
+            <a:avLst/>
+          </a:prstGeom>
+          <a:noFill/>
+          <a:ln>
+            <a:noFill/>
+          </a:ln>
+        </p:spPr>
+        <p:style>
+          <a:lnRef idx="0"/>
+          <a:fillRef idx="0"/>
+          <a:effectRef idx="0"/>
+          <a:fontRef idx="minor"/>
+        </p:style>
+        <p:txBody>
+          <a:bodyPr lIns="90000" rIns="90000" tIns="45000" bIns="45000"/>
+          <a:p>
+            <a:pPr algn="ctr">
+              <a:lnSpc>
+                <a:spcPct val="100000"/>
+              </a:lnSpc>
+            </a:pPr>
+            <a:r>
+              <a:rPr b="0" lang="en-US" sz="1800" spc="-1" strike="noStrike">
+                <a:solidFill>
+                  <a:srgbClr val="333333"/>
+                </a:solidFill>
+                <a:uFill>
+                  <a:solidFill>
+                    <a:srgbClr val="ffffff"/>
+                  </a:solidFill>
+                </a:uFill>
+                <a:latin typeface="Times New Roman"/>
+                <a:ea typeface="DejaVu Sans"/>
+              </a:rPr>
+              <a:t>DRAK2 inihibitor off-target CaMMK2</a:t>
+            </a:r>
+            <a:endParaRPr b="0" lang="en-US" sz="1800" spc="-1" strike="noStrike">
+              <a:solidFill>
+                <a:srgbClr val="000000"/>
+              </a:solidFill>
+              <a:uFill>
+                <a:solidFill>
+                  <a:srgbClr val="ffffff"/>
+                </a:solidFill>
+              </a:uFill>
+              <a:latin typeface="Arial"/>
+            </a:endParaRPr>
+          </a:p>
+        </p:txBody>
+      </p:sp>
+      <p:sp>
+        <p:nvSpPr>
+          <p:cNvPr id="78" name="Line 35"/>
+          <p:cNvSpPr/>
+          <p:nvPr/>
+        </p:nvSpPr>
+        <p:spPr>
+          <a:xfrm flipV="1">
+            <a:off x="18165600" y="24505920"/>
+            <a:ext cx="2127960" cy="274320"/>
+          </a:xfrm>
+          <a:prstGeom prst="line">
+            <a:avLst/>
+          </a:prstGeom>
+          <a:ln>
+            <a:solidFill>
+              <a:srgbClr val="333333"/>
+            </a:solidFill>
+          </a:ln>
+        </p:spPr>
+        <p:style>
+          <a:lnRef idx="0"/>
+          <a:fillRef idx="0"/>
+          <a:effectRef idx="0"/>
+          <a:fontRef idx="minor"/>
+        </p:style>
+      </p:sp>
     </p:spTree>
   </p:cSld>
   <p:timing>

</xml_diff>

<commit_message>
Update poster files (included AV's feedback)
</commit_message>
<xml_diff>
--- a/poster/20190915_ds_phd_Europin_KinSimStructure.pptx
+++ b/poster/20190915_ds_phd_Europin_KinSimStructure.pptx
@@ -53,7 +53,7 @@
       </p:grpSpPr>
       <p:sp>
         <p:nvSpPr>
-          <p:cNvPr id="21" name="PlaceHolder 1"/>
+          <p:cNvPr id="23" name="PlaceHolder 1"/>
           <p:cNvSpPr>
             <a:spLocks noGrp="1"/>
           </p:cNvSpPr>
@@ -90,7 +90,7 @@
       </p:sp>
       <p:sp>
         <p:nvSpPr>
-          <p:cNvPr id="22" name="PlaceHolder 2"/>
+          <p:cNvPr id="24" name="PlaceHolder 2"/>
           <p:cNvSpPr>
             <a:spLocks noGrp="1"/>
           </p:cNvSpPr>
@@ -126,7 +126,7 @@
       </p:sp>
       <p:sp>
         <p:nvSpPr>
-          <p:cNvPr id="23" name="PlaceHolder 3"/>
+          <p:cNvPr id="25" name="PlaceHolder 3"/>
           <p:cNvSpPr>
             <a:spLocks noGrp="1"/>
           </p:cNvSpPr>
@@ -184,7 +184,7 @@
       </p:grpSpPr>
       <p:sp>
         <p:nvSpPr>
-          <p:cNvPr id="24" name="PlaceHolder 1"/>
+          <p:cNvPr id="26" name="PlaceHolder 1"/>
           <p:cNvSpPr>
             <a:spLocks noGrp="1"/>
           </p:cNvSpPr>
@@ -221,7 +221,7 @@
       </p:sp>
       <p:sp>
         <p:nvSpPr>
-          <p:cNvPr id="25" name="PlaceHolder 2"/>
+          <p:cNvPr id="27" name="PlaceHolder 2"/>
           <p:cNvSpPr>
             <a:spLocks noGrp="1"/>
           </p:cNvSpPr>
@@ -257,7 +257,7 @@
       </p:sp>
       <p:sp>
         <p:nvSpPr>
-          <p:cNvPr id="26" name="PlaceHolder 3"/>
+          <p:cNvPr id="28" name="PlaceHolder 3"/>
           <p:cNvSpPr>
             <a:spLocks noGrp="1"/>
           </p:cNvSpPr>
@@ -293,7 +293,7 @@
       </p:sp>
       <p:sp>
         <p:nvSpPr>
-          <p:cNvPr id="27" name="PlaceHolder 4"/>
+          <p:cNvPr id="29" name="PlaceHolder 4"/>
           <p:cNvSpPr>
             <a:spLocks noGrp="1"/>
           </p:cNvSpPr>
@@ -329,7 +329,7 @@
       </p:sp>
       <p:sp>
         <p:nvSpPr>
-          <p:cNvPr id="28" name="PlaceHolder 5"/>
+          <p:cNvPr id="30" name="PlaceHolder 5"/>
           <p:cNvSpPr>
             <a:spLocks noGrp="1"/>
           </p:cNvSpPr>
@@ -387,7 +387,7 @@
       </p:grpSpPr>
       <p:sp>
         <p:nvSpPr>
-          <p:cNvPr id="29" name="PlaceHolder 1"/>
+          <p:cNvPr id="31" name="PlaceHolder 1"/>
           <p:cNvSpPr>
             <a:spLocks noGrp="1"/>
           </p:cNvSpPr>
@@ -424,7 +424,7 @@
       </p:sp>
       <p:sp>
         <p:nvSpPr>
-          <p:cNvPr id="30" name="PlaceHolder 2"/>
+          <p:cNvPr id="32" name="PlaceHolder 2"/>
           <p:cNvSpPr>
             <a:spLocks noGrp="1"/>
           </p:cNvSpPr>
@@ -460,7 +460,7 @@
       </p:sp>
       <p:sp>
         <p:nvSpPr>
-          <p:cNvPr id="31" name="PlaceHolder 3"/>
+          <p:cNvPr id="33" name="PlaceHolder 3"/>
           <p:cNvSpPr>
             <a:spLocks noGrp="1"/>
           </p:cNvSpPr>
@@ -496,7 +496,7 @@
       </p:sp>
       <p:pic>
         <p:nvPicPr>
-          <p:cNvPr id="32" name="" descr=""/>
+          <p:cNvPr id="34" name="" descr=""/>
           <p:cNvPicPr/>
           <p:nvPr/>
         </p:nvPicPr>
@@ -519,7 +519,7 @@
       </p:pic>
       <p:pic>
         <p:nvPicPr>
-          <p:cNvPr id="33" name="" descr=""/>
+          <p:cNvPr id="35" name="" descr=""/>
           <p:cNvPicPr/>
           <p:nvPr/>
         </p:nvPicPr>
@@ -564,7 +564,7 @@
       </p:grpSpPr>
       <p:sp>
         <p:nvSpPr>
-          <p:cNvPr id="0" name="PlaceHolder 1"/>
+          <p:cNvPr id="2" name="PlaceHolder 1"/>
           <p:cNvSpPr>
             <a:spLocks noGrp="1"/>
           </p:cNvSpPr>
@@ -601,7 +601,7 @@
       </p:sp>
       <p:sp>
         <p:nvSpPr>
-          <p:cNvPr id="1" name="PlaceHolder 2"/>
+          <p:cNvPr id="3" name="PlaceHolder 2"/>
           <p:cNvSpPr>
             <a:spLocks noGrp="1"/>
           </p:cNvSpPr>
@@ -660,7 +660,7 @@
       </p:grpSpPr>
       <p:sp>
         <p:nvSpPr>
-          <p:cNvPr id="2" name="PlaceHolder 1"/>
+          <p:cNvPr id="4" name="PlaceHolder 1"/>
           <p:cNvSpPr>
             <a:spLocks noGrp="1"/>
           </p:cNvSpPr>
@@ -697,7 +697,7 @@
       </p:sp>
       <p:sp>
         <p:nvSpPr>
-          <p:cNvPr id="3" name="PlaceHolder 2"/>
+          <p:cNvPr id="5" name="PlaceHolder 2"/>
           <p:cNvSpPr>
             <a:spLocks noGrp="1"/>
           </p:cNvSpPr>
@@ -755,7 +755,7 @@
       </p:grpSpPr>
       <p:sp>
         <p:nvSpPr>
-          <p:cNvPr id="4" name="PlaceHolder 1"/>
+          <p:cNvPr id="6" name="PlaceHolder 1"/>
           <p:cNvSpPr>
             <a:spLocks noGrp="1"/>
           </p:cNvSpPr>
@@ -792,7 +792,7 @@
       </p:sp>
       <p:sp>
         <p:nvSpPr>
-          <p:cNvPr id="5" name="PlaceHolder 2"/>
+          <p:cNvPr id="7" name="PlaceHolder 2"/>
           <p:cNvSpPr>
             <a:spLocks noGrp="1"/>
           </p:cNvSpPr>
@@ -828,7 +828,7 @@
       </p:sp>
       <p:sp>
         <p:nvSpPr>
-          <p:cNvPr id="6" name="PlaceHolder 3"/>
+          <p:cNvPr id="8" name="PlaceHolder 3"/>
           <p:cNvSpPr>
             <a:spLocks noGrp="1"/>
           </p:cNvSpPr>
@@ -886,7 +886,7 @@
       </p:grpSpPr>
       <p:sp>
         <p:nvSpPr>
-          <p:cNvPr id="7" name="PlaceHolder 1"/>
+          <p:cNvPr id="9" name="PlaceHolder 1"/>
           <p:cNvSpPr>
             <a:spLocks noGrp="1"/>
           </p:cNvSpPr>
@@ -945,7 +945,7 @@
       </p:grpSpPr>
       <p:sp>
         <p:nvSpPr>
-          <p:cNvPr id="8" name="PlaceHolder 1"/>
+          <p:cNvPr id="10" name="PlaceHolder 1"/>
           <p:cNvSpPr>
             <a:spLocks noGrp="1"/>
           </p:cNvSpPr>
@@ -1004,7 +1004,7 @@
       </p:grpSpPr>
       <p:sp>
         <p:nvSpPr>
-          <p:cNvPr id="9" name="PlaceHolder 1"/>
+          <p:cNvPr id="11" name="PlaceHolder 1"/>
           <p:cNvSpPr>
             <a:spLocks noGrp="1"/>
           </p:cNvSpPr>
@@ -1041,7 +1041,7 @@
       </p:sp>
       <p:sp>
         <p:nvSpPr>
-          <p:cNvPr id="10" name="PlaceHolder 2"/>
+          <p:cNvPr id="12" name="PlaceHolder 2"/>
           <p:cNvSpPr>
             <a:spLocks noGrp="1"/>
           </p:cNvSpPr>
@@ -1077,7 +1077,7 @@
       </p:sp>
       <p:sp>
         <p:nvSpPr>
-          <p:cNvPr id="11" name="PlaceHolder 3"/>
+          <p:cNvPr id="13" name="PlaceHolder 3"/>
           <p:cNvSpPr>
             <a:spLocks noGrp="1"/>
           </p:cNvSpPr>
@@ -1113,7 +1113,7 @@
       </p:sp>
       <p:sp>
         <p:nvSpPr>
-          <p:cNvPr id="12" name="PlaceHolder 4"/>
+          <p:cNvPr id="14" name="PlaceHolder 4"/>
           <p:cNvSpPr>
             <a:spLocks noGrp="1"/>
           </p:cNvSpPr>
@@ -1171,7 +1171,7 @@
       </p:grpSpPr>
       <p:sp>
         <p:nvSpPr>
-          <p:cNvPr id="13" name="PlaceHolder 1"/>
+          <p:cNvPr id="15" name="PlaceHolder 1"/>
           <p:cNvSpPr>
             <a:spLocks noGrp="1"/>
           </p:cNvSpPr>
@@ -1208,7 +1208,7 @@
       </p:sp>
       <p:sp>
         <p:nvSpPr>
-          <p:cNvPr id="14" name="PlaceHolder 2"/>
+          <p:cNvPr id="16" name="PlaceHolder 2"/>
           <p:cNvSpPr>
             <a:spLocks noGrp="1"/>
           </p:cNvSpPr>
@@ -1244,7 +1244,7 @@
       </p:sp>
       <p:sp>
         <p:nvSpPr>
-          <p:cNvPr id="15" name="PlaceHolder 3"/>
+          <p:cNvPr id="17" name="PlaceHolder 3"/>
           <p:cNvSpPr>
             <a:spLocks noGrp="1"/>
           </p:cNvSpPr>
@@ -1280,7 +1280,7 @@
       </p:sp>
       <p:sp>
         <p:nvSpPr>
-          <p:cNvPr id="16" name="PlaceHolder 4"/>
+          <p:cNvPr id="18" name="PlaceHolder 4"/>
           <p:cNvSpPr>
             <a:spLocks noGrp="1"/>
           </p:cNvSpPr>
@@ -1338,7 +1338,7 @@
       </p:grpSpPr>
       <p:sp>
         <p:nvSpPr>
-          <p:cNvPr id="17" name="PlaceHolder 1"/>
+          <p:cNvPr id="19" name="PlaceHolder 1"/>
           <p:cNvSpPr>
             <a:spLocks noGrp="1"/>
           </p:cNvSpPr>
@@ -1375,7 +1375,7 @@
       </p:sp>
       <p:sp>
         <p:nvSpPr>
-          <p:cNvPr id="18" name="PlaceHolder 2"/>
+          <p:cNvPr id="20" name="PlaceHolder 2"/>
           <p:cNvSpPr>
             <a:spLocks noGrp="1"/>
           </p:cNvSpPr>
@@ -1411,7 +1411,7 @@
       </p:sp>
       <p:sp>
         <p:nvSpPr>
-          <p:cNvPr id="19" name="PlaceHolder 3"/>
+          <p:cNvPr id="21" name="PlaceHolder 3"/>
           <p:cNvSpPr>
             <a:spLocks noGrp="1"/>
           </p:cNvSpPr>
@@ -1447,7 +1447,7 @@
       </p:sp>
       <p:sp>
         <p:nvSpPr>
-          <p:cNvPr id="20" name="PlaceHolder 4"/>
+          <p:cNvPr id="22" name="PlaceHolder 4"/>
           <p:cNvSpPr>
             <a:spLocks noGrp="1"/>
           </p:cNvSpPr>
@@ -1503,6 +1503,325 @@
           <a:chExt cx="0" cy="0"/>
         </a:xfrm>
       </p:grpSpPr>
+      <p:sp>
+        <p:nvSpPr>
+          <p:cNvPr id="0" name="PlaceHolder 1"/>
+          <p:cNvSpPr>
+            <a:spLocks noGrp="1"/>
+          </p:cNvSpPr>
+          <p:nvPr>
+            <p:ph type="title"/>
+          </p:nvPr>
+        </p:nvSpPr>
+        <p:spPr>
+          <a:xfrm>
+            <a:off x="1513440" y="1707480"/>
+            <a:ext cx="27247320" cy="7147440"/>
+          </a:xfrm>
+          <a:prstGeom prst="rect">
+            <a:avLst/>
+          </a:prstGeom>
+        </p:spPr>
+        <p:txBody>
+          <a:bodyPr lIns="0" rIns="0" tIns="0" bIns="0" anchor="ctr"/>
+          <a:p>
+            <a:pPr algn="ctr"/>
+            <a:r>
+              <a:rPr b="0" lang="en-US" sz="4400" spc="-1" strike="noStrike">
+                <a:solidFill>
+                  <a:srgbClr val="000000"/>
+                </a:solidFill>
+                <a:uFill>
+                  <a:solidFill>
+                    <a:srgbClr val="ffffff"/>
+                  </a:solidFill>
+                </a:uFill>
+                <a:latin typeface="Arial"/>
+              </a:rPr>
+              <a:t>Click to edit the title text format</a:t>
+            </a:r>
+            <a:endParaRPr b="0" lang="en-US" sz="4400" spc="-1" strike="noStrike">
+              <a:solidFill>
+                <a:srgbClr val="000000"/>
+              </a:solidFill>
+              <a:uFill>
+                <a:solidFill>
+                  <a:srgbClr val="ffffff"/>
+                </a:solidFill>
+              </a:uFill>
+              <a:latin typeface="Arial"/>
+            </a:endParaRPr>
+          </a:p>
+        </p:txBody>
+      </p:sp>
+      <p:sp>
+        <p:nvSpPr>
+          <p:cNvPr id="1" name="PlaceHolder 2"/>
+          <p:cNvSpPr>
+            <a:spLocks noGrp="1"/>
+          </p:cNvSpPr>
+          <p:nvPr>
+            <p:ph type="body"/>
+          </p:nvPr>
+        </p:nvSpPr>
+        <p:spPr>
+          <a:xfrm>
+            <a:off x="1513440" y="10015560"/>
+            <a:ext cx="27247320" cy="24824880"/>
+          </a:xfrm>
+          <a:prstGeom prst="rect">
+            <a:avLst/>
+          </a:prstGeom>
+        </p:spPr>
+        <p:txBody>
+          <a:bodyPr lIns="0" rIns="0" tIns="0" bIns="0"/>
+          <a:p>
+            <a:pPr marL="432000" indent="-324000">
+              <a:buClr>
+                <a:srgbClr val="000000"/>
+              </a:buClr>
+              <a:buSzPct val="45000"/>
+              <a:buFont typeface="Wingdings" charset="2"/>
+              <a:buChar char=""/>
+            </a:pPr>
+            <a:r>
+              <a:rPr b="0" lang="en-US" sz="3200" spc="-1" strike="noStrike">
+                <a:solidFill>
+                  <a:srgbClr val="000000"/>
+                </a:solidFill>
+                <a:uFill>
+                  <a:solidFill>
+                    <a:srgbClr val="ffffff"/>
+                  </a:solidFill>
+                </a:uFill>
+                <a:latin typeface="Arial"/>
+              </a:rPr>
+              <a:t>Click to edit the outline text format</a:t>
+            </a:r>
+            <a:endParaRPr b="0" lang="en-US" sz="3200" spc="-1" strike="noStrike">
+              <a:solidFill>
+                <a:srgbClr val="000000"/>
+              </a:solidFill>
+              <a:uFill>
+                <a:solidFill>
+                  <a:srgbClr val="ffffff"/>
+                </a:solidFill>
+              </a:uFill>
+              <a:latin typeface="Arial"/>
+            </a:endParaRPr>
+          </a:p>
+          <a:p>
+            <a:pPr lvl="1" marL="864000" indent="-324000">
+              <a:buClr>
+                <a:srgbClr val="000000"/>
+              </a:buClr>
+              <a:buSzPct val="75000"/>
+              <a:buFont typeface="Symbol" charset="2"/>
+              <a:buChar char=""/>
+            </a:pPr>
+            <a:r>
+              <a:rPr b="0" lang="en-US" sz="2800" spc="-1" strike="noStrike">
+                <a:solidFill>
+                  <a:srgbClr val="000000"/>
+                </a:solidFill>
+                <a:uFill>
+                  <a:solidFill>
+                    <a:srgbClr val="ffffff"/>
+                  </a:solidFill>
+                </a:uFill>
+                <a:latin typeface="Arial"/>
+              </a:rPr>
+              <a:t>Second Outline Level</a:t>
+            </a:r>
+            <a:endParaRPr b="0" lang="en-US" sz="2800" spc="-1" strike="noStrike">
+              <a:solidFill>
+                <a:srgbClr val="000000"/>
+              </a:solidFill>
+              <a:uFill>
+                <a:solidFill>
+                  <a:srgbClr val="ffffff"/>
+                </a:solidFill>
+              </a:uFill>
+              <a:latin typeface="Arial"/>
+            </a:endParaRPr>
+          </a:p>
+          <a:p>
+            <a:pPr lvl="2" marL="1296000" indent="-288000">
+              <a:buClr>
+                <a:srgbClr val="000000"/>
+              </a:buClr>
+              <a:buSzPct val="45000"/>
+              <a:buFont typeface="Wingdings" charset="2"/>
+              <a:buChar char=""/>
+            </a:pPr>
+            <a:r>
+              <a:rPr b="0" lang="en-US" sz="2400" spc="-1" strike="noStrike">
+                <a:solidFill>
+                  <a:srgbClr val="000000"/>
+                </a:solidFill>
+                <a:uFill>
+                  <a:solidFill>
+                    <a:srgbClr val="ffffff"/>
+                  </a:solidFill>
+                </a:uFill>
+                <a:latin typeface="Arial"/>
+              </a:rPr>
+              <a:t>Third Outline Level</a:t>
+            </a:r>
+            <a:endParaRPr b="0" lang="en-US" sz="2400" spc="-1" strike="noStrike">
+              <a:solidFill>
+                <a:srgbClr val="000000"/>
+              </a:solidFill>
+              <a:uFill>
+                <a:solidFill>
+                  <a:srgbClr val="ffffff"/>
+                </a:solidFill>
+              </a:uFill>
+              <a:latin typeface="Arial"/>
+            </a:endParaRPr>
+          </a:p>
+          <a:p>
+            <a:pPr lvl="3" marL="1728000" indent="-216000">
+              <a:buClr>
+                <a:srgbClr val="000000"/>
+              </a:buClr>
+              <a:buSzPct val="75000"/>
+              <a:buFont typeface="Symbol" charset="2"/>
+              <a:buChar char=""/>
+            </a:pPr>
+            <a:r>
+              <a:rPr b="0" lang="en-US" sz="2000" spc="-1" strike="noStrike">
+                <a:solidFill>
+                  <a:srgbClr val="000000"/>
+                </a:solidFill>
+                <a:uFill>
+                  <a:solidFill>
+                    <a:srgbClr val="ffffff"/>
+                  </a:solidFill>
+                </a:uFill>
+                <a:latin typeface="Arial"/>
+              </a:rPr>
+              <a:t>Fourth Outline Level</a:t>
+            </a:r>
+            <a:endParaRPr b="0" lang="en-US" sz="2000" spc="-1" strike="noStrike">
+              <a:solidFill>
+                <a:srgbClr val="000000"/>
+              </a:solidFill>
+              <a:uFill>
+                <a:solidFill>
+                  <a:srgbClr val="ffffff"/>
+                </a:solidFill>
+              </a:uFill>
+              <a:latin typeface="Arial"/>
+            </a:endParaRPr>
+          </a:p>
+          <a:p>
+            <a:pPr lvl="4" marL="2160000" indent="-216000">
+              <a:buClr>
+                <a:srgbClr val="000000"/>
+              </a:buClr>
+              <a:buSzPct val="45000"/>
+              <a:buFont typeface="Wingdings" charset="2"/>
+              <a:buChar char=""/>
+            </a:pPr>
+            <a:r>
+              <a:rPr b="0" lang="en-US" sz="2000" spc="-1" strike="noStrike">
+                <a:solidFill>
+                  <a:srgbClr val="000000"/>
+                </a:solidFill>
+                <a:uFill>
+                  <a:solidFill>
+                    <a:srgbClr val="ffffff"/>
+                  </a:solidFill>
+                </a:uFill>
+                <a:latin typeface="Arial"/>
+              </a:rPr>
+              <a:t>Fifth Outline Level</a:t>
+            </a:r>
+            <a:endParaRPr b="0" lang="en-US" sz="2000" spc="-1" strike="noStrike">
+              <a:solidFill>
+                <a:srgbClr val="000000"/>
+              </a:solidFill>
+              <a:uFill>
+                <a:solidFill>
+                  <a:srgbClr val="ffffff"/>
+                </a:solidFill>
+              </a:uFill>
+              <a:latin typeface="Arial"/>
+            </a:endParaRPr>
+          </a:p>
+          <a:p>
+            <a:pPr lvl="5" marL="2592000" indent="-216000">
+              <a:buClr>
+                <a:srgbClr val="000000"/>
+              </a:buClr>
+              <a:buSzPct val="45000"/>
+              <a:buFont typeface="Wingdings" charset="2"/>
+              <a:buChar char=""/>
+            </a:pPr>
+            <a:r>
+              <a:rPr b="0" lang="en-US" sz="2000" spc="-1" strike="noStrike">
+                <a:solidFill>
+                  <a:srgbClr val="000000"/>
+                </a:solidFill>
+                <a:uFill>
+                  <a:solidFill>
+                    <a:srgbClr val="ffffff"/>
+                  </a:solidFill>
+                </a:uFill>
+                <a:latin typeface="Arial"/>
+              </a:rPr>
+              <a:t>Sixth Outline Level</a:t>
+            </a:r>
+            <a:endParaRPr b="0" lang="en-US" sz="2000" spc="-1" strike="noStrike">
+              <a:solidFill>
+                <a:srgbClr val="000000"/>
+              </a:solidFill>
+              <a:uFill>
+                <a:solidFill>
+                  <a:srgbClr val="ffffff"/>
+                </a:solidFill>
+              </a:uFill>
+              <a:latin typeface="Arial"/>
+            </a:endParaRPr>
+          </a:p>
+          <a:p>
+            <a:pPr lvl="6" marL="3024000" indent="-216000">
+              <a:buClr>
+                <a:srgbClr val="000000"/>
+              </a:buClr>
+              <a:buSzPct val="45000"/>
+              <a:buFont typeface="Wingdings" charset="2"/>
+              <a:buChar char=""/>
+            </a:pPr>
+            <a:r>
+              <a:rPr b="0" lang="en-US" sz="2000" spc="-1" strike="noStrike">
+                <a:solidFill>
+                  <a:srgbClr val="000000"/>
+                </a:solidFill>
+                <a:uFill>
+                  <a:solidFill>
+                    <a:srgbClr val="ffffff"/>
+                  </a:solidFill>
+                </a:uFill>
+                <a:latin typeface="Arial"/>
+              </a:rPr>
+              <a:t>Seventh Outline Level</a:t>
+            </a:r>
+            <a:endParaRPr b="0" lang="en-US" sz="2000" spc="-1" strike="noStrike">
+              <a:solidFill>
+                <a:srgbClr val="000000"/>
+              </a:solidFill>
+              <a:uFill>
+                <a:solidFill>
+                  <a:srgbClr val="ffffff"/>
+                </a:solidFill>
+              </a:uFill>
+              <a:latin typeface="Arial"/>
+            </a:endParaRPr>
+          </a:p>
+        </p:txBody>
+      </p:sp>
     </p:spTree>
   </p:cSld>
   <p:clrMap bg1="lt1" bg2="lt2" tx1="dk1" tx2="dk2" accent1="accent1" accent2="accent2" accent3="accent3" accent4="accent4" accent5="accent5" accent6="accent6" hlink="hlink" folHlink="folHlink"/>
@@ -1542,7 +1861,7 @@
       </p:grpSpPr>
       <p:pic>
         <p:nvPicPr>
-          <p:cNvPr id="34" name="" descr=""/>
+          <p:cNvPr id="36" name="" descr=""/>
           <p:cNvPicPr/>
           <p:nvPr/>
         </p:nvPicPr>
@@ -1552,8 +1871,8 @@
         </p:blipFill>
         <p:spPr>
           <a:xfrm>
-            <a:off x="4134240" y="26392320"/>
-            <a:ext cx="10799280" cy="14492880"/>
+            <a:off x="15544800" y="9628560"/>
+            <a:ext cx="14173200" cy="12719160"/>
           </a:xfrm>
           <a:prstGeom prst="rect">
             <a:avLst/>
@@ -1565,19 +1884,19 @@
       </p:pic>
       <p:pic>
         <p:nvPicPr>
-          <p:cNvPr id="35" name="" descr=""/>
+          <p:cNvPr id="37" name="" descr=""/>
           <p:cNvPicPr/>
           <p:nvPr/>
         </p:nvPicPr>
         <p:blipFill>
           <a:blip r:embed="rId2"/>
-          <a:srcRect l="17455" t="0" r="4773" b="0"/>
+          <a:srcRect l="17457" t="0" r="4773" b="0"/>
           <a:stretch/>
         </p:blipFill>
         <p:spPr>
           <a:xfrm>
-            <a:off x="15179040" y="24157440"/>
-            <a:ext cx="12599280" cy="12977280"/>
+            <a:off x="16844760" y="26538840"/>
+            <a:ext cx="12598920" cy="12976920"/>
           </a:xfrm>
           <a:prstGeom prst="rect">
             <a:avLst/>
@@ -1589,18 +1908,19 @@
       </p:pic>
       <p:pic>
         <p:nvPicPr>
-          <p:cNvPr id="36" name="" descr=""/>
+          <p:cNvPr id="38" name="" descr=""/>
           <p:cNvPicPr/>
           <p:nvPr/>
         </p:nvPicPr>
         <p:blipFill>
           <a:blip r:embed="rId3"/>
+          <a:srcRect l="0" t="3291" r="0" b="0"/>
           <a:stretch/>
         </p:blipFill>
         <p:spPr>
           <a:xfrm>
-            <a:off x="9601200" y="20465280"/>
-            <a:ext cx="5399280" cy="3034080"/>
+            <a:off x="23045400" y="33350760"/>
+            <a:ext cx="1699560" cy="1827360"/>
           </a:xfrm>
           <a:prstGeom prst="rect">
             <a:avLst/>
@@ -1610,23 +1930,49 @@
           </a:ln>
         </p:spPr>
       </p:pic>
-      <p:sp>
-        <p:nvSpPr>
-          <p:cNvPr id="37" name="CustomShape 1"/>
+      <p:pic>
+        <p:nvPicPr>
+          <p:cNvPr id="39" name="" descr=""/>
+          <p:cNvPicPr/>
+          <p:nvPr/>
+        </p:nvPicPr>
+        <p:blipFill>
+          <a:blip r:embed="rId4"/>
+          <a:stretch/>
+        </p:blipFill>
+        <p:spPr>
+          <a:xfrm>
+            <a:off x="21903480" y="32142600"/>
+            <a:ext cx="1078920" cy="3120120"/>
+          </a:xfrm>
+          <a:prstGeom prst="rect">
+            <a:avLst/>
+          </a:prstGeom>
+          <a:ln>
+            <a:noFill/>
+          </a:ln>
+        </p:spPr>
+      </p:pic>
+      <p:sp>
+        <p:nvSpPr>
+          <p:cNvPr id="40" name="CustomShape 1"/>
           <p:cNvSpPr/>
           <p:nvPr/>
         </p:nvSpPr>
         <p:spPr>
-          <a:xfrm>
-            <a:off x="1170360" y="4239360"/>
-            <a:ext cx="27923040" cy="3015720"/>
-          </a:xfrm>
-          <a:prstGeom prst="rect">
+          <a:xfrm rot="20922000">
+            <a:off x="22032000" y="26718120"/>
+            <a:ext cx="456480" cy="1006560"/>
+          </a:xfrm>
+          <a:prstGeom prst="ellipse">
             <a:avLst/>
           </a:prstGeom>
           <a:noFill/>
-          <a:ln>
-            <a:noFill/>
+          <a:ln w="12600">
+            <a:solidFill>
+              <a:srgbClr val="333333"/>
+            </a:solidFill>
+            <a:round/>
           </a:ln>
         </p:spPr>
         <p:style>
@@ -1635,86 +1981,17 @@
           <a:effectRef idx="0"/>
           <a:fontRef idx="minor"/>
         </p:style>
-        <p:txBody>
-          <a:bodyPr lIns="90000" rIns="90000" tIns="45000" bIns="45000"/>
-          <a:p>
-            <a:pPr algn="ctr">
-              <a:lnSpc>
-                <a:spcPct val="100000"/>
-              </a:lnSpc>
-            </a:pPr>
-            <a:r>
-              <a:rPr b="1" lang="en-US" sz="8500" spc="-1" strike="noStrike">
-                <a:solidFill>
-                  <a:srgbClr val="3465a4"/>
-                </a:solidFill>
-                <a:uFill>
-                  <a:solidFill>
-                    <a:srgbClr val="ffffff"/>
-                  </a:solidFill>
-                </a:uFill>
-                <a:latin typeface="Arial"/>
-                <a:ea typeface="DejaVu Sans"/>
-              </a:rPr>
-              <a:t>Subpocket-based fingerprint </a:t>
-            </a:r>
-            <a:endParaRPr b="0" lang="en-US" sz="1800" spc="-1" strike="noStrike">
-              <a:solidFill>
-                <a:srgbClr val="000000"/>
-              </a:solidFill>
-              <a:uFill>
-                <a:solidFill>
-                  <a:srgbClr val="ffffff"/>
-                </a:solidFill>
-              </a:uFill>
-              <a:latin typeface="Arial"/>
-            </a:endParaRPr>
-          </a:p>
-          <a:p>
-            <a:pPr algn="ctr">
-              <a:lnSpc>
-                <a:spcPct val="100000"/>
-              </a:lnSpc>
-            </a:pPr>
-            <a:r>
-              <a:rPr b="1" lang="en-US" sz="8500" spc="-1" strike="noStrike">
-                <a:solidFill>
-                  <a:srgbClr val="3465a4"/>
-                </a:solidFill>
-                <a:uFill>
-                  <a:solidFill>
-                    <a:srgbClr val="ffffff"/>
-                  </a:solidFill>
-                </a:uFill>
-                <a:latin typeface="Arial"/>
-                <a:ea typeface="DejaVu Sans"/>
-              </a:rPr>
-              <a:t>for structural kinase comparison</a:t>
-            </a:r>
-            <a:endParaRPr b="0" lang="en-US" sz="1800" spc="-1" strike="noStrike">
-              <a:solidFill>
-                <a:srgbClr val="000000"/>
-              </a:solidFill>
-              <a:uFill>
-                <a:solidFill>
-                  <a:srgbClr val="ffffff"/>
-                </a:solidFill>
-              </a:uFill>
-              <a:latin typeface="Arial"/>
-            </a:endParaRPr>
-          </a:p>
-        </p:txBody>
-      </p:sp>
-      <p:sp>
-        <p:nvSpPr>
-          <p:cNvPr id="38" name="CustomShape 2"/>
+      </p:sp>
+      <p:sp>
+        <p:nvSpPr>
+          <p:cNvPr id="41" name="CustomShape 2"/>
           <p:cNvSpPr/>
           <p:nvPr/>
         </p:nvSpPr>
         <p:spPr>
           <a:xfrm>
-            <a:off x="1170360" y="7155360"/>
-            <a:ext cx="27923040" cy="2490840"/>
+            <a:off x="17812800" y="27051840"/>
+            <a:ext cx="1997280" cy="1005120"/>
           </a:xfrm>
           <a:prstGeom prst="rect">
             <a:avLst/>
@@ -1735,158 +2012,23 @@
           <a:p>
             <a:pPr algn="ctr">
               <a:lnSpc>
-                <a:spcPct val="115000"/>
+                <a:spcPct val="100000"/>
               </a:lnSpc>
             </a:pPr>
             <a:r>
-              <a:rPr b="0" i="1" lang="en-US" sz="3600" spc="-1" strike="noStrike">
-                <a:solidFill>
-                  <a:srgbClr val="333333"/>
-                </a:solidFill>
-                <a:uFill>
-                  <a:solidFill>
-                    <a:srgbClr val="ffffff"/>
-                  </a:solidFill>
-                </a:uFill>
-                <a:latin typeface="Arial"/>
-                <a:ea typeface="DejaVu Sans"/>
-              </a:rPr>
-              <a:t>Dominique Sydow</a:t>
-            </a:r>
-            <a:r>
-              <a:rPr b="0" lang="en-US" sz="3600" spc="-1" strike="noStrike" baseline="33000">
-                <a:solidFill>
-                  <a:srgbClr val="333333"/>
-                </a:solidFill>
-                <a:uFill>
-                  <a:solidFill>
-                    <a:srgbClr val="ffffff"/>
-                  </a:solidFill>
-                </a:uFill>
-                <a:latin typeface="Arial"/>
-                <a:ea typeface="DejaVu Sans"/>
-              </a:rPr>
-              <a:t>1</a:t>
-            </a:r>
-            <a:r>
-              <a:rPr b="0" lang="en-US" sz="3600" spc="-1" strike="noStrike">
-                <a:solidFill>
-                  <a:srgbClr val="333333"/>
-                </a:solidFill>
-                <a:uFill>
-                  <a:solidFill>
-                    <a:srgbClr val="ffffff"/>
-                  </a:solidFill>
-                </a:uFill>
-                <a:latin typeface="Arial"/>
-                <a:ea typeface="DejaVu Sans"/>
-              </a:rPr>
-              <a:t>, Eva Aßmann</a:t>
-            </a:r>
-            <a:r>
-              <a:rPr b="0" lang="en-US" sz="3600" spc="-1" strike="noStrike" baseline="33000">
-                <a:solidFill>
-                  <a:srgbClr val="333333"/>
-                </a:solidFill>
-                <a:uFill>
-                  <a:solidFill>
-                    <a:srgbClr val="ffffff"/>
-                  </a:solidFill>
-                </a:uFill>
-                <a:latin typeface="Arial"/>
-                <a:ea typeface="DejaVu Sans"/>
-              </a:rPr>
-              <a:t>1</a:t>
-            </a:r>
-            <a:r>
-              <a:rPr b="0" lang="en-US" sz="3600" spc="-1" strike="noStrike">
-                <a:solidFill>
-                  <a:srgbClr val="333333"/>
-                </a:solidFill>
-                <a:uFill>
-                  <a:solidFill>
-                    <a:srgbClr val="ffffff"/>
-                  </a:solidFill>
-                </a:uFill>
-                <a:latin typeface="Arial"/>
-                <a:ea typeface="DejaVu Sans"/>
-              </a:rPr>
-              <a:t>, Albert Kooistra</a:t>
-            </a:r>
-            <a:r>
-              <a:rPr b="0" lang="en-US" sz="3600" spc="-1" strike="noStrike" baseline="33000">
-                <a:solidFill>
-                  <a:srgbClr val="333333"/>
-                </a:solidFill>
-                <a:uFill>
-                  <a:solidFill>
-                    <a:srgbClr val="ffffff"/>
-                  </a:solidFill>
-                </a:uFill>
-                <a:latin typeface="Arial"/>
-                <a:ea typeface="DejaVu Sans"/>
-              </a:rPr>
-              <a:t>2</a:t>
-            </a:r>
-            <a:r>
-              <a:rPr b="0" lang="en-US" sz="3600" spc="-1" strike="noStrike">
-                <a:solidFill>
-                  <a:srgbClr val="333333"/>
-                </a:solidFill>
-                <a:uFill>
-                  <a:solidFill>
-                    <a:srgbClr val="ffffff"/>
-                  </a:solidFill>
-                </a:uFill>
-                <a:latin typeface="Arial"/>
-                <a:ea typeface="DejaVu Sans"/>
-              </a:rPr>
-              <a:t>, Friedrich Rippmann</a:t>
-            </a:r>
-            <a:r>
-              <a:rPr b="0" lang="en-US" sz="3600" spc="-1" strike="noStrike" baseline="33000">
-                <a:solidFill>
-                  <a:srgbClr val="333333"/>
-                </a:solidFill>
-                <a:uFill>
-                  <a:solidFill>
-                    <a:srgbClr val="ffffff"/>
-                  </a:solidFill>
-                </a:uFill>
-                <a:latin typeface="Arial"/>
-                <a:ea typeface="DejaVu Sans"/>
-              </a:rPr>
-              <a:t>3</a:t>
-            </a:r>
-            <a:r>
-              <a:rPr b="0" lang="en-US" sz="3600" spc="-1" strike="noStrike">
-                <a:solidFill>
-                  <a:srgbClr val="333333"/>
-                </a:solidFill>
-                <a:uFill>
-                  <a:solidFill>
-                    <a:srgbClr val="ffffff"/>
-                  </a:solidFill>
-                </a:uFill>
-                <a:latin typeface="Arial"/>
-                <a:ea typeface="DejaVu Sans"/>
-              </a:rPr>
-              <a:t>, Andrea Volkamer</a:t>
-            </a:r>
-            <a:r>
-              <a:rPr b="0" lang="en-US" sz="3600" spc="-1" strike="noStrike" baseline="33000">
-                <a:solidFill>
-                  <a:srgbClr val="333333"/>
-                </a:solidFill>
-                <a:uFill>
-                  <a:solidFill>
-                    <a:srgbClr val="ffffff"/>
-                  </a:solidFill>
-                </a:uFill>
-                <a:latin typeface="Arial"/>
-                <a:ea typeface="DejaVu Sans"/>
-              </a:rPr>
-              <a:t>1</a:t>
+              <a:rPr b="0" lang="en-US" sz="1800" spc="-1" strike="noStrike">
+                <a:solidFill>
+                  <a:srgbClr val="333333"/>
+                </a:solidFill>
+                <a:uFill>
+                  <a:solidFill>
+                    <a:srgbClr val="ffffff"/>
+                  </a:solidFill>
+                </a:uFill>
+                <a:latin typeface="Times New Roman"/>
+                <a:ea typeface="DejaVu Sans"/>
+              </a:rPr>
+              <a:t>DRAK2 inihibitor off-target CaMMK2</a:t>
             </a:r>
             <a:endParaRPr b="0" lang="en-US" sz="1800" spc="-1" strike="noStrike">
               <a:solidFill>
@@ -1900,184 +2042,26 @@
               <a:latin typeface="Arial"/>
             </a:endParaRPr>
           </a:p>
-          <a:p>
-            <a:pPr algn="ctr">
-              <a:lnSpc>
-                <a:spcPct val="115000"/>
-              </a:lnSpc>
-            </a:pPr>
-            <a:r>
-              <a:rPr b="0" lang="en-US" sz="2600" spc="-1" strike="noStrike" baseline="33000">
-                <a:solidFill>
-                  <a:srgbClr val="333333"/>
-                </a:solidFill>
-                <a:uFill>
-                  <a:solidFill>
-                    <a:srgbClr val="ffffff"/>
-                  </a:solidFill>
-                </a:uFill>
-                <a:latin typeface="Arial"/>
-                <a:ea typeface="DejaVu Sans"/>
-              </a:rPr>
-              <a:t>1 </a:t>
-            </a:r>
-            <a:r>
-              <a:rPr b="0" i="1" lang="en-US" sz="2600" spc="-1" strike="noStrike">
-                <a:solidFill>
-                  <a:srgbClr val="333333"/>
-                </a:solidFill>
-                <a:uFill>
-                  <a:solidFill>
-                    <a:srgbClr val="ffffff"/>
-                  </a:solidFill>
-                </a:uFill>
-                <a:latin typeface="Arial"/>
-                <a:ea typeface="DejaVu Sans"/>
-              </a:rPr>
-              <a:t>In silico</a:t>
-            </a:r>
-            <a:r>
-              <a:rPr b="0" lang="en-US" sz="2600" spc="-1" strike="noStrike">
-                <a:solidFill>
-                  <a:srgbClr val="333333"/>
-                </a:solidFill>
-                <a:uFill>
-                  <a:solidFill>
-                    <a:srgbClr val="ffffff"/>
-                  </a:solidFill>
-                </a:uFill>
-                <a:latin typeface="Arial"/>
-                <a:ea typeface="DejaVu Sans"/>
-              </a:rPr>
-              <a:t> Toxicology, Institute for Physiology, Universitätsmedizin Berlin, Virchowweg 6, 10117 Berlin, Germany</a:t>
-            </a:r>
-            <a:endParaRPr b="0" lang="en-US" sz="1800" spc="-1" strike="noStrike">
-              <a:solidFill>
-                <a:srgbClr val="000000"/>
-              </a:solidFill>
-              <a:uFill>
-                <a:solidFill>
-                  <a:srgbClr val="ffffff"/>
-                </a:solidFill>
-              </a:uFill>
-              <a:latin typeface="Arial"/>
-            </a:endParaRPr>
-          </a:p>
-          <a:p>
-            <a:pPr algn="ctr">
-              <a:lnSpc>
-                <a:spcPct val="115000"/>
-              </a:lnSpc>
-            </a:pPr>
-            <a:r>
-              <a:rPr b="0" lang="en-US" sz="2600" spc="-1" strike="noStrike" baseline="33000">
-                <a:solidFill>
-                  <a:srgbClr val="333333"/>
-                </a:solidFill>
-                <a:uFill>
-                  <a:solidFill>
-                    <a:srgbClr val="ffffff"/>
-                  </a:solidFill>
-                </a:uFill>
-                <a:latin typeface="Arial"/>
-                <a:ea typeface="DejaVu Sans"/>
-              </a:rPr>
-              <a:t>2 </a:t>
-            </a:r>
-            <a:r>
-              <a:rPr b="0" lang="en-US" sz="2600" spc="-1" strike="noStrike">
-                <a:solidFill>
-                  <a:srgbClr val="333333"/>
-                </a:solidFill>
-                <a:uFill>
-                  <a:solidFill>
-                    <a:srgbClr val="ffffff"/>
-                  </a:solidFill>
-                </a:uFill>
-                <a:latin typeface="Arial"/>
-                <a:ea typeface="DejaVu Sans"/>
-              </a:rPr>
-              <a:t>Department of Drug Design and Pharmacology, Faculty of Health and Medical Sciences, University of Copenhagen, Jagtvej 162, DK-2100 Copenhagen, Denmark</a:t>
-            </a:r>
-            <a:endParaRPr b="0" lang="en-US" sz="1800" spc="-1" strike="noStrike">
-              <a:solidFill>
-                <a:srgbClr val="000000"/>
-              </a:solidFill>
-              <a:uFill>
-                <a:solidFill>
-                  <a:srgbClr val="ffffff"/>
-                </a:solidFill>
-              </a:uFill>
-              <a:latin typeface="Arial"/>
-            </a:endParaRPr>
-          </a:p>
-          <a:p>
-            <a:pPr algn="ctr">
-              <a:lnSpc>
-                <a:spcPct val="115000"/>
-              </a:lnSpc>
-            </a:pPr>
-            <a:r>
-              <a:rPr b="0" lang="en-US" sz="2600" spc="-1" strike="noStrike" baseline="33000">
-                <a:solidFill>
-                  <a:srgbClr val="333333"/>
-                </a:solidFill>
-                <a:uFill>
-                  <a:solidFill>
-                    <a:srgbClr val="ffffff"/>
-                  </a:solidFill>
-                </a:uFill>
-                <a:latin typeface="Arial"/>
-                <a:ea typeface="DejaVu Sans"/>
-              </a:rPr>
-              <a:t>3 </a:t>
-            </a:r>
-            <a:r>
-              <a:rPr b="0" lang="en-US" sz="2600" spc="-1" strike="noStrike">
-                <a:solidFill>
-                  <a:srgbClr val="333333"/>
-                </a:solidFill>
-                <a:uFill>
-                  <a:solidFill>
-                    <a:srgbClr val="ffffff"/>
-                  </a:solidFill>
-                </a:uFill>
-                <a:latin typeface="Arial"/>
-                <a:ea typeface="DejaVu Sans"/>
-              </a:rPr>
-              <a:t>Computational Chemistry &amp; Biology, Merck Healthcare KGaA, Frankfurter Str. 250, 64293 Darmstadt, Germany</a:t>
-            </a:r>
-            <a:endParaRPr b="0" lang="en-US" sz="1800" spc="-1" strike="noStrike">
-              <a:solidFill>
-                <a:srgbClr val="000000"/>
-              </a:solidFill>
-              <a:uFill>
-                <a:solidFill>
-                  <a:srgbClr val="ffffff"/>
-                </a:solidFill>
-              </a:uFill>
-              <a:latin typeface="Arial"/>
-            </a:endParaRPr>
-          </a:p>
-        </p:txBody>
-      </p:sp>
-      <p:sp>
-        <p:nvSpPr>
-          <p:cNvPr id="39" name="CustomShape 3"/>
+        </p:txBody>
+      </p:sp>
+      <p:sp>
+        <p:nvSpPr>
+          <p:cNvPr id="42" name="Line 3"/>
           <p:cNvSpPr/>
           <p:nvPr/>
         </p:nvSpPr>
         <p:spPr>
-          <a:xfrm>
-            <a:off x="15318000" y="37227600"/>
-            <a:ext cx="14398200" cy="1736640"/>
-          </a:xfrm>
-          <a:prstGeom prst="rect">
-            <a:avLst/>
-          </a:prstGeom>
-          <a:noFill/>
+          <a:xfrm flipV="1">
+            <a:off x="19810440" y="26938080"/>
+            <a:ext cx="2127960" cy="274320"/>
+          </a:xfrm>
+          <a:prstGeom prst="line">
+            <a:avLst/>
+          </a:prstGeom>
           <a:ln>
-            <a:noFill/>
+            <a:solidFill>
+              <a:srgbClr val="333333"/>
+            </a:solidFill>
           </a:ln>
         </p:spPr>
         <p:style>
@@ -2086,53 +2070,63 @@
           <a:effectRef idx="0"/>
           <a:fontRef idx="minor"/>
         </p:style>
-        <p:txBody>
-          <a:bodyPr lIns="90000" rIns="90000" tIns="45000" bIns="45000"/>
-          <a:p>
-            <a:pPr algn="just">
-              <a:lnSpc>
-                <a:spcPct val="115000"/>
-              </a:lnSpc>
-            </a:pPr>
-            <a:r>
-              <a:rPr b="0" lang="en-US" sz="2600" spc="-1" strike="noStrike">
-                <a:solidFill>
-                  <a:srgbClr val="333333"/>
-                </a:solidFill>
-                <a:uFill>
-                  <a:solidFill>
-                    <a:srgbClr val="ffffff"/>
-                  </a:solidFill>
-                </a:uFill>
-                <a:latin typeface="Arial"/>
-                <a:ea typeface="DejaVu Sans"/>
-              </a:rPr>
-              <a:t>We believe that our subpocket-based kinase fingerprint can help researchers (i) to detect potential promiscuities and off-targets at an early stage of inhibitor design and (ii) to conduct structure-informed polypharmacology studies. </a:t>
-            </a:r>
-            <a:endParaRPr b="0" lang="en-US" sz="1800" spc="-1" strike="noStrike">
-              <a:solidFill>
-                <a:srgbClr val="000000"/>
-              </a:solidFill>
-              <a:uFill>
-                <a:solidFill>
-                  <a:srgbClr val="ffffff"/>
-                </a:solidFill>
-              </a:uFill>
-              <a:latin typeface="Arial"/>
-            </a:endParaRPr>
-          </a:p>
-        </p:txBody>
-      </p:sp>
-      <p:sp>
-        <p:nvSpPr>
-          <p:cNvPr id="40" name="CustomShape 4"/>
+      </p:sp>
+      <p:pic>
+        <p:nvPicPr>
+          <p:cNvPr id="43" name="" descr=""/>
+          <p:cNvPicPr/>
+          <p:nvPr/>
+        </p:nvPicPr>
+        <p:blipFill>
+          <a:blip r:embed="rId5"/>
+          <a:stretch/>
+        </p:blipFill>
+        <p:spPr>
+          <a:xfrm>
+            <a:off x="7680960" y="26805600"/>
+            <a:ext cx="9144000" cy="12271320"/>
+          </a:xfrm>
+          <a:prstGeom prst="rect">
+            <a:avLst/>
+          </a:prstGeom>
+          <a:ln>
+            <a:noFill/>
+          </a:ln>
+        </p:spPr>
+      </p:pic>
+      <p:pic>
+        <p:nvPicPr>
+          <p:cNvPr id="44" name="" descr=""/>
+          <p:cNvPicPr/>
+          <p:nvPr/>
+        </p:nvPicPr>
+        <p:blipFill>
+          <a:blip r:embed="rId6"/>
+          <a:stretch/>
+        </p:blipFill>
+        <p:spPr>
+          <a:xfrm>
+            <a:off x="10457280" y="20920320"/>
+            <a:ext cx="4572000" cy="2560320"/>
+          </a:xfrm>
+          <a:prstGeom prst="rect">
+            <a:avLst/>
+          </a:prstGeom>
+          <a:ln>
+            <a:noFill/>
+          </a:ln>
+        </p:spPr>
+      </p:pic>
+      <p:sp>
+        <p:nvSpPr>
+          <p:cNvPr id="45" name="CustomShape 4"/>
           <p:cNvSpPr/>
           <p:nvPr/>
         </p:nvSpPr>
         <p:spPr>
           <a:xfrm>
-            <a:off x="15318000" y="39461040"/>
-            <a:ext cx="14398200" cy="2023920"/>
+            <a:off x="1170360" y="4239360"/>
+            <a:ext cx="27922680" cy="3015360"/>
           </a:xfrm>
           <a:prstGeom prst="rect">
             <a:avLst/>
@@ -2151,6 +2145,457 @@
         <p:txBody>
           <a:bodyPr lIns="90000" rIns="90000" tIns="45000" bIns="45000"/>
           <a:p>
+            <a:pPr algn="ctr">
+              <a:lnSpc>
+                <a:spcPct val="100000"/>
+              </a:lnSpc>
+            </a:pPr>
+            <a:r>
+              <a:rPr b="1" lang="en-US" sz="8500" spc="-1" strike="noStrike">
+                <a:solidFill>
+                  <a:srgbClr val="3465a4"/>
+                </a:solidFill>
+                <a:uFill>
+                  <a:solidFill>
+                    <a:srgbClr val="ffffff"/>
+                  </a:solidFill>
+                </a:uFill>
+                <a:latin typeface="Arial"/>
+                <a:ea typeface="DejaVu Sans"/>
+              </a:rPr>
+              <a:t>Subpocket-based fingerprint </a:t>
+            </a:r>
+            <a:endParaRPr b="0" lang="en-US" sz="1800" spc="-1" strike="noStrike">
+              <a:solidFill>
+                <a:srgbClr val="000000"/>
+              </a:solidFill>
+              <a:uFill>
+                <a:solidFill>
+                  <a:srgbClr val="ffffff"/>
+                </a:solidFill>
+              </a:uFill>
+              <a:latin typeface="Arial"/>
+            </a:endParaRPr>
+          </a:p>
+          <a:p>
+            <a:pPr algn="ctr">
+              <a:lnSpc>
+                <a:spcPct val="100000"/>
+              </a:lnSpc>
+            </a:pPr>
+            <a:r>
+              <a:rPr b="1" lang="en-US" sz="8500" spc="-1" strike="noStrike">
+                <a:solidFill>
+                  <a:srgbClr val="3465a4"/>
+                </a:solidFill>
+                <a:uFill>
+                  <a:solidFill>
+                    <a:srgbClr val="ffffff"/>
+                  </a:solidFill>
+                </a:uFill>
+                <a:latin typeface="Arial"/>
+                <a:ea typeface="DejaVu Sans"/>
+              </a:rPr>
+              <a:t>for structural kinase comparison</a:t>
+            </a:r>
+            <a:endParaRPr b="0" lang="en-US" sz="1800" spc="-1" strike="noStrike">
+              <a:solidFill>
+                <a:srgbClr val="000000"/>
+              </a:solidFill>
+              <a:uFill>
+                <a:solidFill>
+                  <a:srgbClr val="ffffff"/>
+                </a:solidFill>
+              </a:uFill>
+              <a:latin typeface="Arial"/>
+            </a:endParaRPr>
+          </a:p>
+        </p:txBody>
+      </p:sp>
+      <p:sp>
+        <p:nvSpPr>
+          <p:cNvPr id="46" name="CustomShape 5"/>
+          <p:cNvSpPr/>
+          <p:nvPr/>
+        </p:nvSpPr>
+        <p:spPr>
+          <a:xfrm>
+            <a:off x="1170360" y="7155360"/>
+            <a:ext cx="27922680" cy="2490480"/>
+          </a:xfrm>
+          <a:prstGeom prst="rect">
+            <a:avLst/>
+          </a:prstGeom>
+          <a:noFill/>
+          <a:ln>
+            <a:noFill/>
+          </a:ln>
+        </p:spPr>
+        <p:style>
+          <a:lnRef idx="0"/>
+          <a:fillRef idx="0"/>
+          <a:effectRef idx="0"/>
+          <a:fontRef idx="minor"/>
+        </p:style>
+        <p:txBody>
+          <a:bodyPr lIns="90000" rIns="90000" tIns="45000" bIns="45000"/>
+          <a:p>
+            <a:pPr algn="ctr">
+              <a:lnSpc>
+                <a:spcPct val="115000"/>
+              </a:lnSpc>
+            </a:pPr>
+            <a:r>
+              <a:rPr b="0" i="1" lang="en-US" sz="3600" spc="-1" strike="noStrike">
+                <a:solidFill>
+                  <a:srgbClr val="333333"/>
+                </a:solidFill>
+                <a:uFill>
+                  <a:solidFill>
+                    <a:srgbClr val="ffffff"/>
+                  </a:solidFill>
+                </a:uFill>
+                <a:latin typeface="Arial"/>
+                <a:ea typeface="DejaVu Sans"/>
+              </a:rPr>
+              <a:t>Dominique Sydow</a:t>
+            </a:r>
+            <a:r>
+              <a:rPr b="0" lang="en-US" sz="3600" spc="-1" strike="noStrike" baseline="33000">
+                <a:solidFill>
+                  <a:srgbClr val="333333"/>
+                </a:solidFill>
+                <a:uFill>
+                  <a:solidFill>
+                    <a:srgbClr val="ffffff"/>
+                  </a:solidFill>
+                </a:uFill>
+                <a:latin typeface="Arial"/>
+                <a:ea typeface="DejaVu Sans"/>
+              </a:rPr>
+              <a:t>1</a:t>
+            </a:r>
+            <a:r>
+              <a:rPr b="0" lang="en-US" sz="3600" spc="-1" strike="noStrike">
+                <a:solidFill>
+                  <a:srgbClr val="333333"/>
+                </a:solidFill>
+                <a:uFill>
+                  <a:solidFill>
+                    <a:srgbClr val="ffffff"/>
+                  </a:solidFill>
+                </a:uFill>
+                <a:latin typeface="Arial"/>
+                <a:ea typeface="DejaVu Sans"/>
+              </a:rPr>
+              <a:t>, Eva Aßmann</a:t>
+            </a:r>
+            <a:r>
+              <a:rPr b="0" lang="en-US" sz="3600" spc="-1" strike="noStrike" baseline="33000">
+                <a:solidFill>
+                  <a:srgbClr val="333333"/>
+                </a:solidFill>
+                <a:uFill>
+                  <a:solidFill>
+                    <a:srgbClr val="ffffff"/>
+                  </a:solidFill>
+                </a:uFill>
+                <a:latin typeface="Arial"/>
+                <a:ea typeface="DejaVu Sans"/>
+              </a:rPr>
+              <a:t>1</a:t>
+            </a:r>
+            <a:r>
+              <a:rPr b="0" lang="en-US" sz="3600" spc="-1" strike="noStrike">
+                <a:solidFill>
+                  <a:srgbClr val="333333"/>
+                </a:solidFill>
+                <a:uFill>
+                  <a:solidFill>
+                    <a:srgbClr val="ffffff"/>
+                  </a:solidFill>
+                </a:uFill>
+                <a:latin typeface="Arial"/>
+                <a:ea typeface="DejaVu Sans"/>
+              </a:rPr>
+              <a:t>, Albert Kooistra</a:t>
+            </a:r>
+            <a:r>
+              <a:rPr b="0" lang="en-US" sz="3600" spc="-1" strike="noStrike" baseline="33000">
+                <a:solidFill>
+                  <a:srgbClr val="333333"/>
+                </a:solidFill>
+                <a:uFill>
+                  <a:solidFill>
+                    <a:srgbClr val="ffffff"/>
+                  </a:solidFill>
+                </a:uFill>
+                <a:latin typeface="Arial"/>
+                <a:ea typeface="DejaVu Sans"/>
+              </a:rPr>
+              <a:t>2</a:t>
+            </a:r>
+            <a:r>
+              <a:rPr b="0" lang="en-US" sz="3600" spc="-1" strike="noStrike">
+                <a:solidFill>
+                  <a:srgbClr val="333333"/>
+                </a:solidFill>
+                <a:uFill>
+                  <a:solidFill>
+                    <a:srgbClr val="ffffff"/>
+                  </a:solidFill>
+                </a:uFill>
+                <a:latin typeface="Arial"/>
+                <a:ea typeface="DejaVu Sans"/>
+              </a:rPr>
+              <a:t>, Friedrich Rippmann</a:t>
+            </a:r>
+            <a:r>
+              <a:rPr b="0" lang="en-US" sz="3600" spc="-1" strike="noStrike" baseline="33000">
+                <a:solidFill>
+                  <a:srgbClr val="333333"/>
+                </a:solidFill>
+                <a:uFill>
+                  <a:solidFill>
+                    <a:srgbClr val="ffffff"/>
+                  </a:solidFill>
+                </a:uFill>
+                <a:latin typeface="Arial"/>
+                <a:ea typeface="DejaVu Sans"/>
+              </a:rPr>
+              <a:t>3</a:t>
+            </a:r>
+            <a:r>
+              <a:rPr b="0" lang="en-US" sz="3600" spc="-1" strike="noStrike">
+                <a:solidFill>
+                  <a:srgbClr val="333333"/>
+                </a:solidFill>
+                <a:uFill>
+                  <a:solidFill>
+                    <a:srgbClr val="ffffff"/>
+                  </a:solidFill>
+                </a:uFill>
+                <a:latin typeface="Arial"/>
+                <a:ea typeface="DejaVu Sans"/>
+              </a:rPr>
+              <a:t>, Andrea Volkamer</a:t>
+            </a:r>
+            <a:r>
+              <a:rPr b="0" lang="en-US" sz="3600" spc="-1" strike="noStrike" baseline="33000">
+                <a:solidFill>
+                  <a:srgbClr val="333333"/>
+                </a:solidFill>
+                <a:uFill>
+                  <a:solidFill>
+                    <a:srgbClr val="ffffff"/>
+                  </a:solidFill>
+                </a:uFill>
+                <a:latin typeface="Arial"/>
+                <a:ea typeface="DejaVu Sans"/>
+              </a:rPr>
+              <a:t>1</a:t>
+            </a:r>
+            <a:endParaRPr b="0" lang="en-US" sz="1800" spc="-1" strike="noStrike">
+              <a:solidFill>
+                <a:srgbClr val="000000"/>
+              </a:solidFill>
+              <a:uFill>
+                <a:solidFill>
+                  <a:srgbClr val="ffffff"/>
+                </a:solidFill>
+              </a:uFill>
+              <a:latin typeface="Arial"/>
+            </a:endParaRPr>
+          </a:p>
+          <a:p>
+            <a:pPr algn="ctr">
+              <a:lnSpc>
+                <a:spcPct val="115000"/>
+              </a:lnSpc>
+            </a:pPr>
+            <a:r>
+              <a:rPr b="0" lang="en-US" sz="2600" spc="-1" strike="noStrike" baseline="33000">
+                <a:solidFill>
+                  <a:srgbClr val="333333"/>
+                </a:solidFill>
+                <a:uFill>
+                  <a:solidFill>
+                    <a:srgbClr val="ffffff"/>
+                  </a:solidFill>
+                </a:uFill>
+                <a:latin typeface="Arial"/>
+                <a:ea typeface="DejaVu Sans"/>
+              </a:rPr>
+              <a:t>1 </a:t>
+            </a:r>
+            <a:r>
+              <a:rPr b="0" i="1" lang="en-US" sz="2600" spc="-1" strike="noStrike">
+                <a:solidFill>
+                  <a:srgbClr val="333333"/>
+                </a:solidFill>
+                <a:uFill>
+                  <a:solidFill>
+                    <a:srgbClr val="ffffff"/>
+                  </a:solidFill>
+                </a:uFill>
+                <a:latin typeface="Arial"/>
+                <a:ea typeface="DejaVu Sans"/>
+              </a:rPr>
+              <a:t>In silico</a:t>
+            </a:r>
+            <a:r>
+              <a:rPr b="0" lang="en-US" sz="2600" spc="-1" strike="noStrike">
+                <a:solidFill>
+                  <a:srgbClr val="333333"/>
+                </a:solidFill>
+                <a:uFill>
+                  <a:solidFill>
+                    <a:srgbClr val="ffffff"/>
+                  </a:solidFill>
+                </a:uFill>
+                <a:latin typeface="Arial"/>
+                <a:ea typeface="DejaVu Sans"/>
+              </a:rPr>
+              <a:t> Toxicology, Institute for Physiology, Universitätsmedizin Berlin, Virchowweg 6, 10117 Berlin, Germany</a:t>
+            </a:r>
+            <a:endParaRPr b="0" lang="en-US" sz="1800" spc="-1" strike="noStrike">
+              <a:solidFill>
+                <a:srgbClr val="000000"/>
+              </a:solidFill>
+              <a:uFill>
+                <a:solidFill>
+                  <a:srgbClr val="ffffff"/>
+                </a:solidFill>
+              </a:uFill>
+              <a:latin typeface="Arial"/>
+            </a:endParaRPr>
+          </a:p>
+          <a:p>
+            <a:pPr algn="ctr">
+              <a:lnSpc>
+                <a:spcPct val="115000"/>
+              </a:lnSpc>
+            </a:pPr>
+            <a:r>
+              <a:rPr b="0" lang="en-US" sz="2600" spc="-1" strike="noStrike" baseline="33000">
+                <a:solidFill>
+                  <a:srgbClr val="333333"/>
+                </a:solidFill>
+                <a:uFill>
+                  <a:solidFill>
+                    <a:srgbClr val="ffffff"/>
+                  </a:solidFill>
+                </a:uFill>
+                <a:latin typeface="Arial"/>
+                <a:ea typeface="DejaVu Sans"/>
+              </a:rPr>
+              <a:t>2 </a:t>
+            </a:r>
+            <a:r>
+              <a:rPr b="0" lang="en-US" sz="2600" spc="-1" strike="noStrike">
+                <a:solidFill>
+                  <a:srgbClr val="333333"/>
+                </a:solidFill>
+                <a:uFill>
+                  <a:solidFill>
+                    <a:srgbClr val="ffffff"/>
+                  </a:solidFill>
+                </a:uFill>
+                <a:latin typeface="Arial"/>
+                <a:ea typeface="DejaVu Sans"/>
+              </a:rPr>
+              <a:t>Department of Drug Design and Pharmacology, Faculty of Health and Medical Sciences, University of Copenhagen, Jagtvej 162, DK-2100 Copenhagen, Denmark</a:t>
+            </a:r>
+            <a:endParaRPr b="0" lang="en-US" sz="1800" spc="-1" strike="noStrike">
+              <a:solidFill>
+                <a:srgbClr val="000000"/>
+              </a:solidFill>
+              <a:uFill>
+                <a:solidFill>
+                  <a:srgbClr val="ffffff"/>
+                </a:solidFill>
+              </a:uFill>
+              <a:latin typeface="Arial"/>
+            </a:endParaRPr>
+          </a:p>
+          <a:p>
+            <a:pPr algn="ctr">
+              <a:lnSpc>
+                <a:spcPct val="115000"/>
+              </a:lnSpc>
+            </a:pPr>
+            <a:r>
+              <a:rPr b="0" lang="en-US" sz="2600" spc="-1" strike="noStrike" baseline="33000">
+                <a:solidFill>
+                  <a:srgbClr val="333333"/>
+                </a:solidFill>
+                <a:uFill>
+                  <a:solidFill>
+                    <a:srgbClr val="ffffff"/>
+                  </a:solidFill>
+                </a:uFill>
+                <a:latin typeface="Arial"/>
+                <a:ea typeface="DejaVu Sans"/>
+              </a:rPr>
+              <a:t>3 </a:t>
+            </a:r>
+            <a:r>
+              <a:rPr b="0" lang="en-US" sz="2600" spc="-1" strike="noStrike">
+                <a:solidFill>
+                  <a:srgbClr val="333333"/>
+                </a:solidFill>
+                <a:uFill>
+                  <a:solidFill>
+                    <a:srgbClr val="ffffff"/>
+                  </a:solidFill>
+                </a:uFill>
+                <a:latin typeface="Arial"/>
+                <a:ea typeface="DejaVu Sans"/>
+              </a:rPr>
+              <a:t>Computational Chemistry &amp; Biology, Merck Healthcare KGaA, Frankfurter Str. 250, 64293 Darmstadt, Germany</a:t>
+            </a:r>
+            <a:endParaRPr b="0" lang="en-US" sz="1800" spc="-1" strike="noStrike">
+              <a:solidFill>
+                <a:srgbClr val="000000"/>
+              </a:solidFill>
+              <a:uFill>
+                <a:solidFill>
+                  <a:srgbClr val="ffffff"/>
+                </a:solidFill>
+              </a:uFill>
+              <a:latin typeface="Arial"/>
+            </a:endParaRPr>
+          </a:p>
+        </p:txBody>
+      </p:sp>
+      <p:sp>
+        <p:nvSpPr>
+          <p:cNvPr id="47" name="CustomShape 6"/>
+          <p:cNvSpPr/>
+          <p:nvPr/>
+        </p:nvSpPr>
+        <p:spPr>
+          <a:xfrm>
+            <a:off x="722520" y="39459240"/>
+            <a:ext cx="14397840" cy="1736280"/>
+          </a:xfrm>
+          <a:prstGeom prst="rect">
+            <a:avLst/>
+          </a:prstGeom>
+          <a:noFill/>
+          <a:ln>
+            <a:noFill/>
+          </a:ln>
+        </p:spPr>
+        <p:style>
+          <a:lnRef idx="0"/>
+          <a:fillRef idx="0"/>
+          <a:effectRef idx="0"/>
+          <a:fontRef idx="minor"/>
+        </p:style>
+        <p:txBody>
+          <a:bodyPr lIns="90000" rIns="90000" tIns="45000" bIns="45000"/>
+          <a:p>
             <a:pPr algn="just">
               <a:lnSpc>
                 <a:spcPct val="115000"/>
@@ -2169,6 +2614,68 @@
                 <a:latin typeface="Arial"/>
                 <a:ea typeface="DejaVu Sans"/>
               </a:rPr>
+              <a:t>Our subpocket-based kinase fingerprinting strategy can partially retrieve the Manning kinase classification but also retrospectively reveals structural relationships between kinase groups. Therefore, we believe our fingerprint can help researchers (i) to detect potential promiscuities and off-targets at an early stage of inhibitor design and (ii) to conduct structure-informed polypharmacology studies.</a:t>
+            </a:r>
+            <a:endParaRPr b="0" lang="en-US" sz="1800" spc="-1" strike="noStrike">
+              <a:solidFill>
+                <a:srgbClr val="000000"/>
+              </a:solidFill>
+              <a:uFill>
+                <a:solidFill>
+                  <a:srgbClr val="ffffff"/>
+                </a:solidFill>
+              </a:uFill>
+              <a:latin typeface="Arial"/>
+            </a:endParaRPr>
+          </a:p>
+        </p:txBody>
+      </p:sp>
+      <p:sp>
+        <p:nvSpPr>
+          <p:cNvPr id="48" name="CustomShape 7"/>
+          <p:cNvSpPr/>
+          <p:nvPr/>
+        </p:nvSpPr>
+        <p:spPr>
+          <a:xfrm>
+            <a:off x="15318000" y="39461040"/>
+            <a:ext cx="14397840" cy="2023560"/>
+          </a:xfrm>
+          <a:prstGeom prst="rect">
+            <a:avLst/>
+          </a:prstGeom>
+          <a:noFill/>
+          <a:ln>
+            <a:noFill/>
+          </a:ln>
+        </p:spPr>
+        <p:style>
+          <a:lnRef idx="0"/>
+          <a:fillRef idx="0"/>
+          <a:effectRef idx="0"/>
+          <a:fontRef idx="minor"/>
+        </p:style>
+        <p:txBody>
+          <a:bodyPr lIns="90000" rIns="90000" tIns="45000" bIns="45000"/>
+          <a:p>
+            <a:pPr algn="just">
+              <a:lnSpc>
+                <a:spcPct val="115000"/>
+              </a:lnSpc>
+            </a:pPr>
+            <a:r>
+              <a:rPr b="0" lang="en-US" sz="2600" spc="-1" strike="noStrike">
+                <a:solidFill>
+                  <a:srgbClr val="333333"/>
+                </a:solidFill>
+                <a:uFill>
+                  <a:solidFill>
+                    <a:srgbClr val="ffffff"/>
+                  </a:solidFill>
+                </a:uFill>
+                <a:latin typeface="Arial"/>
+                <a:ea typeface="DejaVu Sans"/>
+              </a:rPr>
               <a:t>[1] Kooistra and Volkamer. Ann Rep Med Chem. 2017, 50, 263-299. [2] van Linden et al. J Med Chem. 2014, 57, 249-77. [3] Ballester and Richards. J Comp Chem. 2007, 28, 1711-23. [4] Schalon et al. Proteins. 2008, 71, 1755-78. [5] Cock et al. Bioinformatics 2009, 25, 1422-3. [6] Hamelryck Proteins 2005, 59, 38-48. [7] Eid et al. BMC Bioinf 2017, 18. [8] Karaman et al. Nature Biotech 2008, 26, 127-32. [9] Manning et al. Science. 2002, 298, 1912-34. [10] Picado et al. ACS National Meeting Orlando 2019 (poster).</a:t>
             </a:r>
             <a:endParaRPr b="0" lang="en-US" sz="1800" spc="-1" strike="noStrike">
@@ -2187,7 +2694,7 @@
       </p:sp>
       <p:sp>
         <p:nvSpPr>
-          <p:cNvPr id="41" name="Line 5"/>
+          <p:cNvPr id="49" name="Line 8"/>
           <p:cNvSpPr/>
           <p:nvPr/>
         </p:nvSpPr>
@@ -2216,7 +2723,7 @@
       </p:sp>
       <p:sp>
         <p:nvSpPr>
-          <p:cNvPr id="42" name="Line 6"/>
+          <p:cNvPr id="50" name="Line 9"/>
           <p:cNvSpPr/>
           <p:nvPr/>
         </p:nvSpPr>
@@ -2245,7 +2752,7 @@
       </p:sp>
       <p:sp>
         <p:nvSpPr>
-          <p:cNvPr id="43" name="Line 7"/>
+          <p:cNvPr id="51" name="Line 10"/>
           <p:cNvSpPr/>
           <p:nvPr/>
         </p:nvSpPr>
@@ -2274,565 +2781,19 @@
       </p:sp>
       <p:pic>
         <p:nvPicPr>
-          <p:cNvPr id="44" name="" descr=""/>
-          <p:cNvPicPr/>
-          <p:nvPr/>
-        </p:nvPicPr>
-        <p:blipFill>
-          <a:blip r:embed="rId4"/>
-          <a:srcRect l="0" t="41577" r="0" b="16683"/>
-          <a:stretch/>
-        </p:blipFill>
-        <p:spPr>
-          <a:xfrm>
-            <a:off x="0" y="2845440"/>
-            <a:ext cx="30268080" cy="723600"/>
-          </a:xfrm>
-          <a:prstGeom prst="rect">
-            <a:avLst/>
-          </a:prstGeom>
-          <a:ln>
-            <a:noFill/>
-          </a:ln>
-        </p:spPr>
-      </p:pic>
-      <p:pic>
-        <p:nvPicPr>
-          <p:cNvPr id="45" name="" descr=""/>
-          <p:cNvPicPr/>
-          <p:nvPr/>
-        </p:nvPicPr>
-        <p:blipFill>
-          <a:blip r:embed="rId5"/>
-          <a:stretch/>
-        </p:blipFill>
-        <p:spPr>
-          <a:xfrm>
-            <a:off x="12851640" y="912240"/>
-            <a:ext cx="4564440" cy="1684080"/>
-          </a:xfrm>
-          <a:prstGeom prst="rect">
-            <a:avLst/>
-          </a:prstGeom>
-          <a:ln>
-            <a:noFill/>
-          </a:ln>
-        </p:spPr>
-      </p:pic>
-      <p:sp>
-        <p:nvSpPr>
-          <p:cNvPr id="46" name="Line 8"/>
-          <p:cNvSpPr/>
-          <p:nvPr/>
-        </p:nvSpPr>
-        <p:spPr>
-          <a:xfrm>
-            <a:off x="0" y="3588480"/>
-            <a:ext cx="30275640" cy="360"/>
-          </a:xfrm>
-          <a:prstGeom prst="line">
-            <a:avLst/>
-          </a:prstGeom>
-          <a:ln w="91440">
-            <a:solidFill>
-              <a:srgbClr val="3465a4"/>
-            </a:solidFill>
-            <a:round/>
-          </a:ln>
-        </p:spPr>
-        <p:style>
-          <a:lnRef idx="0"/>
-          <a:fillRef idx="0"/>
-          <a:effectRef idx="0"/>
-          <a:fontRef idx="minor"/>
-        </p:style>
-      </p:sp>
-      <p:sp>
-        <p:nvSpPr>
-          <p:cNvPr id="47" name="CustomShape 9"/>
-          <p:cNvSpPr/>
-          <p:nvPr/>
-        </p:nvSpPr>
-        <p:spPr>
-          <a:xfrm>
-            <a:off x="722520" y="17007840"/>
-            <a:ext cx="14398200" cy="4143960"/>
-          </a:xfrm>
-          <a:prstGeom prst="rect">
-            <a:avLst/>
-          </a:prstGeom>
-          <a:noFill/>
-          <a:ln>
-            <a:noFill/>
-          </a:ln>
-        </p:spPr>
-        <p:style>
-          <a:lnRef idx="0"/>
-          <a:fillRef idx="0"/>
-          <a:effectRef idx="0"/>
-          <a:fontRef idx="minor"/>
-        </p:style>
-        <p:txBody>
-          <a:bodyPr lIns="90000" rIns="90000" tIns="0" bIns="45000"/>
-          <a:p>
-            <a:pPr algn="just">
-              <a:lnSpc>
-                <a:spcPct val="115000"/>
-              </a:lnSpc>
-            </a:pPr>
-            <a:r>
-              <a:rPr b="1" lang="en-US" sz="2600" spc="-1" strike="noStrike">
-                <a:solidFill>
-                  <a:srgbClr val="333333"/>
-                </a:solidFill>
-                <a:uFill>
-                  <a:solidFill>
-                    <a:srgbClr val="ffffff"/>
-                  </a:solidFill>
-                </a:uFill>
-                <a:latin typeface="Arial"/>
-                <a:ea typeface="DejaVu Sans"/>
-              </a:rPr>
-              <a:t>Kinase fingerprint. </a:t>
-            </a:r>
-            <a:r>
-              <a:rPr b="0" lang="en-US" sz="2600" spc="-1" strike="noStrike">
-                <a:solidFill>
-                  <a:srgbClr val="333333"/>
-                </a:solidFill>
-                <a:uFill>
-                  <a:solidFill>
-                    <a:srgbClr val="ffffff"/>
-                  </a:solidFill>
-                </a:uFill>
-                <a:latin typeface="Arial"/>
-                <a:ea typeface="DejaVu Sans"/>
-              </a:rPr>
-              <a:t>The </a:t>
-            </a:r>
-            <a:r>
-              <a:rPr b="0" i="1" lang="en-US" sz="2600" spc="-1" strike="noStrike">
-                <a:solidFill>
-                  <a:srgbClr val="333333"/>
-                </a:solidFill>
-                <a:uFill>
-                  <a:solidFill>
-                    <a:srgbClr val="ffffff"/>
-                  </a:solidFill>
-                </a:uFill>
-                <a:latin typeface="Arial"/>
-                <a:ea typeface="DejaVu Sans"/>
-              </a:rPr>
-              <a:t>pocket fingerprint</a:t>
-            </a:r>
-            <a:r>
-              <a:rPr b="0" lang="en-US" sz="2600" spc="-1" strike="noStrike">
-                <a:solidFill>
-                  <a:srgbClr val="333333"/>
-                </a:solidFill>
-                <a:uFill>
-                  <a:solidFill>
-                    <a:srgbClr val="ffffff"/>
-                  </a:solidFill>
-                </a:uFill>
-                <a:latin typeface="Arial"/>
-                <a:ea typeface="DejaVu Sans"/>
-              </a:rPr>
-              <a:t> consists of 85 concatenated </a:t>
-            </a:r>
-            <a:r>
-              <a:rPr b="0" i="1" lang="en-US" sz="2600" spc="-1" strike="noStrike">
-                <a:solidFill>
-                  <a:srgbClr val="333333"/>
-                </a:solidFill>
-                <a:uFill>
-                  <a:solidFill>
-                    <a:srgbClr val="ffffff"/>
-                  </a:solidFill>
-                </a:uFill>
-                <a:latin typeface="Arial"/>
-                <a:ea typeface="DejaVu Sans"/>
-              </a:rPr>
-              <a:t>residue fingerprints</a:t>
-            </a:r>
-            <a:r>
-              <a:rPr b="0" lang="en-US" sz="2600" spc="-1" strike="noStrike">
-                <a:solidFill>
-                  <a:srgbClr val="333333"/>
-                </a:solidFill>
-                <a:uFill>
-                  <a:solidFill>
-                    <a:srgbClr val="ffffff"/>
-                  </a:solidFill>
-                </a:uFill>
-                <a:latin typeface="Arial"/>
-                <a:ea typeface="DejaVu Sans"/>
-              </a:rPr>
-              <a:t>, each encoding a residue’s spatial and physicochemical properties (</a:t>
-            </a:r>
-            <a:r>
-              <a:rPr b="1" lang="en-US" sz="2600" spc="-1" strike="noStrike">
-                <a:solidFill>
-                  <a:srgbClr val="333333"/>
-                </a:solidFill>
-                <a:uFill>
-                  <a:solidFill>
-                    <a:srgbClr val="ffffff"/>
-                  </a:solidFill>
-                </a:uFill>
-                <a:latin typeface="Arial"/>
-                <a:ea typeface="DejaVu Sans"/>
-              </a:rPr>
-              <a:t>Fig. 1</a:t>
-            </a:r>
-            <a:r>
-              <a:rPr b="0" lang="en-US" sz="2600" spc="-1" strike="noStrike">
-                <a:solidFill>
-                  <a:srgbClr val="333333"/>
-                </a:solidFill>
-                <a:uFill>
-                  <a:solidFill>
-                    <a:srgbClr val="ffffff"/>
-                  </a:solidFill>
-                </a:uFill>
-                <a:latin typeface="Arial"/>
-                <a:ea typeface="DejaVu Sans"/>
-              </a:rPr>
-              <a:t>). Inspired by the ligand-based USR approach [3], the </a:t>
-            </a:r>
-            <a:r>
-              <a:rPr b="0" i="1" lang="en-US" sz="2600" spc="-1" strike="noStrike">
-                <a:solidFill>
-                  <a:srgbClr val="333333"/>
-                </a:solidFill>
-                <a:uFill>
-                  <a:solidFill>
-                    <a:srgbClr val="ffffff"/>
-                  </a:solidFill>
-                </a:uFill>
-                <a:latin typeface="Arial"/>
-                <a:ea typeface="DejaVu Sans"/>
-              </a:rPr>
-              <a:t>spatial properties</a:t>
-            </a:r>
-            <a:r>
-              <a:rPr b="0" lang="en-US" sz="2600" spc="-1" strike="noStrike">
-                <a:solidFill>
-                  <a:srgbClr val="333333"/>
-                </a:solidFill>
-                <a:uFill>
-                  <a:solidFill>
-                    <a:srgbClr val="ffffff"/>
-                  </a:solidFill>
-                </a:uFill>
-                <a:latin typeface="Arial"/>
-                <a:ea typeface="DejaVu Sans"/>
-              </a:rPr>
-              <a:t> describe the residue’s position in relation to the kinase pocket centroid and important kinase subpockets, i.e. the hinge region, the DFG region, and the front pocket. The resulting distance distributions per subpocket are reduced in complexity to the first three moments, i.e. the mean, standard deviation and skewness. The </a:t>
-            </a:r>
-            <a:r>
-              <a:rPr b="0" i="1" lang="en-US" sz="2600" spc="-1" strike="noStrike">
-                <a:solidFill>
-                  <a:srgbClr val="333333"/>
-                </a:solidFill>
-                <a:uFill>
-                  <a:solidFill>
-                    <a:srgbClr val="ffffff"/>
-                  </a:solidFill>
-                </a:uFill>
-                <a:latin typeface="Arial"/>
-                <a:ea typeface="DejaVu Sans"/>
-              </a:rPr>
-              <a:t>physicochemical properties</a:t>
-            </a:r>
-            <a:r>
-              <a:rPr b="0" lang="en-US" sz="2600" spc="-1" strike="noStrike">
-                <a:solidFill>
-                  <a:srgbClr val="333333"/>
-                </a:solidFill>
-                <a:uFill>
-                  <a:solidFill>
-                    <a:srgbClr val="ffffff"/>
-                  </a:solidFill>
-                </a:uFill>
-                <a:latin typeface="Arial"/>
-                <a:ea typeface="DejaVu Sans"/>
-              </a:rPr>
-              <a:t> encompass for each residue its size, side chain orientation and pharmacophoric features as described by SiteAlign [4] in addition to its solvent exposure as implemented in Biopython’s module </a:t>
-            </a:r>
-            <a:r>
-              <a:rPr b="0" lang="en-US" sz="2600" spc="-1" strike="noStrike">
-                <a:solidFill>
-                  <a:srgbClr val="333333"/>
-                </a:solidFill>
-                <a:uFill>
-                  <a:solidFill>
-                    <a:srgbClr val="ffffff"/>
-                  </a:solidFill>
-                </a:uFill>
-                <a:latin typeface="Courier New"/>
-                <a:ea typeface="DejaVu Sans"/>
-              </a:rPr>
-              <a:t>Bio.PDB.HSExposure</a:t>
-            </a:r>
-            <a:r>
-              <a:rPr b="0" lang="en-US" sz="2600" spc="-1" strike="noStrike">
-                <a:solidFill>
-                  <a:srgbClr val="333333"/>
-                </a:solidFill>
-                <a:uFill>
-                  <a:solidFill>
-                    <a:srgbClr val="ffffff"/>
-                  </a:solidFill>
-                </a:uFill>
-                <a:latin typeface="Arial"/>
-                <a:ea typeface="DejaVu Sans"/>
-              </a:rPr>
-              <a:t> [5, 6].</a:t>
-            </a:r>
-            <a:endParaRPr b="0" lang="en-US" sz="1800" spc="-1" strike="noStrike">
-              <a:solidFill>
-                <a:srgbClr val="000000"/>
-              </a:solidFill>
-              <a:uFill>
-                <a:solidFill>
-                  <a:srgbClr val="ffffff"/>
-                </a:solidFill>
-              </a:uFill>
-              <a:latin typeface="Arial"/>
-            </a:endParaRPr>
-          </a:p>
-          <a:p>
-            <a:pPr algn="just">
-              <a:lnSpc>
-                <a:spcPct val="115000"/>
-              </a:lnSpc>
-            </a:pPr>
-            <a:endParaRPr b="0" lang="en-US" sz="1800" spc="-1" strike="noStrike">
-              <a:solidFill>
-                <a:srgbClr val="000000"/>
-              </a:solidFill>
-              <a:uFill>
-                <a:solidFill>
-                  <a:srgbClr val="ffffff"/>
-                </a:solidFill>
-              </a:uFill>
-              <a:latin typeface="Arial"/>
-            </a:endParaRPr>
-          </a:p>
-          <a:p>
-            <a:pPr algn="just">
-              <a:lnSpc>
-                <a:spcPct val="115000"/>
-              </a:lnSpc>
-            </a:pPr>
-            <a:endParaRPr b="0" lang="en-US" sz="1800" spc="-1" strike="noStrike">
-              <a:solidFill>
-                <a:srgbClr val="000000"/>
-              </a:solidFill>
-              <a:uFill>
-                <a:solidFill>
-                  <a:srgbClr val="ffffff"/>
-                </a:solidFill>
-              </a:uFill>
-              <a:latin typeface="Arial"/>
-            </a:endParaRPr>
-          </a:p>
-          <a:p>
-            <a:pPr algn="just">
-              <a:lnSpc>
-                <a:spcPct val="115000"/>
-              </a:lnSpc>
-            </a:pPr>
-            <a:endParaRPr b="0" lang="en-US" sz="1800" spc="-1" strike="noStrike">
-              <a:solidFill>
-                <a:srgbClr val="000000"/>
-              </a:solidFill>
-              <a:uFill>
-                <a:solidFill>
-                  <a:srgbClr val="ffffff"/>
-                </a:solidFill>
-              </a:uFill>
-              <a:latin typeface="Arial"/>
-            </a:endParaRPr>
-          </a:p>
-        </p:txBody>
-      </p:sp>
-      <p:sp>
-        <p:nvSpPr>
-          <p:cNvPr id="48" name="CustomShape 10"/>
-          <p:cNvSpPr/>
-          <p:nvPr/>
-        </p:nvSpPr>
-        <p:spPr>
-          <a:xfrm>
-            <a:off x="687960" y="24394320"/>
-            <a:ext cx="14398200" cy="932760"/>
-          </a:xfrm>
-          <a:prstGeom prst="rect">
-            <a:avLst/>
-          </a:prstGeom>
-          <a:noFill/>
-          <a:ln>
-            <a:noFill/>
-          </a:ln>
-        </p:spPr>
-        <p:style>
-          <a:lnRef idx="0"/>
-          <a:fillRef idx="0"/>
-          <a:effectRef idx="0"/>
-          <a:fontRef idx="minor"/>
-        </p:style>
-        <p:txBody>
-          <a:bodyPr lIns="90000" rIns="90000" tIns="45000" bIns="45000"/>
-          <a:p>
-            <a:pPr algn="just">
-              <a:lnSpc>
-                <a:spcPct val="115000"/>
-              </a:lnSpc>
-            </a:pPr>
-            <a:r>
-              <a:rPr b="0" lang="en-US" sz="2600" spc="-1" strike="noStrike">
-                <a:solidFill>
-                  <a:srgbClr val="333333"/>
-                </a:solidFill>
-                <a:uFill>
-                  <a:solidFill>
-                    <a:srgbClr val="ffffff"/>
-                  </a:solidFill>
-                </a:uFill>
-                <a:latin typeface="Arial"/>
-                <a:ea typeface="DejaVu Sans"/>
-              </a:rPr>
-              <a:t>The potential of our subpocket-based kinase comparison is demonstrated by uncovering retrospectively on- and off-targets for EGFR using KinMap [7] (</a:t>
-            </a:r>
-            <a:r>
-              <a:rPr b="1" lang="en-US" sz="2600" spc="-1" strike="noStrike">
-                <a:solidFill>
-                  <a:srgbClr val="333333"/>
-                </a:solidFill>
-                <a:uFill>
-                  <a:solidFill>
-                    <a:srgbClr val="ffffff"/>
-                  </a:solidFill>
-                </a:uFill>
-                <a:latin typeface="Arial"/>
-                <a:ea typeface="DejaVu Sans"/>
-              </a:rPr>
-              <a:t>Fig. 2</a:t>
-            </a:r>
-            <a:r>
-              <a:rPr b="0" lang="en-US" sz="2600" spc="-1" strike="noStrike">
-                <a:solidFill>
-                  <a:srgbClr val="333333"/>
-                </a:solidFill>
-                <a:uFill>
-                  <a:solidFill>
-                    <a:srgbClr val="ffffff"/>
-                  </a:solidFill>
-                </a:uFill>
-                <a:latin typeface="Arial"/>
-                <a:ea typeface="DejaVu Sans"/>
-              </a:rPr>
-              <a:t>). </a:t>
-            </a:r>
-            <a:endParaRPr b="0" lang="en-US" sz="1800" spc="-1" strike="noStrike">
-              <a:solidFill>
-                <a:srgbClr val="000000"/>
-              </a:solidFill>
-              <a:uFill>
-                <a:solidFill>
-                  <a:srgbClr val="ffffff"/>
-                </a:solidFill>
-              </a:uFill>
-              <a:latin typeface="Arial"/>
-            </a:endParaRPr>
-          </a:p>
-          <a:p>
-            <a:pPr algn="just">
-              <a:lnSpc>
-                <a:spcPct val="115000"/>
-              </a:lnSpc>
-            </a:pPr>
-            <a:endParaRPr b="0" lang="en-US" sz="1800" spc="-1" strike="noStrike">
-              <a:solidFill>
-                <a:srgbClr val="000000"/>
-              </a:solidFill>
-              <a:uFill>
-                <a:solidFill>
-                  <a:srgbClr val="ffffff"/>
-                </a:solidFill>
-              </a:uFill>
-              <a:latin typeface="Arial"/>
-            </a:endParaRPr>
-          </a:p>
-        </p:txBody>
-      </p:sp>
-      <p:sp>
-        <p:nvSpPr>
-          <p:cNvPr id="49" name="CustomShape 11"/>
-          <p:cNvSpPr/>
-          <p:nvPr/>
-        </p:nvSpPr>
-        <p:spPr>
-          <a:xfrm>
-            <a:off x="720000" y="37980000"/>
-            <a:ext cx="14398200" cy="1653120"/>
-          </a:xfrm>
-          <a:prstGeom prst="rect">
-            <a:avLst/>
-          </a:prstGeom>
-          <a:noFill/>
-          <a:ln>
-            <a:noFill/>
-          </a:ln>
-        </p:spPr>
-        <p:style>
-          <a:lnRef idx="0"/>
-          <a:fillRef idx="0"/>
-          <a:effectRef idx="0"/>
-          <a:fontRef idx="minor"/>
-        </p:style>
-      </p:sp>
-      <p:pic>
-        <p:nvPicPr>
-          <p:cNvPr id="50" name="" descr=""/>
-          <p:cNvPicPr/>
-          <p:nvPr/>
-        </p:nvPicPr>
-        <p:blipFill>
-          <a:blip r:embed="rId6"/>
-          <a:srcRect l="7328" t="0" r="8003" b="0"/>
-          <a:stretch/>
-        </p:blipFill>
-        <p:spPr>
-          <a:xfrm>
-            <a:off x="16440480" y="18960480"/>
-            <a:ext cx="11611080" cy="4570200"/>
-          </a:xfrm>
-          <a:prstGeom prst="rect">
-            <a:avLst/>
-          </a:prstGeom>
-          <a:ln>
-            <a:noFill/>
-          </a:ln>
-        </p:spPr>
-      </p:pic>
-      <p:pic>
-        <p:nvPicPr>
-          <p:cNvPr id="51" name="" descr=""/>
+          <p:cNvPr id="52" name="" descr=""/>
           <p:cNvPicPr/>
           <p:nvPr/>
         </p:nvPicPr>
         <p:blipFill>
           <a:blip r:embed="rId7"/>
-          <a:srcRect l="0" t="7250" r="0" b="6301"/>
+          <a:srcRect l="0" t="41577" r="0" b="16683"/>
           <a:stretch/>
         </p:blipFill>
         <p:spPr>
           <a:xfrm>
-            <a:off x="15636240" y="10010880"/>
-            <a:ext cx="13678560" cy="8867880"/>
+            <a:off x="0" y="2845440"/>
+            <a:ext cx="30267720" cy="723240"/>
           </a:xfrm>
           <a:prstGeom prst="rect">
             <a:avLst/>
@@ -2842,137 +2803,6 @@
           </a:ln>
         </p:spPr>
       </p:pic>
-      <p:sp>
-        <p:nvSpPr>
-          <p:cNvPr id="52" name="CustomShape 12"/>
-          <p:cNvSpPr/>
-          <p:nvPr/>
-        </p:nvSpPr>
-        <p:spPr>
-          <a:xfrm>
-            <a:off x="720000" y="21250800"/>
-            <a:ext cx="8605440" cy="2469600"/>
-          </a:xfrm>
-          <a:prstGeom prst="rect">
-            <a:avLst/>
-          </a:prstGeom>
-          <a:noFill/>
-          <a:ln>
-            <a:noFill/>
-          </a:ln>
-        </p:spPr>
-        <p:style>
-          <a:lnRef idx="0"/>
-          <a:fillRef idx="0"/>
-          <a:effectRef idx="0"/>
-          <a:fontRef idx="minor"/>
-        </p:style>
-        <p:txBody>
-          <a:bodyPr lIns="90000" rIns="90000" tIns="0" bIns="45000"/>
-          <a:p>
-            <a:pPr algn="just">
-              <a:lnSpc>
-                <a:spcPct val="115000"/>
-              </a:lnSpc>
-            </a:pPr>
-            <a:r>
-              <a:rPr b="1" lang="en-US" sz="2600" spc="-1" strike="noStrike">
-                <a:solidFill>
-                  <a:srgbClr val="333333"/>
-                </a:solidFill>
-                <a:uFill>
-                  <a:solidFill>
-                    <a:srgbClr val="ffffff"/>
-                  </a:solidFill>
-                </a:uFill>
-                <a:latin typeface="Arial"/>
-                <a:ea typeface="DejaVu Sans"/>
-              </a:rPr>
-              <a:t>Kinase comparison &amp; scoring. </a:t>
-            </a:r>
-            <a:r>
-              <a:rPr b="0" lang="en-US" sz="2600" spc="-1" strike="noStrike">
-                <a:solidFill>
-                  <a:srgbClr val="333333"/>
-                </a:solidFill>
-                <a:uFill>
-                  <a:solidFill>
-                    <a:srgbClr val="ffffff"/>
-                  </a:solidFill>
-                </a:uFill>
-                <a:latin typeface="Arial"/>
-                <a:ea typeface="DejaVu Sans"/>
-              </a:rPr>
-              <a:t>Kinase structures are compared pairwise using the inverse, translated and scaled Manhattan distance as implemented for the USR method [3]. Per kinase pair, the best score is used for further analysis, resulting in a 253x253 similarity matrix.</a:t>
-            </a:r>
-            <a:endParaRPr b="0" lang="en-US" sz="1800" spc="-1" strike="noStrike">
-              <a:solidFill>
-                <a:srgbClr val="000000"/>
-              </a:solidFill>
-              <a:uFill>
-                <a:solidFill>
-                  <a:srgbClr val="ffffff"/>
-                </a:solidFill>
-              </a:uFill>
-              <a:latin typeface="Arial"/>
-            </a:endParaRPr>
-          </a:p>
-          <a:p>
-            <a:pPr algn="just">
-              <a:lnSpc>
-                <a:spcPct val="115000"/>
-              </a:lnSpc>
-            </a:pPr>
-            <a:endParaRPr b="0" lang="en-US" sz="1800" spc="-1" strike="noStrike">
-              <a:solidFill>
-                <a:srgbClr val="000000"/>
-              </a:solidFill>
-              <a:uFill>
-                <a:solidFill>
-                  <a:srgbClr val="ffffff"/>
-                </a:solidFill>
-              </a:uFill>
-              <a:latin typeface="Arial"/>
-            </a:endParaRPr>
-          </a:p>
-          <a:p>
-            <a:pPr algn="just">
-              <a:lnSpc>
-                <a:spcPct val="115000"/>
-              </a:lnSpc>
-            </a:pPr>
-            <a:endParaRPr b="0" lang="en-US" sz="1800" spc="-1" strike="noStrike">
-              <a:solidFill>
-                <a:srgbClr val="000000"/>
-              </a:solidFill>
-              <a:uFill>
-                <a:solidFill>
-                  <a:srgbClr val="ffffff"/>
-                </a:solidFill>
-              </a:uFill>
-              <a:latin typeface="Arial"/>
-            </a:endParaRPr>
-          </a:p>
-          <a:p>
-            <a:pPr algn="just">
-              <a:lnSpc>
-                <a:spcPct val="115000"/>
-              </a:lnSpc>
-            </a:pPr>
-            <a:endParaRPr b="0" lang="en-US" sz="1800" spc="-1" strike="noStrike">
-              <a:solidFill>
-                <a:srgbClr val="000000"/>
-              </a:solidFill>
-              <a:uFill>
-                <a:solidFill>
-                  <a:srgbClr val="ffffff"/>
-                </a:solidFill>
-              </a:uFill>
-              <a:latin typeface="Arial"/>
-            </a:endParaRPr>
-          </a:p>
-        </p:txBody>
-      </p:sp>
       <p:pic>
         <p:nvPicPr>
           <p:cNvPr id="53" name="" descr=""/>
@@ -2981,13 +2811,12 @@
         </p:nvPicPr>
         <p:blipFill>
           <a:blip r:embed="rId8"/>
-          <a:srcRect l="0" t="3291" r="0" b="0"/>
           <a:stretch/>
         </p:blipFill>
         <p:spPr>
           <a:xfrm>
-            <a:off x="21400560" y="31181040"/>
-            <a:ext cx="1699920" cy="1827720"/>
+            <a:off x="12851640" y="912240"/>
+            <a:ext cx="4564080" cy="1683720"/>
           </a:xfrm>
           <a:prstGeom prst="rect">
             <a:avLst/>
@@ -2999,21 +2828,23 @@
       </p:pic>
       <p:sp>
         <p:nvSpPr>
-          <p:cNvPr id="54" name="CustomShape 13"/>
+          <p:cNvPr id="54" name="Line 11"/>
           <p:cNvSpPr/>
           <p:nvPr/>
         </p:nvSpPr>
         <p:spPr>
           <a:xfrm>
-            <a:off x="720000" y="10368000"/>
-            <a:ext cx="14398200" cy="2897640"/>
-          </a:xfrm>
-          <a:prstGeom prst="rect">
-            <a:avLst/>
-          </a:prstGeom>
-          <a:noFill/>
-          <a:ln>
-            <a:noFill/>
+            <a:off x="0" y="3588480"/>
+            <a:ext cx="30275640" cy="360"/>
+          </a:xfrm>
+          <a:prstGeom prst="line">
+            <a:avLst/>
+          </a:prstGeom>
+          <a:ln w="91440">
+            <a:solidFill>
+              <a:srgbClr val="3465a4"/>
+            </a:solidFill>
+            <a:round/>
           </a:ln>
         </p:spPr>
         <p:style>
@@ -3022,53 +2853,17 @@
           <a:effectRef idx="0"/>
           <a:fontRef idx="minor"/>
         </p:style>
-        <p:txBody>
-          <a:bodyPr lIns="90000" rIns="90000" tIns="0" bIns="45000"/>
-          <a:p>
-            <a:pPr algn="just">
-              <a:lnSpc>
-                <a:spcPct val="115000"/>
-              </a:lnSpc>
-            </a:pPr>
-            <a:r>
-              <a:rPr b="0" lang="en-US" sz="2600" spc="-1" strike="noStrike">
-                <a:solidFill>
-                  <a:srgbClr val="333333"/>
-                </a:solidFill>
-                <a:uFill>
-                  <a:solidFill>
-                    <a:srgbClr val="ffffff"/>
-                  </a:solidFill>
-                </a:uFill>
-                <a:latin typeface="Arial"/>
-                <a:ea typeface="DejaVu Sans"/>
-              </a:rPr>
-              <a:t>Kinases are important and well studied drug targets for cancer and inflammatory diseases. Due to the highly conserved structure of kinases, especially at the ATP binding site, the main challenge when developing kinase inhibitors is achieving selectivity, which requires a comprehensive understanding of kinase similarity. [1] Here, we present our work on a novel fingerprinting strategy designed specifically for kinase pockets, allowing for similarity studies across the structurally covered kinome. </a:t>
-            </a:r>
-            <a:endParaRPr b="0" lang="en-US" sz="1800" spc="-1" strike="noStrike">
-              <a:solidFill>
-                <a:srgbClr val="000000"/>
-              </a:solidFill>
-              <a:uFill>
-                <a:solidFill>
-                  <a:srgbClr val="ffffff"/>
-                </a:solidFill>
-              </a:uFill>
-              <a:latin typeface="Arial"/>
-            </a:endParaRPr>
-          </a:p>
-        </p:txBody>
-      </p:sp>
-      <p:sp>
-        <p:nvSpPr>
-          <p:cNvPr id="55" name="CustomShape 14"/>
+      </p:sp>
+      <p:sp>
+        <p:nvSpPr>
+          <p:cNvPr id="55" name="CustomShape 12"/>
           <p:cNvSpPr/>
           <p:nvPr/>
         </p:nvSpPr>
         <p:spPr>
           <a:xfrm>
-            <a:off x="720000" y="9720000"/>
-            <a:ext cx="14400720" cy="639000"/>
+            <a:off x="722520" y="17115840"/>
+            <a:ext cx="14397840" cy="4143600"/>
           </a:xfrm>
           <a:prstGeom prst="rect">
             <a:avLst/>
@@ -3093,19 +2888,274 @@
               </a:lnSpc>
             </a:pPr>
             <a:r>
-              <a:rPr b="1" lang="en-US" sz="3600" spc="-1" strike="noStrike">
-                <a:solidFill>
-                  <a:srgbClr val="3465a4"/>
-                </a:solidFill>
-                <a:uFill>
-                  <a:solidFill>
-                    <a:srgbClr val="ffffff"/>
-                  </a:solidFill>
-                </a:uFill>
-                <a:latin typeface="Arial"/>
-                <a:ea typeface="DejaVu Sans"/>
-              </a:rPr>
-              <a:t>Introduction</a:t>
+              <a:rPr b="1" lang="en-US" sz="2600" spc="-1" strike="noStrike">
+                <a:solidFill>
+                  <a:srgbClr val="333333"/>
+                </a:solidFill>
+                <a:uFill>
+                  <a:solidFill>
+                    <a:srgbClr val="ffffff"/>
+                  </a:solidFill>
+                </a:uFill>
+                <a:latin typeface="Arial"/>
+                <a:ea typeface="DejaVu Sans"/>
+              </a:rPr>
+              <a:t>Kinase fingerprint. </a:t>
+            </a:r>
+            <a:r>
+              <a:rPr b="0" lang="en-US" sz="2600" spc="-1" strike="noStrike">
+                <a:solidFill>
+                  <a:srgbClr val="333333"/>
+                </a:solidFill>
+                <a:uFill>
+                  <a:solidFill>
+                    <a:srgbClr val="ffffff"/>
+                  </a:solidFill>
+                </a:uFill>
+                <a:latin typeface="Arial"/>
+                <a:ea typeface="DejaVu Sans"/>
+              </a:rPr>
+              <a:t>The </a:t>
+            </a:r>
+            <a:r>
+              <a:rPr b="0" i="1" lang="en-US" sz="2600" spc="-1" strike="noStrike">
+                <a:solidFill>
+                  <a:srgbClr val="333333"/>
+                </a:solidFill>
+                <a:uFill>
+                  <a:solidFill>
+                    <a:srgbClr val="ffffff"/>
+                  </a:solidFill>
+                </a:uFill>
+                <a:latin typeface="Arial"/>
+                <a:ea typeface="DejaVu Sans"/>
+              </a:rPr>
+              <a:t>pocket fingerprint</a:t>
+            </a:r>
+            <a:r>
+              <a:rPr b="0" lang="en-US" sz="2600" spc="-1" strike="noStrike">
+                <a:solidFill>
+                  <a:srgbClr val="333333"/>
+                </a:solidFill>
+                <a:uFill>
+                  <a:solidFill>
+                    <a:srgbClr val="ffffff"/>
+                  </a:solidFill>
+                </a:uFill>
+                <a:latin typeface="Arial"/>
+                <a:ea typeface="DejaVu Sans"/>
+              </a:rPr>
+              <a:t> consists of 85 concatenated </a:t>
+            </a:r>
+            <a:r>
+              <a:rPr b="0" i="1" lang="en-US" sz="2600" spc="-1" strike="noStrike">
+                <a:solidFill>
+                  <a:srgbClr val="333333"/>
+                </a:solidFill>
+                <a:uFill>
+                  <a:solidFill>
+                    <a:srgbClr val="ffffff"/>
+                  </a:solidFill>
+                </a:uFill>
+                <a:latin typeface="Arial"/>
+                <a:ea typeface="DejaVu Sans"/>
+              </a:rPr>
+              <a:t>residue fingerprints</a:t>
+            </a:r>
+            <a:r>
+              <a:rPr b="0" lang="en-US" sz="2600" spc="-1" strike="noStrike">
+                <a:solidFill>
+                  <a:srgbClr val="333333"/>
+                </a:solidFill>
+                <a:uFill>
+                  <a:solidFill>
+                    <a:srgbClr val="ffffff"/>
+                  </a:solidFill>
+                </a:uFill>
+                <a:latin typeface="Arial"/>
+                <a:ea typeface="DejaVu Sans"/>
+              </a:rPr>
+              <a:t>, each encoding a residue’s spatial and physicochemical properties (</a:t>
+            </a:r>
+            <a:r>
+              <a:rPr b="1" lang="en-US" sz="2600" spc="-1" strike="noStrike">
+                <a:solidFill>
+                  <a:srgbClr val="333333"/>
+                </a:solidFill>
+                <a:uFill>
+                  <a:solidFill>
+                    <a:srgbClr val="ffffff"/>
+                  </a:solidFill>
+                </a:uFill>
+                <a:latin typeface="Arial"/>
+                <a:ea typeface="DejaVu Sans"/>
+              </a:rPr>
+              <a:t>Fig. 1a</a:t>
+            </a:r>
+            <a:r>
+              <a:rPr b="0" lang="en-US" sz="2600" spc="-1" strike="noStrike">
+                <a:solidFill>
+                  <a:srgbClr val="333333"/>
+                </a:solidFill>
+                <a:uFill>
+                  <a:solidFill>
+                    <a:srgbClr val="ffffff"/>
+                  </a:solidFill>
+                </a:uFill>
+                <a:latin typeface="Arial"/>
+                <a:ea typeface="DejaVu Sans"/>
+              </a:rPr>
+              <a:t> and </a:t>
+            </a:r>
+            <a:r>
+              <a:rPr b="1" lang="en-US" sz="2600" spc="-1" strike="noStrike">
+                <a:solidFill>
+                  <a:srgbClr val="333333"/>
+                </a:solidFill>
+                <a:uFill>
+                  <a:solidFill>
+                    <a:srgbClr val="ffffff"/>
+                  </a:solidFill>
+                </a:uFill>
+                <a:latin typeface="Arial"/>
+                <a:ea typeface="DejaVu Sans"/>
+              </a:rPr>
+              <a:t>2a</a:t>
+            </a:r>
+            <a:r>
+              <a:rPr b="0" lang="en-US" sz="2600" spc="-1" strike="noStrike">
+                <a:solidFill>
+                  <a:srgbClr val="333333"/>
+                </a:solidFill>
+                <a:uFill>
+                  <a:solidFill>
+                    <a:srgbClr val="ffffff"/>
+                  </a:solidFill>
+                </a:uFill>
+                <a:latin typeface="Arial"/>
+                <a:ea typeface="DejaVu Sans"/>
+              </a:rPr>
+              <a:t>). The </a:t>
+            </a:r>
+            <a:r>
+              <a:rPr b="0" i="1" lang="en-US" sz="2600" spc="-1" strike="noStrike">
+                <a:solidFill>
+                  <a:srgbClr val="333333"/>
+                </a:solidFill>
+                <a:uFill>
+                  <a:solidFill>
+                    <a:srgbClr val="ffffff"/>
+                  </a:solidFill>
+                </a:uFill>
+                <a:latin typeface="Arial"/>
+                <a:ea typeface="DejaVu Sans"/>
+              </a:rPr>
+              <a:t>physico-chemical properties</a:t>
+            </a:r>
+            <a:r>
+              <a:rPr b="0" lang="en-US" sz="2600" spc="-1" strike="noStrike">
+                <a:solidFill>
+                  <a:srgbClr val="333333"/>
+                </a:solidFill>
+                <a:uFill>
+                  <a:solidFill>
+                    <a:srgbClr val="ffffff"/>
+                  </a:solidFill>
+                </a:uFill>
+                <a:latin typeface="Arial"/>
+                <a:ea typeface="DejaVu Sans"/>
+              </a:rPr>
+              <a:t> encompass for each residue its size, side chain orientation and pharmacophoric features as described by SiteAlign [4], in addition to its solvent exposure as implemented in Biopython’s module </a:t>
+            </a:r>
+            <a:r>
+              <a:rPr b="0" lang="en-US" sz="2600" spc="-1" strike="noStrike">
+                <a:solidFill>
+                  <a:srgbClr val="333333"/>
+                </a:solidFill>
+                <a:uFill>
+                  <a:solidFill>
+                    <a:srgbClr val="ffffff"/>
+                  </a:solidFill>
+                </a:uFill>
+                <a:latin typeface="Courier New"/>
+                <a:ea typeface="DejaVu Sans"/>
+              </a:rPr>
+              <a:t>Bio.PDB.HSExposure</a:t>
+            </a:r>
+            <a:r>
+              <a:rPr b="0" lang="en-US" sz="2600" spc="-1" strike="noStrike">
+                <a:solidFill>
+                  <a:srgbClr val="333333"/>
+                </a:solidFill>
+                <a:uFill>
+                  <a:solidFill>
+                    <a:srgbClr val="ffffff"/>
+                  </a:solidFill>
+                </a:uFill>
+                <a:latin typeface="Arial"/>
+                <a:ea typeface="DejaVu Sans"/>
+              </a:rPr>
+              <a:t> [5, 6]. Inspired by the ligand-based USR approach [3], the </a:t>
+            </a:r>
+            <a:r>
+              <a:rPr b="0" i="1" lang="en-US" sz="2600" spc="-1" strike="noStrike">
+                <a:solidFill>
+                  <a:srgbClr val="333333"/>
+                </a:solidFill>
+                <a:uFill>
+                  <a:solidFill>
+                    <a:srgbClr val="ffffff"/>
+                  </a:solidFill>
+                </a:uFill>
+                <a:latin typeface="Arial"/>
+                <a:ea typeface="DejaVu Sans"/>
+              </a:rPr>
+              <a:t>spatial properties</a:t>
+            </a:r>
+            <a:r>
+              <a:rPr b="0" lang="en-US" sz="2600" spc="-1" strike="noStrike">
+                <a:solidFill>
+                  <a:srgbClr val="333333"/>
+                </a:solidFill>
+                <a:uFill>
+                  <a:solidFill>
+                    <a:srgbClr val="ffffff"/>
+                  </a:solidFill>
+                </a:uFill>
+                <a:latin typeface="Arial"/>
+                <a:ea typeface="DejaVu Sans"/>
+              </a:rPr>
+              <a:t> describe the residue’s position in relation to the kinase pocket centroid and important kinase subpockets, i.e. the hinge region, the DFG region, and the front pocket (</a:t>
+            </a:r>
+            <a:r>
+              <a:rPr b="1" lang="en-US" sz="2600" spc="-1" strike="noStrike">
+                <a:solidFill>
+                  <a:srgbClr val="333333"/>
+                </a:solidFill>
+                <a:uFill>
+                  <a:solidFill>
+                    <a:srgbClr val="ffffff"/>
+                  </a:solidFill>
+                </a:uFill>
+                <a:latin typeface="Arial"/>
+                <a:ea typeface="DejaVu Sans"/>
+              </a:rPr>
+              <a:t>Fig. 1b</a:t>
+            </a:r>
+            <a:r>
+              <a:rPr b="0" lang="en-US" sz="2600" spc="-1" strike="noStrike">
+                <a:solidFill>
+                  <a:srgbClr val="333333"/>
+                </a:solidFill>
+                <a:uFill>
+                  <a:solidFill>
+                    <a:srgbClr val="ffffff"/>
+                  </a:solidFill>
+                </a:uFill>
+                <a:latin typeface="Arial"/>
+                <a:ea typeface="DejaVu Sans"/>
+              </a:rPr>
+              <a:t>). The resulting distance distributions per subpocket are reduced in complexity to the first three moments, i.e. the mean, variance and skewness. </a:t>
             </a:r>
             <a:endParaRPr b="0" lang="en-US" sz="1800" spc="-1" strike="noStrike">
               <a:solidFill>
@@ -3119,18 +3169,72 @@
               <a:latin typeface="Arial"/>
             </a:endParaRPr>
           </a:p>
-        </p:txBody>
-      </p:sp>
-      <p:sp>
-        <p:nvSpPr>
-          <p:cNvPr id="56" name="CustomShape 15"/>
+          <a:p>
+            <a:pPr algn="just">
+              <a:lnSpc>
+                <a:spcPct val="115000"/>
+              </a:lnSpc>
+            </a:pPr>
+            <a:endParaRPr b="0" lang="en-US" sz="1800" spc="-1" strike="noStrike">
+              <a:solidFill>
+                <a:srgbClr val="000000"/>
+              </a:solidFill>
+              <a:uFill>
+                <a:solidFill>
+                  <a:srgbClr val="ffffff"/>
+                </a:solidFill>
+              </a:uFill>
+              <a:latin typeface="Arial"/>
+            </a:endParaRPr>
+          </a:p>
+          <a:p>
+            <a:pPr algn="just">
+              <a:lnSpc>
+                <a:spcPct val="115000"/>
+              </a:lnSpc>
+            </a:pPr>
+            <a:endParaRPr b="0" lang="en-US" sz="1800" spc="-1" strike="noStrike">
+              <a:solidFill>
+                <a:srgbClr val="000000"/>
+              </a:solidFill>
+              <a:uFill>
+                <a:solidFill>
+                  <a:srgbClr val="ffffff"/>
+                </a:solidFill>
+              </a:uFill>
+              <a:latin typeface="Arial"/>
+            </a:endParaRPr>
+          </a:p>
+          <a:p>
+            <a:pPr algn="just">
+              <a:lnSpc>
+                <a:spcPct val="115000"/>
+              </a:lnSpc>
+            </a:pPr>
+            <a:endParaRPr b="0" lang="en-US" sz="1800" spc="-1" strike="noStrike">
+              <a:solidFill>
+                <a:srgbClr val="000000"/>
+              </a:solidFill>
+              <a:uFill>
+                <a:solidFill>
+                  <a:srgbClr val="ffffff"/>
+                </a:solidFill>
+              </a:uFill>
+              <a:latin typeface="Arial"/>
+            </a:endParaRPr>
+          </a:p>
+        </p:txBody>
+      </p:sp>
+      <p:sp>
+        <p:nvSpPr>
+          <p:cNvPr id="56" name="CustomShape 13"/>
           <p:cNvSpPr/>
           <p:nvPr/>
         </p:nvSpPr>
         <p:spPr>
           <a:xfrm>
-            <a:off x="720000" y="13320000"/>
-            <a:ext cx="14400720" cy="639000"/>
+            <a:off x="722520" y="24284160"/>
+            <a:ext cx="14401800" cy="2094120"/>
           </a:xfrm>
           <a:prstGeom prst="rect">
             <a:avLst/>
@@ -3147,7 +3251,7 @@
           <a:fontRef idx="minor"/>
         </p:style>
         <p:txBody>
-          <a:bodyPr lIns="90000" rIns="90000" tIns="0" bIns="45000"/>
+          <a:bodyPr lIns="90000" rIns="90000" tIns="45000" bIns="45000"/>
           <a:p>
             <a:pPr algn="just">
               <a:lnSpc>
@@ -3155,19 +3259,167 @@
               </a:lnSpc>
             </a:pPr>
             <a:r>
-              <a:rPr b="1" lang="en-US" sz="3600" spc="-1" strike="noStrike">
-                <a:solidFill>
-                  <a:srgbClr val="3465a4"/>
-                </a:solidFill>
-                <a:uFill>
-                  <a:solidFill>
-                    <a:srgbClr val="ffffff"/>
-                  </a:solidFill>
-                </a:uFill>
-                <a:latin typeface="Arial"/>
-                <a:ea typeface="DejaVu Sans"/>
-              </a:rPr>
-              <a:t>Methods</a:t>
+              <a:rPr b="0" lang="en-US" sz="2600" spc="-1" strike="noStrike">
+                <a:solidFill>
+                  <a:srgbClr val="333333"/>
+                </a:solidFill>
+                <a:uFill>
+                  <a:solidFill>
+                    <a:srgbClr val="ffffff"/>
+                  </a:solidFill>
+                </a:uFill>
+                <a:latin typeface="Arial"/>
+                <a:ea typeface="DejaVu Sans"/>
+              </a:rPr>
+              <a:t>The potential of our subpocket-based kinase comparison is demonstrated by uncovering retrospectively on- and off-targets for EGFR using KinMap [7] (</a:t>
+            </a:r>
+            <a:r>
+              <a:rPr b="1" lang="en-US" sz="2600" spc="-1" strike="noStrike">
+                <a:solidFill>
+                  <a:srgbClr val="333333"/>
+                </a:solidFill>
+                <a:uFill>
+                  <a:solidFill>
+                    <a:srgbClr val="ffffff"/>
+                  </a:solidFill>
+                </a:uFill>
+                <a:latin typeface="Arial"/>
+                <a:ea typeface="DejaVu Sans"/>
+              </a:rPr>
+              <a:t>Fig. 2b</a:t>
+            </a:r>
+            <a:r>
+              <a:rPr b="0" lang="en-US" sz="2600" spc="-1" strike="noStrike">
+                <a:solidFill>
+                  <a:srgbClr val="333333"/>
+                </a:solidFill>
+                <a:uFill>
+                  <a:solidFill>
+                    <a:srgbClr val="ffffff"/>
+                  </a:solidFill>
+                </a:uFill>
+                <a:latin typeface="Arial"/>
+                <a:ea typeface="DejaVu Sans"/>
+              </a:rPr>
+              <a:t>). Compared to profiling data for EGFR inhibitor erlotinib by Karaman et al. [8], our 20 most similar structures to EGFR include many off-targets in the TK group as well as reported off-target kinases LOK and SLK </a:t>
+            </a:r>
+            <a:r>
+              <a:rPr b="0" lang="en-US" sz="2600" spc="-1" strike="noStrike">
+                <a:solidFill>
+                  <a:srgbClr val="333333"/>
+                </a:solidFill>
+                <a:uFill>
+                  <a:solidFill>
+                    <a:srgbClr val="ffffff"/>
+                  </a:solidFill>
+                </a:uFill>
+                <a:latin typeface="Arial"/>
+                <a:ea typeface="DejaVu Sans"/>
+              </a:rPr>
+              <a:t>(STE), though missing the off-target kinase GAK (Other). Furhtermore, clustering of all similarity aaa</a:t>
+            </a:r>
+            <a:endParaRPr b="0" lang="en-US" sz="1800" spc="-1" strike="noStrike">
+              <a:solidFill>
+                <a:srgbClr val="000000"/>
+              </a:solidFill>
+              <a:uFill>
+                <a:solidFill>
+                  <a:srgbClr val="ffffff"/>
+                </a:solidFill>
+              </a:uFill>
+              <a:latin typeface="Arial"/>
+            </a:endParaRPr>
+          </a:p>
+        </p:txBody>
+      </p:sp>
+      <p:sp>
+        <p:nvSpPr>
+          <p:cNvPr id="57" name="CustomShape 14"/>
+          <p:cNvSpPr/>
+          <p:nvPr/>
+        </p:nvSpPr>
+        <p:spPr>
+          <a:xfrm>
+            <a:off x="720000" y="38268000"/>
+            <a:ext cx="14397840" cy="1652760"/>
+          </a:xfrm>
+          <a:prstGeom prst="rect">
+            <a:avLst/>
+          </a:prstGeom>
+          <a:noFill/>
+          <a:ln>
+            <a:noFill/>
+          </a:ln>
+        </p:spPr>
+        <p:style>
+          <a:lnRef idx="0"/>
+          <a:fillRef idx="0"/>
+          <a:effectRef idx="0"/>
+          <a:fontRef idx="minor"/>
+        </p:style>
+      </p:sp>
+      <p:sp>
+        <p:nvSpPr>
+          <p:cNvPr id="58" name="CustomShape 15"/>
+          <p:cNvSpPr/>
+          <p:nvPr/>
+        </p:nvSpPr>
+        <p:spPr>
+          <a:xfrm>
+            <a:off x="720000" y="21286800"/>
+            <a:ext cx="9521280" cy="2469240"/>
+          </a:xfrm>
+          <a:prstGeom prst="rect">
+            <a:avLst/>
+          </a:prstGeom>
+          <a:noFill/>
+          <a:ln>
+            <a:noFill/>
+          </a:ln>
+        </p:spPr>
+        <p:style>
+          <a:lnRef idx="0"/>
+          <a:fillRef idx="0"/>
+          <a:effectRef idx="0"/>
+          <a:fontRef idx="minor"/>
+        </p:style>
+        <p:txBody>
+          <a:bodyPr lIns="90000" rIns="90000" tIns="0" bIns="45000"/>
+          <a:p>
+            <a:pPr algn="just">
+              <a:lnSpc>
+                <a:spcPct val="115000"/>
+              </a:lnSpc>
+            </a:pPr>
+            <a:r>
+              <a:rPr b="1" lang="en-US" sz="2600" spc="-1" strike="noStrike">
+                <a:solidFill>
+                  <a:srgbClr val="333333"/>
+                </a:solidFill>
+                <a:uFill>
+                  <a:solidFill>
+                    <a:srgbClr val="ffffff"/>
+                  </a:solidFill>
+                </a:uFill>
+                <a:latin typeface="Arial"/>
+                <a:ea typeface="DejaVu Sans"/>
+              </a:rPr>
+              <a:t>Kinase comparison &amp; scoring. </a:t>
+            </a:r>
+            <a:r>
+              <a:rPr b="0" lang="en-US" sz="2600" spc="-1" strike="noStrike">
+                <a:solidFill>
+                  <a:srgbClr val="333333"/>
+                </a:solidFill>
+                <a:uFill>
+                  <a:solidFill>
+                    <a:srgbClr val="ffffff"/>
+                  </a:solidFill>
+                </a:uFill>
+                <a:latin typeface="Arial"/>
+                <a:ea typeface="DejaVu Sans"/>
+              </a:rPr>
+              <a:t>Kinase structures are compared pairwise using the inverse, translated and scaled Manhattan distance as implemented for the USR method [3]. For each kinase pair, the best scoring structure pair is used for further analysis, resulting in a 253x253 similarity matrix.</a:t>
             </a:r>
             <a:endParaRPr b="0" lang="en-US" sz="1800" spc="-1" strike="noStrike">
               <a:solidFill>
@@ -3239,14 +3491,14 @@
       </p:sp>
       <p:sp>
         <p:nvSpPr>
-          <p:cNvPr id="57" name="CustomShape 16"/>
+          <p:cNvPr id="59" name="CustomShape 16"/>
           <p:cNvSpPr/>
           <p:nvPr/>
         </p:nvSpPr>
         <p:spPr>
           <a:xfrm>
-            <a:off x="722520" y="15526440"/>
-            <a:ext cx="14398200" cy="1337400"/>
+            <a:off x="720000" y="10044000"/>
+            <a:ext cx="14397840" cy="2897280"/>
           </a:xfrm>
           <a:prstGeom prst="rect">
             <a:avLst/>
@@ -3271,21 +3523,6 @@
               </a:lnSpc>
             </a:pPr>
             <a:r>
-              <a:rPr b="1" lang="en-US" sz="2600" spc="-1" strike="noStrike">
-                <a:solidFill>
-                  <a:srgbClr val="333333"/>
-                </a:solidFill>
-                <a:uFill>
-                  <a:solidFill>
-                    <a:srgbClr val="ffffff"/>
-                  </a:solidFill>
-                </a:uFill>
-                <a:latin typeface="Arial"/>
-                <a:ea typeface="DejaVu Sans"/>
-              </a:rPr>
-              <a:t>Data preparation. </a:t>
-            </a:r>
-            <a:r>
               <a:rPr b="0" lang="en-US" sz="2600" spc="-1" strike="noStrike">
                 <a:solidFill>
                   <a:srgbClr val="333333"/>
@@ -3298,67 +3535,131 @@
                 <a:latin typeface="Arial"/>
                 <a:ea typeface="DejaVu Sans"/>
               </a:rPr>
-              <a:t>KLIFS dataset was filtered for structures (i) describing human kinases, (ii) in DFG-in conformation, (iii) with the best quality score per kinase-structure pair, and (iv) with a resolution </a:t>
-            </a:r>
-            <a:r>
-              <a:rPr b="0" lang="en-US" sz="2600" spc="-1" strike="noStrike">
-                <a:solidFill>
-                  <a:srgbClr val="333333"/>
-                </a:solidFill>
-                <a:uFill>
-                  <a:solidFill>
-                    <a:srgbClr val="ffffff"/>
-                  </a:solidFill>
-                </a:uFill>
-                <a:latin typeface="Ubuntu"/>
-                <a:ea typeface="Ubuntu"/>
-              </a:rPr>
-              <a:t>≤ </a:t>
-            </a:r>
-            <a:r>
-              <a:rPr b="0" lang="en-US" sz="2600" spc="-1" strike="noStrike">
-                <a:solidFill>
-                  <a:srgbClr val="333333"/>
-                </a:solidFill>
-                <a:uFill>
-                  <a:solidFill>
-                    <a:srgbClr val="ffffff"/>
-                  </a:solidFill>
-                </a:uFill>
-                <a:latin typeface="Arial"/>
-                <a:ea typeface="DejaVu Sans"/>
-              </a:rPr>
-              <a:t>4 and a quality score </a:t>
-            </a:r>
-            <a:r>
-              <a:rPr b="0" lang="en-US" sz="2600" spc="-1" strike="noStrike">
-                <a:solidFill>
-                  <a:srgbClr val="333333"/>
-                </a:solidFill>
-                <a:uFill>
-                  <a:solidFill>
-                    <a:srgbClr val="ffffff"/>
-                  </a:solidFill>
-                </a:uFill>
-                <a:latin typeface="Ubuntu"/>
-                <a:ea typeface="Ubuntu"/>
-              </a:rPr>
-              <a:t>≥ </a:t>
-            </a:r>
-            <a:r>
-              <a:rPr b="0" lang="en-US" sz="2600" spc="-1" strike="noStrike">
-                <a:solidFill>
-                  <a:srgbClr val="333333"/>
-                </a:solidFill>
-                <a:uFill>
-                  <a:solidFill>
-                    <a:srgbClr val="ffffff"/>
-                  </a:solidFill>
-                </a:uFill>
-                <a:latin typeface="Arial"/>
-                <a:ea typeface="DejaVu Sans"/>
-              </a:rPr>
-              <a:t>4. The resulting kinase dataset consists of 3,875 structures.</a:t>
+              <a:t>Kinases are important and well studied drug targets for cancer and inflammatory diseases. Due to the highly conserved structure of kinases, especially at the ATP binding site, the main challenge when developing kinase inhibitors is achieving selectivity, which requires a comprehensive understanding of kinase similarity. [1] Here, we present our work on a novel fingerprinting strategy designed specifically for kinase pockets, allowing for similarity studies across the structurally covered kinome. </a:t>
+            </a:r>
+            <a:endParaRPr b="0" lang="en-US" sz="1800" spc="-1" strike="noStrike">
+              <a:solidFill>
+                <a:srgbClr val="000000"/>
+              </a:solidFill>
+              <a:uFill>
+                <a:solidFill>
+                  <a:srgbClr val="ffffff"/>
+                </a:solidFill>
+              </a:uFill>
+              <a:latin typeface="Arial"/>
+            </a:endParaRPr>
+          </a:p>
+        </p:txBody>
+      </p:sp>
+      <p:sp>
+        <p:nvSpPr>
+          <p:cNvPr id="60" name="CustomShape 17"/>
+          <p:cNvSpPr/>
+          <p:nvPr/>
+        </p:nvSpPr>
+        <p:spPr>
+          <a:xfrm>
+            <a:off x="720000" y="9396000"/>
+            <a:ext cx="14400360" cy="638640"/>
+          </a:xfrm>
+          <a:prstGeom prst="rect">
+            <a:avLst/>
+          </a:prstGeom>
+          <a:noFill/>
+          <a:ln>
+            <a:noFill/>
+          </a:ln>
+        </p:spPr>
+        <p:style>
+          <a:lnRef idx="0"/>
+          <a:fillRef idx="0"/>
+          <a:effectRef idx="0"/>
+          <a:fontRef idx="minor"/>
+        </p:style>
+        <p:txBody>
+          <a:bodyPr lIns="90000" rIns="90000" tIns="0" bIns="45000"/>
+          <a:p>
+            <a:pPr algn="just">
+              <a:lnSpc>
+                <a:spcPct val="115000"/>
+              </a:lnSpc>
+            </a:pPr>
+            <a:r>
+              <a:rPr b="1" lang="en-US" sz="3600" spc="-1" strike="noStrike">
+                <a:solidFill>
+                  <a:srgbClr val="3465a4"/>
+                </a:solidFill>
+                <a:uFill>
+                  <a:solidFill>
+                    <a:srgbClr val="ffffff"/>
+                  </a:solidFill>
+                </a:uFill>
+                <a:latin typeface="Arial"/>
+                <a:ea typeface="DejaVu Sans"/>
+              </a:rPr>
+              <a:t>Introduction</a:t>
+            </a:r>
+            <a:endParaRPr b="0" lang="en-US" sz="1800" spc="-1" strike="noStrike">
+              <a:solidFill>
+                <a:srgbClr val="000000"/>
+              </a:solidFill>
+              <a:uFill>
+                <a:solidFill>
+                  <a:srgbClr val="ffffff"/>
+                </a:solidFill>
+              </a:uFill>
+              <a:latin typeface="Arial"/>
+            </a:endParaRPr>
+          </a:p>
+        </p:txBody>
+      </p:sp>
+      <p:sp>
+        <p:nvSpPr>
+          <p:cNvPr id="61" name="CustomShape 18"/>
+          <p:cNvSpPr/>
+          <p:nvPr/>
+        </p:nvSpPr>
+        <p:spPr>
+          <a:xfrm>
+            <a:off x="720000" y="12996000"/>
+            <a:ext cx="14400360" cy="638640"/>
+          </a:xfrm>
+          <a:prstGeom prst="rect">
+            <a:avLst/>
+          </a:prstGeom>
+          <a:noFill/>
+          <a:ln>
+            <a:noFill/>
+          </a:ln>
+        </p:spPr>
+        <p:style>
+          <a:lnRef idx="0"/>
+          <a:fillRef idx="0"/>
+          <a:effectRef idx="0"/>
+          <a:fontRef idx="minor"/>
+        </p:style>
+        <p:txBody>
+          <a:bodyPr lIns="90000" rIns="90000" tIns="0" bIns="45000"/>
+          <a:p>
+            <a:pPr algn="just">
+              <a:lnSpc>
+                <a:spcPct val="115000"/>
+              </a:lnSpc>
+            </a:pPr>
+            <a:r>
+              <a:rPr b="1" lang="en-US" sz="3600" spc="-1" strike="noStrike">
+                <a:solidFill>
+                  <a:srgbClr val="3465a4"/>
+                </a:solidFill>
+                <a:uFill>
+                  <a:solidFill>
+                    <a:srgbClr val="ffffff"/>
+                  </a:solidFill>
+                </a:uFill>
+                <a:latin typeface="Arial"/>
+                <a:ea typeface="DejaVu Sans"/>
+              </a:rPr>
+              <a:t>Methods</a:t>
             </a:r>
             <a:endParaRPr b="0" lang="en-US" sz="1800" spc="-1" strike="noStrike">
               <a:solidFill>
@@ -3426,6 +3727,143 @@
               <a:latin typeface="Arial"/>
             </a:endParaRPr>
           </a:p>
+        </p:txBody>
+      </p:sp>
+      <p:sp>
+        <p:nvSpPr>
+          <p:cNvPr id="62" name="CustomShape 19"/>
+          <p:cNvSpPr/>
+          <p:nvPr/>
+        </p:nvSpPr>
+        <p:spPr>
+          <a:xfrm>
+            <a:off x="722520" y="15202440"/>
+            <a:ext cx="14397840" cy="1337040"/>
+          </a:xfrm>
+          <a:prstGeom prst="rect">
+            <a:avLst/>
+          </a:prstGeom>
+          <a:noFill/>
+          <a:ln>
+            <a:noFill/>
+          </a:ln>
+        </p:spPr>
+        <p:style>
+          <a:lnRef idx="0"/>
+          <a:fillRef idx="0"/>
+          <a:effectRef idx="0"/>
+          <a:fontRef idx="minor"/>
+        </p:style>
+        <p:txBody>
+          <a:bodyPr lIns="90000" rIns="90000" tIns="0" bIns="45000"/>
+          <a:p>
+            <a:pPr algn="just">
+              <a:lnSpc>
+                <a:spcPct val="115000"/>
+              </a:lnSpc>
+            </a:pPr>
+            <a:r>
+              <a:rPr b="1" lang="en-US" sz="2600" spc="-1" strike="noStrike">
+                <a:solidFill>
+                  <a:srgbClr val="333333"/>
+                </a:solidFill>
+                <a:uFill>
+                  <a:solidFill>
+                    <a:srgbClr val="ffffff"/>
+                  </a:solidFill>
+                </a:uFill>
+                <a:latin typeface="Arial"/>
+                <a:ea typeface="DejaVu Sans"/>
+              </a:rPr>
+              <a:t>Data preparation. </a:t>
+            </a:r>
+            <a:r>
+              <a:rPr b="0" lang="en-US" sz="2600" spc="-1" strike="noStrike">
+                <a:solidFill>
+                  <a:srgbClr val="333333"/>
+                </a:solidFill>
+                <a:uFill>
+                  <a:solidFill>
+                    <a:srgbClr val="ffffff"/>
+                  </a:solidFill>
+                </a:uFill>
+                <a:latin typeface="Arial"/>
+                <a:ea typeface="DejaVu Sans"/>
+              </a:rPr>
+              <a:t>KLIFS dataset was filtered for entries (i) describing human kinases, (ii) in DFG-in conformation, (iii) with the best quality score per PDB structure (if multiple chains and/or alternate models available), and (iv) with a resolution </a:t>
+            </a:r>
+            <a:r>
+              <a:rPr b="0" lang="en-US" sz="2600" spc="-1" strike="noStrike">
+                <a:solidFill>
+                  <a:srgbClr val="333333"/>
+                </a:solidFill>
+                <a:uFill>
+                  <a:solidFill>
+                    <a:srgbClr val="ffffff"/>
+                  </a:solidFill>
+                </a:uFill>
+                <a:latin typeface="Ubuntu"/>
+                <a:ea typeface="Ubuntu"/>
+              </a:rPr>
+              <a:t>≤ </a:t>
+            </a:r>
+            <a:r>
+              <a:rPr b="0" lang="en-US" sz="2600" spc="-1" strike="noStrike">
+                <a:solidFill>
+                  <a:srgbClr val="333333"/>
+                </a:solidFill>
+                <a:uFill>
+                  <a:solidFill>
+                    <a:srgbClr val="ffffff"/>
+                  </a:solidFill>
+                </a:uFill>
+                <a:latin typeface="Arial"/>
+                <a:ea typeface="DejaVu Sans"/>
+              </a:rPr>
+              <a:t>4 and a quality score </a:t>
+            </a:r>
+            <a:r>
+              <a:rPr b="0" lang="en-US" sz="2600" spc="-1" strike="noStrike">
+                <a:solidFill>
+                  <a:srgbClr val="333333"/>
+                </a:solidFill>
+                <a:uFill>
+                  <a:solidFill>
+                    <a:srgbClr val="ffffff"/>
+                  </a:solidFill>
+                </a:uFill>
+                <a:latin typeface="Ubuntu"/>
+                <a:ea typeface="Ubuntu"/>
+              </a:rPr>
+              <a:t>≥ </a:t>
+            </a:r>
+            <a:r>
+              <a:rPr b="0" lang="en-US" sz="2600" spc="-1" strike="noStrike">
+                <a:solidFill>
+                  <a:srgbClr val="333333"/>
+                </a:solidFill>
+                <a:uFill>
+                  <a:solidFill>
+                    <a:srgbClr val="ffffff"/>
+                  </a:solidFill>
+                </a:uFill>
+                <a:latin typeface="Arial"/>
+                <a:ea typeface="DejaVu Sans"/>
+              </a:rPr>
+              <a:t>4. The resulting kinase dataset consists of 3,875 structures.</a:t>
+            </a:r>
+            <a:endParaRPr b="0" lang="en-US" sz="1800" spc="-1" strike="noStrike">
+              <a:solidFill>
+                <a:srgbClr val="000000"/>
+              </a:solidFill>
+              <a:uFill>
+                <a:solidFill>
+                  <a:srgbClr val="ffffff"/>
+                </a:solidFill>
+              </a:uFill>
+              <a:latin typeface="Arial"/>
+            </a:endParaRPr>
+          </a:p>
           <a:p>
             <a:pPr algn="just">
               <a:lnSpc>
@@ -3444,18 +3882,72 @@
               <a:latin typeface="Arial"/>
             </a:endParaRPr>
           </a:p>
-        </p:txBody>
-      </p:sp>
-      <p:sp>
-        <p:nvSpPr>
-          <p:cNvPr id="58" name="CustomShape 17"/>
+          <a:p>
+            <a:pPr algn="just">
+              <a:lnSpc>
+                <a:spcPct val="115000"/>
+              </a:lnSpc>
+            </a:pPr>
+            <a:endParaRPr b="0" lang="en-US" sz="1800" spc="-1" strike="noStrike">
+              <a:solidFill>
+                <a:srgbClr val="000000"/>
+              </a:solidFill>
+              <a:uFill>
+                <a:solidFill>
+                  <a:srgbClr val="ffffff"/>
+                </a:solidFill>
+              </a:uFill>
+              <a:latin typeface="Arial"/>
+            </a:endParaRPr>
+          </a:p>
+          <a:p>
+            <a:pPr algn="just">
+              <a:lnSpc>
+                <a:spcPct val="115000"/>
+              </a:lnSpc>
+            </a:pPr>
+            <a:endParaRPr b="0" lang="en-US" sz="1800" spc="-1" strike="noStrike">
+              <a:solidFill>
+                <a:srgbClr val="000000"/>
+              </a:solidFill>
+              <a:uFill>
+                <a:solidFill>
+                  <a:srgbClr val="ffffff"/>
+                </a:solidFill>
+              </a:uFill>
+              <a:latin typeface="Arial"/>
+            </a:endParaRPr>
+          </a:p>
+          <a:p>
+            <a:pPr algn="just">
+              <a:lnSpc>
+                <a:spcPct val="115000"/>
+              </a:lnSpc>
+            </a:pPr>
+            <a:endParaRPr b="0" lang="en-US" sz="1800" spc="-1" strike="noStrike">
+              <a:solidFill>
+                <a:srgbClr val="000000"/>
+              </a:solidFill>
+              <a:uFill>
+                <a:solidFill>
+                  <a:srgbClr val="ffffff"/>
+                </a:solidFill>
+              </a:uFill>
+              <a:latin typeface="Arial"/>
+            </a:endParaRPr>
+          </a:p>
+        </p:txBody>
+      </p:sp>
+      <p:sp>
+        <p:nvSpPr>
+          <p:cNvPr id="63" name="CustomShape 20"/>
           <p:cNvSpPr/>
           <p:nvPr/>
         </p:nvSpPr>
         <p:spPr>
           <a:xfrm>
-            <a:off x="720000" y="13990320"/>
-            <a:ext cx="14398200" cy="1370520"/>
+            <a:off x="720000" y="13666320"/>
+            <a:ext cx="14397840" cy="1370160"/>
           </a:xfrm>
           <a:prstGeom prst="rect">
             <a:avLst/>
@@ -3564,14 +4056,14 @@
       </p:sp>
       <p:sp>
         <p:nvSpPr>
-          <p:cNvPr id="59" name="CustomShape 18"/>
+          <p:cNvPr id="64" name="CustomShape 21"/>
           <p:cNvSpPr/>
           <p:nvPr/>
         </p:nvSpPr>
         <p:spPr>
           <a:xfrm>
-            <a:off x="687960" y="23717880"/>
-            <a:ext cx="14398200" cy="639000"/>
+            <a:off x="722520" y="23645880"/>
+            <a:ext cx="14397840" cy="638640"/>
           </a:xfrm>
           <a:prstGeom prst="rect">
             <a:avLst/>
@@ -3677,14 +4169,14 @@
       </p:sp>
       <p:sp>
         <p:nvSpPr>
-          <p:cNvPr id="60" name="CustomShape 19"/>
+          <p:cNvPr id="65" name="CustomShape 22"/>
           <p:cNvSpPr/>
           <p:nvPr/>
         </p:nvSpPr>
         <p:spPr>
           <a:xfrm>
-            <a:off x="15532200" y="23735520"/>
-            <a:ext cx="14400720" cy="655920"/>
+            <a:off x="15316200" y="22511880"/>
+            <a:ext cx="14400360" cy="655560"/>
           </a:xfrm>
           <a:prstGeom prst="rect">
             <a:avLst/>
@@ -3731,7 +4223,7 @@
                 <a:latin typeface="Arial"/>
                 <a:ea typeface="DejaVu Sans"/>
               </a:rPr>
-              <a:t>: (a) Composition of 962 bit kinase fingerprint, (b) feature value distribution over all 3,875 kinase structures.</a:t>
+              <a:t>: (a) Composition of the 692 bit kinase fingerprint, (b) reference points for spatial feature calculation: centroid (orange), hinge region (magenta), DFG region (blue), and front pocket (green). Reference points (large spheres) are calculated based on centroid of three anchor residue CA atoms each (small spheres). Backbone of hinge and DFG region are highlighted.</a:t>
             </a:r>
             <a:endParaRPr b="0" lang="en-US" sz="1800" spc="-1" strike="noStrike">
               <a:solidFill>
@@ -3749,14 +4241,14 @@
       </p:sp>
       <p:sp>
         <p:nvSpPr>
-          <p:cNvPr id="61" name="CustomShape 20"/>
+          <p:cNvPr id="66" name="CustomShape 23"/>
           <p:cNvSpPr/>
           <p:nvPr/>
         </p:nvSpPr>
         <p:spPr>
           <a:xfrm>
-            <a:off x="15760800" y="12003840"/>
-            <a:ext cx="1004760" cy="458280"/>
+            <a:off x="15316200" y="12003840"/>
+            <a:ext cx="1004400" cy="457920"/>
           </a:xfrm>
           <a:prstGeom prst="rect">
             <a:avLst/>
@@ -3806,14 +4298,14 @@
       </p:sp>
       <p:sp>
         <p:nvSpPr>
-          <p:cNvPr id="62" name="CustomShape 21"/>
+          <p:cNvPr id="67" name="CustomShape 24"/>
           <p:cNvSpPr/>
           <p:nvPr/>
         </p:nvSpPr>
         <p:spPr>
           <a:xfrm>
-            <a:off x="15760800" y="19595520"/>
-            <a:ext cx="1004760" cy="458280"/>
+            <a:off x="15316200" y="16859520"/>
+            <a:ext cx="1004400" cy="457920"/>
           </a:xfrm>
           <a:prstGeom prst="rect">
             <a:avLst/>
@@ -3863,14 +4355,14 @@
       </p:sp>
       <p:sp>
         <p:nvSpPr>
-          <p:cNvPr id="63" name="CustomShape 22"/>
+          <p:cNvPr id="68" name="CustomShape 25"/>
           <p:cNvSpPr/>
           <p:nvPr/>
         </p:nvSpPr>
         <p:spPr>
           <a:xfrm>
-            <a:off x="4480560" y="41176080"/>
-            <a:ext cx="10605960" cy="939240"/>
+            <a:off x="-12638160" y="39564000"/>
+            <a:ext cx="10605600" cy="938880"/>
           </a:xfrm>
           <a:prstGeom prst="rect">
             <a:avLst/>
@@ -3886,63 +4378,17 @@
           <a:effectRef idx="0"/>
           <a:fontRef idx="minor"/>
         </p:style>
-        <p:txBody>
-          <a:bodyPr lIns="90000" rIns="90000" tIns="45000" bIns="45000"/>
-          <a:p>
-            <a:r>
-              <a:rPr b="1" lang="en-US" sz="2000" spc="-1" strike="noStrike">
-                <a:solidFill>
-                  <a:srgbClr val="333333"/>
-                </a:solidFill>
-                <a:uFill>
-                  <a:solidFill>
-                    <a:srgbClr val="ffffff"/>
-                  </a:solidFill>
-                </a:uFill>
-                <a:latin typeface="Arial"/>
-                <a:ea typeface="DejaVu Sans"/>
-              </a:rPr>
-              <a:t>Fig. 2</a:t>
-            </a:r>
-            <a:r>
-              <a:rPr b="0" lang="en-US" sz="2000" spc="-1" strike="noStrike">
-                <a:solidFill>
-                  <a:srgbClr val="333333"/>
-                </a:solidFill>
-                <a:uFill>
-                  <a:solidFill>
-                    <a:srgbClr val="ffffff"/>
-                  </a:solidFill>
-                </a:uFill>
-                <a:latin typeface="Arial"/>
-                <a:ea typeface="DejaVu Sans"/>
-              </a:rPr>
-              <a:t>: Ligand-based on-/off-target prediction for EGFR inhibitor erlotinib based on our kinase fingerprint similarity: the 20 most similar structures to EGFR (blue pentagons) and erlotinib profiling data (orange circles).</a:t>
-            </a:r>
-            <a:endParaRPr b="0" lang="en-US" sz="1800" spc="-1" strike="noStrike">
-              <a:solidFill>
-                <a:srgbClr val="000000"/>
-              </a:solidFill>
-              <a:uFill>
-                <a:solidFill>
-                  <a:srgbClr val="ffffff"/>
-                </a:solidFill>
-              </a:uFill>
-              <a:latin typeface="Arial"/>
-            </a:endParaRPr>
-          </a:p>
-        </p:txBody>
-      </p:sp>
-      <p:sp>
-        <p:nvSpPr>
-          <p:cNvPr id="64" name="CustomShape 23"/>
+      </p:sp>
+      <p:sp>
+        <p:nvSpPr>
+          <p:cNvPr id="69" name="CustomShape 26"/>
           <p:cNvSpPr/>
           <p:nvPr/>
         </p:nvSpPr>
         <p:spPr>
           <a:xfrm>
             <a:off x="15318000" y="38753640"/>
-            <a:ext cx="14398200" cy="2683800"/>
+            <a:ext cx="14397840" cy="2683440"/>
           </a:xfrm>
           <a:prstGeom prst="rect">
             <a:avLst/>
@@ -3997,14 +4443,14 @@
       </p:sp>
       <p:sp>
         <p:nvSpPr>
-          <p:cNvPr id="65" name="CustomShape 24"/>
+          <p:cNvPr id="70" name="CustomShape 27"/>
           <p:cNvSpPr/>
           <p:nvPr/>
         </p:nvSpPr>
         <p:spPr>
           <a:xfrm>
-            <a:off x="15318000" y="36520560"/>
-            <a:ext cx="14398200" cy="2244240"/>
+            <a:off x="722520" y="38752200"/>
+            <a:ext cx="14397840" cy="2243880"/>
           </a:xfrm>
           <a:prstGeom prst="rect">
             <a:avLst/>
@@ -4059,14 +4505,14 @@
       </p:sp>
       <p:sp>
         <p:nvSpPr>
-          <p:cNvPr id="66" name="CustomShape 25"/>
+          <p:cNvPr id="71" name="CustomShape 28"/>
           <p:cNvSpPr/>
           <p:nvPr/>
         </p:nvSpPr>
         <p:spPr>
           <a:xfrm>
-            <a:off x="26893440" y="33687360"/>
-            <a:ext cx="2696040" cy="2639160"/>
+            <a:off x="722520" y="35071200"/>
+            <a:ext cx="6684120" cy="3425040"/>
           </a:xfrm>
           <a:prstGeom prst="rect">
             <a:avLst/>
@@ -4098,7 +4544,7 @@
                 <a:latin typeface="Arial"/>
                 <a:ea typeface="DejaVu Sans"/>
               </a:rPr>
-              <a:t>Fig. 3</a:t>
+              <a:t>Fig. 2</a:t>
             </a:r>
             <a:r>
               <a:rPr b="0" lang="en-US" sz="2000" spc="-1" strike="noStrike">
@@ -4113,7 +4559,97 @@
                 <a:latin typeface="Arial"/>
                 <a:ea typeface="DejaVu Sans"/>
               </a:rPr>
-              <a:t>: Hierarchical clustering of pairwise similarity scores for best scoring structure pair for each kinase pair (Euclidean distance with unweighted average linkage clustering).</a:t>
+              <a:t>: </a:t>
+            </a:r>
+            <a:r>
+              <a:rPr b="1" lang="en-US" sz="2000" spc="-1" strike="noStrike">
+                <a:solidFill>
+                  <a:srgbClr val="333333"/>
+                </a:solidFill>
+                <a:uFill>
+                  <a:solidFill>
+                    <a:srgbClr val="ffffff"/>
+                  </a:solidFill>
+                </a:uFill>
+                <a:latin typeface="Arial"/>
+                <a:ea typeface="DejaVu Sans"/>
+              </a:rPr>
+              <a:t>(a)</a:t>
+            </a:r>
+            <a:r>
+              <a:rPr b="0" lang="en-US" sz="2000" spc="-1" strike="noStrike">
+                <a:solidFill>
+                  <a:srgbClr val="333333"/>
+                </a:solidFill>
+                <a:uFill>
+                  <a:solidFill>
+                    <a:srgbClr val="ffffff"/>
+                  </a:solidFill>
+                </a:uFill>
+                <a:latin typeface="Arial"/>
+                <a:ea typeface="DejaVu Sans"/>
+              </a:rPr>
+              <a:t> Feature value distribution for physicochemical (orange) and spatial (blue) bits of the kinase fingerprint. </a:t>
+            </a:r>
+            <a:r>
+              <a:rPr b="1" lang="en-US" sz="2000" spc="-1" strike="noStrike">
+                <a:solidFill>
+                  <a:srgbClr val="333333"/>
+                </a:solidFill>
+                <a:uFill>
+                  <a:solidFill>
+                    <a:srgbClr val="ffffff"/>
+                  </a:solidFill>
+                </a:uFill>
+                <a:latin typeface="Arial"/>
+                <a:ea typeface="DejaVu Sans"/>
+              </a:rPr>
+              <a:t>(b)</a:t>
+            </a:r>
+            <a:r>
+              <a:rPr b="0" lang="en-US" sz="2000" spc="-1" strike="noStrike">
+                <a:solidFill>
+                  <a:srgbClr val="333333"/>
+                </a:solidFill>
+                <a:uFill>
+                  <a:solidFill>
+                    <a:srgbClr val="ffffff"/>
+                  </a:solidFill>
+                </a:uFill>
+                <a:latin typeface="Arial"/>
+                <a:ea typeface="DejaVu Sans"/>
+              </a:rPr>
+              <a:t> Ligand-based on-/off-target prediction for EGFR inhibitor erlotinib based on our kinase fingerprint similarity: the 20 most similar structures to EGFR (blue pentagons) and erlotinib profiling data (orange circles). Illustration reproduced courtesy of Cell signalling Technology, Inc. </a:t>
+            </a:r>
+            <a:r>
+              <a:rPr b="1" lang="en-US" sz="2000" spc="-1" strike="noStrike">
+                <a:solidFill>
+                  <a:srgbClr val="333333"/>
+                </a:solidFill>
+                <a:uFill>
+                  <a:solidFill>
+                    <a:srgbClr val="ffffff"/>
+                  </a:solidFill>
+                </a:uFill>
+                <a:latin typeface="Arial"/>
+                <a:ea typeface="DejaVu Sans"/>
+              </a:rPr>
+              <a:t>(c)</a:t>
+            </a:r>
+            <a:r>
+              <a:rPr b="0" lang="en-US" sz="2000" spc="-1" strike="noStrike">
+                <a:solidFill>
+                  <a:srgbClr val="333333"/>
+                </a:solidFill>
+                <a:uFill>
+                  <a:solidFill>
+                    <a:srgbClr val="ffffff"/>
+                  </a:solidFill>
+                </a:uFill>
+                <a:latin typeface="Arial"/>
+                <a:ea typeface="DejaVu Sans"/>
+              </a:rPr>
+              <a:t> Hierarchical clustering of pairwise similarity scores for best scoring structure pair for each kinase pair (Euclidean distance with unweighted average linkage clustering).</a:t>
             </a:r>
             <a:endParaRPr b="0" lang="en-US" sz="1800" spc="-1" strike="noStrike">
               <a:solidFill>
@@ -4131,14 +4667,14 @@
       </p:sp>
       <p:sp>
         <p:nvSpPr>
-          <p:cNvPr id="67" name="CustomShape 26"/>
+          <p:cNvPr id="72" name="CustomShape 29"/>
           <p:cNvSpPr/>
           <p:nvPr/>
         </p:nvSpPr>
         <p:spPr>
           <a:xfrm>
-            <a:off x="685800" y="25274160"/>
-            <a:ext cx="3336480" cy="14812200"/>
+            <a:off x="12056760" y="27262800"/>
+            <a:ext cx="1933560" cy="595080"/>
           </a:xfrm>
           <a:prstGeom prst="rect">
             <a:avLst/>
@@ -4157,98 +4693,6 @@
         <p:txBody>
           <a:bodyPr lIns="90000" rIns="90000" tIns="45000" bIns="45000"/>
           <a:p>
-            <a:pPr algn="just">
-              <a:lnSpc>
-                <a:spcPct val="115000"/>
-              </a:lnSpc>
-            </a:pPr>
-            <a:r>
-              <a:rPr b="0" lang="en-US" sz="2600" spc="-1" strike="noStrike">
-                <a:solidFill>
-                  <a:srgbClr val="333333"/>
-                </a:solidFill>
-                <a:uFill>
-                  <a:solidFill>
-                    <a:srgbClr val="ffffff"/>
-                  </a:solidFill>
-                </a:uFill>
-                <a:latin typeface="Arial"/>
-                <a:ea typeface="DejaVu Sans"/>
-              </a:rPr>
-              <a:t>Compared to profiling data for EGFR inhibitor erlotinib by Karaman et al. [8], our 20 most similar structures to EGFR include  many off-targets in the TK group as well as the reported off-target kinases LOK and SLK (STE), though missing the off-target kinase GAK (Other). Similarity score clustering shows that our method can reproduce the Manning classification [9] in large part, however also reveals new groupings such as the aforementioned STE kinases within the TK group or the grouping of DRAK2 (DAPK) with the reported off-target CaMKK2 (Other group) [10] (</a:t>
-            </a:r>
-            <a:r>
-              <a:rPr b="1" lang="en-US" sz="2600" spc="-1" strike="noStrike">
-                <a:solidFill>
-                  <a:srgbClr val="333333"/>
-                </a:solidFill>
-                <a:uFill>
-                  <a:solidFill>
-                    <a:srgbClr val="ffffff"/>
-                  </a:solidFill>
-                </a:uFill>
-                <a:latin typeface="Arial"/>
-                <a:ea typeface="DejaVu Sans"/>
-              </a:rPr>
-              <a:t>Fig. 3</a:t>
-            </a:r>
-            <a:r>
-              <a:rPr b="0" lang="en-US" sz="2600" spc="-1" strike="noStrike">
-                <a:solidFill>
-                  <a:srgbClr val="333333"/>
-                </a:solidFill>
-                <a:uFill>
-                  <a:solidFill>
-                    <a:srgbClr val="ffffff"/>
-                  </a:solidFill>
-                </a:uFill>
-                <a:latin typeface="Arial"/>
-                <a:ea typeface="DejaVu Sans"/>
-              </a:rPr>
-              <a:t>).</a:t>
-            </a:r>
-            <a:endParaRPr b="0" lang="en-US" sz="1800" spc="-1" strike="noStrike">
-              <a:solidFill>
-                <a:srgbClr val="000000"/>
-              </a:solidFill>
-              <a:uFill>
-                <a:solidFill>
-                  <a:srgbClr val="ffffff"/>
-                </a:solidFill>
-              </a:uFill>
-              <a:latin typeface="Arial"/>
-            </a:endParaRPr>
-          </a:p>
-        </p:txBody>
-      </p:sp>
-      <p:sp>
-        <p:nvSpPr>
-          <p:cNvPr id="68" name="CustomShape 27"/>
-          <p:cNvSpPr/>
-          <p:nvPr/>
-        </p:nvSpPr>
-        <p:spPr>
-          <a:xfrm>
-            <a:off x="9050400" y="27110160"/>
-            <a:ext cx="1933920" cy="595440"/>
-          </a:xfrm>
-          <a:prstGeom prst="rect">
-            <a:avLst/>
-          </a:prstGeom>
-          <a:noFill/>
-          <a:ln>
-            <a:noFill/>
-          </a:ln>
-        </p:spPr>
-        <p:style>
-          <a:lnRef idx="0"/>
-          <a:fillRef idx="0"/>
-          <a:effectRef idx="0"/>
-          <a:fontRef idx="minor"/>
-        </p:style>
-        <p:txBody>
-          <a:bodyPr lIns="90000" rIns="90000" tIns="45000" bIns="45000"/>
-          <a:p>
             <a:pPr algn="ctr">
               <a:lnSpc>
                 <a:spcPct val="100000"/>
@@ -4351,188 +4795,14 @@
       </p:sp>
       <p:sp>
         <p:nvSpPr>
-          <p:cNvPr id="69" name="CustomShape 28"/>
+          <p:cNvPr id="73" name="CustomShape 30"/>
           <p:cNvSpPr/>
           <p:nvPr/>
         </p:nvSpPr>
         <p:spPr>
-          <a:xfrm>
-            <a:off x="13857120" y="33031440"/>
-            <a:ext cx="1997640" cy="1005480"/>
-          </a:xfrm>
-          <a:prstGeom prst="rect">
-            <a:avLst/>
-          </a:prstGeom>
-          <a:noFill/>
-          <a:ln>
-            <a:noFill/>
-          </a:ln>
-        </p:spPr>
-        <p:style>
-          <a:lnRef idx="0"/>
-          <a:fillRef idx="0"/>
-          <a:effectRef idx="0"/>
-          <a:fontRef idx="minor"/>
-        </p:style>
-        <p:txBody>
-          <a:bodyPr lIns="90000" rIns="90000" tIns="45000" bIns="45000"/>
-          <a:p>
-            <a:pPr algn="ctr">
-              <a:lnSpc>
-                <a:spcPct val="100000"/>
-              </a:lnSpc>
-            </a:pPr>
-            <a:r>
-              <a:rPr b="0" lang="en-US" sz="1800" spc="-1" strike="noStrike">
-                <a:solidFill>
-                  <a:srgbClr val="333333"/>
-                </a:solidFill>
-                <a:uFill>
-                  <a:solidFill>
-                    <a:srgbClr val="ffffff"/>
-                  </a:solidFill>
-                </a:uFill>
-                <a:latin typeface="Times New Roman"/>
-                <a:ea typeface="DejaVu Sans"/>
-              </a:rPr>
-              <a:t>Erlotinib </a:t>
-            </a:r>
-            <a:endParaRPr b="0" lang="en-US" sz="1800" spc="-1" strike="noStrike">
-              <a:solidFill>
-                <a:srgbClr val="000000"/>
-              </a:solidFill>
-              <a:uFill>
-                <a:solidFill>
-                  <a:srgbClr val="ffffff"/>
-                </a:solidFill>
-              </a:uFill>
-              <a:latin typeface="Arial"/>
-            </a:endParaRPr>
-          </a:p>
-          <a:p>
-            <a:pPr algn="ctr">
-              <a:lnSpc>
-                <a:spcPct val="100000"/>
-              </a:lnSpc>
-            </a:pPr>
-            <a:r>
-              <a:rPr b="0" lang="en-US" sz="1800" spc="-1" strike="noStrike">
-                <a:solidFill>
-                  <a:srgbClr val="333333"/>
-                </a:solidFill>
-                <a:uFill>
-                  <a:solidFill>
-                    <a:srgbClr val="ffffff"/>
-                  </a:solidFill>
-                </a:uFill>
-                <a:latin typeface="Times New Roman"/>
-                <a:ea typeface="DejaVu Sans"/>
-              </a:rPr>
-              <a:t>off-targets</a:t>
-            </a:r>
-            <a:endParaRPr b="0" lang="en-US" sz="1800" spc="-1" strike="noStrike">
-              <a:solidFill>
-                <a:srgbClr val="000000"/>
-              </a:solidFill>
-              <a:uFill>
-                <a:solidFill>
-                  <a:srgbClr val="ffffff"/>
-                </a:solidFill>
-              </a:uFill>
-              <a:latin typeface="Arial"/>
-            </a:endParaRPr>
-          </a:p>
-          <a:p>
-            <a:pPr algn="ctr">
-              <a:lnSpc>
-                <a:spcPct val="100000"/>
-              </a:lnSpc>
-            </a:pPr>
-            <a:r>
-              <a:rPr b="0" lang="en-US" sz="1800" spc="-1" strike="noStrike">
-                <a:solidFill>
-                  <a:srgbClr val="333333"/>
-                </a:solidFill>
-                <a:uFill>
-                  <a:solidFill>
-                    <a:srgbClr val="ffffff"/>
-                  </a:solidFill>
-                </a:uFill>
-                <a:latin typeface="Times New Roman"/>
-                <a:ea typeface="DejaVu Sans"/>
-              </a:rPr>
-              <a:t>LOK &amp; SLK</a:t>
-            </a:r>
-            <a:endParaRPr b="0" lang="en-US" sz="1800" spc="-1" strike="noStrike">
-              <a:solidFill>
-                <a:srgbClr val="000000"/>
-              </a:solidFill>
-              <a:uFill>
-                <a:solidFill>
-                  <a:srgbClr val="ffffff"/>
-                </a:solidFill>
-              </a:uFill>
-              <a:latin typeface="Arial"/>
-            </a:endParaRPr>
-          </a:p>
-        </p:txBody>
-      </p:sp>
-      <p:pic>
-        <p:nvPicPr>
-          <p:cNvPr id="70" name="" descr=""/>
-          <p:cNvPicPr/>
-          <p:nvPr/>
-        </p:nvPicPr>
-        <p:blipFill>
-          <a:blip r:embed="rId9"/>
-          <a:stretch/>
-        </p:blipFill>
-        <p:spPr>
-          <a:xfrm>
-            <a:off x="20258640" y="29972880"/>
-            <a:ext cx="1079280" cy="3120480"/>
-          </a:xfrm>
-          <a:prstGeom prst="rect">
-            <a:avLst/>
-          </a:prstGeom>
-          <a:ln>
-            <a:noFill/>
-          </a:ln>
-        </p:spPr>
-      </p:pic>
-      <p:pic>
-        <p:nvPicPr>
-          <p:cNvPr id="71" name="" descr=""/>
-          <p:cNvPicPr/>
-          <p:nvPr/>
-        </p:nvPicPr>
-        <p:blipFill>
-          <a:blip r:embed="rId10"/>
-          <a:stretch/>
-        </p:blipFill>
-        <p:spPr>
-          <a:xfrm>
-            <a:off x="6790320" y="40504320"/>
-            <a:ext cx="7199280" cy="413280"/>
-          </a:xfrm>
-          <a:prstGeom prst="rect">
-            <a:avLst/>
-          </a:prstGeom>
-          <a:ln>
-            <a:noFill/>
-          </a:ln>
-        </p:spPr>
-      </p:pic>
-      <p:sp>
-        <p:nvSpPr>
-          <p:cNvPr id="72" name="CustomShape 29"/>
-          <p:cNvSpPr/>
-          <p:nvPr/>
-        </p:nvSpPr>
-        <p:spPr>
-          <a:xfrm rot="20922000">
-            <a:off x="20387520" y="24286320"/>
-            <a:ext cx="456840" cy="1006920"/>
+          <a:xfrm rot="2700000">
+            <a:off x="18664560" y="36825840"/>
+            <a:ext cx="456480" cy="737280"/>
           </a:xfrm>
           <a:prstGeom prst="ellipse">
             <a:avLst/>
@@ -4554,24 +4824,22 @@
       </p:sp>
       <p:sp>
         <p:nvSpPr>
-          <p:cNvPr id="73" name="CustomShape 30"/>
+          <p:cNvPr id="74" name="Line 31"/>
           <p:cNvSpPr/>
           <p:nvPr/>
         </p:nvSpPr>
         <p:spPr>
-          <a:xfrm rot="2700000">
-            <a:off x="17067600" y="34435080"/>
-            <a:ext cx="456840" cy="737640"/>
-          </a:xfrm>
-          <a:prstGeom prst="ellipse">
-            <a:avLst/>
-          </a:prstGeom>
-          <a:noFill/>
-          <a:ln w="12600">
+          <a:xfrm flipV="1">
+            <a:off x="12186360" y="27822600"/>
+            <a:ext cx="365760" cy="274680"/>
+          </a:xfrm>
+          <a:prstGeom prst="line">
+            <a:avLst/>
+          </a:prstGeom>
+          <a:ln>
             <a:solidFill>
               <a:srgbClr val="333333"/>
             </a:solidFill>
-            <a:round/>
           </a:ln>
         </p:spPr>
         <p:style>
@@ -4583,22 +4851,21 @@
       </p:sp>
       <p:sp>
         <p:nvSpPr>
-          <p:cNvPr id="74" name="Line 31"/>
+          <p:cNvPr id="75" name="CustomShape 32"/>
           <p:cNvSpPr/>
           <p:nvPr/>
         </p:nvSpPr>
         <p:spPr>
           <a:xfrm>
-            <a:off x="13167360" y="32004000"/>
-            <a:ext cx="1554480" cy="1027440"/>
-          </a:xfrm>
-          <a:prstGeom prst="line">
-            <a:avLst/>
-          </a:prstGeom>
+            <a:off x="16288200" y="36287280"/>
+            <a:ext cx="1997280" cy="1005120"/>
+          </a:xfrm>
+          <a:prstGeom prst="rect">
+            <a:avLst/>
+          </a:prstGeom>
+          <a:noFill/>
           <a:ln>
-            <a:solidFill>
-              <a:srgbClr val="333333"/>
-            </a:solidFill>
+            <a:noFill/>
           </a:ln>
         </p:spPr>
         <p:style>
@@ -4607,17 +4874,119 @@
           <a:effectRef idx="0"/>
           <a:fontRef idx="minor"/>
         </p:style>
-      </p:sp>
-      <p:sp>
-        <p:nvSpPr>
-          <p:cNvPr id="75" name="Line 32"/>
+        <p:txBody>
+          <a:bodyPr lIns="90000" rIns="90000" tIns="45000" bIns="45000"/>
+          <a:p>
+            <a:pPr algn="ctr">
+              <a:lnSpc>
+                <a:spcPct val="100000"/>
+              </a:lnSpc>
+            </a:pPr>
+            <a:r>
+              <a:rPr b="0" lang="en-US" sz="1800" spc="-1" strike="noStrike">
+                <a:solidFill>
+                  <a:srgbClr val="333333"/>
+                </a:solidFill>
+                <a:uFill>
+                  <a:solidFill>
+                    <a:srgbClr val="ffffff"/>
+                  </a:solidFill>
+                </a:uFill>
+                <a:latin typeface="Times New Roman"/>
+                <a:ea typeface="DejaVu Sans"/>
+              </a:rPr>
+              <a:t>Erlotinib </a:t>
+            </a:r>
+            <a:endParaRPr b="0" lang="en-US" sz="1800" spc="-1" strike="noStrike">
+              <a:solidFill>
+                <a:srgbClr val="000000"/>
+              </a:solidFill>
+              <a:uFill>
+                <a:solidFill>
+                  <a:srgbClr val="ffffff"/>
+                </a:solidFill>
+              </a:uFill>
+              <a:latin typeface="Arial"/>
+            </a:endParaRPr>
+          </a:p>
+          <a:p>
+            <a:pPr algn="ctr">
+              <a:lnSpc>
+                <a:spcPct val="100000"/>
+              </a:lnSpc>
+            </a:pPr>
+            <a:r>
+              <a:rPr b="0" lang="en-US" sz="1800" spc="-1" strike="noStrike">
+                <a:solidFill>
+                  <a:srgbClr val="333333"/>
+                </a:solidFill>
+                <a:uFill>
+                  <a:solidFill>
+                    <a:srgbClr val="ffffff"/>
+                  </a:solidFill>
+                </a:uFill>
+                <a:latin typeface="Times New Roman"/>
+                <a:ea typeface="DejaVu Sans"/>
+              </a:rPr>
+              <a:t>off-targets</a:t>
+            </a:r>
+            <a:endParaRPr b="0" lang="en-US" sz="1800" spc="-1" strike="noStrike">
+              <a:solidFill>
+                <a:srgbClr val="000000"/>
+              </a:solidFill>
+              <a:uFill>
+                <a:solidFill>
+                  <a:srgbClr val="ffffff"/>
+                </a:solidFill>
+              </a:uFill>
+              <a:latin typeface="Arial"/>
+            </a:endParaRPr>
+          </a:p>
+          <a:p>
+            <a:pPr algn="ctr">
+              <a:lnSpc>
+                <a:spcPct val="100000"/>
+              </a:lnSpc>
+            </a:pPr>
+            <a:r>
+              <a:rPr b="0" lang="en-US" sz="1800" spc="-1" strike="noStrike">
+                <a:solidFill>
+                  <a:srgbClr val="333333"/>
+                </a:solidFill>
+                <a:uFill>
+                  <a:solidFill>
+                    <a:srgbClr val="ffffff"/>
+                  </a:solidFill>
+                </a:uFill>
+                <a:latin typeface="Times New Roman"/>
+                <a:ea typeface="DejaVu Sans"/>
+              </a:rPr>
+              <a:t>LOK &amp; SLK</a:t>
+            </a:r>
+            <a:endParaRPr b="0" lang="en-US" sz="1800" spc="-1" strike="noStrike">
+              <a:solidFill>
+                <a:srgbClr val="000000"/>
+              </a:solidFill>
+              <a:uFill>
+                <a:solidFill>
+                  <a:srgbClr val="ffffff"/>
+                </a:solidFill>
+              </a:uFill>
+              <a:latin typeface="Arial"/>
+            </a:endParaRPr>
+          </a:p>
+        </p:txBody>
+      </p:sp>
+      <p:sp>
+        <p:nvSpPr>
+          <p:cNvPr id="76" name="Line 33"/>
           <p:cNvSpPr/>
           <p:nvPr/>
         </p:nvSpPr>
         <p:spPr>
           <a:xfrm>
-            <a:off x="15179040" y="34037280"/>
-            <a:ext cx="1694520" cy="892800"/>
+            <a:off x="15453360" y="31560480"/>
+            <a:ext cx="1828800" cy="4726800"/>
           </a:xfrm>
           <a:prstGeom prst="line">
             <a:avLst/>
@@ -4637,14 +5006,14 @@
       </p:sp>
       <p:sp>
         <p:nvSpPr>
-          <p:cNvPr id="76" name="Line 33"/>
+          <p:cNvPr id="77" name="Line 34"/>
           <p:cNvSpPr/>
           <p:nvPr/>
         </p:nvSpPr>
         <p:spPr>
-          <a:xfrm flipV="1">
-            <a:off x="9180000" y="27669960"/>
-            <a:ext cx="365760" cy="274680"/>
+          <a:xfrm>
+            <a:off x="18013680" y="37229760"/>
+            <a:ext cx="457200" cy="182880"/>
           </a:xfrm>
           <a:prstGeom prst="line">
             <a:avLst/>
@@ -4662,16 +5031,40 @@
           <a:fontRef idx="minor"/>
         </p:style>
       </p:sp>
-      <p:sp>
-        <p:nvSpPr>
-          <p:cNvPr id="77" name="CustomShape 34"/>
+      <p:pic>
+        <p:nvPicPr>
+          <p:cNvPr id="78" name="" descr=""/>
+          <p:cNvPicPr/>
+          <p:nvPr/>
+        </p:nvPicPr>
+        <p:blipFill>
+          <a:blip r:embed="rId9"/>
+          <a:srcRect l="0" t="894" r="0" b="5768"/>
+          <a:stretch/>
+        </p:blipFill>
+        <p:spPr>
+          <a:xfrm>
+            <a:off x="506520" y="26531280"/>
+            <a:ext cx="6857640" cy="8534160"/>
+          </a:xfrm>
+          <a:prstGeom prst="rect">
+            <a:avLst/>
+          </a:prstGeom>
+          <a:ln>
+            <a:noFill/>
+          </a:ln>
+        </p:spPr>
+      </p:pic>
+      <p:sp>
+        <p:nvSpPr>
+          <p:cNvPr id="79" name="CustomShape 35"/>
           <p:cNvSpPr/>
           <p:nvPr/>
         </p:nvSpPr>
         <p:spPr>
           <a:xfrm>
-            <a:off x="16167960" y="24619680"/>
-            <a:ext cx="1997640" cy="1005480"/>
+            <a:off x="15316200" y="24284160"/>
+            <a:ext cx="14116320" cy="2112480"/>
           </a:xfrm>
           <a:prstGeom prst="rect">
             <a:avLst/>
@@ -4690,25 +5083,55 @@
         <p:txBody>
           <a:bodyPr lIns="90000" rIns="90000" tIns="45000" bIns="45000"/>
           <a:p>
-            <a:pPr algn="ctr">
+            <a:pPr algn="just">
               <a:lnSpc>
-                <a:spcPct val="100000"/>
+                <a:spcPct val="115000"/>
               </a:lnSpc>
             </a:pPr>
             <a:r>
-              <a:rPr b="0" lang="en-US" sz="1800" spc="-1" strike="noStrike">
-                <a:solidFill>
-                  <a:srgbClr val="333333"/>
-                </a:solidFill>
-                <a:uFill>
-                  <a:solidFill>
-                    <a:srgbClr val="ffffff"/>
-                  </a:solidFill>
-                </a:uFill>
-                <a:latin typeface="Times New Roman"/>
-                <a:ea typeface="DejaVu Sans"/>
-              </a:rPr>
-              <a:t>DRAK2 inihibitor off-target CaMMK2</a:t>
+              <a:rPr b="0" lang="en-US" sz="2600" spc="-1" strike="noStrike">
+                <a:solidFill>
+                  <a:srgbClr val="333333"/>
+                </a:solidFill>
+                <a:uFill>
+                  <a:solidFill>
+                    <a:srgbClr val="ffffff"/>
+                  </a:solidFill>
+                </a:uFill>
+                <a:latin typeface="Arial"/>
+                <a:ea typeface="DejaVu Sans"/>
+              </a:rPr>
+              <a:t>scores for the kinase pairs (253x253 similarity matrix) shows that our method can reproduce the Manning classification [9] in large part, however also reveals new groupings such as the aforementioned STE kinases within the TK group or the grouping of DRAK2 (DAPK) with the reported off-target CaMKK2 (Other group) [10] (</a:t>
+            </a:r>
+            <a:r>
+              <a:rPr b="1" lang="en-US" sz="2600" spc="-1" strike="noStrike">
+                <a:solidFill>
+                  <a:srgbClr val="333333"/>
+                </a:solidFill>
+                <a:uFill>
+                  <a:solidFill>
+                    <a:srgbClr val="ffffff"/>
+                  </a:solidFill>
+                </a:uFill>
+                <a:latin typeface="Arial"/>
+                <a:ea typeface="DejaVu Sans"/>
+              </a:rPr>
+              <a:t>Fig. 2c</a:t>
+            </a:r>
+            <a:r>
+              <a:rPr b="0" lang="en-US" sz="2600" spc="-1" strike="noStrike">
+                <a:solidFill>
+                  <a:srgbClr val="333333"/>
+                </a:solidFill>
+                <a:uFill>
+                  <a:solidFill>
+                    <a:srgbClr val="ffffff"/>
+                  </a:solidFill>
+                </a:uFill>
+                <a:latin typeface="Arial"/>
+                <a:ea typeface="DejaVu Sans"/>
+              </a:rPr>
+              <a:t>). </a:t>
             </a:r>
             <a:endParaRPr b="0" lang="en-US" sz="1800" spc="-1" strike="noStrike">
               <a:solidFill>
@@ -4722,26 +5145,43 @@
               <a:latin typeface="Arial"/>
             </a:endParaRPr>
           </a:p>
-        </p:txBody>
-      </p:sp>
-      <p:sp>
-        <p:nvSpPr>
-          <p:cNvPr id="78" name="Line 35"/>
+          <a:p>
+            <a:pPr algn="just">
+              <a:lnSpc>
+                <a:spcPct val="115000"/>
+              </a:lnSpc>
+            </a:pPr>
+            <a:endParaRPr b="0" lang="en-US" sz="1800" spc="-1" strike="noStrike">
+              <a:solidFill>
+                <a:srgbClr val="000000"/>
+              </a:solidFill>
+              <a:uFill>
+                <a:solidFill>
+                  <a:srgbClr val="ffffff"/>
+                </a:solidFill>
+              </a:uFill>
+              <a:latin typeface="Arial"/>
+            </a:endParaRPr>
+          </a:p>
+        </p:txBody>
+      </p:sp>
+      <p:sp>
+        <p:nvSpPr>
+          <p:cNvPr id="80" name="CustomShape 36"/>
           <p:cNvSpPr/>
           <p:nvPr/>
         </p:nvSpPr>
         <p:spPr>
-          <a:xfrm flipV="1">
-            <a:off x="18165600" y="24505920"/>
-            <a:ext cx="2127960" cy="274320"/>
-          </a:xfrm>
-          <a:prstGeom prst="line">
-            <a:avLst/>
-          </a:prstGeom>
+          <a:xfrm>
+            <a:off x="7315200" y="26713440"/>
+            <a:ext cx="1004400" cy="457920"/>
+          </a:xfrm>
+          <a:prstGeom prst="rect">
+            <a:avLst/>
+          </a:prstGeom>
+          <a:noFill/>
           <a:ln>
-            <a:solidFill>
-              <a:srgbClr val="333333"/>
-            </a:solidFill>
+            <a:noFill/>
           </a:ln>
         </p:spPr>
         <p:style>
@@ -4750,6 +5190,151 @@
           <a:effectRef idx="0"/>
           <a:fontRef idx="minor"/>
         </p:style>
+        <p:txBody>
+          <a:bodyPr lIns="90000" rIns="90000" tIns="45000" bIns="45000"/>
+          <a:p>
+            <a:r>
+              <a:rPr b="0" lang="en-US" sz="2600" spc="-1" strike="noStrike">
+                <a:solidFill>
+                  <a:srgbClr val="000000"/>
+                </a:solidFill>
+                <a:uFill>
+                  <a:solidFill>
+                    <a:srgbClr val="ffffff"/>
+                  </a:solidFill>
+                </a:uFill>
+                <a:latin typeface="Arial"/>
+                <a:ea typeface="DejaVu Sans"/>
+              </a:rPr>
+              <a:t>(b)</a:t>
+            </a:r>
+            <a:endParaRPr b="0" lang="en-US" sz="1800" spc="-1" strike="noStrike">
+              <a:solidFill>
+                <a:srgbClr val="000000"/>
+              </a:solidFill>
+              <a:uFill>
+                <a:solidFill>
+                  <a:srgbClr val="ffffff"/>
+                </a:solidFill>
+              </a:uFill>
+              <a:latin typeface="Arial"/>
+            </a:endParaRPr>
+          </a:p>
+        </p:txBody>
+      </p:sp>
+      <p:sp>
+        <p:nvSpPr>
+          <p:cNvPr id="81" name="CustomShape 37"/>
+          <p:cNvSpPr/>
+          <p:nvPr/>
+        </p:nvSpPr>
+        <p:spPr>
+          <a:xfrm>
+            <a:off x="722520" y="26713440"/>
+            <a:ext cx="1004400" cy="457920"/>
+          </a:xfrm>
+          <a:prstGeom prst="rect">
+            <a:avLst/>
+          </a:prstGeom>
+          <a:noFill/>
+          <a:ln>
+            <a:noFill/>
+          </a:ln>
+        </p:spPr>
+        <p:style>
+          <a:lnRef idx="0"/>
+          <a:fillRef idx="0"/>
+          <a:effectRef idx="0"/>
+          <a:fontRef idx="minor"/>
+        </p:style>
+        <p:txBody>
+          <a:bodyPr lIns="90000" rIns="90000" tIns="45000" bIns="45000"/>
+          <a:p>
+            <a:r>
+              <a:rPr b="0" lang="en-US" sz="2600" spc="-1" strike="noStrike">
+                <a:solidFill>
+                  <a:srgbClr val="000000"/>
+                </a:solidFill>
+                <a:uFill>
+                  <a:solidFill>
+                    <a:srgbClr val="ffffff"/>
+                  </a:solidFill>
+                </a:uFill>
+                <a:latin typeface="Arial"/>
+                <a:ea typeface="DejaVu Sans"/>
+              </a:rPr>
+              <a:t>(a)</a:t>
+            </a:r>
+            <a:endParaRPr b="0" lang="en-US" sz="1800" spc="-1" strike="noStrike">
+              <a:solidFill>
+                <a:srgbClr val="000000"/>
+              </a:solidFill>
+              <a:uFill>
+                <a:solidFill>
+                  <a:srgbClr val="ffffff"/>
+                </a:solidFill>
+              </a:uFill>
+              <a:latin typeface="Arial"/>
+            </a:endParaRPr>
+          </a:p>
+        </p:txBody>
+      </p:sp>
+      <p:sp>
+        <p:nvSpPr>
+          <p:cNvPr id="82" name="CustomShape 38"/>
+          <p:cNvSpPr/>
+          <p:nvPr/>
+        </p:nvSpPr>
+        <p:spPr>
+          <a:xfrm>
+            <a:off x="15316200" y="26713440"/>
+            <a:ext cx="1004400" cy="457920"/>
+          </a:xfrm>
+          <a:prstGeom prst="rect">
+            <a:avLst/>
+          </a:prstGeom>
+          <a:noFill/>
+          <a:ln>
+            <a:noFill/>
+          </a:ln>
+        </p:spPr>
+        <p:style>
+          <a:lnRef idx="0"/>
+          <a:fillRef idx="0"/>
+          <a:effectRef idx="0"/>
+          <a:fontRef idx="minor"/>
+        </p:style>
+        <p:txBody>
+          <a:bodyPr lIns="90000" rIns="90000" tIns="45000" bIns="45000"/>
+          <a:p>
+            <a:r>
+              <a:rPr b="0" lang="en-US" sz="2600" spc="-1" strike="noStrike">
+                <a:solidFill>
+                  <a:srgbClr val="000000"/>
+                </a:solidFill>
+                <a:uFill>
+                  <a:solidFill>
+                    <a:srgbClr val="ffffff"/>
+                  </a:solidFill>
+                </a:uFill>
+                <a:latin typeface="Arial"/>
+                <a:ea typeface="DejaVu Sans"/>
+              </a:rPr>
+              <a:t>(c)</a:t>
+            </a:r>
+            <a:endParaRPr b="0" lang="en-US" sz="1800" spc="-1" strike="noStrike">
+              <a:solidFill>
+                <a:srgbClr val="000000"/>
+              </a:solidFill>
+              <a:uFill>
+                <a:solidFill>
+                  <a:srgbClr val="ffffff"/>
+                </a:solidFill>
+              </a:uFill>
+              <a:latin typeface="Arial"/>
+            </a:endParaRPr>
+          </a:p>
+        </p:txBody>
       </p:sp>
     </p:spTree>
   </p:cSld>

</xml_diff>

<commit_message>
Update poster (AV comments #2)
</commit_message>
<xml_diff>
--- a/poster/20190915_ds_phd_Europin_KinSimStructure.pptx
+++ b/poster/20190915_ds_phd_Europin_KinSimStructure.pptx
@@ -1872,7 +1872,7 @@
         <p:spPr>
           <a:xfrm>
             <a:off x="15544800" y="9628560"/>
-            <a:ext cx="14173200" cy="12719160"/>
+            <a:ext cx="14171760" cy="12717720"/>
           </a:xfrm>
           <a:prstGeom prst="rect">
             <a:avLst/>
@@ -1890,13 +1890,13 @@
         </p:nvPicPr>
         <p:blipFill>
           <a:blip r:embed="rId2"/>
-          <a:srcRect l="17457" t="0" r="4773" b="0"/>
+          <a:srcRect l="17464" t="0" r="4773" b="0"/>
           <a:stretch/>
         </p:blipFill>
         <p:spPr>
           <a:xfrm>
             <a:off x="16844760" y="26538840"/>
-            <a:ext cx="12598920" cy="12976920"/>
+            <a:ext cx="12597480" cy="12975480"/>
           </a:xfrm>
           <a:prstGeom prst="rect">
             <a:avLst/>
@@ -1920,7 +1920,7 @@
         <p:spPr>
           <a:xfrm>
             <a:off x="23045400" y="33350760"/>
-            <a:ext cx="1699560" cy="1827360"/>
+            <a:ext cx="1698120" cy="1825920"/>
           </a:xfrm>
           <a:prstGeom prst="rect">
             <a:avLst/>
@@ -1943,7 +1943,7 @@
         <p:spPr>
           <a:xfrm>
             <a:off x="21903480" y="32142600"/>
-            <a:ext cx="1078920" cy="3120120"/>
+            <a:ext cx="1077480" cy="3118680"/>
           </a:xfrm>
           <a:prstGeom prst="rect">
             <a:avLst/>
@@ -1961,8 +1961,8 @@
         </p:nvSpPr>
         <p:spPr>
           <a:xfrm rot="20922000">
-            <a:off x="22032000" y="26718120"/>
-            <a:ext cx="456480" cy="1006560"/>
+            <a:off x="22031280" y="26717040"/>
+            <a:ext cx="455040" cy="1005120"/>
           </a:xfrm>
           <a:prstGeom prst="ellipse">
             <a:avLst/>
@@ -1991,7 +1991,7 @@
         <p:spPr>
           <a:xfrm>
             <a:off x="17812800" y="27051840"/>
-            <a:ext cx="1997280" cy="1005120"/>
+            <a:ext cx="1995840" cy="1003680"/>
           </a:xfrm>
           <a:prstGeom prst="rect">
             <a:avLst/>
@@ -2084,7 +2084,7 @@
         <p:spPr>
           <a:xfrm>
             <a:off x="7680960" y="26805600"/>
-            <a:ext cx="9144000" cy="12271320"/>
+            <a:ext cx="9142560" cy="12269880"/>
           </a:xfrm>
           <a:prstGeom prst="rect">
             <a:avLst/>
@@ -2107,7 +2107,7 @@
         <p:spPr>
           <a:xfrm>
             <a:off x="10457280" y="20920320"/>
-            <a:ext cx="4572000" cy="2560320"/>
+            <a:ext cx="4570560" cy="2558880"/>
           </a:xfrm>
           <a:prstGeom prst="rect">
             <a:avLst/>
@@ -2126,7 +2126,7 @@
         <p:spPr>
           <a:xfrm>
             <a:off x="1170360" y="4239360"/>
-            <a:ext cx="27922680" cy="3015360"/>
+            <a:ext cx="27921240" cy="3013920"/>
           </a:xfrm>
           <a:prstGeom prst="rect">
             <a:avLst/>
@@ -2221,7 +2221,7 @@
         <p:spPr>
           <a:xfrm>
             <a:off x="1170360" y="7155360"/>
-            <a:ext cx="27922680" cy="2490480"/>
+            <a:ext cx="27921240" cy="2489040"/>
           </a:xfrm>
           <a:prstGeom prst="rect">
             <a:avLst/>
@@ -2577,7 +2577,7 @@
         <p:spPr>
           <a:xfrm>
             <a:off x="722520" y="39459240"/>
-            <a:ext cx="14397840" cy="1736280"/>
+            <a:ext cx="14396400" cy="1734840"/>
           </a:xfrm>
           <a:prstGeom prst="rect">
             <a:avLst/>
@@ -2614,7 +2614,7 @@
                 <a:latin typeface="Arial"/>
                 <a:ea typeface="DejaVu Sans"/>
               </a:rPr>
-              <a:t>Our subpocket-based kinase fingerprinting strategy can partially retrieve the Manning kinase classification but also retrospectively reveals structural relationships between kinase groups. Therefore, we believe our fingerprint can help researchers (i) to detect potential promiscuities and off-targets at an early stage of inhibitor design and (ii) to conduct structure-informed polypharmacology studies.</a:t>
+              <a:t>Our subpocket-based kinase fingerprinting strategy can partially retrieve the Manning kinase classification but also reveals structural relationships between different kinase groups. Therefore, we believe our fingerprint can help researchers (i) to detect potential promiscuities and off-targets at an early stage of inhibitor design and (ii) to conduct structure-informed polypharmacology studies.</a:t>
             </a:r>
             <a:endParaRPr b="0" lang="en-US" sz="1800" spc="-1" strike="noStrike">
               <a:solidFill>
@@ -2639,7 +2639,7 @@
         <p:spPr>
           <a:xfrm>
             <a:off x="15318000" y="39461040"/>
-            <a:ext cx="14397840" cy="2023560"/>
+            <a:ext cx="14396400" cy="2022120"/>
           </a:xfrm>
           <a:prstGeom prst="rect">
             <a:avLst/>
@@ -2793,7 +2793,7 @@
         <p:spPr>
           <a:xfrm>
             <a:off x="0" y="2845440"/>
-            <a:ext cx="30267720" cy="723240"/>
+            <a:ext cx="30266280" cy="721800"/>
           </a:xfrm>
           <a:prstGeom prst="rect">
             <a:avLst/>
@@ -2816,7 +2816,7 @@
         <p:spPr>
           <a:xfrm>
             <a:off x="12851640" y="912240"/>
-            <a:ext cx="4564080" cy="1683720"/>
+            <a:ext cx="4562640" cy="1682280"/>
           </a:xfrm>
           <a:prstGeom prst="rect">
             <a:avLst/>
@@ -2863,7 +2863,7 @@
         <p:spPr>
           <a:xfrm>
             <a:off x="722520" y="17115840"/>
-            <a:ext cx="14397840" cy="4143600"/>
+            <a:ext cx="14396400" cy="4142160"/>
           </a:xfrm>
           <a:prstGeom prst="rect">
             <a:avLst/>
@@ -3234,7 +3234,7 @@
         <p:spPr>
           <a:xfrm>
             <a:off x="722520" y="24284160"/>
-            <a:ext cx="14401800" cy="2094120"/>
+            <a:ext cx="14400360" cy="2092680"/>
           </a:xfrm>
           <a:prstGeom prst="rect">
             <a:avLst/>
@@ -3271,7 +3271,7 @@
                 <a:latin typeface="Arial"/>
                 <a:ea typeface="DejaVu Sans"/>
               </a:rPr>
-              <a:t>The potential of our subpocket-based kinase comparison is demonstrated by uncovering retrospectively on- and off-targets for EGFR using KinMap [7] (</a:t>
+              <a:t>The potential of our subpocket-based kinase comparison is demonstrated by uncovering retrospectively on- and off-targets for EGFR inhibitor erlotinib using KinMap [7] (</a:t>
             </a:r>
             <a:r>
               <a:rPr b="1" lang="en-US" sz="2600" spc="-1" strike="noStrike">
@@ -3301,22 +3301,7 @@
                 <a:latin typeface="Arial"/>
                 <a:ea typeface="DejaVu Sans"/>
               </a:rPr>
-              <a:t>). Compared to profiling data for EGFR inhibitor erlotinib by Karaman et al. [8], our 20 most similar structures to EGFR include many off-targets in the TK group as well as reported off-target kinases LOK and SLK </a:t>
-            </a:r>
-            <a:r>
-              <a:rPr b="0" lang="en-US" sz="2600" spc="-1" strike="noStrike">
-                <a:solidFill>
-                  <a:srgbClr val="333333"/>
-                </a:solidFill>
-                <a:uFill>
-                  <a:solidFill>
-                    <a:srgbClr val="ffffff"/>
-                  </a:solidFill>
-                </a:uFill>
-                <a:latin typeface="Arial"/>
-                <a:ea typeface="DejaVu Sans"/>
-              </a:rPr>
-              <a:t>(STE), though missing the off-target kinase GAK (Other). Furhtermore, clustering of all similarity aaa</a:t>
+              <a:t>). Compared to erlotinib profiling data by Karaman et al. [8], our 20 most similar structures to EGFR include many off-targets in the TK group as well as the reported main off-target kinases LOK and SLK (in the more distant STE group), though missing the off-target kinase GAK (Other).</a:t>
             </a:r>
             <a:endParaRPr b="0" lang="en-US" sz="1800" spc="-1" strike="noStrike">
               <a:solidFill>
@@ -3341,7 +3326,7 @@
         <p:spPr>
           <a:xfrm>
             <a:off x="720000" y="38268000"/>
-            <a:ext cx="14397840" cy="1652760"/>
+            <a:ext cx="14396400" cy="1651320"/>
           </a:xfrm>
           <a:prstGeom prst="rect">
             <a:avLst/>
@@ -3367,7 +3352,7 @@
         <p:spPr>
           <a:xfrm>
             <a:off x="720000" y="21286800"/>
-            <a:ext cx="9521280" cy="2469240"/>
+            <a:ext cx="9519840" cy="2467800"/>
           </a:xfrm>
           <a:prstGeom prst="rect">
             <a:avLst/>
@@ -3498,7 +3483,7 @@
         <p:spPr>
           <a:xfrm>
             <a:off x="720000" y="10044000"/>
-            <a:ext cx="14397840" cy="2897280"/>
+            <a:ext cx="14396400" cy="2895840"/>
           </a:xfrm>
           <a:prstGeom prst="rect">
             <a:avLst/>
@@ -3560,7 +3545,7 @@
         <p:spPr>
           <a:xfrm>
             <a:off x="720000" y="9396000"/>
-            <a:ext cx="14400360" cy="638640"/>
+            <a:ext cx="14398920" cy="637200"/>
           </a:xfrm>
           <a:prstGeom prst="rect">
             <a:avLst/>
@@ -3622,7 +3607,7 @@
         <p:spPr>
           <a:xfrm>
             <a:off x="720000" y="12996000"/>
-            <a:ext cx="14400360" cy="638640"/>
+            <a:ext cx="14398920" cy="637200"/>
           </a:xfrm>
           <a:prstGeom prst="rect">
             <a:avLst/>
@@ -3738,7 +3723,7 @@
         <p:spPr>
           <a:xfrm>
             <a:off x="722520" y="15202440"/>
-            <a:ext cx="14397840" cy="1337040"/>
+            <a:ext cx="14396400" cy="1335600"/>
           </a:xfrm>
           <a:prstGeom prst="rect">
             <a:avLst/>
@@ -3820,7 +3805,37 @@
                 <a:latin typeface="Arial"/>
                 <a:ea typeface="DejaVu Sans"/>
               </a:rPr>
-              <a:t>4 and a quality score </a:t>
+              <a:t>4 </a:t>
+            </a:r>
+            <a:r>
+              <a:rPr b="0" lang="en-US" sz="2600" spc="-1" strike="noStrike">
+                <a:solidFill>
+                  <a:srgbClr val="333333"/>
+                </a:solidFill>
+                <a:uFill>
+                  <a:solidFill>
+                    <a:srgbClr val="ffffff"/>
+                  </a:solidFill>
+                </a:uFill>
+                <a:latin typeface="Arial"/>
+                <a:ea typeface="Arial"/>
+              </a:rPr>
+              <a:t>Å</a:t>
+            </a:r>
+            <a:r>
+              <a:rPr b="0" lang="en-US" sz="2600" spc="-1" strike="noStrike">
+                <a:solidFill>
+                  <a:srgbClr val="333333"/>
+                </a:solidFill>
+                <a:uFill>
+                  <a:solidFill>
+                    <a:srgbClr val="ffffff"/>
+                  </a:solidFill>
+                </a:uFill>
+                <a:latin typeface="Arial"/>
+                <a:ea typeface="DejaVu Sans"/>
+              </a:rPr>
+              <a:t> and a quality score </a:t>
             </a:r>
             <a:r>
               <a:rPr b="0" lang="en-US" sz="2600" spc="-1" strike="noStrike">
@@ -3850,7 +3865,7 @@
                 <a:latin typeface="Arial"/>
                 <a:ea typeface="DejaVu Sans"/>
               </a:rPr>
-              <a:t>4. The resulting kinase dataset consists of 3,875 structures.</a:t>
+              <a:t>4. The resulting kinase dataset consists of 3,875 structures, representing 253 kinases.</a:t>
             </a:r>
             <a:endParaRPr b="0" lang="en-US" sz="1800" spc="-1" strike="noStrike">
               <a:solidFill>
@@ -3947,7 +3962,7 @@
         <p:spPr>
           <a:xfrm>
             <a:off x="720000" y="13666320"/>
-            <a:ext cx="14397840" cy="1370160"/>
+            <a:ext cx="14396400" cy="1368720"/>
           </a:xfrm>
           <a:prstGeom prst="rect">
             <a:avLst/>
@@ -4063,7 +4078,7 @@
         <p:spPr>
           <a:xfrm>
             <a:off x="722520" y="23645880"/>
-            <a:ext cx="14397840" cy="638640"/>
+            <a:ext cx="14396400" cy="637200"/>
           </a:xfrm>
           <a:prstGeom prst="rect">
             <a:avLst/>
@@ -4176,7 +4191,7 @@
         <p:spPr>
           <a:xfrm>
             <a:off x="15316200" y="22511880"/>
-            <a:ext cx="14400360" cy="655560"/>
+            <a:ext cx="14398920" cy="654120"/>
           </a:xfrm>
           <a:prstGeom prst="rect">
             <a:avLst/>
@@ -4195,6 +4210,11 @@
         <p:txBody>
           <a:bodyPr lIns="90000" rIns="90000" tIns="45000" bIns="45000"/>
           <a:p>
+            <a:pPr algn="just">
+              <a:lnSpc>
+                <a:spcPct val="100000"/>
+              </a:lnSpc>
+            </a:pPr>
             <a:r>
               <a:rPr b="1" lang="en-US" sz="2000" spc="-1" strike="noStrike">
                 <a:solidFill>
@@ -4223,7 +4243,7 @@
                 <a:latin typeface="Arial"/>
                 <a:ea typeface="DejaVu Sans"/>
               </a:rPr>
-              <a:t>: (a) Composition of the 692 bit kinase fingerprint, (b) reference points for spatial feature calculation: centroid (orange), hinge region (magenta), DFG region (blue), and front pocket (green). Reference points (large spheres) are calculated based on centroid of three anchor residue CA atoms each (small spheres). Backbone of hinge and DFG region are highlighted.</a:t>
+              <a:t>: (a) Composition of the 692 bit kinase fingerprint, (b) reference points for spatial feature calculation: centroid (orange), hinge region (magenta), DFG region (blue), and front pocket (green). The last three reference points (large spheres) are the centroids of three anchor residue CA atoms each (small spheres). Backbone of hinge and DFG region are highlighted.</a:t>
             </a:r>
             <a:endParaRPr b="0" lang="en-US" sz="1800" spc="-1" strike="noStrike">
               <a:solidFill>
@@ -4248,7 +4268,7 @@
         <p:spPr>
           <a:xfrm>
             <a:off x="15316200" y="12003840"/>
-            <a:ext cx="1004400" cy="457920"/>
+            <a:ext cx="1002960" cy="456480"/>
           </a:xfrm>
           <a:prstGeom prst="rect">
             <a:avLst/>
@@ -4305,7 +4325,7 @@
         <p:spPr>
           <a:xfrm>
             <a:off x="15316200" y="16859520"/>
-            <a:ext cx="1004400" cy="457920"/>
+            <a:ext cx="1002960" cy="456480"/>
           </a:xfrm>
           <a:prstGeom prst="rect">
             <a:avLst/>
@@ -4362,7 +4382,7 @@
         <p:spPr>
           <a:xfrm>
             <a:off x="-12638160" y="39564000"/>
-            <a:ext cx="10605600" cy="938880"/>
+            <a:ext cx="10604160" cy="937440"/>
           </a:xfrm>
           <a:prstGeom prst="rect">
             <a:avLst/>
@@ -4388,7 +4408,7 @@
         <p:spPr>
           <a:xfrm>
             <a:off x="15318000" y="38753640"/>
-            <a:ext cx="14397840" cy="2683440"/>
+            <a:ext cx="14396400" cy="2682000"/>
           </a:xfrm>
           <a:prstGeom prst="rect">
             <a:avLst/>
@@ -4450,7 +4470,7 @@
         <p:spPr>
           <a:xfrm>
             <a:off x="722520" y="38752200"/>
-            <a:ext cx="14397840" cy="2243880"/>
+            <a:ext cx="14396400" cy="2242440"/>
           </a:xfrm>
           <a:prstGeom prst="rect">
             <a:avLst/>
@@ -4512,7 +4532,7 @@
         <p:spPr>
           <a:xfrm>
             <a:off x="722520" y="35071200"/>
-            <a:ext cx="6684120" cy="3425040"/>
+            <a:ext cx="6682680" cy="3423600"/>
           </a:xfrm>
           <a:prstGeom prst="rect">
             <a:avLst/>
@@ -4531,6 +4551,11 @@
         <p:txBody>
           <a:bodyPr lIns="90000" rIns="90000" tIns="45000" bIns="45000"/>
           <a:p>
+            <a:pPr algn="just">
+              <a:lnSpc>
+                <a:spcPct val="100000"/>
+              </a:lnSpc>
+            </a:pPr>
             <a:r>
               <a:rPr b="1" lang="en-US" sz="2000" spc="-1" strike="noStrike">
                 <a:solidFill>
@@ -4619,7 +4644,37 @@
                 <a:latin typeface="Arial"/>
                 <a:ea typeface="DejaVu Sans"/>
               </a:rPr>
-              <a:t> Ligand-based on-/off-target prediction for EGFR inhibitor erlotinib based on our kinase fingerprint similarity: the 20 most similar structures to EGFR (blue pentagons) and erlotinib profiling data (orange circles). Illustration reproduced courtesy of Cell signalling Technology, Inc. </a:t>
+              <a:t> Ligand-based on-/off-target prediction for EGFR inhibitor erlotinib based on the novel kinase fingerprint similarity </a:t>
+            </a:r>
+            <a:r>
+              <a:rPr b="0" lang="en-US" sz="2000" spc="-1" strike="noStrike">
+                <a:solidFill>
+                  <a:srgbClr val="333333"/>
+                </a:solidFill>
+                <a:uFill>
+                  <a:solidFill>
+                    <a:srgbClr val="ffffff"/>
+                  </a:solidFill>
+                </a:uFill>
+                <a:latin typeface="Arial"/>
+                <a:ea typeface="DejaVu Sans"/>
+              </a:rPr>
+              <a:t>reported here</a:t>
+            </a:r>
+            <a:r>
+              <a:rPr b="0" lang="en-US" sz="2000" spc="-1" strike="noStrike">
+                <a:solidFill>
+                  <a:srgbClr val="333333"/>
+                </a:solidFill>
+                <a:uFill>
+                  <a:solidFill>
+                    <a:srgbClr val="ffffff"/>
+                  </a:solidFill>
+                </a:uFill>
+                <a:latin typeface="Arial"/>
+                <a:ea typeface="DejaVu Sans"/>
+              </a:rPr>
+              <a:t>: the 20 most similar structures to EGFR (blue pentagons) and erlotinib profiling data (orange circles). Illustration reproduced courtesy of Cell signalling Technology, Inc. </a:t>
             </a:r>
             <a:r>
               <a:rPr b="1" lang="en-US" sz="2000" spc="-1" strike="noStrike">
@@ -4674,7 +4729,7 @@
         <p:spPr>
           <a:xfrm>
             <a:off x="12056760" y="27262800"/>
-            <a:ext cx="1933560" cy="595080"/>
+            <a:ext cx="1932120" cy="593640"/>
           </a:xfrm>
           <a:prstGeom prst="rect">
             <a:avLst/>
@@ -4801,8 +4856,8 @@
         </p:nvSpPr>
         <p:spPr>
           <a:xfrm rot="2700000">
-            <a:off x="18664560" y="36825840"/>
-            <a:ext cx="456480" cy="737280"/>
+            <a:off x="18664560" y="36824760"/>
+            <a:ext cx="455040" cy="735840"/>
           </a:xfrm>
           <a:prstGeom prst="ellipse">
             <a:avLst/>
@@ -4858,7 +4913,7 @@
         <p:spPr>
           <a:xfrm>
             <a:off x="16288200" y="36287280"/>
-            <a:ext cx="1997280" cy="1005120"/>
+            <a:ext cx="1995840" cy="1003680"/>
           </a:xfrm>
           <a:prstGeom prst="rect">
             <a:avLst/>
@@ -5045,7 +5100,7 @@
         <p:spPr>
           <a:xfrm>
             <a:off x="506520" y="26531280"/>
-            <a:ext cx="6857640" cy="8534160"/>
+            <a:ext cx="6856200" cy="8532720"/>
           </a:xfrm>
           <a:prstGeom prst="rect">
             <a:avLst/>
@@ -5064,7 +5119,7 @@
         <p:spPr>
           <a:xfrm>
             <a:off x="15316200" y="24284160"/>
-            <a:ext cx="14116320" cy="2112480"/>
+            <a:ext cx="14114880" cy="2111040"/>
           </a:xfrm>
           <a:prstGeom prst="rect">
             <a:avLst/>
@@ -5101,7 +5156,7 @@
                 <a:latin typeface="Arial"/>
                 <a:ea typeface="DejaVu Sans"/>
               </a:rPr>
-              <a:t>scores for the kinase pairs (253x253 similarity matrix) shows that our method can reproduce the Manning classification [9] in large part, however also reveals new groupings such as the aforementioned STE kinases within the TK group or the grouping of DRAK2 (DAPK) with the reported off-target CaMKK2 (Other group) [10] (</a:t>
+              <a:t>Furthermore, clustering of all similarity scores for the kinase pairs (253x253 similarity matrix) shows that our method can reproduce the Manning classification [9] in large part, however also reveals new relationships such as the aforementioned STE kinases within the TK group or the grouping of DRAK2 (DAPK) with CaMKK2 (Other), a reported off-target of DRAK2 inhibitors [10] (</a:t>
             </a:r>
             <a:r>
               <a:rPr b="1" lang="en-US" sz="2600" spc="-1" strike="noStrike">
@@ -5174,7 +5229,7 @@
         <p:spPr>
           <a:xfrm>
             <a:off x="7315200" y="26713440"/>
-            <a:ext cx="1004400" cy="457920"/>
+            <a:ext cx="1002960" cy="456480"/>
           </a:xfrm>
           <a:prstGeom prst="rect">
             <a:avLst/>
@@ -5231,7 +5286,7 @@
         <p:spPr>
           <a:xfrm>
             <a:off x="722520" y="26713440"/>
-            <a:ext cx="1004400" cy="457920"/>
+            <a:ext cx="1002960" cy="456480"/>
           </a:xfrm>
           <a:prstGeom prst="rect">
             <a:avLst/>
@@ -5288,7 +5343,7 @@
         <p:spPr>
           <a:xfrm>
             <a:off x="15316200" y="26713440"/>
-            <a:ext cx="1004400" cy="457920"/>
+            <a:ext cx="1002960" cy="456480"/>
           </a:xfrm>
           <a:prstGeom prst="rect">
             <a:avLst/>

</xml_diff>

<commit_message>
Update poster (DS minor changes)
</commit_message>
<xml_diff>
--- a/poster/20190915_ds_phd_Europin_KinSimStructure.pptx
+++ b/poster/20190915_ds_phd_Europin_KinSimStructure.pptx
@@ -53,7 +53,7 @@
       </p:grpSpPr>
       <p:sp>
         <p:nvSpPr>
-          <p:cNvPr id="23" name="PlaceHolder 1"/>
+          <p:cNvPr id="22" name="PlaceHolder 1"/>
           <p:cNvSpPr>
             <a:spLocks noGrp="1"/>
           </p:cNvSpPr>
@@ -64,7 +64,7 @@
         <p:spPr>
           <a:xfrm>
             <a:off x="1513440" y="1707480"/>
-            <a:ext cx="27247320" cy="7147440"/>
+            <a:ext cx="27246960" cy="7147080"/>
           </a:xfrm>
           <a:prstGeom prst="rect">
             <a:avLst/>
@@ -90,7 +90,7 @@
       </p:sp>
       <p:sp>
         <p:nvSpPr>
-          <p:cNvPr id="24" name="PlaceHolder 2"/>
+          <p:cNvPr id="23" name="PlaceHolder 2"/>
           <p:cNvSpPr>
             <a:spLocks noGrp="1"/>
           </p:cNvSpPr>
@@ -126,7 +126,7 @@
       </p:sp>
       <p:sp>
         <p:nvSpPr>
-          <p:cNvPr id="25" name="PlaceHolder 3"/>
+          <p:cNvPr id="24" name="PlaceHolder 3"/>
           <p:cNvSpPr>
             <a:spLocks noGrp="1"/>
           </p:cNvSpPr>
@@ -184,7 +184,7 @@
       </p:grpSpPr>
       <p:sp>
         <p:nvSpPr>
-          <p:cNvPr id="26" name="PlaceHolder 1"/>
+          <p:cNvPr id="25" name="PlaceHolder 1"/>
           <p:cNvSpPr>
             <a:spLocks noGrp="1"/>
           </p:cNvSpPr>
@@ -195,7 +195,7 @@
         <p:spPr>
           <a:xfrm>
             <a:off x="1513440" y="1707480"/>
-            <a:ext cx="27247320" cy="7147440"/>
+            <a:ext cx="27246960" cy="7147080"/>
           </a:xfrm>
           <a:prstGeom prst="rect">
             <a:avLst/>
@@ -221,7 +221,7 @@
       </p:sp>
       <p:sp>
         <p:nvSpPr>
-          <p:cNvPr id="27" name="PlaceHolder 2"/>
+          <p:cNvPr id="26" name="PlaceHolder 2"/>
           <p:cNvSpPr>
             <a:spLocks noGrp="1"/>
           </p:cNvSpPr>
@@ -257,7 +257,7 @@
       </p:sp>
       <p:sp>
         <p:nvSpPr>
-          <p:cNvPr id="28" name="PlaceHolder 3"/>
+          <p:cNvPr id="27" name="PlaceHolder 3"/>
           <p:cNvSpPr>
             <a:spLocks noGrp="1"/>
           </p:cNvSpPr>
@@ -293,7 +293,7 @@
       </p:sp>
       <p:sp>
         <p:nvSpPr>
-          <p:cNvPr id="29" name="PlaceHolder 4"/>
+          <p:cNvPr id="28" name="PlaceHolder 4"/>
           <p:cNvSpPr>
             <a:spLocks noGrp="1"/>
           </p:cNvSpPr>
@@ -329,7 +329,7 @@
       </p:sp>
       <p:sp>
         <p:nvSpPr>
-          <p:cNvPr id="30" name="PlaceHolder 5"/>
+          <p:cNvPr id="29" name="PlaceHolder 5"/>
           <p:cNvSpPr>
             <a:spLocks noGrp="1"/>
           </p:cNvSpPr>
@@ -387,7 +387,7 @@
       </p:grpSpPr>
       <p:sp>
         <p:nvSpPr>
-          <p:cNvPr id="31" name="PlaceHolder 1"/>
+          <p:cNvPr id="30" name="PlaceHolder 1"/>
           <p:cNvSpPr>
             <a:spLocks noGrp="1"/>
           </p:cNvSpPr>
@@ -398,7 +398,7 @@
         <p:spPr>
           <a:xfrm>
             <a:off x="1513440" y="1707480"/>
-            <a:ext cx="27247320" cy="7147440"/>
+            <a:ext cx="27246960" cy="7147080"/>
           </a:xfrm>
           <a:prstGeom prst="rect">
             <a:avLst/>
@@ -424,7 +424,7 @@
       </p:sp>
       <p:sp>
         <p:nvSpPr>
-          <p:cNvPr id="32" name="PlaceHolder 2"/>
+          <p:cNvPr id="31" name="PlaceHolder 2"/>
           <p:cNvSpPr>
             <a:spLocks noGrp="1"/>
           </p:cNvSpPr>
@@ -460,7 +460,7 @@
       </p:sp>
       <p:sp>
         <p:nvSpPr>
-          <p:cNvPr id="33" name="PlaceHolder 3"/>
+          <p:cNvPr id="32" name="PlaceHolder 3"/>
           <p:cNvSpPr>
             <a:spLocks noGrp="1"/>
           </p:cNvSpPr>
@@ -496,7 +496,7 @@
       </p:sp>
       <p:pic>
         <p:nvPicPr>
-          <p:cNvPr id="34" name="" descr=""/>
+          <p:cNvPr id="33" name="" descr=""/>
           <p:cNvPicPr/>
           <p:nvPr/>
         </p:nvPicPr>
@@ -519,7 +519,7 @@
       </p:pic>
       <p:pic>
         <p:nvPicPr>
-          <p:cNvPr id="35" name="" descr=""/>
+          <p:cNvPr id="34" name="" descr=""/>
           <p:cNvPicPr/>
           <p:nvPr/>
         </p:nvPicPr>
@@ -564,7 +564,7 @@
       </p:grpSpPr>
       <p:sp>
         <p:nvSpPr>
-          <p:cNvPr id="2" name="PlaceHolder 1"/>
+          <p:cNvPr id="1" name="PlaceHolder 1"/>
           <p:cNvSpPr>
             <a:spLocks noGrp="1"/>
           </p:cNvSpPr>
@@ -575,7 +575,7 @@
         <p:spPr>
           <a:xfrm>
             <a:off x="1513440" y="1707480"/>
-            <a:ext cx="27247320" cy="7147440"/>
+            <a:ext cx="27246960" cy="7147080"/>
           </a:xfrm>
           <a:prstGeom prst="rect">
             <a:avLst/>
@@ -601,7 +601,7 @@
       </p:sp>
       <p:sp>
         <p:nvSpPr>
-          <p:cNvPr id="3" name="PlaceHolder 2"/>
+          <p:cNvPr id="2" name="PlaceHolder 2"/>
           <p:cNvSpPr>
             <a:spLocks noGrp="1"/>
           </p:cNvSpPr>
@@ -660,7 +660,7 @@
       </p:grpSpPr>
       <p:sp>
         <p:nvSpPr>
-          <p:cNvPr id="4" name="PlaceHolder 1"/>
+          <p:cNvPr id="3" name="PlaceHolder 1"/>
           <p:cNvSpPr>
             <a:spLocks noGrp="1"/>
           </p:cNvSpPr>
@@ -671,7 +671,7 @@
         <p:spPr>
           <a:xfrm>
             <a:off x="1513440" y="1707480"/>
-            <a:ext cx="27247320" cy="7147440"/>
+            <a:ext cx="27246960" cy="7147080"/>
           </a:xfrm>
           <a:prstGeom prst="rect">
             <a:avLst/>
@@ -697,7 +697,7 @@
       </p:sp>
       <p:sp>
         <p:nvSpPr>
-          <p:cNvPr id="5" name="PlaceHolder 2"/>
+          <p:cNvPr id="4" name="PlaceHolder 2"/>
           <p:cNvSpPr>
             <a:spLocks noGrp="1"/>
           </p:cNvSpPr>
@@ -755,7 +755,7 @@
       </p:grpSpPr>
       <p:sp>
         <p:nvSpPr>
-          <p:cNvPr id="6" name="PlaceHolder 1"/>
+          <p:cNvPr id="5" name="PlaceHolder 1"/>
           <p:cNvSpPr>
             <a:spLocks noGrp="1"/>
           </p:cNvSpPr>
@@ -766,7 +766,7 @@
         <p:spPr>
           <a:xfrm>
             <a:off x="1513440" y="1707480"/>
-            <a:ext cx="27247320" cy="7147440"/>
+            <a:ext cx="27246960" cy="7147080"/>
           </a:xfrm>
           <a:prstGeom prst="rect">
             <a:avLst/>
@@ -792,7 +792,7 @@
       </p:sp>
       <p:sp>
         <p:nvSpPr>
-          <p:cNvPr id="7" name="PlaceHolder 2"/>
+          <p:cNvPr id="6" name="PlaceHolder 2"/>
           <p:cNvSpPr>
             <a:spLocks noGrp="1"/>
           </p:cNvSpPr>
@@ -828,7 +828,7 @@
       </p:sp>
       <p:sp>
         <p:nvSpPr>
-          <p:cNvPr id="8" name="PlaceHolder 3"/>
+          <p:cNvPr id="7" name="PlaceHolder 3"/>
           <p:cNvSpPr>
             <a:spLocks noGrp="1"/>
           </p:cNvSpPr>
@@ -886,7 +886,7 @@
       </p:grpSpPr>
       <p:sp>
         <p:nvSpPr>
-          <p:cNvPr id="9" name="PlaceHolder 1"/>
+          <p:cNvPr id="8" name="PlaceHolder 1"/>
           <p:cNvSpPr>
             <a:spLocks noGrp="1"/>
           </p:cNvSpPr>
@@ -897,7 +897,7 @@
         <p:spPr>
           <a:xfrm>
             <a:off x="1513440" y="1707480"/>
-            <a:ext cx="27247320" cy="7147440"/>
+            <a:ext cx="27246960" cy="7147080"/>
           </a:xfrm>
           <a:prstGeom prst="rect">
             <a:avLst/>
@@ -945,7 +945,7 @@
       </p:grpSpPr>
       <p:sp>
         <p:nvSpPr>
-          <p:cNvPr id="10" name="PlaceHolder 1"/>
+          <p:cNvPr id="9" name="PlaceHolder 1"/>
           <p:cNvSpPr>
             <a:spLocks noGrp="1"/>
           </p:cNvSpPr>
@@ -956,7 +956,7 @@
         <p:spPr>
           <a:xfrm>
             <a:off x="1513440" y="1707480"/>
-            <a:ext cx="27247320" cy="33132600"/>
+            <a:ext cx="27246960" cy="33130800"/>
           </a:xfrm>
           <a:prstGeom prst="rect">
             <a:avLst/>
@@ -1004,7 +1004,7 @@
       </p:grpSpPr>
       <p:sp>
         <p:nvSpPr>
-          <p:cNvPr id="11" name="PlaceHolder 1"/>
+          <p:cNvPr id="10" name="PlaceHolder 1"/>
           <p:cNvSpPr>
             <a:spLocks noGrp="1"/>
           </p:cNvSpPr>
@@ -1015,7 +1015,7 @@
         <p:spPr>
           <a:xfrm>
             <a:off x="1513440" y="1707480"/>
-            <a:ext cx="27247320" cy="7147440"/>
+            <a:ext cx="27246960" cy="7147080"/>
           </a:xfrm>
           <a:prstGeom prst="rect">
             <a:avLst/>
@@ -1041,7 +1041,7 @@
       </p:sp>
       <p:sp>
         <p:nvSpPr>
-          <p:cNvPr id="12" name="PlaceHolder 2"/>
+          <p:cNvPr id="11" name="PlaceHolder 2"/>
           <p:cNvSpPr>
             <a:spLocks noGrp="1"/>
           </p:cNvSpPr>
@@ -1077,7 +1077,7 @@
       </p:sp>
       <p:sp>
         <p:nvSpPr>
-          <p:cNvPr id="13" name="PlaceHolder 3"/>
+          <p:cNvPr id="12" name="PlaceHolder 3"/>
           <p:cNvSpPr>
             <a:spLocks noGrp="1"/>
           </p:cNvSpPr>
@@ -1113,7 +1113,7 @@
       </p:sp>
       <p:sp>
         <p:nvSpPr>
-          <p:cNvPr id="14" name="PlaceHolder 4"/>
+          <p:cNvPr id="13" name="PlaceHolder 4"/>
           <p:cNvSpPr>
             <a:spLocks noGrp="1"/>
           </p:cNvSpPr>
@@ -1171,7 +1171,7 @@
       </p:grpSpPr>
       <p:sp>
         <p:nvSpPr>
-          <p:cNvPr id="15" name="PlaceHolder 1"/>
+          <p:cNvPr id="14" name="PlaceHolder 1"/>
           <p:cNvSpPr>
             <a:spLocks noGrp="1"/>
           </p:cNvSpPr>
@@ -1182,7 +1182,7 @@
         <p:spPr>
           <a:xfrm>
             <a:off x="1513440" y="1707480"/>
-            <a:ext cx="27247320" cy="7147440"/>
+            <a:ext cx="27246960" cy="7147080"/>
           </a:xfrm>
           <a:prstGeom prst="rect">
             <a:avLst/>
@@ -1208,7 +1208,7 @@
       </p:sp>
       <p:sp>
         <p:nvSpPr>
-          <p:cNvPr id="16" name="PlaceHolder 2"/>
+          <p:cNvPr id="15" name="PlaceHolder 2"/>
           <p:cNvSpPr>
             <a:spLocks noGrp="1"/>
           </p:cNvSpPr>
@@ -1244,7 +1244,7 @@
       </p:sp>
       <p:sp>
         <p:nvSpPr>
-          <p:cNvPr id="17" name="PlaceHolder 3"/>
+          <p:cNvPr id="16" name="PlaceHolder 3"/>
           <p:cNvSpPr>
             <a:spLocks noGrp="1"/>
           </p:cNvSpPr>
@@ -1280,7 +1280,7 @@
       </p:sp>
       <p:sp>
         <p:nvSpPr>
-          <p:cNvPr id="18" name="PlaceHolder 4"/>
+          <p:cNvPr id="17" name="PlaceHolder 4"/>
           <p:cNvSpPr>
             <a:spLocks noGrp="1"/>
           </p:cNvSpPr>
@@ -1338,7 +1338,7 @@
       </p:grpSpPr>
       <p:sp>
         <p:nvSpPr>
-          <p:cNvPr id="19" name="PlaceHolder 1"/>
+          <p:cNvPr id="18" name="PlaceHolder 1"/>
           <p:cNvSpPr>
             <a:spLocks noGrp="1"/>
           </p:cNvSpPr>
@@ -1349,7 +1349,7 @@
         <p:spPr>
           <a:xfrm>
             <a:off x="1513440" y="1707480"/>
-            <a:ext cx="27247320" cy="7147440"/>
+            <a:ext cx="27246960" cy="7147080"/>
           </a:xfrm>
           <a:prstGeom prst="rect">
             <a:avLst/>
@@ -1375,7 +1375,7 @@
       </p:sp>
       <p:sp>
         <p:nvSpPr>
-          <p:cNvPr id="20" name="PlaceHolder 2"/>
+          <p:cNvPr id="19" name="PlaceHolder 2"/>
           <p:cNvSpPr>
             <a:spLocks noGrp="1"/>
           </p:cNvSpPr>
@@ -1411,7 +1411,7 @@
       </p:sp>
       <p:sp>
         <p:nvSpPr>
-          <p:cNvPr id="21" name="PlaceHolder 3"/>
+          <p:cNvPr id="20" name="PlaceHolder 3"/>
           <p:cNvSpPr>
             <a:spLocks noGrp="1"/>
           </p:cNvSpPr>
@@ -1447,7 +1447,7 @@
       </p:sp>
       <p:sp>
         <p:nvSpPr>
-          <p:cNvPr id="22" name="PlaceHolder 4"/>
+          <p:cNvPr id="21" name="PlaceHolder 4"/>
           <p:cNvSpPr>
             <a:spLocks noGrp="1"/>
           </p:cNvSpPr>
@@ -1516,7 +1516,7 @@
         <p:spPr>
           <a:xfrm>
             <a:off x="1513440" y="1707480"/>
-            <a:ext cx="27247320" cy="7147440"/>
+            <a:ext cx="27246960" cy="7147080"/>
           </a:xfrm>
           <a:prstGeom prst="rect">
             <a:avLst/>
@@ -1526,289 +1526,7 @@
           <a:bodyPr lIns="0" rIns="0" tIns="0" bIns="0" anchor="ctr"/>
           <a:p>
             <a:pPr algn="ctr"/>
-            <a:r>
-              <a:rPr b="0" lang="en-US" sz="4400" spc="-1" strike="noStrike">
-                <a:solidFill>
-                  <a:srgbClr val="000000"/>
-                </a:solidFill>
-                <a:uFill>
-                  <a:solidFill>
-                    <a:srgbClr val="ffffff"/>
-                  </a:solidFill>
-                </a:uFill>
-                <a:latin typeface="Arial"/>
-              </a:rPr>
-              <a:t>Click to edit the title text format</a:t>
-            </a:r>
             <a:endParaRPr b="0" lang="en-US" sz="4400" spc="-1" strike="noStrike">
-              <a:solidFill>
-                <a:srgbClr val="000000"/>
-              </a:solidFill>
-              <a:uFill>
-                <a:solidFill>
-                  <a:srgbClr val="ffffff"/>
-                </a:solidFill>
-              </a:uFill>
-              <a:latin typeface="Arial"/>
-            </a:endParaRPr>
-          </a:p>
-        </p:txBody>
-      </p:sp>
-      <p:sp>
-        <p:nvSpPr>
-          <p:cNvPr id="1" name="PlaceHolder 2"/>
-          <p:cNvSpPr>
-            <a:spLocks noGrp="1"/>
-          </p:cNvSpPr>
-          <p:nvPr>
-            <p:ph type="body"/>
-          </p:nvPr>
-        </p:nvSpPr>
-        <p:spPr>
-          <a:xfrm>
-            <a:off x="1513440" y="10015560"/>
-            <a:ext cx="27247320" cy="24824880"/>
-          </a:xfrm>
-          <a:prstGeom prst="rect">
-            <a:avLst/>
-          </a:prstGeom>
-        </p:spPr>
-        <p:txBody>
-          <a:bodyPr lIns="0" rIns="0" tIns="0" bIns="0"/>
-          <a:p>
-            <a:pPr marL="432000" indent="-324000">
-              <a:buClr>
-                <a:srgbClr val="000000"/>
-              </a:buClr>
-              <a:buSzPct val="45000"/>
-              <a:buFont typeface="Wingdings" charset="2"/>
-              <a:buChar char=""/>
-            </a:pPr>
-            <a:r>
-              <a:rPr b="0" lang="en-US" sz="3200" spc="-1" strike="noStrike">
-                <a:solidFill>
-                  <a:srgbClr val="000000"/>
-                </a:solidFill>
-                <a:uFill>
-                  <a:solidFill>
-                    <a:srgbClr val="ffffff"/>
-                  </a:solidFill>
-                </a:uFill>
-                <a:latin typeface="Arial"/>
-              </a:rPr>
-              <a:t>Click to edit the outline text format</a:t>
-            </a:r>
-            <a:endParaRPr b="0" lang="en-US" sz="3200" spc="-1" strike="noStrike">
-              <a:solidFill>
-                <a:srgbClr val="000000"/>
-              </a:solidFill>
-              <a:uFill>
-                <a:solidFill>
-                  <a:srgbClr val="ffffff"/>
-                </a:solidFill>
-              </a:uFill>
-              <a:latin typeface="Arial"/>
-            </a:endParaRPr>
-          </a:p>
-          <a:p>
-            <a:pPr lvl="1" marL="864000" indent="-324000">
-              <a:buClr>
-                <a:srgbClr val="000000"/>
-              </a:buClr>
-              <a:buSzPct val="75000"/>
-              <a:buFont typeface="Symbol" charset="2"/>
-              <a:buChar char=""/>
-            </a:pPr>
-            <a:r>
-              <a:rPr b="0" lang="en-US" sz="2800" spc="-1" strike="noStrike">
-                <a:solidFill>
-                  <a:srgbClr val="000000"/>
-                </a:solidFill>
-                <a:uFill>
-                  <a:solidFill>
-                    <a:srgbClr val="ffffff"/>
-                  </a:solidFill>
-                </a:uFill>
-                <a:latin typeface="Arial"/>
-              </a:rPr>
-              <a:t>Second Outline Level</a:t>
-            </a:r>
-            <a:endParaRPr b="0" lang="en-US" sz="2800" spc="-1" strike="noStrike">
-              <a:solidFill>
-                <a:srgbClr val="000000"/>
-              </a:solidFill>
-              <a:uFill>
-                <a:solidFill>
-                  <a:srgbClr val="ffffff"/>
-                </a:solidFill>
-              </a:uFill>
-              <a:latin typeface="Arial"/>
-            </a:endParaRPr>
-          </a:p>
-          <a:p>
-            <a:pPr lvl="2" marL="1296000" indent="-288000">
-              <a:buClr>
-                <a:srgbClr val="000000"/>
-              </a:buClr>
-              <a:buSzPct val="45000"/>
-              <a:buFont typeface="Wingdings" charset="2"/>
-              <a:buChar char=""/>
-            </a:pPr>
-            <a:r>
-              <a:rPr b="0" lang="en-US" sz="2400" spc="-1" strike="noStrike">
-                <a:solidFill>
-                  <a:srgbClr val="000000"/>
-                </a:solidFill>
-                <a:uFill>
-                  <a:solidFill>
-                    <a:srgbClr val="ffffff"/>
-                  </a:solidFill>
-                </a:uFill>
-                <a:latin typeface="Arial"/>
-              </a:rPr>
-              <a:t>Third Outline Level</a:t>
-            </a:r>
-            <a:endParaRPr b="0" lang="en-US" sz="2400" spc="-1" strike="noStrike">
-              <a:solidFill>
-                <a:srgbClr val="000000"/>
-              </a:solidFill>
-              <a:uFill>
-                <a:solidFill>
-                  <a:srgbClr val="ffffff"/>
-                </a:solidFill>
-              </a:uFill>
-              <a:latin typeface="Arial"/>
-            </a:endParaRPr>
-          </a:p>
-          <a:p>
-            <a:pPr lvl="3" marL="1728000" indent="-216000">
-              <a:buClr>
-                <a:srgbClr val="000000"/>
-              </a:buClr>
-              <a:buSzPct val="75000"/>
-              <a:buFont typeface="Symbol" charset="2"/>
-              <a:buChar char=""/>
-            </a:pPr>
-            <a:r>
-              <a:rPr b="0" lang="en-US" sz="2000" spc="-1" strike="noStrike">
-                <a:solidFill>
-                  <a:srgbClr val="000000"/>
-                </a:solidFill>
-                <a:uFill>
-                  <a:solidFill>
-                    <a:srgbClr val="ffffff"/>
-                  </a:solidFill>
-                </a:uFill>
-                <a:latin typeface="Arial"/>
-              </a:rPr>
-              <a:t>Fourth Outline Level</a:t>
-            </a:r>
-            <a:endParaRPr b="0" lang="en-US" sz="2000" spc="-1" strike="noStrike">
-              <a:solidFill>
-                <a:srgbClr val="000000"/>
-              </a:solidFill>
-              <a:uFill>
-                <a:solidFill>
-                  <a:srgbClr val="ffffff"/>
-                </a:solidFill>
-              </a:uFill>
-              <a:latin typeface="Arial"/>
-            </a:endParaRPr>
-          </a:p>
-          <a:p>
-            <a:pPr lvl="4" marL="2160000" indent="-216000">
-              <a:buClr>
-                <a:srgbClr val="000000"/>
-              </a:buClr>
-              <a:buSzPct val="45000"/>
-              <a:buFont typeface="Wingdings" charset="2"/>
-              <a:buChar char=""/>
-            </a:pPr>
-            <a:r>
-              <a:rPr b="0" lang="en-US" sz="2000" spc="-1" strike="noStrike">
-                <a:solidFill>
-                  <a:srgbClr val="000000"/>
-                </a:solidFill>
-                <a:uFill>
-                  <a:solidFill>
-                    <a:srgbClr val="ffffff"/>
-                  </a:solidFill>
-                </a:uFill>
-                <a:latin typeface="Arial"/>
-              </a:rPr>
-              <a:t>Fifth Outline Level</a:t>
-            </a:r>
-            <a:endParaRPr b="0" lang="en-US" sz="2000" spc="-1" strike="noStrike">
-              <a:solidFill>
-                <a:srgbClr val="000000"/>
-              </a:solidFill>
-              <a:uFill>
-                <a:solidFill>
-                  <a:srgbClr val="ffffff"/>
-                </a:solidFill>
-              </a:uFill>
-              <a:latin typeface="Arial"/>
-            </a:endParaRPr>
-          </a:p>
-          <a:p>
-            <a:pPr lvl="5" marL="2592000" indent="-216000">
-              <a:buClr>
-                <a:srgbClr val="000000"/>
-              </a:buClr>
-              <a:buSzPct val="45000"/>
-              <a:buFont typeface="Wingdings" charset="2"/>
-              <a:buChar char=""/>
-            </a:pPr>
-            <a:r>
-              <a:rPr b="0" lang="en-US" sz="2000" spc="-1" strike="noStrike">
-                <a:solidFill>
-                  <a:srgbClr val="000000"/>
-                </a:solidFill>
-                <a:uFill>
-                  <a:solidFill>
-                    <a:srgbClr val="ffffff"/>
-                  </a:solidFill>
-                </a:uFill>
-                <a:latin typeface="Arial"/>
-              </a:rPr>
-              <a:t>Sixth Outline Level</a:t>
-            </a:r>
-            <a:endParaRPr b="0" lang="en-US" sz="2000" spc="-1" strike="noStrike">
-              <a:solidFill>
-                <a:srgbClr val="000000"/>
-              </a:solidFill>
-              <a:uFill>
-                <a:solidFill>
-                  <a:srgbClr val="ffffff"/>
-                </a:solidFill>
-              </a:uFill>
-              <a:latin typeface="Arial"/>
-            </a:endParaRPr>
-          </a:p>
-          <a:p>
-            <a:pPr lvl="6" marL="3024000" indent="-216000">
-              <a:buClr>
-                <a:srgbClr val="000000"/>
-              </a:buClr>
-              <a:buSzPct val="45000"/>
-              <a:buFont typeface="Wingdings" charset="2"/>
-              <a:buChar char=""/>
-            </a:pPr>
-            <a:r>
-              <a:rPr b="0" lang="en-US" sz="2000" spc="-1" strike="noStrike">
-                <a:solidFill>
-                  <a:srgbClr val="000000"/>
-                </a:solidFill>
-                <a:uFill>
-                  <a:solidFill>
-                    <a:srgbClr val="ffffff"/>
-                  </a:solidFill>
-                </a:uFill>
-                <a:latin typeface="Arial"/>
-              </a:rPr>
-              <a:t>Seventh Outline Level</a:t>
-            </a:r>
-            <a:endParaRPr b="0" lang="en-US" sz="2000" spc="-1" strike="noStrike">
               <a:solidFill>
                 <a:srgbClr val="000000"/>
               </a:solidFill>
@@ -1861,7 +1579,7 @@
       </p:grpSpPr>
       <p:pic>
         <p:nvPicPr>
-          <p:cNvPr id="36" name="" descr=""/>
+          <p:cNvPr id="35" name="" descr=""/>
           <p:cNvPicPr/>
           <p:nvPr/>
         </p:nvPicPr>
@@ -1872,7 +1590,31 @@
         <p:spPr>
           <a:xfrm>
             <a:off x="15544800" y="9628560"/>
-            <a:ext cx="14171760" cy="12717720"/>
+            <a:ext cx="14171040" cy="12717000"/>
+          </a:xfrm>
+          <a:prstGeom prst="rect">
+            <a:avLst/>
+          </a:prstGeom>
+          <a:ln>
+            <a:noFill/>
+          </a:ln>
+        </p:spPr>
+      </p:pic>
+      <p:pic>
+        <p:nvPicPr>
+          <p:cNvPr id="36" name="" descr=""/>
+          <p:cNvPicPr/>
+          <p:nvPr/>
+        </p:nvPicPr>
+        <p:blipFill>
+          <a:blip r:embed="rId2"/>
+          <a:srcRect l="17464" t="0" r="4773" b="0"/>
+          <a:stretch/>
+        </p:blipFill>
+        <p:spPr>
+          <a:xfrm>
+            <a:off x="16844760" y="26538840"/>
+            <a:ext cx="12596760" cy="12974760"/>
           </a:xfrm>
           <a:prstGeom prst="rect">
             <a:avLst/>
@@ -1889,14 +1631,14 @@
           <p:nvPr/>
         </p:nvPicPr>
         <p:blipFill>
-          <a:blip r:embed="rId2"/>
-          <a:srcRect l="17464" t="0" r="4773" b="0"/>
+          <a:blip r:embed="rId3"/>
+          <a:srcRect l="0" t="3291" r="0" b="0"/>
           <a:stretch/>
         </p:blipFill>
         <p:spPr>
           <a:xfrm>
-            <a:off x="16844760" y="26538840"/>
-            <a:ext cx="12597480" cy="12975480"/>
+            <a:off x="23045400" y="33350760"/>
+            <a:ext cx="1697400" cy="1825200"/>
           </a:xfrm>
           <a:prstGeom prst="rect">
             <a:avLst/>
@@ -1913,14 +1655,13 @@
           <p:nvPr/>
         </p:nvPicPr>
         <p:blipFill>
-          <a:blip r:embed="rId3"/>
-          <a:srcRect l="0" t="3291" r="0" b="0"/>
+          <a:blip r:embed="rId4"/>
           <a:stretch/>
         </p:blipFill>
         <p:spPr>
           <a:xfrm>
-            <a:off x="23045400" y="33350760"/>
-            <a:ext cx="1698120" cy="1825920"/>
+            <a:off x="21903480" y="32142600"/>
+            <a:ext cx="1076760" cy="3117960"/>
           </a:xfrm>
           <a:prstGeom prst="rect">
             <a:avLst/>
@@ -1930,39 +1671,16 @@
           </a:ln>
         </p:spPr>
       </p:pic>
-      <p:pic>
-        <p:nvPicPr>
-          <p:cNvPr id="39" name="" descr=""/>
-          <p:cNvPicPr/>
-          <p:nvPr/>
-        </p:nvPicPr>
-        <p:blipFill>
-          <a:blip r:embed="rId4"/>
-          <a:stretch/>
-        </p:blipFill>
-        <p:spPr>
-          <a:xfrm>
-            <a:off x="21903480" y="32142600"/>
-            <a:ext cx="1077480" cy="3118680"/>
-          </a:xfrm>
-          <a:prstGeom prst="rect">
-            <a:avLst/>
-          </a:prstGeom>
-          <a:ln>
-            <a:noFill/>
-          </a:ln>
-        </p:spPr>
-      </p:pic>
-      <p:sp>
-        <p:nvSpPr>
-          <p:cNvPr id="40" name="CustomShape 1"/>
+      <p:sp>
+        <p:nvSpPr>
+          <p:cNvPr id="39" name="CustomShape 1"/>
           <p:cNvSpPr/>
           <p:nvPr/>
         </p:nvSpPr>
         <p:spPr>
           <a:xfrm rot="20922000">
             <a:off x="22031280" y="26717040"/>
-            <a:ext cx="455040" cy="1005120"/>
+            <a:ext cx="454320" cy="1004400"/>
           </a:xfrm>
           <a:prstGeom prst="ellipse">
             <a:avLst/>
@@ -1984,14 +1702,14 @@
       </p:sp>
       <p:sp>
         <p:nvSpPr>
-          <p:cNvPr id="41" name="CustomShape 2"/>
+          <p:cNvPr id="40" name="CustomShape 2"/>
           <p:cNvSpPr/>
           <p:nvPr/>
         </p:nvSpPr>
         <p:spPr>
           <a:xfrm>
             <a:off x="17812800" y="27051840"/>
-            <a:ext cx="1995840" cy="1003680"/>
+            <a:ext cx="1995120" cy="1002960"/>
           </a:xfrm>
           <a:prstGeom prst="rect">
             <a:avLst/>
@@ -2046,7 +1764,7 @@
       </p:sp>
       <p:sp>
         <p:nvSpPr>
-          <p:cNvPr id="42" name="Line 3"/>
+          <p:cNvPr id="41" name="Line 3"/>
           <p:cNvSpPr/>
           <p:nvPr/>
         </p:nvSpPr>
@@ -2071,6 +1789,29 @@
           <a:fontRef idx="minor"/>
         </p:style>
       </p:sp>
+      <p:pic>
+        <p:nvPicPr>
+          <p:cNvPr id="42" name="" descr=""/>
+          <p:cNvPicPr/>
+          <p:nvPr/>
+        </p:nvPicPr>
+        <p:blipFill>
+          <a:blip r:embed="rId5"/>
+          <a:stretch/>
+        </p:blipFill>
+        <p:spPr>
+          <a:xfrm>
+            <a:off x="7680960" y="26805600"/>
+            <a:ext cx="9141840" cy="12269160"/>
+          </a:xfrm>
+          <a:prstGeom prst="rect">
+            <a:avLst/>
+          </a:prstGeom>
+          <a:ln>
+            <a:noFill/>
+          </a:ln>
+        </p:spPr>
+      </p:pic>
       <p:pic>
         <p:nvPicPr>
           <p:cNvPr id="43" name="" descr=""/>
@@ -2078,13 +1819,13 @@
           <p:nvPr/>
         </p:nvPicPr>
         <p:blipFill>
-          <a:blip r:embed="rId5"/>
+          <a:blip r:embed="rId6"/>
           <a:stretch/>
         </p:blipFill>
         <p:spPr>
           <a:xfrm>
-            <a:off x="7680960" y="26805600"/>
-            <a:ext cx="9142560" cy="12269880"/>
+            <a:off x="10457280" y="20920320"/>
+            <a:ext cx="4569840" cy="2558160"/>
           </a:xfrm>
           <a:prstGeom prst="rect">
             <a:avLst/>
@@ -2094,39 +1835,16 @@
           </a:ln>
         </p:spPr>
       </p:pic>
-      <p:pic>
-        <p:nvPicPr>
-          <p:cNvPr id="44" name="" descr=""/>
-          <p:cNvPicPr/>
-          <p:nvPr/>
-        </p:nvPicPr>
-        <p:blipFill>
-          <a:blip r:embed="rId6"/>
-          <a:stretch/>
-        </p:blipFill>
-        <p:spPr>
-          <a:xfrm>
-            <a:off x="10457280" y="20920320"/>
-            <a:ext cx="4570560" cy="2558880"/>
-          </a:xfrm>
-          <a:prstGeom prst="rect">
-            <a:avLst/>
-          </a:prstGeom>
-          <a:ln>
-            <a:noFill/>
-          </a:ln>
-        </p:spPr>
-      </p:pic>
-      <p:sp>
-        <p:nvSpPr>
-          <p:cNvPr id="45" name="CustomShape 4"/>
+      <p:sp>
+        <p:nvSpPr>
+          <p:cNvPr id="44" name="CustomShape 4"/>
           <p:cNvSpPr/>
           <p:nvPr/>
         </p:nvSpPr>
         <p:spPr>
           <a:xfrm>
             <a:off x="1170360" y="4239360"/>
-            <a:ext cx="27921240" cy="3013920"/>
+            <a:ext cx="27920520" cy="3013200"/>
           </a:xfrm>
           <a:prstGeom prst="rect">
             <a:avLst/>
@@ -2214,14 +1932,14 @@
       </p:sp>
       <p:sp>
         <p:nvSpPr>
-          <p:cNvPr id="46" name="CustomShape 5"/>
+          <p:cNvPr id="45" name="CustomShape 5"/>
           <p:cNvSpPr/>
           <p:nvPr/>
         </p:nvSpPr>
         <p:spPr>
           <a:xfrm>
             <a:off x="1170360" y="7155360"/>
-            <a:ext cx="27921240" cy="2489040"/>
+            <a:ext cx="27920520" cy="2488320"/>
           </a:xfrm>
           <a:prstGeom prst="rect">
             <a:avLst/>
@@ -2456,7 +2174,7 @@
                 <a:latin typeface="Arial"/>
                 <a:ea typeface="DejaVu Sans"/>
               </a:rPr>
-              <a:t> Toxicology, Institute for Physiology, Universitätsmedizin Berlin, Virchowweg 6, 10117 Berlin, Germany</a:t>
+              <a:t> Toxicology, Institute for Physiology, Universitätsmedizin Berlin, Charitéplatz 1, 10117 Berlin, Germany</a:t>
             </a:r>
             <a:endParaRPr b="0" lang="en-US" sz="1800" spc="-1" strike="noStrike">
               <a:solidFill>
@@ -2570,14 +2288,14 @@
       </p:sp>
       <p:sp>
         <p:nvSpPr>
-          <p:cNvPr id="47" name="CustomShape 6"/>
+          <p:cNvPr id="46" name="CustomShape 6"/>
           <p:cNvSpPr/>
           <p:nvPr/>
         </p:nvSpPr>
         <p:spPr>
           <a:xfrm>
             <a:off x="722520" y="39459240"/>
-            <a:ext cx="14396400" cy="1734840"/>
+            <a:ext cx="14395680" cy="1734120"/>
           </a:xfrm>
           <a:prstGeom prst="rect">
             <a:avLst/>
@@ -2632,14 +2350,14 @@
       </p:sp>
       <p:sp>
         <p:nvSpPr>
-          <p:cNvPr id="48" name="CustomShape 7"/>
+          <p:cNvPr id="47" name="CustomShape 7"/>
           <p:cNvSpPr/>
           <p:nvPr/>
         </p:nvSpPr>
         <p:spPr>
           <a:xfrm>
             <a:off x="15318000" y="39461040"/>
-            <a:ext cx="14396400" cy="2022120"/>
+            <a:ext cx="14395680" cy="2021400"/>
           </a:xfrm>
           <a:prstGeom prst="rect">
             <a:avLst/>
@@ -2676,7 +2394,7 @@
                 <a:latin typeface="Arial"/>
                 <a:ea typeface="DejaVu Sans"/>
               </a:rPr>
-              <a:t>[1] Kooistra and Volkamer. Ann Rep Med Chem. 2017, 50, 263-299. [2] van Linden et al. J Med Chem. 2014, 57, 249-77. [3] Ballester and Richards. J Comp Chem. 2007, 28, 1711-23. [4] Schalon et al. Proteins. 2008, 71, 1755-78. [5] Cock et al. Bioinformatics 2009, 25, 1422-3. [6] Hamelryck Proteins 2005, 59, 38-48. [7] Eid et al. BMC Bioinf 2017, 18. [8] Karaman et al. Nature Biotech 2008, 26, 127-32. [9] Manning et al. Science. 2002, 298, 1912-34. [10] Picado et al. ACS National Meeting Orlando 2019 (poster).</a:t>
+              <a:t>[1] Kooistra and Volkamer. Ann Rep Med Chem. 2017, 50, 263-299. [2] van Linden et al. J Med Chem. 2014, 57, 249-77. [3] Schalon et al. Proteins. 2008, 71, 1755-78. [4] Cock et al. Bioinformatics 2009, 25, 1422-3. [5] Hamelryck. Proteins 2005, 59, 38-48. [6] Ballester and Richards. J Comp Chem. 2007, 28, 1711-23. [7] Eid et al. BMC Bioinf 2017, 18. [8] Karaman et al. Nature Biotech 2008, 26, 127-32. [9] Manning et al. Science. 2002, 298, 1912-34. [10] Picado et al. ACS National Meeting Orlando 2019 (poster).</a:t>
             </a:r>
             <a:endParaRPr b="0" lang="en-US" sz="1800" spc="-1" strike="noStrike">
               <a:solidFill>
@@ -2694,7 +2412,7 @@
       </p:sp>
       <p:sp>
         <p:nvSpPr>
-          <p:cNvPr id="49" name="Line 8"/>
+          <p:cNvPr id="48" name="Line 8"/>
           <p:cNvSpPr/>
           <p:nvPr/>
         </p:nvSpPr>
@@ -2723,7 +2441,7 @@
       </p:sp>
       <p:sp>
         <p:nvSpPr>
-          <p:cNvPr id="50" name="Line 9"/>
+          <p:cNvPr id="49" name="Line 9"/>
           <p:cNvSpPr/>
           <p:nvPr/>
         </p:nvSpPr>
@@ -2752,7 +2470,7 @@
       </p:sp>
       <p:sp>
         <p:nvSpPr>
-          <p:cNvPr id="51" name="Line 10"/>
+          <p:cNvPr id="50" name="Line 10"/>
           <p:cNvSpPr/>
           <p:nvPr/>
         </p:nvSpPr>
@@ -2781,7 +2499,7 @@
       </p:sp>
       <p:pic>
         <p:nvPicPr>
-          <p:cNvPr id="52" name="" descr=""/>
+          <p:cNvPr id="51" name="" descr=""/>
           <p:cNvPicPr/>
           <p:nvPr/>
         </p:nvPicPr>
@@ -2793,7 +2511,7 @@
         <p:spPr>
           <a:xfrm>
             <a:off x="0" y="2845440"/>
-            <a:ext cx="30266280" cy="721800"/>
+            <a:ext cx="30265560" cy="721080"/>
           </a:xfrm>
           <a:prstGeom prst="rect">
             <a:avLst/>
@@ -2805,7 +2523,7 @@
       </p:pic>
       <p:pic>
         <p:nvPicPr>
-          <p:cNvPr id="53" name="" descr=""/>
+          <p:cNvPr id="52" name="" descr=""/>
           <p:cNvPicPr/>
           <p:nvPr/>
         </p:nvPicPr>
@@ -2816,7 +2534,7 @@
         <p:spPr>
           <a:xfrm>
             <a:off x="12851640" y="912240"/>
-            <a:ext cx="4562640" cy="1682280"/>
+            <a:ext cx="4561920" cy="1681560"/>
           </a:xfrm>
           <a:prstGeom prst="rect">
             <a:avLst/>
@@ -2828,7 +2546,7 @@
       </p:pic>
       <p:sp>
         <p:nvSpPr>
-          <p:cNvPr id="54" name="Line 11"/>
+          <p:cNvPr id="53" name="Line 11"/>
           <p:cNvSpPr/>
           <p:nvPr/>
         </p:nvSpPr>
@@ -2856,14 +2574,14 @@
       </p:sp>
       <p:sp>
         <p:nvSpPr>
-          <p:cNvPr id="55" name="CustomShape 12"/>
+          <p:cNvPr id="54" name="CustomShape 12"/>
           <p:cNvSpPr/>
           <p:nvPr/>
         </p:nvSpPr>
         <p:spPr>
           <a:xfrm>
             <a:off x="722520" y="17115840"/>
-            <a:ext cx="14396400" cy="4142160"/>
+            <a:ext cx="14395680" cy="4141440"/>
           </a:xfrm>
           <a:prstGeom prst="rect">
             <a:avLst/>
@@ -3065,7 +2783,7 @@
                 <a:latin typeface="Arial"/>
                 <a:ea typeface="DejaVu Sans"/>
               </a:rPr>
-              <a:t> encompass for each residue its size, side chain orientation and pharmacophoric features as described by SiteAlign [4], in addition to its solvent exposure as implemented in Biopython’s module </a:t>
+              <a:t> encompass for each residue its size, side chain orientation and pharmacophoric features as described by SiteAlign [3], in addition to its solvent exposure as implemented in Biopython’s module </a:t>
             </a:r>
             <a:r>
               <a:rPr b="0" lang="en-US" sz="2600" spc="-1" strike="noStrike">
@@ -3095,7 +2813,7 @@
                 <a:latin typeface="Arial"/>
                 <a:ea typeface="DejaVu Sans"/>
               </a:rPr>
-              <a:t> [5, 6]. Inspired by the ligand-based USR approach [3], the </a:t>
+              <a:t> [4, 5]. Inspired by the ligand-based USR approach [6], the </a:t>
             </a:r>
             <a:r>
               <a:rPr b="0" i="1" lang="en-US" sz="2600" spc="-1" strike="noStrike">
@@ -3155,7 +2873,7 @@
                 <a:latin typeface="Arial"/>
                 <a:ea typeface="DejaVu Sans"/>
               </a:rPr>
-              <a:t>). The resulting distance distributions per subpocket are reduced in complexity to the first three moments, i.e. the mean, variance and skewness. </a:t>
+              <a:t>). The resulting distance distributions per subpocket are reduced in complexity to the first three moments, i.e. the mean, variance, and skewness. </a:t>
             </a:r>
             <a:endParaRPr b="0" lang="en-US" sz="1800" spc="-1" strike="noStrike">
               <a:solidFill>
@@ -3227,14 +2945,14 @@
       </p:sp>
       <p:sp>
         <p:nvSpPr>
-          <p:cNvPr id="56" name="CustomShape 13"/>
+          <p:cNvPr id="55" name="CustomShape 13"/>
           <p:cNvSpPr/>
           <p:nvPr/>
         </p:nvSpPr>
         <p:spPr>
           <a:xfrm>
             <a:off x="722520" y="24284160"/>
-            <a:ext cx="14400360" cy="2092680"/>
+            <a:ext cx="14399640" cy="2091960"/>
           </a:xfrm>
           <a:prstGeom prst="rect">
             <a:avLst/>
@@ -3319,14 +3037,14 @@
       </p:sp>
       <p:sp>
         <p:nvSpPr>
-          <p:cNvPr id="57" name="CustomShape 14"/>
+          <p:cNvPr id="56" name="CustomShape 14"/>
           <p:cNvSpPr/>
           <p:nvPr/>
         </p:nvSpPr>
         <p:spPr>
           <a:xfrm>
             <a:off x="720000" y="38268000"/>
-            <a:ext cx="14396400" cy="1651320"/>
+            <a:ext cx="14395680" cy="1650600"/>
           </a:xfrm>
           <a:prstGeom prst="rect">
             <a:avLst/>
@@ -3345,14 +3063,14 @@
       </p:sp>
       <p:sp>
         <p:nvSpPr>
-          <p:cNvPr id="58" name="CustomShape 15"/>
+          <p:cNvPr id="57" name="CustomShape 15"/>
           <p:cNvSpPr/>
           <p:nvPr/>
         </p:nvSpPr>
         <p:spPr>
           <a:xfrm>
             <a:off x="720000" y="21286800"/>
-            <a:ext cx="9519840" cy="2467800"/>
+            <a:ext cx="9519120" cy="2467080"/>
           </a:xfrm>
           <a:prstGeom prst="rect">
             <a:avLst/>
@@ -3476,14 +3194,14 @@
       </p:sp>
       <p:sp>
         <p:nvSpPr>
-          <p:cNvPr id="59" name="CustomShape 16"/>
+          <p:cNvPr id="58" name="CustomShape 16"/>
           <p:cNvSpPr/>
           <p:nvPr/>
         </p:nvSpPr>
         <p:spPr>
           <a:xfrm>
             <a:off x="720000" y="10044000"/>
-            <a:ext cx="14396400" cy="2895840"/>
+            <a:ext cx="14395680" cy="2895120"/>
           </a:xfrm>
           <a:prstGeom prst="rect">
             <a:avLst/>
@@ -3538,14 +3256,14 @@
       </p:sp>
       <p:sp>
         <p:nvSpPr>
-          <p:cNvPr id="60" name="CustomShape 17"/>
+          <p:cNvPr id="59" name="CustomShape 17"/>
           <p:cNvSpPr/>
           <p:nvPr/>
         </p:nvSpPr>
         <p:spPr>
           <a:xfrm>
             <a:off x="720000" y="9396000"/>
-            <a:ext cx="14398920" cy="637200"/>
+            <a:ext cx="14398200" cy="636480"/>
           </a:xfrm>
           <a:prstGeom prst="rect">
             <a:avLst/>
@@ -3600,14 +3318,14 @@
       </p:sp>
       <p:sp>
         <p:nvSpPr>
-          <p:cNvPr id="61" name="CustomShape 18"/>
+          <p:cNvPr id="60" name="CustomShape 18"/>
           <p:cNvSpPr/>
           <p:nvPr/>
         </p:nvSpPr>
         <p:spPr>
           <a:xfrm>
             <a:off x="720000" y="12996000"/>
-            <a:ext cx="14398920" cy="637200"/>
+            <a:ext cx="14398200" cy="636480"/>
           </a:xfrm>
           <a:prstGeom prst="rect">
             <a:avLst/>
@@ -3716,14 +3434,14 @@
       </p:sp>
       <p:sp>
         <p:nvSpPr>
-          <p:cNvPr id="62" name="CustomShape 19"/>
+          <p:cNvPr id="61" name="CustomShape 19"/>
           <p:cNvSpPr/>
           <p:nvPr/>
         </p:nvSpPr>
         <p:spPr>
           <a:xfrm>
             <a:off x="722520" y="15202440"/>
-            <a:ext cx="14396400" cy="1335600"/>
+            <a:ext cx="14395680" cy="1334880"/>
           </a:xfrm>
           <a:prstGeom prst="rect">
             <a:avLst/>
@@ -3955,14 +3673,14 @@
       </p:sp>
       <p:sp>
         <p:nvSpPr>
-          <p:cNvPr id="63" name="CustomShape 20"/>
+          <p:cNvPr id="62" name="CustomShape 20"/>
           <p:cNvSpPr/>
           <p:nvPr/>
         </p:nvSpPr>
         <p:spPr>
           <a:xfrm>
             <a:off x="720000" y="13666320"/>
-            <a:ext cx="14396400" cy="1368720"/>
+            <a:ext cx="14395680" cy="1368000"/>
           </a:xfrm>
           <a:prstGeom prst="rect">
             <a:avLst/>
@@ -4071,14 +3789,14 @@
       </p:sp>
       <p:sp>
         <p:nvSpPr>
-          <p:cNvPr id="64" name="CustomShape 21"/>
+          <p:cNvPr id="63" name="CustomShape 21"/>
           <p:cNvSpPr/>
           <p:nvPr/>
         </p:nvSpPr>
         <p:spPr>
           <a:xfrm>
             <a:off x="722520" y="23645880"/>
-            <a:ext cx="14396400" cy="637200"/>
+            <a:ext cx="14395680" cy="636480"/>
           </a:xfrm>
           <a:prstGeom prst="rect">
             <a:avLst/>
@@ -4184,14 +3902,14 @@
       </p:sp>
       <p:sp>
         <p:nvSpPr>
-          <p:cNvPr id="65" name="CustomShape 22"/>
+          <p:cNvPr id="64" name="CustomShape 22"/>
           <p:cNvSpPr/>
           <p:nvPr/>
         </p:nvSpPr>
         <p:spPr>
           <a:xfrm>
             <a:off x="15316200" y="22511880"/>
-            <a:ext cx="14398920" cy="654120"/>
+            <a:ext cx="14398200" cy="653400"/>
           </a:xfrm>
           <a:prstGeom prst="rect">
             <a:avLst/>
@@ -4243,7 +3961,67 @@
                 <a:latin typeface="Arial"/>
                 <a:ea typeface="DejaVu Sans"/>
               </a:rPr>
-              <a:t>: (a) Composition of the 692 bit kinase fingerprint, (b) reference points for spatial feature calculation: centroid (orange), hinge region (magenta), DFG region (blue), and front pocket (green). The last three reference points (large spheres) are the centroids of three anchor residue CA atoms each (small spheres). Backbone of hinge and DFG region are highlighted.</a:t>
+              <a:t>: </a:t>
+            </a:r>
+            <a:r>
+              <a:rPr b="1" lang="en-US" sz="2000" spc="-1" strike="noStrike">
+                <a:solidFill>
+                  <a:srgbClr val="333333"/>
+                </a:solidFill>
+                <a:uFill>
+                  <a:solidFill>
+                    <a:srgbClr val="ffffff"/>
+                  </a:solidFill>
+                </a:uFill>
+                <a:latin typeface="Arial"/>
+                <a:ea typeface="DejaVu Sans"/>
+              </a:rPr>
+              <a:t>(a)</a:t>
+            </a:r>
+            <a:r>
+              <a:rPr b="0" lang="en-US" sz="2000" spc="-1" strike="noStrike">
+                <a:solidFill>
+                  <a:srgbClr val="333333"/>
+                </a:solidFill>
+                <a:uFill>
+                  <a:solidFill>
+                    <a:srgbClr val="ffffff"/>
+                  </a:solidFill>
+                </a:uFill>
+                <a:latin typeface="Arial"/>
+                <a:ea typeface="DejaVu Sans"/>
+              </a:rPr>
+              <a:t> Composition of the 692 bit kinase fingerprint. </a:t>
+            </a:r>
+            <a:r>
+              <a:rPr b="1" lang="en-US" sz="2000" spc="-1" strike="noStrike">
+                <a:solidFill>
+                  <a:srgbClr val="333333"/>
+                </a:solidFill>
+                <a:uFill>
+                  <a:solidFill>
+                    <a:srgbClr val="ffffff"/>
+                  </a:solidFill>
+                </a:uFill>
+                <a:latin typeface="Arial"/>
+                <a:ea typeface="DejaVu Sans"/>
+              </a:rPr>
+              <a:t>(b)</a:t>
+            </a:r>
+            <a:r>
+              <a:rPr b="0" lang="en-US" sz="2000" spc="-1" strike="noStrike">
+                <a:solidFill>
+                  <a:srgbClr val="333333"/>
+                </a:solidFill>
+                <a:uFill>
+                  <a:solidFill>
+                    <a:srgbClr val="ffffff"/>
+                  </a:solidFill>
+                </a:uFill>
+                <a:latin typeface="Arial"/>
+                <a:ea typeface="DejaVu Sans"/>
+              </a:rPr>
+              <a:t> Reference points for spatial feature calculation: centroid (orange), hinge region (magenta), DFG region (blue), and front pocket (green). The last three reference points (large spheres) are the centroids of three anchor residue CA atoms each (small spheres). Backbones of hinge and DFG region are highlighted.</a:t>
             </a:r>
             <a:endParaRPr b="0" lang="en-US" sz="1800" spc="-1" strike="noStrike">
               <a:solidFill>
@@ -4261,14 +4039,14 @@
       </p:sp>
       <p:sp>
         <p:nvSpPr>
-          <p:cNvPr id="66" name="CustomShape 23"/>
+          <p:cNvPr id="65" name="CustomShape 23"/>
           <p:cNvSpPr/>
           <p:nvPr/>
         </p:nvSpPr>
         <p:spPr>
           <a:xfrm>
             <a:off x="15316200" y="12003840"/>
-            <a:ext cx="1002960" cy="456480"/>
+            <a:ext cx="1002240" cy="455760"/>
           </a:xfrm>
           <a:prstGeom prst="rect">
             <a:avLst/>
@@ -4318,14 +4096,14 @@
       </p:sp>
       <p:sp>
         <p:nvSpPr>
-          <p:cNvPr id="67" name="CustomShape 24"/>
+          <p:cNvPr id="66" name="CustomShape 24"/>
           <p:cNvSpPr/>
           <p:nvPr/>
         </p:nvSpPr>
         <p:spPr>
           <a:xfrm>
             <a:off x="15316200" y="16859520"/>
-            <a:ext cx="1002960" cy="456480"/>
+            <a:ext cx="1002240" cy="455760"/>
           </a:xfrm>
           <a:prstGeom prst="rect">
             <a:avLst/>
@@ -4375,14 +4153,14 @@
       </p:sp>
       <p:sp>
         <p:nvSpPr>
-          <p:cNvPr id="68" name="CustomShape 25"/>
+          <p:cNvPr id="67" name="CustomShape 25"/>
           <p:cNvSpPr/>
           <p:nvPr/>
         </p:nvSpPr>
         <p:spPr>
           <a:xfrm>
             <a:off x="-12638160" y="39564000"/>
-            <a:ext cx="10604160" cy="937440"/>
+            <a:ext cx="10603440" cy="936720"/>
           </a:xfrm>
           <a:prstGeom prst="rect">
             <a:avLst/>
@@ -4401,14 +4179,14 @@
       </p:sp>
       <p:sp>
         <p:nvSpPr>
-          <p:cNvPr id="69" name="CustomShape 26"/>
+          <p:cNvPr id="68" name="CustomShape 26"/>
           <p:cNvSpPr/>
           <p:nvPr/>
         </p:nvSpPr>
         <p:spPr>
           <a:xfrm>
             <a:off x="15318000" y="38753640"/>
-            <a:ext cx="14396400" cy="2682000"/>
+            <a:ext cx="14395680" cy="2681280"/>
           </a:xfrm>
           <a:prstGeom prst="rect">
             <a:avLst/>
@@ -4463,14 +4241,14 @@
       </p:sp>
       <p:sp>
         <p:nvSpPr>
-          <p:cNvPr id="70" name="CustomShape 27"/>
+          <p:cNvPr id="69" name="CustomShape 27"/>
           <p:cNvSpPr/>
           <p:nvPr/>
         </p:nvSpPr>
         <p:spPr>
           <a:xfrm>
             <a:off x="722520" y="38752200"/>
-            <a:ext cx="14396400" cy="2242440"/>
+            <a:ext cx="14395680" cy="2241720"/>
           </a:xfrm>
           <a:prstGeom prst="rect">
             <a:avLst/>
@@ -4525,14 +4303,14 @@
       </p:sp>
       <p:sp>
         <p:nvSpPr>
-          <p:cNvPr id="71" name="CustomShape 28"/>
+          <p:cNvPr id="70" name="CustomShape 28"/>
           <p:cNvSpPr/>
           <p:nvPr/>
         </p:nvSpPr>
         <p:spPr>
           <a:xfrm>
             <a:off x="722520" y="35071200"/>
-            <a:ext cx="6682680" cy="3423600"/>
+            <a:ext cx="6681960" cy="3422880"/>
           </a:xfrm>
           <a:prstGeom prst="rect">
             <a:avLst/>
@@ -4614,7 +4392,7 @@
                 <a:latin typeface="Arial"/>
                 <a:ea typeface="DejaVu Sans"/>
               </a:rPr>
-              <a:t> Feature value distribution for physicochemical (orange) and spatial (blue) bits of the kinase fingerprint. </a:t>
+              <a:t> Feature value distribution for physicochemical (orange) and spatial (blue) bits of the novel kinase fingerprint. </a:t>
             </a:r>
             <a:r>
               <a:rPr b="1" lang="en-US" sz="2000" spc="-1" strike="noStrike">
@@ -4644,7 +4422,22 @@
                 <a:latin typeface="Arial"/>
                 <a:ea typeface="DejaVu Sans"/>
               </a:rPr>
-              <a:t> Ligand-based on-/off-target prediction for EGFR inhibitor erlotinib based on the novel kinase fingerprint similarity </a:t>
+              <a:t> Ligand-based on-/off-target prediction for EGFR inhibitor erlotinib based on the novel kinase fingerprint similarity: the 20 most similar structures to EGFR (blue pentagons) and erlotinib profiling data (orange circles). Illustration reproduced courtesy of Cell signalling Technology, Inc. </a:t>
+            </a:r>
+            <a:r>
+              <a:rPr b="1" lang="en-US" sz="2000" spc="-1" strike="noStrike">
+                <a:solidFill>
+                  <a:srgbClr val="333333"/>
+                </a:solidFill>
+                <a:uFill>
+                  <a:solidFill>
+                    <a:srgbClr val="ffffff"/>
+                  </a:solidFill>
+                </a:uFill>
+                <a:latin typeface="Arial"/>
+                <a:ea typeface="DejaVu Sans"/>
+              </a:rPr>
+              <a:t>(c)</a:t>
             </a:r>
             <a:r>
               <a:rPr b="0" lang="en-US" sz="2000" spc="-1" strike="noStrike">
@@ -4659,51 +4452,6 @@
                 <a:latin typeface="Arial"/>
                 <a:ea typeface="DejaVu Sans"/>
               </a:rPr>
-              <a:t>reported here</a:t>
-            </a:r>
-            <a:r>
-              <a:rPr b="0" lang="en-US" sz="2000" spc="-1" strike="noStrike">
-                <a:solidFill>
-                  <a:srgbClr val="333333"/>
-                </a:solidFill>
-                <a:uFill>
-                  <a:solidFill>
-                    <a:srgbClr val="ffffff"/>
-                  </a:solidFill>
-                </a:uFill>
-                <a:latin typeface="Arial"/>
-                <a:ea typeface="DejaVu Sans"/>
-              </a:rPr>
-              <a:t>: the 20 most similar structures to EGFR (blue pentagons) and erlotinib profiling data (orange circles). Illustration reproduced courtesy of Cell signalling Technology, Inc. </a:t>
-            </a:r>
-            <a:r>
-              <a:rPr b="1" lang="en-US" sz="2000" spc="-1" strike="noStrike">
-                <a:solidFill>
-                  <a:srgbClr val="333333"/>
-                </a:solidFill>
-                <a:uFill>
-                  <a:solidFill>
-                    <a:srgbClr val="ffffff"/>
-                  </a:solidFill>
-                </a:uFill>
-                <a:latin typeface="Arial"/>
-                <a:ea typeface="DejaVu Sans"/>
-              </a:rPr>
-              <a:t>(c)</a:t>
-            </a:r>
-            <a:r>
-              <a:rPr b="0" lang="en-US" sz="2000" spc="-1" strike="noStrike">
-                <a:solidFill>
-                  <a:srgbClr val="333333"/>
-                </a:solidFill>
-                <a:uFill>
-                  <a:solidFill>
-                    <a:srgbClr val="ffffff"/>
-                  </a:solidFill>
-                </a:uFill>
-                <a:latin typeface="Arial"/>
-                <a:ea typeface="DejaVu Sans"/>
-              </a:rPr>
               <a:t> Hierarchical clustering of pairwise similarity scores for best scoring structure pair for each kinase pair (Euclidean distance with unweighted average linkage clustering).</a:t>
             </a:r>
             <a:endParaRPr b="0" lang="en-US" sz="1800" spc="-1" strike="noStrike">
@@ -4722,14 +4470,14 @@
       </p:sp>
       <p:sp>
         <p:nvSpPr>
-          <p:cNvPr id="72" name="CustomShape 29"/>
+          <p:cNvPr id="71" name="CustomShape 29"/>
           <p:cNvSpPr/>
           <p:nvPr/>
         </p:nvSpPr>
         <p:spPr>
           <a:xfrm>
             <a:off x="12056760" y="27262800"/>
-            <a:ext cx="1932120" cy="593640"/>
+            <a:ext cx="1931400" cy="592920"/>
           </a:xfrm>
           <a:prstGeom prst="rect">
             <a:avLst/>
@@ -4850,14 +4598,14 @@
       </p:sp>
       <p:sp>
         <p:nvSpPr>
-          <p:cNvPr id="73" name="CustomShape 30"/>
+          <p:cNvPr id="72" name="CustomShape 30"/>
           <p:cNvSpPr/>
           <p:nvPr/>
         </p:nvSpPr>
         <p:spPr>
           <a:xfrm rot="2700000">
-            <a:off x="18664560" y="36824760"/>
-            <a:ext cx="455040" cy="735840"/>
+            <a:off x="18664560" y="36824400"/>
+            <a:ext cx="454320" cy="735120"/>
           </a:xfrm>
           <a:prstGeom prst="ellipse">
             <a:avLst/>
@@ -4879,7 +4627,7 @@
       </p:sp>
       <p:sp>
         <p:nvSpPr>
-          <p:cNvPr id="74" name="Line 31"/>
+          <p:cNvPr id="73" name="Line 31"/>
           <p:cNvSpPr/>
           <p:nvPr/>
         </p:nvSpPr>
@@ -4906,14 +4654,14 @@
       </p:sp>
       <p:sp>
         <p:nvSpPr>
-          <p:cNvPr id="75" name="CustomShape 32"/>
+          <p:cNvPr id="74" name="CustomShape 32"/>
           <p:cNvSpPr/>
           <p:nvPr/>
         </p:nvSpPr>
         <p:spPr>
           <a:xfrm>
             <a:off x="16288200" y="36287280"/>
-            <a:ext cx="1995840" cy="1003680"/>
+            <a:ext cx="1995120" cy="1002960"/>
           </a:xfrm>
           <a:prstGeom prst="rect">
             <a:avLst/>
@@ -5034,7 +4782,7 @@
       </p:sp>
       <p:sp>
         <p:nvSpPr>
-          <p:cNvPr id="76" name="Line 33"/>
+          <p:cNvPr id="75" name="Line 33"/>
           <p:cNvSpPr/>
           <p:nvPr/>
         </p:nvSpPr>
@@ -5061,7 +4809,7 @@
       </p:sp>
       <p:sp>
         <p:nvSpPr>
-          <p:cNvPr id="77" name="Line 34"/>
+          <p:cNvPr id="76" name="Line 34"/>
           <p:cNvSpPr/>
           <p:nvPr/>
         </p:nvSpPr>
@@ -5088,7 +4836,7 @@
       </p:sp>
       <p:pic>
         <p:nvPicPr>
-          <p:cNvPr id="78" name="" descr=""/>
+          <p:cNvPr id="77" name="" descr=""/>
           <p:cNvPicPr/>
           <p:nvPr/>
         </p:nvPicPr>
@@ -5099,8 +4847,8 @@
         </p:blipFill>
         <p:spPr>
           <a:xfrm>
-            <a:off x="506520" y="26531280"/>
-            <a:ext cx="6856200" cy="8532720"/>
+            <a:off x="506520" y="26567280"/>
+            <a:ext cx="6855480" cy="8532000"/>
           </a:xfrm>
           <a:prstGeom prst="rect">
             <a:avLst/>
@@ -5112,14 +4860,14 @@
       </p:pic>
       <p:sp>
         <p:nvSpPr>
-          <p:cNvPr id="79" name="CustomShape 35"/>
+          <p:cNvPr id="78" name="CustomShape 35"/>
           <p:cNvSpPr/>
           <p:nvPr/>
         </p:nvSpPr>
         <p:spPr>
           <a:xfrm>
             <a:off x="15316200" y="24284160"/>
-            <a:ext cx="14114880" cy="2111040"/>
+            <a:ext cx="14114160" cy="2110320"/>
           </a:xfrm>
           <a:prstGeom prst="rect">
             <a:avLst/>
@@ -5222,14 +4970,14 @@
       </p:sp>
       <p:sp>
         <p:nvSpPr>
-          <p:cNvPr id="80" name="CustomShape 36"/>
+          <p:cNvPr id="79" name="CustomShape 36"/>
           <p:cNvSpPr/>
           <p:nvPr/>
         </p:nvSpPr>
         <p:spPr>
           <a:xfrm>
             <a:off x="7315200" y="26713440"/>
-            <a:ext cx="1002960" cy="456480"/>
+            <a:ext cx="1002240" cy="455760"/>
           </a:xfrm>
           <a:prstGeom prst="rect">
             <a:avLst/>
@@ -5279,14 +5027,14 @@
       </p:sp>
       <p:sp>
         <p:nvSpPr>
-          <p:cNvPr id="81" name="CustomShape 37"/>
+          <p:cNvPr id="80" name="CustomShape 37"/>
           <p:cNvSpPr/>
           <p:nvPr/>
         </p:nvSpPr>
         <p:spPr>
           <a:xfrm>
             <a:off x="722520" y="26713440"/>
-            <a:ext cx="1002960" cy="456480"/>
+            <a:ext cx="1002240" cy="455760"/>
           </a:xfrm>
           <a:prstGeom prst="rect">
             <a:avLst/>
@@ -5336,14 +5084,14 @@
       </p:sp>
       <p:sp>
         <p:nvSpPr>
-          <p:cNvPr id="82" name="CustomShape 38"/>
+          <p:cNvPr id="81" name="CustomShape 38"/>
           <p:cNvSpPr/>
           <p:nvPr/>
         </p:nvSpPr>
         <p:spPr>
           <a:xfrm>
             <a:off x="15316200" y="26713440"/>
-            <a:ext cx="1002960" cy="456480"/>
+            <a:ext cx="1002240" cy="455760"/>
           </a:xfrm>
           <a:prstGeom prst="rect">
             <a:avLst/>
@@ -5393,33 +5141,6 @@
       </p:sp>
     </p:spTree>
   </p:cSld>
-  <p:timing>
-    <p:tnLst>
-      <p:par>
-        <p:cTn id="1" dur="indefinite" restart="never" nodeType="tmRoot">
-          <p:childTnLst>
-            <p:seq>
-              <p:cTn id="2" nodeType="mainSeq"/>
-              <p:prevCondLst>
-                <p:cond delay="0" evt="onPrev">
-                  <p:tgtEl>
-                    <p:sldTgt/>
-                  </p:tgtEl>
-                </p:cond>
-              </p:prevCondLst>
-              <p:nextCondLst>
-                <p:cond delay="0" evt="onNext">
-                  <p:tgtEl>
-                    <p:sldTgt/>
-                  </p:tgtEl>
-                </p:cond>
-              </p:nextCondLst>
-            </p:seq>
-          </p:childTnLst>
-        </p:cTn>
-      </p:par>
-    </p:tnLst>
-  </p:timing>
 </p:sld>
 </file>
 

</xml_diff>

<commit_message>
Update poster (AM comments)
</commit_message>
<xml_diff>
--- a/poster/20190915_ds_phd_Europin_KinSimStructure.pptx
+++ b/poster/20190915_ds_phd_Europin_KinSimStructure.pptx
@@ -53,7 +53,7 @@
       </p:grpSpPr>
       <p:sp>
         <p:nvSpPr>
-          <p:cNvPr id="22" name="PlaceHolder 1"/>
+          <p:cNvPr id="23" name="PlaceHolder 1"/>
           <p:cNvSpPr>
             <a:spLocks noGrp="1"/>
           </p:cNvSpPr>
@@ -64,7 +64,7 @@
         <p:spPr>
           <a:xfrm>
             <a:off x="1513440" y="1707480"/>
-            <a:ext cx="27246960" cy="7147080"/>
+            <a:ext cx="27246600" cy="7146720"/>
           </a:xfrm>
           <a:prstGeom prst="rect">
             <a:avLst/>
@@ -90,7 +90,7 @@
       </p:sp>
       <p:sp>
         <p:nvSpPr>
-          <p:cNvPr id="23" name="PlaceHolder 2"/>
+          <p:cNvPr id="24" name="PlaceHolder 2"/>
           <p:cNvSpPr>
             <a:spLocks noGrp="1"/>
           </p:cNvSpPr>
@@ -101,7 +101,7 @@
         <p:spPr>
           <a:xfrm>
             <a:off x="1513440" y="10015560"/>
-            <a:ext cx="27247320" cy="11841120"/>
+            <a:ext cx="27246960" cy="11841120"/>
           </a:xfrm>
           <a:prstGeom prst="rect">
             <a:avLst/>
@@ -126,7 +126,7 @@
       </p:sp>
       <p:sp>
         <p:nvSpPr>
-          <p:cNvPr id="24" name="PlaceHolder 3"/>
+          <p:cNvPr id="25" name="PlaceHolder 3"/>
           <p:cNvSpPr>
             <a:spLocks noGrp="1"/>
           </p:cNvSpPr>
@@ -137,7 +137,7 @@
         <p:spPr>
           <a:xfrm>
             <a:off x="1513440" y="22982040"/>
-            <a:ext cx="27247320" cy="11841120"/>
+            <a:ext cx="27246960" cy="11841120"/>
           </a:xfrm>
           <a:prstGeom prst="rect">
             <a:avLst/>
@@ -184,7 +184,7 @@
       </p:grpSpPr>
       <p:sp>
         <p:nvSpPr>
-          <p:cNvPr id="25" name="PlaceHolder 1"/>
+          <p:cNvPr id="26" name="PlaceHolder 1"/>
           <p:cNvSpPr>
             <a:spLocks noGrp="1"/>
           </p:cNvSpPr>
@@ -195,7 +195,7 @@
         <p:spPr>
           <a:xfrm>
             <a:off x="1513440" y="1707480"/>
-            <a:ext cx="27246960" cy="7147080"/>
+            <a:ext cx="27246600" cy="7146720"/>
           </a:xfrm>
           <a:prstGeom prst="rect">
             <a:avLst/>
@@ -221,7 +221,7 @@
       </p:sp>
       <p:sp>
         <p:nvSpPr>
-          <p:cNvPr id="26" name="PlaceHolder 2"/>
+          <p:cNvPr id="27" name="PlaceHolder 2"/>
           <p:cNvSpPr>
             <a:spLocks noGrp="1"/>
           </p:cNvSpPr>
@@ -232,7 +232,7 @@
         <p:spPr>
           <a:xfrm>
             <a:off x="1513440" y="10015560"/>
-            <a:ext cx="13296600" cy="11841120"/>
+            <a:ext cx="13296240" cy="11841120"/>
           </a:xfrm>
           <a:prstGeom prst="rect">
             <a:avLst/>
@@ -257,7 +257,7 @@
       </p:sp>
       <p:sp>
         <p:nvSpPr>
-          <p:cNvPr id="27" name="PlaceHolder 3"/>
+          <p:cNvPr id="28" name="PlaceHolder 3"/>
           <p:cNvSpPr>
             <a:spLocks noGrp="1"/>
           </p:cNvSpPr>
@@ -267,8 +267,8 @@
         </p:nvSpPr>
         <p:spPr>
           <a:xfrm>
-            <a:off x="15475320" y="10015560"/>
-            <a:ext cx="13296600" cy="11841120"/>
+            <a:off x="15474960" y="10015560"/>
+            <a:ext cx="13296240" cy="11841120"/>
           </a:xfrm>
           <a:prstGeom prst="rect">
             <a:avLst/>
@@ -293,7 +293,7 @@
       </p:sp>
       <p:sp>
         <p:nvSpPr>
-          <p:cNvPr id="28" name="PlaceHolder 4"/>
+          <p:cNvPr id="29" name="PlaceHolder 4"/>
           <p:cNvSpPr>
             <a:spLocks noGrp="1"/>
           </p:cNvSpPr>
@@ -303,8 +303,8 @@
         </p:nvSpPr>
         <p:spPr>
           <a:xfrm>
-            <a:off x="15475320" y="22982040"/>
-            <a:ext cx="13296600" cy="11841120"/>
+            <a:off x="15474960" y="22982040"/>
+            <a:ext cx="13296240" cy="11841120"/>
           </a:xfrm>
           <a:prstGeom prst="rect">
             <a:avLst/>
@@ -329,7 +329,7 @@
       </p:sp>
       <p:sp>
         <p:nvSpPr>
-          <p:cNvPr id="29" name="PlaceHolder 5"/>
+          <p:cNvPr id="30" name="PlaceHolder 5"/>
           <p:cNvSpPr>
             <a:spLocks noGrp="1"/>
           </p:cNvSpPr>
@@ -340,7 +340,7 @@
         <p:spPr>
           <a:xfrm>
             <a:off x="1513440" y="22982040"/>
-            <a:ext cx="13296600" cy="11841120"/>
+            <a:ext cx="13296240" cy="11841120"/>
           </a:xfrm>
           <a:prstGeom prst="rect">
             <a:avLst/>
@@ -387,7 +387,7 @@
       </p:grpSpPr>
       <p:sp>
         <p:nvSpPr>
-          <p:cNvPr id="30" name="PlaceHolder 1"/>
+          <p:cNvPr id="31" name="PlaceHolder 1"/>
           <p:cNvSpPr>
             <a:spLocks noGrp="1"/>
           </p:cNvSpPr>
@@ -398,7 +398,7 @@
         <p:spPr>
           <a:xfrm>
             <a:off x="1513440" y="1707480"/>
-            <a:ext cx="27246960" cy="7147080"/>
+            <a:ext cx="27246600" cy="7146720"/>
           </a:xfrm>
           <a:prstGeom prst="rect">
             <a:avLst/>
@@ -424,7 +424,7 @@
       </p:sp>
       <p:sp>
         <p:nvSpPr>
-          <p:cNvPr id="31" name="PlaceHolder 2"/>
+          <p:cNvPr id="32" name="PlaceHolder 2"/>
           <p:cNvSpPr>
             <a:spLocks noGrp="1"/>
           </p:cNvSpPr>
@@ -435,7 +435,7 @@
         <p:spPr>
           <a:xfrm>
             <a:off x="1513440" y="10015560"/>
-            <a:ext cx="27247320" cy="24824880"/>
+            <a:ext cx="27246960" cy="24824520"/>
           </a:xfrm>
           <a:prstGeom prst="rect">
             <a:avLst/>
@@ -460,7 +460,7 @@
       </p:sp>
       <p:sp>
         <p:nvSpPr>
-          <p:cNvPr id="32" name="PlaceHolder 3"/>
+          <p:cNvPr id="33" name="PlaceHolder 3"/>
           <p:cNvSpPr>
             <a:spLocks noGrp="1"/>
           </p:cNvSpPr>
@@ -471,7 +471,7 @@
         <p:spPr>
           <a:xfrm>
             <a:off x="1513440" y="10015560"/>
-            <a:ext cx="27247320" cy="24824880"/>
+            <a:ext cx="27246960" cy="24824520"/>
           </a:xfrm>
           <a:prstGeom prst="rect">
             <a:avLst/>
@@ -496,7 +496,7 @@
       </p:sp>
       <p:pic>
         <p:nvPicPr>
-          <p:cNvPr id="33" name="" descr=""/>
+          <p:cNvPr id="34" name="" descr=""/>
           <p:cNvPicPr/>
           <p:nvPr/>
         </p:nvPicPr>
@@ -506,8 +506,8 @@
         </p:blipFill>
         <p:spPr>
           <a:xfrm>
-            <a:off x="1513080" y="11558160"/>
-            <a:ext cx="27247320" cy="21739680"/>
+            <a:off x="1513440" y="11557800"/>
+            <a:ext cx="27246960" cy="21739320"/>
           </a:xfrm>
           <a:prstGeom prst="rect">
             <a:avLst/>
@@ -519,7 +519,7 @@
       </p:pic>
       <p:pic>
         <p:nvPicPr>
-          <p:cNvPr id="34" name="" descr=""/>
+          <p:cNvPr id="35" name="" descr=""/>
           <p:cNvPicPr/>
           <p:nvPr/>
         </p:nvPicPr>
@@ -529,8 +529,8 @@
         </p:blipFill>
         <p:spPr>
           <a:xfrm>
-            <a:off x="1513080" y="11558160"/>
-            <a:ext cx="27247320" cy="21739680"/>
+            <a:off x="1513440" y="11557800"/>
+            <a:ext cx="27246960" cy="21739320"/>
           </a:xfrm>
           <a:prstGeom prst="rect">
             <a:avLst/>
@@ -564,7 +564,7 @@
       </p:grpSpPr>
       <p:sp>
         <p:nvSpPr>
-          <p:cNvPr id="1" name="PlaceHolder 1"/>
+          <p:cNvPr id="2" name="PlaceHolder 1"/>
           <p:cNvSpPr>
             <a:spLocks noGrp="1"/>
           </p:cNvSpPr>
@@ -575,7 +575,7 @@
         <p:spPr>
           <a:xfrm>
             <a:off x="1513440" y="1707480"/>
-            <a:ext cx="27246960" cy="7147080"/>
+            <a:ext cx="27246600" cy="7146720"/>
           </a:xfrm>
           <a:prstGeom prst="rect">
             <a:avLst/>
@@ -601,7 +601,7 @@
       </p:sp>
       <p:sp>
         <p:nvSpPr>
-          <p:cNvPr id="2" name="PlaceHolder 2"/>
+          <p:cNvPr id="3" name="PlaceHolder 2"/>
           <p:cNvSpPr>
             <a:spLocks noGrp="1"/>
           </p:cNvSpPr>
@@ -612,7 +612,7 @@
         <p:spPr>
           <a:xfrm>
             <a:off x="1513440" y="10015560"/>
-            <a:ext cx="27247320" cy="24824880"/>
+            <a:ext cx="27246960" cy="24824520"/>
           </a:xfrm>
           <a:prstGeom prst="rect">
             <a:avLst/>
@@ -660,7 +660,7 @@
       </p:grpSpPr>
       <p:sp>
         <p:nvSpPr>
-          <p:cNvPr id="3" name="PlaceHolder 1"/>
+          <p:cNvPr id="4" name="PlaceHolder 1"/>
           <p:cNvSpPr>
             <a:spLocks noGrp="1"/>
           </p:cNvSpPr>
@@ -671,7 +671,7 @@
         <p:spPr>
           <a:xfrm>
             <a:off x="1513440" y="1707480"/>
-            <a:ext cx="27246960" cy="7147080"/>
+            <a:ext cx="27246600" cy="7146720"/>
           </a:xfrm>
           <a:prstGeom prst="rect">
             <a:avLst/>
@@ -697,7 +697,7 @@
       </p:sp>
       <p:sp>
         <p:nvSpPr>
-          <p:cNvPr id="4" name="PlaceHolder 2"/>
+          <p:cNvPr id="5" name="PlaceHolder 2"/>
           <p:cNvSpPr>
             <a:spLocks noGrp="1"/>
           </p:cNvSpPr>
@@ -708,7 +708,7 @@
         <p:spPr>
           <a:xfrm>
             <a:off x="1513440" y="10015560"/>
-            <a:ext cx="27247320" cy="24824880"/>
+            <a:ext cx="27246960" cy="24824520"/>
           </a:xfrm>
           <a:prstGeom prst="rect">
             <a:avLst/>
@@ -755,7 +755,7 @@
       </p:grpSpPr>
       <p:sp>
         <p:nvSpPr>
-          <p:cNvPr id="5" name="PlaceHolder 1"/>
+          <p:cNvPr id="6" name="PlaceHolder 1"/>
           <p:cNvSpPr>
             <a:spLocks noGrp="1"/>
           </p:cNvSpPr>
@@ -766,7 +766,7 @@
         <p:spPr>
           <a:xfrm>
             <a:off x="1513440" y="1707480"/>
-            <a:ext cx="27246960" cy="7147080"/>
+            <a:ext cx="27246600" cy="7146720"/>
           </a:xfrm>
           <a:prstGeom prst="rect">
             <a:avLst/>
@@ -792,7 +792,7 @@
       </p:sp>
       <p:sp>
         <p:nvSpPr>
-          <p:cNvPr id="6" name="PlaceHolder 2"/>
+          <p:cNvPr id="7" name="PlaceHolder 2"/>
           <p:cNvSpPr>
             <a:spLocks noGrp="1"/>
           </p:cNvSpPr>
@@ -803,7 +803,7 @@
         <p:spPr>
           <a:xfrm>
             <a:off x="1513440" y="10015560"/>
-            <a:ext cx="13296600" cy="24824880"/>
+            <a:ext cx="13296240" cy="24824520"/>
           </a:xfrm>
           <a:prstGeom prst="rect">
             <a:avLst/>
@@ -828,7 +828,7 @@
       </p:sp>
       <p:sp>
         <p:nvSpPr>
-          <p:cNvPr id="7" name="PlaceHolder 3"/>
+          <p:cNvPr id="8" name="PlaceHolder 3"/>
           <p:cNvSpPr>
             <a:spLocks noGrp="1"/>
           </p:cNvSpPr>
@@ -838,8 +838,8 @@
         </p:nvSpPr>
         <p:spPr>
           <a:xfrm>
-            <a:off x="15475320" y="10015560"/>
-            <a:ext cx="13296600" cy="24824880"/>
+            <a:off x="15474960" y="10015560"/>
+            <a:ext cx="13296240" cy="24824520"/>
           </a:xfrm>
           <a:prstGeom prst="rect">
             <a:avLst/>
@@ -886,7 +886,7 @@
       </p:grpSpPr>
       <p:sp>
         <p:nvSpPr>
-          <p:cNvPr id="8" name="PlaceHolder 1"/>
+          <p:cNvPr id="9" name="PlaceHolder 1"/>
           <p:cNvSpPr>
             <a:spLocks noGrp="1"/>
           </p:cNvSpPr>
@@ -897,7 +897,7 @@
         <p:spPr>
           <a:xfrm>
             <a:off x="1513440" y="1707480"/>
-            <a:ext cx="27246960" cy="7147080"/>
+            <a:ext cx="27246600" cy="7146720"/>
           </a:xfrm>
           <a:prstGeom prst="rect">
             <a:avLst/>
@@ -945,7 +945,7 @@
       </p:grpSpPr>
       <p:sp>
         <p:nvSpPr>
-          <p:cNvPr id="9" name="PlaceHolder 1"/>
+          <p:cNvPr id="10" name="PlaceHolder 1"/>
           <p:cNvSpPr>
             <a:spLocks noGrp="1"/>
           </p:cNvSpPr>
@@ -956,7 +956,7 @@
         <p:spPr>
           <a:xfrm>
             <a:off x="1513440" y="1707480"/>
-            <a:ext cx="27246960" cy="33130800"/>
+            <a:ext cx="27246600" cy="33129360"/>
           </a:xfrm>
           <a:prstGeom prst="rect">
             <a:avLst/>
@@ -1004,7 +1004,7 @@
       </p:grpSpPr>
       <p:sp>
         <p:nvSpPr>
-          <p:cNvPr id="10" name="PlaceHolder 1"/>
+          <p:cNvPr id="11" name="PlaceHolder 1"/>
           <p:cNvSpPr>
             <a:spLocks noGrp="1"/>
           </p:cNvSpPr>
@@ -1015,7 +1015,7 @@
         <p:spPr>
           <a:xfrm>
             <a:off x="1513440" y="1707480"/>
-            <a:ext cx="27246960" cy="7147080"/>
+            <a:ext cx="27246600" cy="7146720"/>
           </a:xfrm>
           <a:prstGeom prst="rect">
             <a:avLst/>
@@ -1041,7 +1041,7 @@
       </p:sp>
       <p:sp>
         <p:nvSpPr>
-          <p:cNvPr id="11" name="PlaceHolder 2"/>
+          <p:cNvPr id="12" name="PlaceHolder 2"/>
           <p:cNvSpPr>
             <a:spLocks noGrp="1"/>
           </p:cNvSpPr>
@@ -1052,7 +1052,7 @@
         <p:spPr>
           <a:xfrm>
             <a:off x="1513440" y="10015560"/>
-            <a:ext cx="13296600" cy="11841120"/>
+            <a:ext cx="13296240" cy="11841120"/>
           </a:xfrm>
           <a:prstGeom prst="rect">
             <a:avLst/>
@@ -1077,7 +1077,7 @@
       </p:sp>
       <p:sp>
         <p:nvSpPr>
-          <p:cNvPr id="12" name="PlaceHolder 3"/>
+          <p:cNvPr id="13" name="PlaceHolder 3"/>
           <p:cNvSpPr>
             <a:spLocks noGrp="1"/>
           </p:cNvSpPr>
@@ -1088,7 +1088,7 @@
         <p:spPr>
           <a:xfrm>
             <a:off x="1513440" y="22982040"/>
-            <a:ext cx="13296600" cy="11841120"/>
+            <a:ext cx="13296240" cy="11841120"/>
           </a:xfrm>
           <a:prstGeom prst="rect">
             <a:avLst/>
@@ -1113,7 +1113,7 @@
       </p:sp>
       <p:sp>
         <p:nvSpPr>
-          <p:cNvPr id="13" name="PlaceHolder 4"/>
+          <p:cNvPr id="14" name="PlaceHolder 4"/>
           <p:cNvSpPr>
             <a:spLocks noGrp="1"/>
           </p:cNvSpPr>
@@ -1123,8 +1123,8 @@
         </p:nvSpPr>
         <p:spPr>
           <a:xfrm>
-            <a:off x="15475320" y="10015560"/>
-            <a:ext cx="13296600" cy="24824880"/>
+            <a:off x="15474960" y="10015560"/>
+            <a:ext cx="13296240" cy="24824520"/>
           </a:xfrm>
           <a:prstGeom prst="rect">
             <a:avLst/>
@@ -1171,7 +1171,7 @@
       </p:grpSpPr>
       <p:sp>
         <p:nvSpPr>
-          <p:cNvPr id="14" name="PlaceHolder 1"/>
+          <p:cNvPr id="15" name="PlaceHolder 1"/>
           <p:cNvSpPr>
             <a:spLocks noGrp="1"/>
           </p:cNvSpPr>
@@ -1182,7 +1182,7 @@
         <p:spPr>
           <a:xfrm>
             <a:off x="1513440" y="1707480"/>
-            <a:ext cx="27246960" cy="7147080"/>
+            <a:ext cx="27246600" cy="7146720"/>
           </a:xfrm>
           <a:prstGeom prst="rect">
             <a:avLst/>
@@ -1208,7 +1208,7 @@
       </p:sp>
       <p:sp>
         <p:nvSpPr>
-          <p:cNvPr id="15" name="PlaceHolder 2"/>
+          <p:cNvPr id="16" name="PlaceHolder 2"/>
           <p:cNvSpPr>
             <a:spLocks noGrp="1"/>
           </p:cNvSpPr>
@@ -1219,7 +1219,7 @@
         <p:spPr>
           <a:xfrm>
             <a:off x="1513440" y="10015560"/>
-            <a:ext cx="13296600" cy="24824880"/>
+            <a:ext cx="13296240" cy="24824520"/>
           </a:xfrm>
           <a:prstGeom prst="rect">
             <a:avLst/>
@@ -1244,7 +1244,7 @@
       </p:sp>
       <p:sp>
         <p:nvSpPr>
-          <p:cNvPr id="16" name="PlaceHolder 3"/>
+          <p:cNvPr id="17" name="PlaceHolder 3"/>
           <p:cNvSpPr>
             <a:spLocks noGrp="1"/>
           </p:cNvSpPr>
@@ -1254,8 +1254,8 @@
         </p:nvSpPr>
         <p:spPr>
           <a:xfrm>
-            <a:off x="15475320" y="10015560"/>
-            <a:ext cx="13296600" cy="11841120"/>
+            <a:off x="15474960" y="10015560"/>
+            <a:ext cx="13296240" cy="11841120"/>
           </a:xfrm>
           <a:prstGeom prst="rect">
             <a:avLst/>
@@ -1280,7 +1280,7 @@
       </p:sp>
       <p:sp>
         <p:nvSpPr>
-          <p:cNvPr id="17" name="PlaceHolder 4"/>
+          <p:cNvPr id="18" name="PlaceHolder 4"/>
           <p:cNvSpPr>
             <a:spLocks noGrp="1"/>
           </p:cNvSpPr>
@@ -1290,8 +1290,8 @@
         </p:nvSpPr>
         <p:spPr>
           <a:xfrm>
-            <a:off x="15475320" y="22982040"/>
-            <a:ext cx="13296600" cy="11841120"/>
+            <a:off x="15474960" y="22982040"/>
+            <a:ext cx="13296240" cy="11841120"/>
           </a:xfrm>
           <a:prstGeom prst="rect">
             <a:avLst/>
@@ -1338,7 +1338,7 @@
       </p:grpSpPr>
       <p:sp>
         <p:nvSpPr>
-          <p:cNvPr id="18" name="PlaceHolder 1"/>
+          <p:cNvPr id="19" name="PlaceHolder 1"/>
           <p:cNvSpPr>
             <a:spLocks noGrp="1"/>
           </p:cNvSpPr>
@@ -1349,7 +1349,7 @@
         <p:spPr>
           <a:xfrm>
             <a:off x="1513440" y="1707480"/>
-            <a:ext cx="27246960" cy="7147080"/>
+            <a:ext cx="27246600" cy="7146720"/>
           </a:xfrm>
           <a:prstGeom prst="rect">
             <a:avLst/>
@@ -1375,7 +1375,7 @@
       </p:sp>
       <p:sp>
         <p:nvSpPr>
-          <p:cNvPr id="19" name="PlaceHolder 2"/>
+          <p:cNvPr id="20" name="PlaceHolder 2"/>
           <p:cNvSpPr>
             <a:spLocks noGrp="1"/>
           </p:cNvSpPr>
@@ -1386,7 +1386,7 @@
         <p:spPr>
           <a:xfrm>
             <a:off x="1513440" y="10015560"/>
-            <a:ext cx="13296600" cy="11841120"/>
+            <a:ext cx="13296240" cy="11841120"/>
           </a:xfrm>
           <a:prstGeom prst="rect">
             <a:avLst/>
@@ -1411,7 +1411,7 @@
       </p:sp>
       <p:sp>
         <p:nvSpPr>
-          <p:cNvPr id="20" name="PlaceHolder 3"/>
+          <p:cNvPr id="21" name="PlaceHolder 3"/>
           <p:cNvSpPr>
             <a:spLocks noGrp="1"/>
           </p:cNvSpPr>
@@ -1421,8 +1421,8 @@
         </p:nvSpPr>
         <p:spPr>
           <a:xfrm>
-            <a:off x="15475320" y="10015560"/>
-            <a:ext cx="13296600" cy="11841120"/>
+            <a:off x="15474960" y="10015560"/>
+            <a:ext cx="13296240" cy="11841120"/>
           </a:xfrm>
           <a:prstGeom prst="rect">
             <a:avLst/>
@@ -1447,7 +1447,7 @@
       </p:sp>
       <p:sp>
         <p:nvSpPr>
-          <p:cNvPr id="21" name="PlaceHolder 4"/>
+          <p:cNvPr id="22" name="PlaceHolder 4"/>
           <p:cNvSpPr>
             <a:spLocks noGrp="1"/>
           </p:cNvSpPr>
@@ -1458,7 +1458,7 @@
         <p:spPr>
           <a:xfrm>
             <a:off x="1513440" y="22982040"/>
-            <a:ext cx="27247320" cy="11841120"/>
+            <a:ext cx="27246960" cy="11841120"/>
           </a:xfrm>
           <a:prstGeom prst="rect">
             <a:avLst/>
@@ -1516,7 +1516,7 @@
         <p:spPr>
           <a:xfrm>
             <a:off x="1513440" y="1707480"/>
-            <a:ext cx="27246960" cy="7147080"/>
+            <a:ext cx="27246600" cy="7146720"/>
           </a:xfrm>
           <a:prstGeom prst="rect">
             <a:avLst/>
@@ -1527,6 +1527,274 @@
           <a:p>
             <a:pPr algn="ctr"/>
             <a:endParaRPr b="0" lang="en-US" sz="4400" spc="-1" strike="noStrike">
+              <a:solidFill>
+                <a:srgbClr val="000000"/>
+              </a:solidFill>
+              <a:uFill>
+                <a:solidFill>
+                  <a:srgbClr val="ffffff"/>
+                </a:solidFill>
+              </a:uFill>
+              <a:latin typeface="Arial"/>
+            </a:endParaRPr>
+          </a:p>
+        </p:txBody>
+      </p:sp>
+      <p:sp>
+        <p:nvSpPr>
+          <p:cNvPr id="1" name="PlaceHolder 2"/>
+          <p:cNvSpPr>
+            <a:spLocks noGrp="1"/>
+          </p:cNvSpPr>
+          <p:nvPr>
+            <p:ph type="body"/>
+          </p:nvPr>
+        </p:nvSpPr>
+        <p:spPr>
+          <a:xfrm>
+            <a:off x="1513440" y="10015560"/>
+            <a:ext cx="27246960" cy="24824520"/>
+          </a:xfrm>
+          <a:prstGeom prst="rect">
+            <a:avLst/>
+          </a:prstGeom>
+        </p:spPr>
+        <p:txBody>
+          <a:bodyPr lIns="0" rIns="0" tIns="0" bIns="0"/>
+          <a:p>
+            <a:pPr marL="432000" indent="-324000">
+              <a:buClr>
+                <a:srgbClr val="000000"/>
+              </a:buClr>
+              <a:buSzPct val="45000"/>
+              <a:buFont typeface="Wingdings" charset="2"/>
+              <a:buChar char=""/>
+            </a:pPr>
+            <a:r>
+              <a:rPr b="0" lang="en-US" sz="1800" spc="-1" strike="noStrike">
+                <a:solidFill>
+                  <a:srgbClr val="000000"/>
+                </a:solidFill>
+                <a:uFill>
+                  <a:solidFill>
+                    <a:srgbClr val="ffffff"/>
+                  </a:solidFill>
+                </a:uFill>
+                <a:latin typeface="Arial"/>
+              </a:rPr>
+              <a:t>Click to edit the outline text format</a:t>
+            </a:r>
+            <a:endParaRPr b="0" lang="en-US" sz="1800" spc="-1" strike="noStrike">
+              <a:solidFill>
+                <a:srgbClr val="000000"/>
+              </a:solidFill>
+              <a:uFill>
+                <a:solidFill>
+                  <a:srgbClr val="ffffff"/>
+                </a:solidFill>
+              </a:uFill>
+              <a:latin typeface="Arial"/>
+            </a:endParaRPr>
+          </a:p>
+          <a:p>
+            <a:pPr lvl="1" marL="864000" indent="-324000">
+              <a:buClr>
+                <a:srgbClr val="000000"/>
+              </a:buClr>
+              <a:buSzPct val="75000"/>
+              <a:buFont typeface="Symbol" charset="2"/>
+              <a:buChar char=""/>
+            </a:pPr>
+            <a:r>
+              <a:rPr b="0" lang="en-US" sz="1800" spc="-1" strike="noStrike">
+                <a:solidFill>
+                  <a:srgbClr val="000000"/>
+                </a:solidFill>
+                <a:uFill>
+                  <a:solidFill>
+                    <a:srgbClr val="ffffff"/>
+                  </a:solidFill>
+                </a:uFill>
+                <a:latin typeface="Arial"/>
+              </a:rPr>
+              <a:t>Second Outline Level</a:t>
+            </a:r>
+            <a:endParaRPr b="0" lang="en-US" sz="1800" spc="-1" strike="noStrike">
+              <a:solidFill>
+                <a:srgbClr val="000000"/>
+              </a:solidFill>
+              <a:uFill>
+                <a:solidFill>
+                  <a:srgbClr val="ffffff"/>
+                </a:solidFill>
+              </a:uFill>
+              <a:latin typeface="Arial"/>
+            </a:endParaRPr>
+          </a:p>
+          <a:p>
+            <a:pPr lvl="2" marL="1296000" indent="-288000">
+              <a:buClr>
+                <a:srgbClr val="000000"/>
+              </a:buClr>
+              <a:buSzPct val="45000"/>
+              <a:buFont typeface="Wingdings" charset="2"/>
+              <a:buChar char=""/>
+            </a:pPr>
+            <a:r>
+              <a:rPr b="0" lang="en-US" sz="1800" spc="-1" strike="noStrike">
+                <a:solidFill>
+                  <a:srgbClr val="000000"/>
+                </a:solidFill>
+                <a:uFill>
+                  <a:solidFill>
+                    <a:srgbClr val="ffffff"/>
+                  </a:solidFill>
+                </a:uFill>
+                <a:latin typeface="Arial"/>
+              </a:rPr>
+              <a:t>Third Outline Level</a:t>
+            </a:r>
+            <a:endParaRPr b="0" lang="en-US" sz="1800" spc="-1" strike="noStrike">
+              <a:solidFill>
+                <a:srgbClr val="000000"/>
+              </a:solidFill>
+              <a:uFill>
+                <a:solidFill>
+                  <a:srgbClr val="ffffff"/>
+                </a:solidFill>
+              </a:uFill>
+              <a:latin typeface="Arial"/>
+            </a:endParaRPr>
+          </a:p>
+          <a:p>
+            <a:pPr lvl="3" marL="1728000" indent="-216000">
+              <a:buClr>
+                <a:srgbClr val="000000"/>
+              </a:buClr>
+              <a:buSzPct val="75000"/>
+              <a:buFont typeface="Symbol" charset="2"/>
+              <a:buChar char=""/>
+            </a:pPr>
+            <a:r>
+              <a:rPr b="0" lang="en-US" sz="1800" spc="-1" strike="noStrike">
+                <a:solidFill>
+                  <a:srgbClr val="000000"/>
+                </a:solidFill>
+                <a:uFill>
+                  <a:solidFill>
+                    <a:srgbClr val="ffffff"/>
+                  </a:solidFill>
+                </a:uFill>
+                <a:latin typeface="Arial"/>
+              </a:rPr>
+              <a:t>Fourth Outline Level</a:t>
+            </a:r>
+            <a:endParaRPr b="0" lang="en-US" sz="1800" spc="-1" strike="noStrike">
+              <a:solidFill>
+                <a:srgbClr val="000000"/>
+              </a:solidFill>
+              <a:uFill>
+                <a:solidFill>
+                  <a:srgbClr val="ffffff"/>
+                </a:solidFill>
+              </a:uFill>
+              <a:latin typeface="Arial"/>
+            </a:endParaRPr>
+          </a:p>
+          <a:p>
+            <a:pPr lvl="4" marL="2160000" indent="-216000">
+              <a:buClr>
+                <a:srgbClr val="000000"/>
+              </a:buClr>
+              <a:buSzPct val="45000"/>
+              <a:buFont typeface="Wingdings" charset="2"/>
+              <a:buChar char=""/>
+            </a:pPr>
+            <a:r>
+              <a:rPr b="0" lang="en-US" sz="1800" spc="-1" strike="noStrike">
+                <a:solidFill>
+                  <a:srgbClr val="000000"/>
+                </a:solidFill>
+                <a:uFill>
+                  <a:solidFill>
+                    <a:srgbClr val="ffffff"/>
+                  </a:solidFill>
+                </a:uFill>
+                <a:latin typeface="Arial"/>
+              </a:rPr>
+              <a:t>Fifth Outline Level</a:t>
+            </a:r>
+            <a:endParaRPr b="0" lang="en-US" sz="1800" spc="-1" strike="noStrike">
+              <a:solidFill>
+                <a:srgbClr val="000000"/>
+              </a:solidFill>
+              <a:uFill>
+                <a:solidFill>
+                  <a:srgbClr val="ffffff"/>
+                </a:solidFill>
+              </a:uFill>
+              <a:latin typeface="Arial"/>
+            </a:endParaRPr>
+          </a:p>
+          <a:p>
+            <a:pPr lvl="5" marL="2592000" indent="-216000">
+              <a:buClr>
+                <a:srgbClr val="000000"/>
+              </a:buClr>
+              <a:buSzPct val="45000"/>
+              <a:buFont typeface="Wingdings" charset="2"/>
+              <a:buChar char=""/>
+            </a:pPr>
+            <a:r>
+              <a:rPr b="0" lang="en-US" sz="1800" spc="-1" strike="noStrike">
+                <a:solidFill>
+                  <a:srgbClr val="000000"/>
+                </a:solidFill>
+                <a:uFill>
+                  <a:solidFill>
+                    <a:srgbClr val="ffffff"/>
+                  </a:solidFill>
+                </a:uFill>
+                <a:latin typeface="Arial"/>
+              </a:rPr>
+              <a:t>Sixth Outline Level</a:t>
+            </a:r>
+            <a:endParaRPr b="0" lang="en-US" sz="1800" spc="-1" strike="noStrike">
+              <a:solidFill>
+                <a:srgbClr val="000000"/>
+              </a:solidFill>
+              <a:uFill>
+                <a:solidFill>
+                  <a:srgbClr val="ffffff"/>
+                </a:solidFill>
+              </a:uFill>
+              <a:latin typeface="Arial"/>
+            </a:endParaRPr>
+          </a:p>
+          <a:p>
+            <a:pPr lvl="6" marL="3024000" indent="-216000">
+              <a:buClr>
+                <a:srgbClr val="000000"/>
+              </a:buClr>
+              <a:buSzPct val="45000"/>
+              <a:buFont typeface="Wingdings" charset="2"/>
+              <a:buChar char=""/>
+            </a:pPr>
+            <a:r>
+              <a:rPr b="0" lang="en-US" sz="1800" spc="-1" strike="noStrike">
+                <a:solidFill>
+                  <a:srgbClr val="000000"/>
+                </a:solidFill>
+                <a:uFill>
+                  <a:solidFill>
+                    <a:srgbClr val="ffffff"/>
+                  </a:solidFill>
+                </a:uFill>
+                <a:latin typeface="Arial"/>
+              </a:rPr>
+              <a:t>Seventh Outline Level</a:t>
+            </a:r>
+            <a:endParaRPr b="0" lang="en-US" sz="1800" spc="-1" strike="noStrike">
               <a:solidFill>
                 <a:srgbClr val="000000"/>
               </a:solidFill>
@@ -1579,7 +1847,7 @@
       </p:grpSpPr>
       <p:pic>
         <p:nvPicPr>
-          <p:cNvPr id="35" name="" descr=""/>
+          <p:cNvPr id="36" name="" descr=""/>
           <p:cNvPicPr/>
           <p:nvPr/>
         </p:nvPicPr>
@@ -1590,31 +1858,7 @@
         <p:spPr>
           <a:xfrm>
             <a:off x="15544800" y="9628560"/>
-            <a:ext cx="14171040" cy="12717000"/>
-          </a:xfrm>
-          <a:prstGeom prst="rect">
-            <a:avLst/>
-          </a:prstGeom>
-          <a:ln>
-            <a:noFill/>
-          </a:ln>
-        </p:spPr>
-      </p:pic>
-      <p:pic>
-        <p:nvPicPr>
-          <p:cNvPr id="36" name="" descr=""/>
-          <p:cNvPicPr/>
-          <p:nvPr/>
-        </p:nvPicPr>
-        <p:blipFill>
-          <a:blip r:embed="rId2"/>
-          <a:srcRect l="17464" t="0" r="4773" b="0"/>
-          <a:stretch/>
-        </p:blipFill>
-        <p:spPr>
-          <a:xfrm>
-            <a:off x="16844760" y="26538840"/>
-            <a:ext cx="12596760" cy="12974760"/>
+            <a:ext cx="14170680" cy="12716640"/>
           </a:xfrm>
           <a:prstGeom prst="rect">
             <a:avLst/>
@@ -1631,14 +1875,14 @@
           <p:nvPr/>
         </p:nvPicPr>
         <p:blipFill>
-          <a:blip r:embed="rId3"/>
-          <a:srcRect l="0" t="3291" r="0" b="0"/>
+          <a:blip r:embed="rId2"/>
+          <a:srcRect l="17463" t="0" r="4773" b="0"/>
           <a:stretch/>
         </p:blipFill>
         <p:spPr>
           <a:xfrm>
-            <a:off x="23045400" y="33350760"/>
-            <a:ext cx="1697400" cy="1825200"/>
+            <a:off x="16844760" y="26538840"/>
+            <a:ext cx="12596400" cy="12974400"/>
           </a:xfrm>
           <a:prstGeom prst="rect">
             <a:avLst/>
@@ -1655,13 +1899,37 @@
           <p:nvPr/>
         </p:nvPicPr>
         <p:blipFill>
+          <a:blip r:embed="rId3"/>
+          <a:srcRect l="0" t="3291" r="0" b="0"/>
+          <a:stretch/>
+        </p:blipFill>
+        <p:spPr>
+          <a:xfrm>
+            <a:off x="23045400" y="33350760"/>
+            <a:ext cx="1697040" cy="1824840"/>
+          </a:xfrm>
+          <a:prstGeom prst="rect">
+            <a:avLst/>
+          </a:prstGeom>
+          <a:ln>
+            <a:noFill/>
+          </a:ln>
+        </p:spPr>
+      </p:pic>
+      <p:pic>
+        <p:nvPicPr>
+          <p:cNvPr id="39" name="" descr=""/>
+          <p:cNvPicPr/>
+          <p:nvPr/>
+        </p:nvPicPr>
+        <p:blipFill>
           <a:blip r:embed="rId4"/>
           <a:stretch/>
         </p:blipFill>
         <p:spPr>
           <a:xfrm>
             <a:off x="21903480" y="32142600"/>
-            <a:ext cx="1076760" cy="3117960"/>
+            <a:ext cx="1076400" cy="3117600"/>
           </a:xfrm>
           <a:prstGeom prst="rect">
             <a:avLst/>
@@ -1673,14 +1941,14 @@
       </p:pic>
       <p:sp>
         <p:nvSpPr>
-          <p:cNvPr id="39" name="CustomShape 1"/>
+          <p:cNvPr id="40" name="CustomShape 1"/>
           <p:cNvSpPr/>
           <p:nvPr/>
         </p:nvSpPr>
         <p:spPr>
           <a:xfrm rot="20922000">
             <a:off x="22031280" y="26717040"/>
-            <a:ext cx="454320" cy="1004400"/>
+            <a:ext cx="453960" cy="1004040"/>
           </a:xfrm>
           <a:prstGeom prst="ellipse">
             <a:avLst/>
@@ -1702,14 +1970,14 @@
       </p:sp>
       <p:sp>
         <p:nvSpPr>
-          <p:cNvPr id="40" name="CustomShape 2"/>
+          <p:cNvPr id="41" name="CustomShape 2"/>
           <p:cNvSpPr/>
           <p:nvPr/>
         </p:nvSpPr>
         <p:spPr>
           <a:xfrm>
             <a:off x="17812800" y="27051840"/>
-            <a:ext cx="1995120" cy="1002960"/>
+            <a:ext cx="1994760" cy="1002600"/>
           </a:xfrm>
           <a:prstGeom prst="rect">
             <a:avLst/>
@@ -1764,7 +2032,7 @@
       </p:sp>
       <p:sp>
         <p:nvSpPr>
-          <p:cNvPr id="41" name="Line 3"/>
+          <p:cNvPr id="42" name="Line 3"/>
           <p:cNvSpPr/>
           <p:nvPr/>
         </p:nvSpPr>
@@ -1791,7 +2059,7 @@
       </p:sp>
       <p:pic>
         <p:nvPicPr>
-          <p:cNvPr id="42" name="" descr=""/>
+          <p:cNvPr id="43" name="" descr=""/>
           <p:cNvPicPr/>
           <p:nvPr/>
         </p:nvPicPr>
@@ -1802,7 +2070,7 @@
         <p:spPr>
           <a:xfrm>
             <a:off x="7680960" y="26805600"/>
-            <a:ext cx="9141840" cy="12269160"/>
+            <a:ext cx="9141480" cy="12268800"/>
           </a:xfrm>
           <a:prstGeom prst="rect">
             <a:avLst/>
@@ -1814,7 +2082,7 @@
       </p:pic>
       <p:pic>
         <p:nvPicPr>
-          <p:cNvPr id="43" name="" descr=""/>
+          <p:cNvPr id="44" name="" descr=""/>
           <p:cNvPicPr/>
           <p:nvPr/>
         </p:nvPicPr>
@@ -1825,7 +2093,7 @@
         <p:spPr>
           <a:xfrm>
             <a:off x="10457280" y="20920320"/>
-            <a:ext cx="4569840" cy="2558160"/>
+            <a:ext cx="4569480" cy="2557800"/>
           </a:xfrm>
           <a:prstGeom prst="rect">
             <a:avLst/>
@@ -1837,14 +2105,14 @@
       </p:pic>
       <p:sp>
         <p:nvSpPr>
-          <p:cNvPr id="44" name="CustomShape 4"/>
+          <p:cNvPr id="45" name="CustomShape 4"/>
           <p:cNvSpPr/>
           <p:nvPr/>
         </p:nvSpPr>
         <p:spPr>
           <a:xfrm>
             <a:off x="1170360" y="4239360"/>
-            <a:ext cx="27920520" cy="3013200"/>
+            <a:ext cx="27920160" cy="3012840"/>
           </a:xfrm>
           <a:prstGeom prst="rect">
             <a:avLst/>
@@ -1932,14 +2200,14 @@
       </p:sp>
       <p:sp>
         <p:nvSpPr>
-          <p:cNvPr id="45" name="CustomShape 5"/>
+          <p:cNvPr id="46" name="CustomShape 5"/>
           <p:cNvSpPr/>
           <p:nvPr/>
         </p:nvSpPr>
         <p:spPr>
           <a:xfrm>
             <a:off x="1170360" y="7155360"/>
-            <a:ext cx="27920520" cy="2488320"/>
+            <a:ext cx="27920160" cy="2487960"/>
           </a:xfrm>
           <a:prstGeom prst="rect">
             <a:avLst/>
@@ -2288,14 +2556,14 @@
       </p:sp>
       <p:sp>
         <p:nvSpPr>
-          <p:cNvPr id="46" name="CustomShape 6"/>
+          <p:cNvPr id="47" name="CustomShape 6"/>
           <p:cNvSpPr/>
           <p:nvPr/>
         </p:nvSpPr>
         <p:spPr>
           <a:xfrm>
             <a:off x="722520" y="39459240"/>
-            <a:ext cx="14395680" cy="1734120"/>
+            <a:ext cx="14395320" cy="1733760"/>
           </a:xfrm>
           <a:prstGeom prst="rect">
             <a:avLst/>
@@ -2350,14 +2618,14 @@
       </p:sp>
       <p:sp>
         <p:nvSpPr>
-          <p:cNvPr id="47" name="CustomShape 7"/>
+          <p:cNvPr id="48" name="CustomShape 7"/>
           <p:cNvSpPr/>
           <p:nvPr/>
         </p:nvSpPr>
         <p:spPr>
           <a:xfrm>
             <a:off x="15318000" y="39461040"/>
-            <a:ext cx="14395680" cy="2021400"/>
+            <a:ext cx="14395320" cy="2021040"/>
           </a:xfrm>
           <a:prstGeom prst="rect">
             <a:avLst/>
@@ -2394,25 +2662,25 @@
                 <a:latin typeface="Arial"/>
                 <a:ea typeface="DejaVu Sans"/>
               </a:rPr>
-              <a:t>[1] Kooistra and Volkamer. Ann Rep Med Chem. 2017, 50, 263-299. [2] van Linden et al. J Med Chem. 2014, 57, 249-77. [3] Schalon et al. Proteins. 2008, 71, 1755-78. [4] Cock et al. Bioinformatics 2009, 25, 1422-3. [5] Hamelryck. Proteins 2005, 59, 38-48. [6] Ballester and Richards. J Comp Chem. 2007, 28, 1711-23. [7] Eid et al. BMC Bioinf 2017, 18. [8] Karaman et al. Nature Biotech 2008, 26, 127-32. [9] Manning et al. Science. 2002, 298, 1912-34. [10] Picado et al. ACS National Meeting Orlando 2019 (poster).</a:t>
-            </a:r>
-            <a:endParaRPr b="0" lang="en-US" sz="1800" spc="-1" strike="noStrike">
-              <a:solidFill>
-                <a:srgbClr val="000000"/>
-              </a:solidFill>
-              <a:uFill>
-                <a:solidFill>
-                  <a:srgbClr val="ffffff"/>
-                </a:solidFill>
-              </a:uFill>
-              <a:latin typeface="Arial"/>
-            </a:endParaRPr>
-          </a:p>
-        </p:txBody>
-      </p:sp>
-      <p:sp>
-        <p:nvSpPr>
-          <p:cNvPr id="48" name="Line 8"/>
+              <a:t>[1] Kooistra and Volkamer. Ann Rep Med Chem 2017, 50, 263-299. [2] van Linden et al. J Med Chem 2014, 57, 249-77. [3] Schalon et al. Proteins 2008, 71, 1755-78. [4] Cock et al. Bioinformatics 2009, 25, 1422-3. [5] Hamelryck. Proteins 2005, 59, 38-48. [6] Ballester and Richards. J Comp Chem 2007, 28, 1711-23. [7] Eid et al. BMC Bioinf 2017, 18. [8] Karaman et al. Nature Biotech 2008, 26, 127-32. [9] Manning et al. Science 2002, 298, 1912-34. [10] Picado et al. ACS National Meeting Orlando 2019 (poster).</a:t>
+            </a:r>
+            <a:endParaRPr b="0" lang="en-US" sz="1800" spc="-1" strike="noStrike">
+              <a:solidFill>
+                <a:srgbClr val="000000"/>
+              </a:solidFill>
+              <a:uFill>
+                <a:solidFill>
+                  <a:srgbClr val="ffffff"/>
+                </a:solidFill>
+              </a:uFill>
+              <a:latin typeface="Arial"/>
+            </a:endParaRPr>
+          </a:p>
+        </p:txBody>
+      </p:sp>
+      <p:sp>
+        <p:nvSpPr>
+          <p:cNvPr id="49" name="Line 8"/>
           <p:cNvSpPr/>
           <p:nvPr/>
         </p:nvSpPr>
@@ -2441,7 +2709,7 @@
       </p:sp>
       <p:sp>
         <p:nvSpPr>
-          <p:cNvPr id="49" name="Line 9"/>
+          <p:cNvPr id="50" name="Line 9"/>
           <p:cNvSpPr/>
           <p:nvPr/>
         </p:nvSpPr>
@@ -2470,7 +2738,7 @@
       </p:sp>
       <p:sp>
         <p:nvSpPr>
-          <p:cNvPr id="50" name="Line 10"/>
+          <p:cNvPr id="51" name="Line 10"/>
           <p:cNvSpPr/>
           <p:nvPr/>
         </p:nvSpPr>
@@ -2499,7 +2767,7 @@
       </p:sp>
       <p:pic>
         <p:nvPicPr>
-          <p:cNvPr id="51" name="" descr=""/>
+          <p:cNvPr id="52" name="" descr=""/>
           <p:cNvPicPr/>
           <p:nvPr/>
         </p:nvPicPr>
@@ -2511,7 +2779,7 @@
         <p:spPr>
           <a:xfrm>
             <a:off x="0" y="2845440"/>
-            <a:ext cx="30265560" cy="721080"/>
+            <a:ext cx="30265200" cy="720720"/>
           </a:xfrm>
           <a:prstGeom prst="rect">
             <a:avLst/>
@@ -2523,7 +2791,7 @@
       </p:pic>
       <p:pic>
         <p:nvPicPr>
-          <p:cNvPr id="52" name="" descr=""/>
+          <p:cNvPr id="53" name="" descr=""/>
           <p:cNvPicPr/>
           <p:nvPr/>
         </p:nvPicPr>
@@ -2534,7 +2802,7 @@
         <p:spPr>
           <a:xfrm>
             <a:off x="12851640" y="912240"/>
-            <a:ext cx="4561920" cy="1681560"/>
+            <a:ext cx="4561560" cy="1681200"/>
           </a:xfrm>
           <a:prstGeom prst="rect">
             <a:avLst/>
@@ -2546,7 +2814,7 @@
       </p:pic>
       <p:sp>
         <p:nvSpPr>
-          <p:cNvPr id="53" name="Line 11"/>
+          <p:cNvPr id="54" name="Line 11"/>
           <p:cNvSpPr/>
           <p:nvPr/>
         </p:nvSpPr>
@@ -2574,14 +2842,14 @@
       </p:sp>
       <p:sp>
         <p:nvSpPr>
-          <p:cNvPr id="54" name="CustomShape 12"/>
+          <p:cNvPr id="55" name="CustomShape 12"/>
           <p:cNvSpPr/>
           <p:nvPr/>
         </p:nvSpPr>
         <p:spPr>
           <a:xfrm>
             <a:off x="722520" y="17115840"/>
-            <a:ext cx="14395680" cy="4141440"/>
+            <a:ext cx="14395320" cy="4141080"/>
           </a:xfrm>
           <a:prstGeom prst="rect">
             <a:avLst/>
@@ -2945,14 +3213,14 @@
       </p:sp>
       <p:sp>
         <p:nvSpPr>
-          <p:cNvPr id="55" name="CustomShape 13"/>
+          <p:cNvPr id="56" name="CustomShape 13"/>
           <p:cNvSpPr/>
           <p:nvPr/>
         </p:nvSpPr>
         <p:spPr>
           <a:xfrm>
             <a:off x="722520" y="24284160"/>
-            <a:ext cx="14399640" cy="2091960"/>
+            <a:ext cx="14399280" cy="2091600"/>
           </a:xfrm>
           <a:prstGeom prst="rect">
             <a:avLst/>
@@ -3037,14 +3305,14 @@
       </p:sp>
       <p:sp>
         <p:nvSpPr>
-          <p:cNvPr id="56" name="CustomShape 14"/>
+          <p:cNvPr id="57" name="CustomShape 14"/>
           <p:cNvSpPr/>
           <p:nvPr/>
         </p:nvSpPr>
         <p:spPr>
           <a:xfrm>
             <a:off x="720000" y="38268000"/>
-            <a:ext cx="14395680" cy="1650600"/>
+            <a:ext cx="14395320" cy="1650240"/>
           </a:xfrm>
           <a:prstGeom prst="rect">
             <a:avLst/>
@@ -3063,14 +3331,14 @@
       </p:sp>
       <p:sp>
         <p:nvSpPr>
-          <p:cNvPr id="57" name="CustomShape 15"/>
+          <p:cNvPr id="58" name="CustomShape 15"/>
           <p:cNvSpPr/>
           <p:nvPr/>
         </p:nvSpPr>
         <p:spPr>
           <a:xfrm>
             <a:off x="720000" y="21286800"/>
-            <a:ext cx="9519120" cy="2467080"/>
+            <a:ext cx="9518760" cy="2466720"/>
           </a:xfrm>
           <a:prstGeom prst="rect">
             <a:avLst/>
@@ -3194,14 +3462,14 @@
       </p:sp>
       <p:sp>
         <p:nvSpPr>
-          <p:cNvPr id="58" name="CustomShape 16"/>
+          <p:cNvPr id="59" name="CustomShape 16"/>
           <p:cNvSpPr/>
           <p:nvPr/>
         </p:nvSpPr>
         <p:spPr>
           <a:xfrm>
             <a:off x="720000" y="10044000"/>
-            <a:ext cx="14395680" cy="2895120"/>
+            <a:ext cx="14395320" cy="2894760"/>
           </a:xfrm>
           <a:prstGeom prst="rect">
             <a:avLst/>
@@ -3256,14 +3524,14 @@
       </p:sp>
       <p:sp>
         <p:nvSpPr>
-          <p:cNvPr id="59" name="CustomShape 17"/>
+          <p:cNvPr id="60" name="CustomShape 17"/>
           <p:cNvSpPr/>
           <p:nvPr/>
         </p:nvSpPr>
         <p:spPr>
           <a:xfrm>
             <a:off x="720000" y="9396000"/>
-            <a:ext cx="14398200" cy="636480"/>
+            <a:ext cx="14397840" cy="636120"/>
           </a:xfrm>
           <a:prstGeom prst="rect">
             <a:avLst/>
@@ -3318,14 +3586,14 @@
       </p:sp>
       <p:sp>
         <p:nvSpPr>
-          <p:cNvPr id="60" name="CustomShape 18"/>
+          <p:cNvPr id="61" name="CustomShape 18"/>
           <p:cNvSpPr/>
           <p:nvPr/>
         </p:nvSpPr>
         <p:spPr>
           <a:xfrm>
             <a:off x="720000" y="12996000"/>
-            <a:ext cx="14398200" cy="636480"/>
+            <a:ext cx="14397840" cy="636120"/>
           </a:xfrm>
           <a:prstGeom prst="rect">
             <a:avLst/>
@@ -3434,14 +3702,14 @@
       </p:sp>
       <p:sp>
         <p:nvSpPr>
-          <p:cNvPr id="61" name="CustomShape 19"/>
+          <p:cNvPr id="62" name="CustomShape 19"/>
           <p:cNvSpPr/>
           <p:nvPr/>
         </p:nvSpPr>
         <p:spPr>
           <a:xfrm>
             <a:off x="722520" y="15202440"/>
-            <a:ext cx="14395680" cy="1334880"/>
+            <a:ext cx="14395320" cy="1334520"/>
           </a:xfrm>
           <a:prstGeom prst="rect">
             <a:avLst/>
@@ -3673,14 +3941,14 @@
       </p:sp>
       <p:sp>
         <p:nvSpPr>
-          <p:cNvPr id="62" name="CustomShape 20"/>
+          <p:cNvPr id="63" name="CustomShape 20"/>
           <p:cNvSpPr/>
           <p:nvPr/>
         </p:nvSpPr>
         <p:spPr>
           <a:xfrm>
             <a:off x="720000" y="13666320"/>
-            <a:ext cx="14395680" cy="1368000"/>
+            <a:ext cx="14395320" cy="1367640"/>
           </a:xfrm>
           <a:prstGeom prst="rect">
             <a:avLst/>
@@ -3789,14 +4057,14 @@
       </p:sp>
       <p:sp>
         <p:nvSpPr>
-          <p:cNvPr id="63" name="CustomShape 21"/>
+          <p:cNvPr id="64" name="CustomShape 21"/>
           <p:cNvSpPr/>
           <p:nvPr/>
         </p:nvSpPr>
         <p:spPr>
           <a:xfrm>
             <a:off x="722520" y="23645880"/>
-            <a:ext cx="14395680" cy="636480"/>
+            <a:ext cx="14395320" cy="636120"/>
           </a:xfrm>
           <a:prstGeom prst="rect">
             <a:avLst/>
@@ -3902,14 +4170,14 @@
       </p:sp>
       <p:sp>
         <p:nvSpPr>
-          <p:cNvPr id="64" name="CustomShape 22"/>
+          <p:cNvPr id="65" name="CustomShape 22"/>
           <p:cNvSpPr/>
           <p:nvPr/>
         </p:nvSpPr>
         <p:spPr>
           <a:xfrm>
             <a:off x="15316200" y="22511880"/>
-            <a:ext cx="14398200" cy="653400"/>
+            <a:ext cx="14397840" cy="653040"/>
           </a:xfrm>
           <a:prstGeom prst="rect">
             <a:avLst/>
@@ -4039,14 +4307,14 @@
       </p:sp>
       <p:sp>
         <p:nvSpPr>
-          <p:cNvPr id="65" name="CustomShape 23"/>
+          <p:cNvPr id="66" name="CustomShape 23"/>
           <p:cNvSpPr/>
           <p:nvPr/>
         </p:nvSpPr>
         <p:spPr>
           <a:xfrm>
             <a:off x="15316200" y="12003840"/>
-            <a:ext cx="1002240" cy="455760"/>
+            <a:ext cx="1001880" cy="455400"/>
           </a:xfrm>
           <a:prstGeom prst="rect">
             <a:avLst/>
@@ -4096,14 +4364,14 @@
       </p:sp>
       <p:sp>
         <p:nvSpPr>
-          <p:cNvPr id="66" name="CustomShape 24"/>
+          <p:cNvPr id="67" name="CustomShape 24"/>
           <p:cNvSpPr/>
           <p:nvPr/>
         </p:nvSpPr>
         <p:spPr>
           <a:xfrm>
             <a:off x="15316200" y="16859520"/>
-            <a:ext cx="1002240" cy="455760"/>
+            <a:ext cx="1001880" cy="455400"/>
           </a:xfrm>
           <a:prstGeom prst="rect">
             <a:avLst/>
@@ -4153,14 +4421,14 @@
       </p:sp>
       <p:sp>
         <p:nvSpPr>
-          <p:cNvPr id="67" name="CustomShape 25"/>
+          <p:cNvPr id="68" name="CustomShape 25"/>
           <p:cNvSpPr/>
           <p:nvPr/>
         </p:nvSpPr>
         <p:spPr>
           <a:xfrm>
             <a:off x="-12638160" y="39564000"/>
-            <a:ext cx="10603440" cy="936720"/>
+            <a:ext cx="10603080" cy="936360"/>
           </a:xfrm>
           <a:prstGeom prst="rect">
             <a:avLst/>
@@ -4179,14 +4447,14 @@
       </p:sp>
       <p:sp>
         <p:nvSpPr>
-          <p:cNvPr id="68" name="CustomShape 26"/>
+          <p:cNvPr id="69" name="CustomShape 26"/>
           <p:cNvSpPr/>
           <p:nvPr/>
         </p:nvSpPr>
         <p:spPr>
           <a:xfrm>
             <a:off x="15318000" y="38753640"/>
-            <a:ext cx="14395680" cy="2681280"/>
+            <a:ext cx="14395320" cy="2680920"/>
           </a:xfrm>
           <a:prstGeom prst="rect">
             <a:avLst/>
@@ -4241,14 +4509,14 @@
       </p:sp>
       <p:sp>
         <p:nvSpPr>
-          <p:cNvPr id="69" name="CustomShape 27"/>
+          <p:cNvPr id="70" name="CustomShape 27"/>
           <p:cNvSpPr/>
           <p:nvPr/>
         </p:nvSpPr>
         <p:spPr>
           <a:xfrm>
             <a:off x="722520" y="38752200"/>
-            <a:ext cx="14395680" cy="2241720"/>
+            <a:ext cx="14395320" cy="2241360"/>
           </a:xfrm>
           <a:prstGeom prst="rect">
             <a:avLst/>
@@ -4303,14 +4571,14 @@
       </p:sp>
       <p:sp>
         <p:nvSpPr>
-          <p:cNvPr id="70" name="CustomShape 28"/>
+          <p:cNvPr id="71" name="CustomShape 28"/>
           <p:cNvSpPr/>
           <p:nvPr/>
         </p:nvSpPr>
         <p:spPr>
           <a:xfrm>
             <a:off x="722520" y="35071200"/>
-            <a:ext cx="6681960" cy="3422880"/>
+            <a:ext cx="6681600" cy="3422520"/>
           </a:xfrm>
           <a:prstGeom prst="rect">
             <a:avLst/>
@@ -4470,14 +4738,14 @@
       </p:sp>
       <p:sp>
         <p:nvSpPr>
-          <p:cNvPr id="71" name="CustomShape 29"/>
+          <p:cNvPr id="72" name="CustomShape 29"/>
           <p:cNvSpPr/>
           <p:nvPr/>
         </p:nvSpPr>
         <p:spPr>
           <a:xfrm>
             <a:off x="12056760" y="27262800"/>
-            <a:ext cx="1931400" cy="592920"/>
+            <a:ext cx="1931040" cy="592560"/>
           </a:xfrm>
           <a:prstGeom prst="rect">
             <a:avLst/>
@@ -4598,14 +4866,14 @@
       </p:sp>
       <p:sp>
         <p:nvSpPr>
-          <p:cNvPr id="72" name="CustomShape 30"/>
+          <p:cNvPr id="73" name="CustomShape 30"/>
           <p:cNvSpPr/>
           <p:nvPr/>
         </p:nvSpPr>
         <p:spPr>
           <a:xfrm rot="2700000">
-            <a:off x="18664560" y="36824400"/>
-            <a:ext cx="454320" cy="735120"/>
+            <a:off x="18664560" y="36824040"/>
+            <a:ext cx="453960" cy="734760"/>
           </a:xfrm>
           <a:prstGeom prst="ellipse">
             <a:avLst/>
@@ -4627,7 +4895,7 @@
       </p:sp>
       <p:sp>
         <p:nvSpPr>
-          <p:cNvPr id="73" name="Line 31"/>
+          <p:cNvPr id="74" name="Line 31"/>
           <p:cNvSpPr/>
           <p:nvPr/>
         </p:nvSpPr>
@@ -4654,14 +4922,14 @@
       </p:sp>
       <p:sp>
         <p:nvSpPr>
-          <p:cNvPr id="74" name="CustomShape 32"/>
+          <p:cNvPr id="75" name="CustomShape 32"/>
           <p:cNvSpPr/>
           <p:nvPr/>
         </p:nvSpPr>
         <p:spPr>
           <a:xfrm>
             <a:off x="16288200" y="36287280"/>
-            <a:ext cx="1995120" cy="1002960"/>
+            <a:ext cx="1994760" cy="1002600"/>
           </a:xfrm>
           <a:prstGeom prst="rect">
             <a:avLst/>
@@ -4782,7 +5050,7 @@
       </p:sp>
       <p:sp>
         <p:nvSpPr>
-          <p:cNvPr id="75" name="Line 33"/>
+          <p:cNvPr id="76" name="Line 33"/>
           <p:cNvSpPr/>
           <p:nvPr/>
         </p:nvSpPr>
@@ -4809,7 +5077,7 @@
       </p:sp>
       <p:sp>
         <p:nvSpPr>
-          <p:cNvPr id="76" name="Line 34"/>
+          <p:cNvPr id="77" name="Line 34"/>
           <p:cNvSpPr/>
           <p:nvPr/>
         </p:nvSpPr>
@@ -4836,7 +5104,7 @@
       </p:sp>
       <p:pic>
         <p:nvPicPr>
-          <p:cNvPr id="77" name="" descr=""/>
+          <p:cNvPr id="78" name="" descr=""/>
           <p:cNvPicPr/>
           <p:nvPr/>
         </p:nvPicPr>
@@ -4848,7 +5116,7 @@
         <p:spPr>
           <a:xfrm>
             <a:off x="506520" y="26567280"/>
-            <a:ext cx="6855480" cy="8532000"/>
+            <a:ext cx="6855120" cy="8531640"/>
           </a:xfrm>
           <a:prstGeom prst="rect">
             <a:avLst/>
@@ -4860,14 +5128,14 @@
       </p:pic>
       <p:sp>
         <p:nvSpPr>
-          <p:cNvPr id="78" name="CustomShape 35"/>
+          <p:cNvPr id="79" name="CustomShape 35"/>
           <p:cNvSpPr/>
           <p:nvPr/>
         </p:nvSpPr>
         <p:spPr>
           <a:xfrm>
             <a:off x="15316200" y="24284160"/>
-            <a:ext cx="14114160" cy="2110320"/>
+            <a:ext cx="14113800" cy="2109960"/>
           </a:xfrm>
           <a:prstGeom prst="rect">
             <a:avLst/>
@@ -4904,7 +5172,7 @@
                 <a:latin typeface="Arial"/>
                 <a:ea typeface="DejaVu Sans"/>
               </a:rPr>
-              <a:t>Furthermore, clustering of all similarity scores for the kinase pairs (253x253 similarity matrix) shows that our method can reproduce the Manning classification [9] in large part, however also reveals new relationships such as the aforementioned STE kinases within the TK group or the grouping of DRAK2 (DAPK) with CaMKK2 (Other), a reported off-target of DRAK2 inhibitors [10] (</a:t>
+              <a:t>Furthermore, clustering of all similarity scores for the kinase pairs (253x253 similarity matrix) shows that our method can reproduce the Manning classification [9] in large part. However, it also reveals new relationships such as the aforementioned STE kinases within the TK group or the grouping of DRAK2 (DAPK) with CaMKK2 (Other), a reported off-target of DRAK2 inhibitors [10] (</a:t>
             </a:r>
             <a:r>
               <a:rPr b="1" lang="en-US" sz="2600" spc="-1" strike="noStrike">
@@ -4970,14 +5238,14 @@
       </p:sp>
       <p:sp>
         <p:nvSpPr>
-          <p:cNvPr id="79" name="CustomShape 36"/>
+          <p:cNvPr id="80" name="CustomShape 36"/>
           <p:cNvSpPr/>
           <p:nvPr/>
         </p:nvSpPr>
         <p:spPr>
           <a:xfrm>
             <a:off x="7315200" y="26713440"/>
-            <a:ext cx="1002240" cy="455760"/>
+            <a:ext cx="1001880" cy="455400"/>
           </a:xfrm>
           <a:prstGeom prst="rect">
             <a:avLst/>
@@ -5027,14 +5295,14 @@
       </p:sp>
       <p:sp>
         <p:nvSpPr>
-          <p:cNvPr id="80" name="CustomShape 37"/>
+          <p:cNvPr id="81" name="CustomShape 37"/>
           <p:cNvSpPr/>
           <p:nvPr/>
         </p:nvSpPr>
         <p:spPr>
           <a:xfrm>
             <a:off x="722520" y="26713440"/>
-            <a:ext cx="1002240" cy="455760"/>
+            <a:ext cx="1001880" cy="455400"/>
           </a:xfrm>
           <a:prstGeom prst="rect">
             <a:avLst/>
@@ -5084,14 +5352,14 @@
       </p:sp>
       <p:sp>
         <p:nvSpPr>
-          <p:cNvPr id="81" name="CustomShape 38"/>
+          <p:cNvPr id="82" name="CustomShape 38"/>
           <p:cNvSpPr/>
           <p:nvPr/>
         </p:nvSpPr>
         <p:spPr>
           <a:xfrm>
             <a:off x="15316200" y="26713440"/>
-            <a:ext cx="1002240" cy="455760"/>
+            <a:ext cx="1001880" cy="455400"/>
           </a:xfrm>
           <a:prstGeom prst="rect">
             <a:avLst/>
@@ -5139,8 +5407,93 @@
           </a:p>
         </p:txBody>
       </p:sp>
+      <p:sp>
+        <p:nvSpPr>
+          <p:cNvPr id="83" name="CustomShape 39"/>
+          <p:cNvSpPr/>
+          <p:nvPr/>
+        </p:nvSpPr>
+        <p:spPr>
+          <a:xfrm rot="17253600">
+            <a:off x="17177760" y="31566600"/>
+            <a:ext cx="313920" cy="702360"/>
+          </a:xfrm>
+          <a:prstGeom prst="ellipse">
+            <a:avLst/>
+          </a:prstGeom>
+          <a:noFill/>
+          <a:ln w="12600">
+            <a:solidFill>
+              <a:srgbClr val="333333"/>
+            </a:solidFill>
+            <a:round/>
+          </a:ln>
+        </p:spPr>
+        <p:style>
+          <a:lnRef idx="0"/>
+          <a:fillRef idx="0"/>
+          <a:effectRef idx="0"/>
+          <a:fontRef idx="minor"/>
+        </p:style>
+      </p:sp>
+      <p:sp>
+        <p:nvSpPr>
+          <p:cNvPr id="84" name="CustomShape 40"/>
+          <p:cNvSpPr/>
+          <p:nvPr/>
+        </p:nvSpPr>
+        <p:spPr>
+          <a:xfrm rot="12765600">
+            <a:off x="26308080" y="28033200"/>
+            <a:ext cx="313920" cy="702360"/>
+          </a:xfrm>
+          <a:prstGeom prst="ellipse">
+            <a:avLst/>
+          </a:prstGeom>
+          <a:noFill/>
+          <a:ln w="12600">
+            <a:solidFill>
+              <a:srgbClr val="333333"/>
+            </a:solidFill>
+            <a:round/>
+          </a:ln>
+        </p:spPr>
+        <p:style>
+          <a:lnRef idx="0"/>
+          <a:fillRef idx="0"/>
+          <a:effectRef idx="0"/>
+          <a:fontRef idx="minor"/>
+        </p:style>
+      </p:sp>
     </p:spTree>
   </p:cSld>
+  <p:timing>
+    <p:tnLst>
+      <p:par>
+        <p:cTn id="1" dur="indefinite" restart="never" nodeType="tmRoot">
+          <p:childTnLst>
+            <p:seq>
+              <p:cTn id="2" nodeType="mainSeq"/>
+              <p:prevCondLst>
+                <p:cond delay="0" evt="onPrev">
+                  <p:tgtEl>
+                    <p:sldTgt/>
+                  </p:tgtEl>
+                </p:cond>
+              </p:prevCondLst>
+              <p:nextCondLst>
+                <p:cond delay="0" evt="onNext">
+                  <p:tgtEl>
+                    <p:sldTgt/>
+                  </p:tgtEl>
+                </p:cond>
+              </p:nextCondLst>
+            </p:seq>
+          </p:childTnLst>
+        </p:cTn>
+      </p:par>
+    </p:tnLst>
+  </p:timing>
 </p:sld>
 </file>
 

</xml_diff>